<commit_message>
Update diagrams for model to match current structure
</commit_message>
<xml_diff>
--- a/docs/diagrams/Diagrams.pptx
+++ b/docs/diagrams/Diagrams.pptx
@@ -216,7 +216,7 @@
           <a:p>
             <a:fld id="{F5CC4B3F-88C1-4FFA-B1B6-F41C21DC6924}" type="datetimeFigureOut">
               <a:rPr lang="en-US" smtClean="0"/>
-              <a:t>10/4/2016</a:t>
+              <a:t>10/11/2016</a:t>
             </a:fld>
             <a:endParaRPr lang="en-US"/>
           </a:p>
@@ -665,7 +665,7 @@
           <a:p>
             <a:fld id="{78C97017-6FC3-485B-9764-EAC9E56C1D49}" type="datetimeFigureOut">
               <a:rPr lang="en-US" smtClean="0"/>
-              <a:t>10/4/2016</a:t>
+              <a:t>10/11/2016</a:t>
             </a:fld>
             <a:endParaRPr lang="en-US"/>
           </a:p>
@@ -835,7 +835,7 @@
           <a:p>
             <a:fld id="{78C97017-6FC3-485B-9764-EAC9E56C1D49}" type="datetimeFigureOut">
               <a:rPr lang="en-US" smtClean="0"/>
-              <a:t>10/4/2016</a:t>
+              <a:t>10/11/2016</a:t>
             </a:fld>
             <a:endParaRPr lang="en-US"/>
           </a:p>
@@ -1015,7 +1015,7 @@
           <a:p>
             <a:fld id="{78C97017-6FC3-485B-9764-EAC9E56C1D49}" type="datetimeFigureOut">
               <a:rPr lang="en-US" smtClean="0"/>
-              <a:t>10/4/2016</a:t>
+              <a:t>10/11/2016</a:t>
             </a:fld>
             <a:endParaRPr lang="en-US"/>
           </a:p>
@@ -1185,7 +1185,7 @@
           <a:p>
             <a:fld id="{78C97017-6FC3-485B-9764-EAC9E56C1D49}" type="datetimeFigureOut">
               <a:rPr lang="en-US" smtClean="0"/>
-              <a:t>10/4/2016</a:t>
+              <a:t>10/11/2016</a:t>
             </a:fld>
             <a:endParaRPr lang="en-US"/>
           </a:p>
@@ -1431,7 +1431,7 @@
           <a:p>
             <a:fld id="{78C97017-6FC3-485B-9764-EAC9E56C1D49}" type="datetimeFigureOut">
               <a:rPr lang="en-US" smtClean="0"/>
-              <a:t>10/4/2016</a:t>
+              <a:t>10/11/2016</a:t>
             </a:fld>
             <a:endParaRPr lang="en-US"/>
           </a:p>
@@ -1719,7 +1719,7 @@
           <a:p>
             <a:fld id="{78C97017-6FC3-485B-9764-EAC9E56C1D49}" type="datetimeFigureOut">
               <a:rPr lang="en-US" smtClean="0"/>
-              <a:t>10/4/2016</a:t>
+              <a:t>10/11/2016</a:t>
             </a:fld>
             <a:endParaRPr lang="en-US"/>
           </a:p>
@@ -2141,7 +2141,7 @@
           <a:p>
             <a:fld id="{78C97017-6FC3-485B-9764-EAC9E56C1D49}" type="datetimeFigureOut">
               <a:rPr lang="en-US" smtClean="0"/>
-              <a:t>10/4/2016</a:t>
+              <a:t>10/11/2016</a:t>
             </a:fld>
             <a:endParaRPr lang="en-US"/>
           </a:p>
@@ -2259,7 +2259,7 @@
           <a:p>
             <a:fld id="{78C97017-6FC3-485B-9764-EAC9E56C1D49}" type="datetimeFigureOut">
               <a:rPr lang="en-US" smtClean="0"/>
-              <a:t>10/4/2016</a:t>
+              <a:t>10/11/2016</a:t>
             </a:fld>
             <a:endParaRPr lang="en-US"/>
           </a:p>
@@ -2354,7 +2354,7 @@
           <a:p>
             <a:fld id="{78C97017-6FC3-485B-9764-EAC9E56C1D49}" type="datetimeFigureOut">
               <a:rPr lang="en-US" smtClean="0"/>
-              <a:t>10/4/2016</a:t>
+              <a:t>10/11/2016</a:t>
             </a:fld>
             <a:endParaRPr lang="en-US"/>
           </a:p>
@@ -2631,7 +2631,7 @@
           <a:p>
             <a:fld id="{78C97017-6FC3-485B-9764-EAC9E56C1D49}" type="datetimeFigureOut">
               <a:rPr lang="en-US" smtClean="0"/>
-              <a:t>10/4/2016</a:t>
+              <a:t>10/11/2016</a:t>
             </a:fld>
             <a:endParaRPr lang="en-US"/>
           </a:p>
@@ -2884,7 +2884,7 @@
           <a:p>
             <a:fld id="{78C97017-6FC3-485B-9764-EAC9E56C1D49}" type="datetimeFigureOut">
               <a:rPr lang="en-US" smtClean="0"/>
-              <a:t>10/4/2016</a:t>
+              <a:t>10/11/2016</a:t>
             </a:fld>
             <a:endParaRPr lang="en-US"/>
           </a:p>
@@ -3097,7 +3097,7 @@
           <a:p>
             <a:fld id="{78C97017-6FC3-485B-9764-EAC9E56C1D49}" type="datetimeFigureOut">
               <a:rPr lang="en-US" smtClean="0"/>
-              <a:t>10/4/2016</a:t>
+              <a:t>10/11/2016</a:t>
             </a:fld>
             <a:endParaRPr lang="en-US"/>
           </a:p>
@@ -13446,8 +13446,8 @@
         </p:nvCxnSpPr>
         <p:spPr>
           <a:xfrm flipV="1">
-            <a:off x="6477000" y="3204826"/>
-            <a:ext cx="190770" cy="405819"/>
+            <a:off x="6477000" y="2952155"/>
+            <a:ext cx="188848" cy="658490"/>
           </a:xfrm>
           <a:prstGeom prst="bentConnector2">
             <a:avLst/>
@@ -13487,13 +13487,13 @@
         </p:nvCxnSpPr>
         <p:spPr>
           <a:xfrm rot="5400000" flipH="1" flipV="1">
-            <a:off x="4360065" y="1080909"/>
-            <a:ext cx="378691" cy="4637261"/>
+            <a:off x="4242165" y="939993"/>
+            <a:ext cx="637507" cy="4660277"/>
           </a:xfrm>
           <a:prstGeom prst="bentConnector4">
             <a:avLst>
-              <a:gd name="adj1" fmla="val -101829"/>
-              <a:gd name="adj2" fmla="val 99976"/>
+              <a:gd name="adj1" fmla="val -62819"/>
+              <a:gd name="adj2" fmla="val 99978"/>
             </a:avLst>
           </a:prstGeom>
           <a:ln w="19050">
@@ -13649,7 +13649,7 @@
         </p:nvCxnSpPr>
         <p:spPr>
           <a:xfrm flipV="1">
-            <a:off x="6667770" y="2632344"/>
+            <a:off x="6665848" y="2379673"/>
             <a:ext cx="1612" cy="225722"/>
           </a:xfrm>
           <a:prstGeom prst="straightConnector1">
@@ -14051,7 +14051,7 @@
         </p:nvSpPr>
         <p:spPr>
           <a:xfrm>
-            <a:off x="4487017" y="2847371"/>
+            <a:off x="4487017" y="2583815"/>
             <a:ext cx="1156969" cy="346760"/>
           </a:xfrm>
           <a:prstGeom prst="rect">
@@ -14156,9 +14156,9 @@
           <p:nvPr/>
         </p:nvCxnSpPr>
         <p:spPr>
-          <a:xfrm>
-            <a:off x="4220351" y="2760681"/>
-            <a:ext cx="266666" cy="260070"/>
+          <a:xfrm flipV="1">
+            <a:off x="4220351" y="2757195"/>
+            <a:ext cx="266666" cy="3486"/>
           </a:xfrm>
           <a:prstGeom prst="bentConnector3">
             <a:avLst/>
@@ -14189,112 +14189,13 @@
       </p:cxnSp>
       <p:sp>
         <p:nvSpPr>
-          <p:cNvPr id="57" name="Rectangle 8"/>
-          <p:cNvSpPr/>
-          <p:nvPr/>
-        </p:nvSpPr>
-        <p:spPr>
-          <a:xfrm>
-            <a:off x="4503204" y="2280569"/>
-            <a:ext cx="1156969" cy="346760"/>
-          </a:xfrm>
-          <a:prstGeom prst="rect">
-            <a:avLst/>
-          </a:prstGeom>
-          <a:ln w="19050">
-            <a:solidFill>
-              <a:srgbClr val="7030A0"/>
-            </a:solidFill>
-          </a:ln>
-          <a:effectLst/>
-        </p:spPr>
-        <p:style>
-          <a:lnRef idx="1">
-            <a:schemeClr val="accent4"/>
-          </a:lnRef>
-          <a:fillRef idx="2">
-            <a:schemeClr val="accent4"/>
-          </a:fillRef>
-          <a:effectRef idx="1">
-            <a:schemeClr val="accent4"/>
-          </a:effectRef>
-          <a:fontRef idx="minor">
-            <a:schemeClr val="dk1"/>
-          </a:fontRef>
-        </p:style>
-        <p:txBody>
-          <a:bodyPr rtlCol="0" anchor="ctr"/>
-          <a:lstStyle/>
-          <a:p>
-            <a:pPr algn="ctr"/>
-            <a:r>
-              <a:rPr lang="en-US" sz="1050" dirty="0" err="1" smtClean="0">
-                <a:solidFill>
-                  <a:srgbClr val="7030A0"/>
-                </a:solidFill>
-              </a:rPr>
-              <a:t>UniqueTagList</a:t>
-            </a:r>
-            <a:endParaRPr lang="en-SG" sz="1050" dirty="0">
-              <a:solidFill>
-                <a:srgbClr val="7030A0"/>
-              </a:solidFill>
-            </a:endParaRPr>
-          </a:p>
-        </p:txBody>
-      </p:sp>
-      <p:cxnSp>
-        <p:nvCxnSpPr>
-          <p:cNvPr id="59" name="Elbow Connector 58"/>
-          <p:cNvCxnSpPr>
-            <a:stCxn id="51" idx="3"/>
-            <a:endCxn id="57" idx="1"/>
-          </p:cNvCxnSpPr>
-          <p:nvPr/>
-        </p:nvCxnSpPr>
-        <p:spPr>
-          <a:xfrm flipV="1">
-            <a:off x="4220351" y="2453949"/>
-            <a:ext cx="282853" cy="306732"/>
-          </a:xfrm>
-          <a:prstGeom prst="bentConnector3">
-            <a:avLst>
-              <a:gd name="adj1" fmla="val 50000"/>
-            </a:avLst>
-          </a:prstGeom>
-          <a:ln w="19050">
-            <a:solidFill>
-              <a:srgbClr val="7030A0"/>
-            </a:solidFill>
-            <a:headEnd type="none" w="med" len="med"/>
-            <a:tailEnd type="arrow" w="med" len="med"/>
-          </a:ln>
-          <a:effectLst/>
-        </p:spPr>
-        <p:style>
-          <a:lnRef idx="1">
-            <a:schemeClr val="accent2"/>
-          </a:lnRef>
-          <a:fillRef idx="2">
-            <a:schemeClr val="accent2"/>
-          </a:fillRef>
-          <a:effectRef idx="1">
-            <a:schemeClr val="accent2"/>
-          </a:effectRef>
-          <a:fontRef idx="minor">
-            <a:schemeClr val="dk1"/>
-          </a:fontRef>
-        </p:style>
-      </p:cxnSp>
-      <p:sp>
-        <p:nvSpPr>
           <p:cNvPr id="62" name="Rectangle 8"/>
           <p:cNvSpPr/>
           <p:nvPr/>
         </p:nvSpPr>
         <p:spPr>
           <a:xfrm>
-            <a:off x="6313677" y="2858066"/>
+            <a:off x="6311755" y="2605395"/>
             <a:ext cx="708186" cy="346760"/>
           </a:xfrm>
           <a:prstGeom prst="rect">
@@ -14350,7 +14251,7 @@
         </p:nvSpPr>
         <p:spPr>
           <a:xfrm>
-            <a:off x="5643227" y="2943979"/>
+            <a:off x="5641305" y="2691308"/>
             <a:ext cx="236048" cy="173380"/>
           </a:xfrm>
           <a:prstGeom prst="flowChartDecision">
@@ -14398,7 +14299,7 @@
         </p:nvCxnSpPr>
         <p:spPr>
           <a:xfrm>
-            <a:off x="5879275" y="3030669"/>
+            <a:off x="5877353" y="2777998"/>
             <a:ext cx="434402" cy="777"/>
           </a:xfrm>
           <a:prstGeom prst="bentConnector3">
@@ -14436,7 +14337,7 @@
         </p:nvSpPr>
         <p:spPr>
           <a:xfrm>
-            <a:off x="6315289" y="2285584"/>
+            <a:off x="6313367" y="2032913"/>
             <a:ext cx="708186" cy="346760"/>
           </a:xfrm>
           <a:prstGeom prst="rect">
@@ -14484,92 +14385,6 @@
           </a:p>
         </p:txBody>
       </p:sp>
-      <p:sp>
-        <p:nvSpPr>
-          <p:cNvPr id="68" name="Flowchart: Decision 96"/>
-          <p:cNvSpPr/>
-          <p:nvPr/>
-        </p:nvSpPr>
-        <p:spPr>
-          <a:xfrm>
-            <a:off x="5672547" y="2371497"/>
-            <a:ext cx="236048" cy="173380"/>
-          </a:xfrm>
-          <a:prstGeom prst="flowChartDecision">
-            <a:avLst/>
-          </a:prstGeom>
-          <a:noFill/>
-          <a:ln w="19050">
-            <a:solidFill>
-              <a:srgbClr val="7030A0"/>
-            </a:solidFill>
-          </a:ln>
-          <a:effectLst/>
-        </p:spPr>
-        <p:style>
-          <a:lnRef idx="1">
-            <a:schemeClr val="accent6"/>
-          </a:lnRef>
-          <a:fillRef idx="2">
-            <a:schemeClr val="accent6"/>
-          </a:fillRef>
-          <a:effectRef idx="1">
-            <a:schemeClr val="accent6"/>
-          </a:effectRef>
-          <a:fontRef idx="minor">
-            <a:schemeClr val="dk1"/>
-          </a:fontRef>
-        </p:style>
-        <p:txBody>
-          <a:bodyPr rtlCol="0" anchor="ctr"/>
-          <a:lstStyle/>
-          <a:p>
-            <a:pPr algn="ctr"/>
-            <a:endParaRPr lang="en-US" sz="1050"/>
-          </a:p>
-        </p:txBody>
-      </p:sp>
-      <p:cxnSp>
-        <p:nvCxnSpPr>
-          <p:cNvPr id="69" name="Elbow Connector 68"/>
-          <p:cNvCxnSpPr>
-            <a:stCxn id="68" idx="3"/>
-            <a:endCxn id="67" idx="1"/>
-          </p:cNvCxnSpPr>
-          <p:nvPr/>
-        </p:nvCxnSpPr>
-        <p:spPr>
-          <a:xfrm>
-            <a:off x="5908595" y="2458187"/>
-            <a:ext cx="406694" cy="777"/>
-          </a:xfrm>
-          <a:prstGeom prst="bentConnector3">
-            <a:avLst/>
-          </a:prstGeom>
-          <a:ln w="19050">
-            <a:solidFill>
-              <a:srgbClr val="7030A0"/>
-            </a:solidFill>
-            <a:headEnd type="none" w="med" len="med"/>
-            <a:tailEnd type="arrow" w="med" len="med"/>
-          </a:ln>
-          <a:effectLst/>
-        </p:spPr>
-        <p:style>
-          <a:lnRef idx="1">
-            <a:schemeClr val="accent2"/>
-          </a:lnRef>
-          <a:fillRef idx="2">
-            <a:schemeClr val="accent2"/>
-          </a:fillRef>
-          <a:effectRef idx="1">
-            <a:schemeClr val="accent2"/>
-          </a:effectRef>
-          <a:fontRef idx="minor">
-            <a:schemeClr val="dk1"/>
-          </a:fontRef>
-        </p:style>
-      </p:cxnSp>
       <p:sp>
         <p:nvSpPr>
           <p:cNvPr id="72" name="Rectangle 8"/>
@@ -14649,7 +14464,7 @@
         </p:nvSpPr>
         <p:spPr>
           <a:xfrm>
-            <a:off x="7041947" y="2948201"/>
+            <a:off x="7034644" y="2685386"/>
             <a:ext cx="236048" cy="173380"/>
           </a:xfrm>
           <a:prstGeom prst="flowChartDecision">
@@ -14688,103 +14503,6 @@
           </a:p>
         </p:txBody>
       </p:sp>
-      <p:sp>
-        <p:nvSpPr>
-          <p:cNvPr id="80" name="Rectangle 8"/>
-          <p:cNvSpPr/>
-          <p:nvPr/>
-        </p:nvSpPr>
-        <p:spPr>
-          <a:xfrm>
-            <a:off x="7712397" y="2887216"/>
-            <a:ext cx="708186" cy="285783"/>
-          </a:xfrm>
-          <a:prstGeom prst="rect">
-            <a:avLst/>
-          </a:prstGeom>
-          <a:ln w="19050">
-            <a:solidFill>
-              <a:srgbClr val="7030A0"/>
-            </a:solidFill>
-          </a:ln>
-          <a:effectLst/>
-        </p:spPr>
-        <p:style>
-          <a:lnRef idx="1">
-            <a:schemeClr val="accent4"/>
-          </a:lnRef>
-          <a:fillRef idx="2">
-            <a:schemeClr val="accent4"/>
-          </a:fillRef>
-          <a:effectRef idx="1">
-            <a:schemeClr val="accent4"/>
-          </a:effectRef>
-          <a:fontRef idx="minor">
-            <a:schemeClr val="dk1"/>
-          </a:fontRef>
-        </p:style>
-        <p:txBody>
-          <a:bodyPr rtlCol="0" anchor="ctr"/>
-          <a:lstStyle/>
-          <a:p>
-            <a:pPr algn="ctr"/>
-            <a:r>
-              <a:rPr lang="en-US" sz="1050" dirty="0" smtClean="0">
-                <a:solidFill>
-                  <a:srgbClr val="7030A0"/>
-                </a:solidFill>
-              </a:rPr>
-              <a:t>Title</a:t>
-            </a:r>
-            <a:endParaRPr lang="en-SG" sz="1050" dirty="0">
-              <a:solidFill>
-                <a:srgbClr val="7030A0"/>
-              </a:solidFill>
-            </a:endParaRPr>
-          </a:p>
-        </p:txBody>
-      </p:sp>
-      <p:cxnSp>
-        <p:nvCxnSpPr>
-          <p:cNvPr id="81" name="Elbow Connector 80"/>
-          <p:cNvCxnSpPr>
-            <a:stCxn id="78" idx="3"/>
-            <a:endCxn id="80" idx="1"/>
-          </p:cNvCxnSpPr>
-          <p:nvPr/>
-        </p:nvCxnSpPr>
-        <p:spPr>
-          <a:xfrm flipV="1">
-            <a:off x="7277995" y="3030108"/>
-            <a:ext cx="434402" cy="4783"/>
-          </a:xfrm>
-          <a:prstGeom prst="bentConnector3">
-            <a:avLst/>
-          </a:prstGeom>
-          <a:ln w="19050">
-            <a:solidFill>
-              <a:srgbClr val="7030A0"/>
-            </a:solidFill>
-            <a:headEnd type="none" w="med" len="med"/>
-            <a:tailEnd type="arrow" w="med" len="med"/>
-          </a:ln>
-          <a:effectLst/>
-        </p:spPr>
-        <p:style>
-          <a:lnRef idx="1">
-            <a:schemeClr val="accent2"/>
-          </a:lnRef>
-          <a:fillRef idx="2">
-            <a:schemeClr val="accent2"/>
-          </a:fillRef>
-          <a:effectRef idx="1">
-            <a:schemeClr val="accent2"/>
-          </a:effectRef>
-          <a:fontRef idx="minor">
-            <a:schemeClr val="dk1"/>
-          </a:fontRef>
-        </p:style>
-      </p:cxnSp>
       <p:cxnSp>
         <p:nvCxnSpPr>
           <p:cNvPr id="97" name="Elbow Connector 63"/>
@@ -15087,6 +14805,294 @@
               <a:srgbClr val="7030A0"/>
             </a:solidFill>
             <a:prstDash val="sysDot"/>
+            <a:headEnd type="none" w="med" len="med"/>
+            <a:tailEnd type="arrow" w="med" len="med"/>
+          </a:ln>
+          <a:effectLst/>
+        </p:spPr>
+        <p:style>
+          <a:lnRef idx="1">
+            <a:schemeClr val="accent2"/>
+          </a:lnRef>
+          <a:fillRef idx="2">
+            <a:schemeClr val="accent2"/>
+          </a:fillRef>
+          <a:effectRef idx="1">
+            <a:schemeClr val="accent2"/>
+          </a:effectRef>
+          <a:fontRef idx="minor">
+            <a:schemeClr val="dk1"/>
+          </a:fontRef>
+        </p:style>
+      </p:cxnSp>
+      <p:sp>
+        <p:nvSpPr>
+          <p:cNvPr id="50" name="Rectangle 8"/>
+          <p:cNvSpPr/>
+          <p:nvPr/>
+        </p:nvSpPr>
+        <p:spPr>
+          <a:xfrm>
+            <a:off x="7714090" y="2307345"/>
+            <a:ext cx="839192" cy="285783"/>
+          </a:xfrm>
+          <a:prstGeom prst="rect">
+            <a:avLst/>
+          </a:prstGeom>
+          <a:ln w="19050">
+            <a:solidFill>
+              <a:srgbClr val="7030A0"/>
+            </a:solidFill>
+          </a:ln>
+          <a:effectLst/>
+        </p:spPr>
+        <p:style>
+          <a:lnRef idx="1">
+            <a:schemeClr val="accent4"/>
+          </a:lnRef>
+          <a:fillRef idx="2">
+            <a:schemeClr val="accent4"/>
+          </a:fillRef>
+          <a:effectRef idx="1">
+            <a:schemeClr val="accent4"/>
+          </a:effectRef>
+          <a:fontRef idx="minor">
+            <a:schemeClr val="dk1"/>
+          </a:fontRef>
+        </p:style>
+        <p:txBody>
+          <a:bodyPr rtlCol="0" anchor="ctr"/>
+          <a:lstStyle/>
+          <a:p>
+            <a:pPr algn="ctr"/>
+            <a:r>
+              <a:rPr lang="en-US" sz="1050" dirty="0" smtClean="0">
+                <a:solidFill>
+                  <a:srgbClr val="7030A0"/>
+                </a:solidFill>
+              </a:rPr>
+              <a:t>Title</a:t>
+            </a:r>
+            <a:endParaRPr lang="en-SG" sz="1050" dirty="0">
+              <a:solidFill>
+                <a:srgbClr val="7030A0"/>
+              </a:solidFill>
+            </a:endParaRPr>
+          </a:p>
+        </p:txBody>
+      </p:sp>
+      <p:cxnSp>
+        <p:nvCxnSpPr>
+          <p:cNvPr id="52" name="Elbow Connector 78"/>
+          <p:cNvCxnSpPr>
+            <a:endCxn id="50" idx="1"/>
+          </p:cNvCxnSpPr>
+          <p:nvPr/>
+        </p:nvCxnSpPr>
+        <p:spPr>
+          <a:xfrm flipV="1">
+            <a:off x="7279688" y="2450237"/>
+            <a:ext cx="434402" cy="327762"/>
+          </a:xfrm>
+          <a:prstGeom prst="bentConnector3">
+            <a:avLst/>
+          </a:prstGeom>
+          <a:ln w="19050">
+            <a:solidFill>
+              <a:srgbClr val="7030A0"/>
+            </a:solidFill>
+            <a:headEnd type="none" w="med" len="med"/>
+            <a:tailEnd type="arrow" w="med" len="med"/>
+          </a:ln>
+          <a:effectLst/>
+        </p:spPr>
+        <p:style>
+          <a:lnRef idx="1">
+            <a:schemeClr val="accent2"/>
+          </a:lnRef>
+          <a:fillRef idx="2">
+            <a:schemeClr val="accent2"/>
+          </a:fillRef>
+          <a:effectRef idx="1">
+            <a:schemeClr val="accent2"/>
+          </a:effectRef>
+          <a:fontRef idx="minor">
+            <a:schemeClr val="dk1"/>
+          </a:fontRef>
+        </p:style>
+      </p:cxnSp>
+      <p:sp>
+        <p:nvSpPr>
+          <p:cNvPr id="54" name="Rectangle 8"/>
+          <p:cNvSpPr/>
+          <p:nvPr/>
+        </p:nvSpPr>
+        <p:spPr>
+          <a:xfrm>
+            <a:off x="7714090" y="2630323"/>
+            <a:ext cx="839192" cy="285783"/>
+          </a:xfrm>
+          <a:prstGeom prst="rect">
+            <a:avLst/>
+          </a:prstGeom>
+          <a:ln w="19050">
+            <a:solidFill>
+              <a:srgbClr val="7030A0"/>
+            </a:solidFill>
+          </a:ln>
+          <a:effectLst/>
+        </p:spPr>
+        <p:style>
+          <a:lnRef idx="1">
+            <a:schemeClr val="accent4"/>
+          </a:lnRef>
+          <a:fillRef idx="2">
+            <a:schemeClr val="accent4"/>
+          </a:fillRef>
+          <a:effectRef idx="1">
+            <a:schemeClr val="accent4"/>
+          </a:effectRef>
+          <a:fontRef idx="minor">
+            <a:schemeClr val="dk1"/>
+          </a:fontRef>
+        </p:style>
+        <p:txBody>
+          <a:bodyPr rtlCol="0" anchor="ctr"/>
+          <a:lstStyle/>
+          <a:p>
+            <a:pPr algn="ctr"/>
+            <a:r>
+              <a:rPr lang="en-US" sz="1050" dirty="0" err="1" smtClean="0">
+                <a:solidFill>
+                  <a:srgbClr val="7030A0"/>
+                </a:solidFill>
+              </a:rPr>
+              <a:t>DueDate</a:t>
+            </a:r>
+            <a:endParaRPr lang="en-SG" sz="1050" dirty="0">
+              <a:solidFill>
+                <a:srgbClr val="7030A0"/>
+              </a:solidFill>
+            </a:endParaRPr>
+          </a:p>
+        </p:txBody>
+      </p:sp>
+      <p:cxnSp>
+        <p:nvCxnSpPr>
+          <p:cNvPr id="56" name="Elbow Connector 80"/>
+          <p:cNvCxnSpPr>
+            <a:endCxn id="54" idx="1"/>
+          </p:cNvCxnSpPr>
+          <p:nvPr/>
+        </p:nvCxnSpPr>
+        <p:spPr>
+          <a:xfrm flipV="1">
+            <a:off x="7279688" y="2773215"/>
+            <a:ext cx="434402" cy="4784"/>
+          </a:xfrm>
+          <a:prstGeom prst="bentConnector3">
+            <a:avLst/>
+          </a:prstGeom>
+          <a:ln w="19050">
+            <a:solidFill>
+              <a:srgbClr val="7030A0"/>
+            </a:solidFill>
+            <a:headEnd type="none" w="med" len="med"/>
+            <a:tailEnd type="arrow" w="med" len="med"/>
+          </a:ln>
+          <a:effectLst/>
+        </p:spPr>
+        <p:style>
+          <a:lnRef idx="1">
+            <a:schemeClr val="accent2"/>
+          </a:lnRef>
+          <a:fillRef idx="2">
+            <a:schemeClr val="accent2"/>
+          </a:fillRef>
+          <a:effectRef idx="1">
+            <a:schemeClr val="accent2"/>
+          </a:effectRef>
+          <a:fontRef idx="minor">
+            <a:schemeClr val="dk1"/>
+          </a:fontRef>
+        </p:style>
+      </p:cxnSp>
+      <p:sp>
+        <p:nvSpPr>
+          <p:cNvPr id="60" name="Rectangle 8"/>
+          <p:cNvSpPr/>
+          <p:nvPr/>
+        </p:nvSpPr>
+        <p:spPr>
+          <a:xfrm>
+            <a:off x="7714090" y="2953301"/>
+            <a:ext cx="839192" cy="285783"/>
+          </a:xfrm>
+          <a:prstGeom prst="rect">
+            <a:avLst/>
+          </a:prstGeom>
+          <a:ln w="19050">
+            <a:solidFill>
+              <a:srgbClr val="7030A0"/>
+            </a:solidFill>
+          </a:ln>
+          <a:effectLst/>
+        </p:spPr>
+        <p:style>
+          <a:lnRef idx="1">
+            <a:schemeClr val="accent4"/>
+          </a:lnRef>
+          <a:fillRef idx="2">
+            <a:schemeClr val="accent4"/>
+          </a:fillRef>
+          <a:effectRef idx="1">
+            <a:schemeClr val="accent4"/>
+          </a:effectRef>
+          <a:fontRef idx="minor">
+            <a:schemeClr val="dk1"/>
+          </a:fontRef>
+        </p:style>
+        <p:txBody>
+          <a:bodyPr rtlCol="0" anchor="ctr"/>
+          <a:lstStyle/>
+          <a:p>
+            <a:pPr algn="ctr"/>
+            <a:r>
+              <a:rPr lang="en-US" sz="1050" dirty="0" err="1" smtClean="0">
+                <a:solidFill>
+                  <a:srgbClr val="7030A0"/>
+                </a:solidFill>
+              </a:rPr>
+              <a:t>DateRange</a:t>
+            </a:r>
+            <a:endParaRPr lang="en-SG" sz="1050" dirty="0">
+              <a:solidFill>
+                <a:srgbClr val="7030A0"/>
+              </a:solidFill>
+            </a:endParaRPr>
+          </a:p>
+        </p:txBody>
+      </p:sp>
+      <p:cxnSp>
+        <p:nvCxnSpPr>
+          <p:cNvPr id="61" name="Elbow Connector 83"/>
+          <p:cNvCxnSpPr>
+            <a:endCxn id="60" idx="1"/>
+          </p:cNvCxnSpPr>
+          <p:nvPr/>
+        </p:nvCxnSpPr>
+        <p:spPr>
+          <a:xfrm>
+            <a:off x="7279688" y="2777998"/>
+            <a:ext cx="434402" cy="318195"/>
+          </a:xfrm>
+          <a:prstGeom prst="bentConnector3">
+            <a:avLst/>
+          </a:prstGeom>
+          <a:ln w="19050">
+            <a:solidFill>
+              <a:srgbClr val="7030A0"/>
+            </a:solidFill>
             <a:headEnd type="none" w="med" len="med"/>
             <a:tailEnd type="arrow" w="med" len="med"/>
           </a:ln>
@@ -15277,15 +15283,7 @@
                   <a:schemeClr val="bg1"/>
                 </a:solidFill>
               </a:rPr>
-              <a:t>TodoList</a:t>
-            </a:r>
-            <a:r>
-              <a:rPr lang="en-US" sz="1050" dirty="0" err="1" smtClean="0">
-                <a:solidFill>
-                  <a:schemeClr val="bg1"/>
-                </a:solidFill>
-              </a:rPr>
-              <a:t>Storage</a:t>
+              <a:t>TodoListStorage</a:t>
             </a:r>
             <a:endParaRPr lang="en-SG" sz="1050" dirty="0">
               <a:solidFill>

</xml_diff>

<commit_message>
Update diagrams for logic
</commit_message>
<xml_diff>
--- a/docs/diagrams/Diagrams.pptx
+++ b/docs/diagrams/Diagrams.pptx
@@ -11801,7 +11801,7 @@
         </p:nvSpPr>
         <p:spPr>
           <a:xfrm>
-            <a:off x="3411783" y="2300233"/>
+            <a:off x="2725591" y="2274834"/>
             <a:ext cx="1093635" cy="346760"/>
           </a:xfrm>
           <a:prstGeom prst="rect">
@@ -11860,7 +11860,7 @@
         </p:nvCxnSpPr>
         <p:spPr>
           <a:xfrm>
-            <a:off x="3958600" y="2663904"/>
+            <a:off x="3272408" y="2638505"/>
             <a:ext cx="0" cy="1587652"/>
           </a:xfrm>
           <a:prstGeom prst="line">
@@ -11897,7 +11897,7 @@
         </p:nvSpPr>
         <p:spPr>
           <a:xfrm>
-            <a:off x="3886592" y="3122097"/>
+            <a:off x="3200400" y="3096698"/>
             <a:ext cx="144016" cy="832525"/>
           </a:xfrm>
           <a:prstGeom prst="rect">
@@ -11948,7 +11948,7 @@
         </p:nvSpPr>
         <p:spPr>
           <a:xfrm>
-            <a:off x="4953000" y="2996259"/>
+            <a:off x="5535317" y="2995234"/>
             <a:ext cx="1093635" cy="461538"/>
           </a:xfrm>
           <a:prstGeom prst="rect">
@@ -12030,7 +12030,7 @@
         </p:nvCxnSpPr>
         <p:spPr>
           <a:xfrm>
-            <a:off x="5499817" y="3417319"/>
+            <a:off x="6082134" y="3416294"/>
             <a:ext cx="0" cy="2450081"/>
           </a:xfrm>
           <a:prstGeom prst="line">
@@ -12067,7 +12067,7 @@
         </p:nvSpPr>
         <p:spPr>
           <a:xfrm>
-            <a:off x="5427809" y="3457797"/>
+            <a:off x="6010126" y="3456772"/>
             <a:ext cx="152400" cy="276003"/>
           </a:xfrm>
           <a:prstGeom prst="rect">
@@ -12149,9 +12149,9 @@
           <p:nvPr/>
         </p:nvCxnSpPr>
         <p:spPr>
-          <a:xfrm>
-            <a:off x="1815269" y="3122098"/>
-            <a:ext cx="2071323" cy="0"/>
+          <a:xfrm flipV="1">
+            <a:off x="1815269" y="3122097"/>
+            <a:ext cx="1385131" cy="1"/>
           </a:xfrm>
           <a:prstGeom prst="straightConnector1">
             <a:avLst/>
@@ -12226,9 +12226,9 @@
           <p:nvPr/>
         </p:nvCxnSpPr>
         <p:spPr>
-          <a:xfrm flipV="1">
-            <a:off x="4030608" y="3227028"/>
-            <a:ext cx="922392" cy="1"/>
+          <a:xfrm>
+            <a:off x="4773315" y="3226003"/>
+            <a:ext cx="762002" cy="0"/>
           </a:xfrm>
           <a:prstGeom prst="straightConnector1">
             <a:avLst/>
@@ -12263,7 +12263,7 @@
         </p:nvSpPr>
         <p:spPr>
           <a:xfrm>
-            <a:off x="4419600" y="4251556"/>
+            <a:off x="4790118" y="4518801"/>
             <a:ext cx="855809" cy="215444"/>
           </a:xfrm>
           <a:prstGeom prst="rect">
@@ -12303,8 +12303,8 @@
         </p:nvCxnSpPr>
         <p:spPr>
           <a:xfrm>
-            <a:off x="4030608" y="3733800"/>
-            <a:ext cx="1406215" cy="0"/>
+            <a:off x="4798829" y="3718573"/>
+            <a:ext cx="1229022" cy="0"/>
           </a:xfrm>
           <a:prstGeom prst="straightConnector1">
             <a:avLst/>
@@ -12341,8 +12341,8 @@
         </p:nvCxnSpPr>
         <p:spPr>
           <a:xfrm>
-            <a:off x="1815269" y="3954622"/>
-            <a:ext cx="2058118" cy="0"/>
+            <a:off x="1815269" y="4038600"/>
+            <a:ext cx="1457139" cy="0"/>
           </a:xfrm>
           <a:prstGeom prst="straightConnector1">
             <a:avLst/>
@@ -12482,8 +12482,8 @@
         </p:nvCxnSpPr>
         <p:spPr>
           <a:xfrm>
-            <a:off x="1815269" y="4495317"/>
-            <a:ext cx="3612540" cy="0"/>
+            <a:off x="1815269" y="4772043"/>
+            <a:ext cx="4194857" cy="0"/>
           </a:xfrm>
           <a:prstGeom prst="straightConnector1">
             <a:avLst/>
@@ -12518,7 +12518,7 @@
         </p:nvSpPr>
         <p:spPr>
           <a:xfrm>
-            <a:off x="5427809" y="4495317"/>
+            <a:off x="6010126" y="4494292"/>
             <a:ext cx="152400" cy="1191256"/>
           </a:xfrm>
           <a:prstGeom prst="rect">
@@ -12662,8 +12662,8 @@
         </p:nvCxnSpPr>
         <p:spPr>
           <a:xfrm>
-            <a:off x="5580209" y="4542759"/>
-            <a:ext cx="2787374" cy="0"/>
+            <a:off x="6162526" y="4572000"/>
+            <a:ext cx="2205057" cy="0"/>
           </a:xfrm>
           <a:prstGeom prst="straightConnector1">
             <a:avLst/>
@@ -12698,8 +12698,8 @@
         </p:nvCxnSpPr>
         <p:spPr>
           <a:xfrm>
-            <a:off x="5580209" y="4800600"/>
-            <a:ext cx="2873799" cy="0"/>
+            <a:off x="6162526" y="4800600"/>
+            <a:ext cx="2291482" cy="0"/>
           </a:xfrm>
           <a:prstGeom prst="straightConnector1">
             <a:avLst/>
@@ -12740,7 +12740,7 @@
         <p:spPr>
           <a:xfrm>
             <a:off x="1815269" y="5661173"/>
-            <a:ext cx="3651369" cy="0"/>
+            <a:ext cx="4194857" cy="0"/>
           </a:xfrm>
           <a:prstGeom prst="straightConnector1">
             <a:avLst/>
@@ -12834,8 +12834,8 @@
         </p:nvSpPr>
         <p:spPr>
           <a:xfrm>
-            <a:off x="4191000" y="2996259"/>
-            <a:ext cx="640023" cy="215444"/>
+            <a:off x="4773317" y="2995234"/>
+            <a:ext cx="640023" cy="184666"/>
           </a:xfrm>
           <a:prstGeom prst="rect">
             <a:avLst/>
@@ -12860,10 +12860,10 @@
           </a:lstStyle>
           <a:p>
             <a:r>
-              <a:rPr lang="en-US" dirty="0" smtClean="0"/>
-              <a:t>create()</a:t>
-            </a:r>
-            <a:endParaRPr lang="en-US" dirty="0"/>
+              <a:rPr lang="en-US" sz="1200" dirty="0" smtClean="0"/>
+              <a:t>build()</a:t>
+            </a:r>
+            <a:endParaRPr lang="en-US" sz="1200" dirty="0"/>
           </a:p>
         </p:txBody>
       </p:sp>
@@ -12875,7 +12875,7 @@
         </p:nvSpPr>
         <p:spPr>
           <a:xfrm>
-            <a:off x="2131905" y="2850922"/>
+            <a:off x="1747564" y="2860189"/>
             <a:ext cx="1424846" cy="215444"/>
           </a:xfrm>
           <a:prstGeom prst="rect">
@@ -12998,8 +12998,8 @@
         </p:nvSpPr>
         <p:spPr>
           <a:xfrm>
-            <a:off x="6029646" y="4953000"/>
-            <a:ext cx="1666554" cy="461538"/>
+            <a:off x="6629286" y="4953000"/>
+            <a:ext cx="1066914" cy="461538"/>
           </a:xfrm>
           <a:prstGeom prst="rect">
             <a:avLst/>
@@ -13034,7 +13034,7 @@
           <a:p>
             <a:pPr algn="ctr"/>
             <a:r>
-              <a:rPr lang="en-US" sz="1600" dirty="0" smtClean="0">
+              <a:rPr lang="en-US" sz="1200" dirty="0" smtClean="0">
                 <a:solidFill>
                   <a:schemeClr val="bg1"/>
                 </a:solidFill>
@@ -13042,21 +13042,21 @@
               <a:t>result:</a:t>
             </a:r>
             <a:br>
-              <a:rPr lang="en-US" sz="1600" dirty="0" smtClean="0">
+              <a:rPr lang="en-US" sz="1200" dirty="0" smtClean="0">
                 <a:solidFill>
                   <a:schemeClr val="bg1"/>
                 </a:solidFill>
               </a:rPr>
             </a:br>
             <a:r>
-              <a:rPr lang="en-US" sz="1600" dirty="0" err="1" smtClean="0">
+              <a:rPr lang="en-US" sz="1200" dirty="0" err="1" smtClean="0">
                 <a:solidFill>
                   <a:schemeClr val="bg1"/>
                 </a:solidFill>
               </a:rPr>
               <a:t>CommandResult</a:t>
             </a:r>
-            <a:endParaRPr lang="en-SG" sz="1600" dirty="0">
+            <a:endParaRPr lang="en-SG" sz="1200" dirty="0">
               <a:solidFill>
                 <a:schemeClr val="bg1"/>
               </a:solidFill>
@@ -13119,7 +13119,7 @@
         </p:nvCxnSpPr>
         <p:spPr>
           <a:xfrm>
-            <a:off x="5580209" y="5165675"/>
+            <a:off x="6162526" y="5164650"/>
             <a:ext cx="447975" cy="0"/>
           </a:xfrm>
           <a:prstGeom prst="straightConnector1">
@@ -13155,8 +13155,8 @@
         </p:nvCxnSpPr>
         <p:spPr>
           <a:xfrm>
-            <a:off x="5580209" y="5585914"/>
-            <a:ext cx="1253815" cy="0"/>
+            <a:off x="6162526" y="5585914"/>
+            <a:ext cx="671498" cy="0"/>
           </a:xfrm>
           <a:prstGeom prst="straightConnector1">
             <a:avLst/>
@@ -13193,7 +13193,7 @@
         </p:nvSpPr>
         <p:spPr>
           <a:xfrm>
-            <a:off x="2818928" y="3733800"/>
+            <a:off x="2646985" y="3796298"/>
             <a:ext cx="220343" cy="215444"/>
           </a:xfrm>
           <a:prstGeom prst="rect">
@@ -13226,6 +13226,280 @@
           </a:p>
         </p:txBody>
       </p:sp>
+      <p:sp>
+        <p:nvSpPr>
+          <p:cNvPr id="52" name="Rectangle 62"/>
+          <p:cNvSpPr/>
+          <p:nvPr/>
+        </p:nvSpPr>
+        <p:spPr>
+          <a:xfrm>
+            <a:off x="4154490" y="2281419"/>
+            <a:ext cx="1093635" cy="346760"/>
+          </a:xfrm>
+          <a:prstGeom prst="rect">
+            <a:avLst/>
+          </a:prstGeom>
+          <a:solidFill>
+            <a:srgbClr val="0070C0"/>
+          </a:solidFill>
+          <a:ln w="19050">
+            <a:solidFill>
+              <a:srgbClr val="0070C0"/>
+            </a:solidFill>
+          </a:ln>
+          <a:effectLst/>
+        </p:spPr>
+        <p:style>
+          <a:lnRef idx="1">
+            <a:schemeClr val="accent2"/>
+          </a:lnRef>
+          <a:fillRef idx="2">
+            <a:schemeClr val="accent2"/>
+          </a:fillRef>
+          <a:effectRef idx="1">
+            <a:schemeClr val="accent2"/>
+          </a:effectRef>
+          <a:fontRef idx="minor">
+            <a:schemeClr val="dk1"/>
+          </a:fontRef>
+        </p:style>
+        <p:txBody>
+          <a:bodyPr rtlCol="0" anchor="ctr"/>
+          <a:lstStyle/>
+          <a:p>
+            <a:pPr algn="ctr"/>
+            <a:r>
+              <a:rPr lang="en-US" sz="1400" dirty="0" smtClean="0">
+                <a:solidFill>
+                  <a:schemeClr val="bg1"/>
+                </a:solidFill>
+              </a:rPr>
+              <a:t>:</a:t>
+            </a:r>
+            <a:r>
+              <a:rPr lang="en-US" sz="1400" dirty="0" err="1" smtClean="0">
+                <a:solidFill>
+                  <a:schemeClr val="bg1"/>
+                </a:solidFill>
+              </a:rPr>
+              <a:t>CommandFactory</a:t>
+            </a:r>
+            <a:endParaRPr lang="en-SG" sz="1400" dirty="0">
+              <a:solidFill>
+                <a:schemeClr val="bg1"/>
+              </a:solidFill>
+            </a:endParaRPr>
+          </a:p>
+        </p:txBody>
+      </p:sp>
+      <p:cxnSp>
+        <p:nvCxnSpPr>
+          <p:cNvPr id="53" name="Straight Connector 16"/>
+          <p:cNvCxnSpPr/>
+          <p:nvPr/>
+        </p:nvCxnSpPr>
+        <p:spPr>
+          <a:xfrm>
+            <a:off x="4701307" y="2645090"/>
+            <a:ext cx="0" cy="1587652"/>
+          </a:xfrm>
+          <a:prstGeom prst="line">
+            <a:avLst/>
+          </a:prstGeom>
+          <a:ln w="19050">
+            <a:solidFill>
+              <a:srgbClr val="0070C0"/>
+            </a:solidFill>
+            <a:prstDash val="sysDash"/>
+          </a:ln>
+          <a:effectLst/>
+        </p:spPr>
+        <p:style>
+          <a:lnRef idx="1">
+            <a:schemeClr val="accent1"/>
+          </a:lnRef>
+          <a:fillRef idx="2">
+            <a:schemeClr val="accent1"/>
+          </a:fillRef>
+          <a:effectRef idx="1">
+            <a:schemeClr val="accent1"/>
+          </a:effectRef>
+          <a:fontRef idx="minor">
+            <a:schemeClr val="dk1"/>
+          </a:fontRef>
+        </p:style>
+      </p:cxnSp>
+      <p:sp>
+        <p:nvSpPr>
+          <p:cNvPr id="54" name="Rectangle 17"/>
+          <p:cNvSpPr/>
+          <p:nvPr/>
+        </p:nvSpPr>
+        <p:spPr>
+          <a:xfrm>
+            <a:off x="4629299" y="3103283"/>
+            <a:ext cx="144016" cy="832525"/>
+          </a:xfrm>
+          <a:prstGeom prst="rect">
+            <a:avLst/>
+          </a:prstGeom>
+          <a:solidFill>
+            <a:srgbClr val="0070C0"/>
+          </a:solidFill>
+          <a:ln>
+            <a:solidFill>
+              <a:srgbClr val="0070C0"/>
+            </a:solidFill>
+          </a:ln>
+          <a:effectLst/>
+        </p:spPr>
+        <p:style>
+          <a:lnRef idx="1">
+            <a:schemeClr val="accent3"/>
+          </a:lnRef>
+          <a:fillRef idx="2">
+            <a:schemeClr val="accent3"/>
+          </a:fillRef>
+          <a:effectRef idx="1">
+            <a:schemeClr val="accent3"/>
+          </a:effectRef>
+          <a:fontRef idx="minor">
+            <a:schemeClr val="dk1"/>
+          </a:fontRef>
+        </p:style>
+        <p:txBody>
+          <a:bodyPr rtlCol="0" anchor="ctr"/>
+          <a:lstStyle/>
+          <a:p>
+            <a:pPr algn="ctr"/>
+            <a:endParaRPr lang="en-SG" sz="1400">
+              <a:solidFill>
+                <a:schemeClr val="dk1"/>
+              </a:solidFill>
+            </a:endParaRPr>
+          </a:p>
+        </p:txBody>
+      </p:sp>
+      <p:cxnSp>
+        <p:nvCxnSpPr>
+          <p:cNvPr id="57" name="Straight Arrow Connector 27"/>
+          <p:cNvCxnSpPr/>
+          <p:nvPr/>
+        </p:nvCxnSpPr>
+        <p:spPr>
+          <a:xfrm>
+            <a:off x="3344416" y="3188315"/>
+            <a:ext cx="1284883" cy="0"/>
+          </a:xfrm>
+          <a:prstGeom prst="straightConnector1">
+            <a:avLst/>
+          </a:prstGeom>
+          <a:ln w="19050">
+            <a:solidFill>
+              <a:srgbClr val="0070C0"/>
+            </a:solidFill>
+            <a:tailEnd type="arrow"/>
+          </a:ln>
+        </p:spPr>
+        <p:style>
+          <a:lnRef idx="1">
+            <a:schemeClr val="accent1"/>
+          </a:lnRef>
+          <a:fillRef idx="0">
+            <a:schemeClr val="accent1"/>
+          </a:fillRef>
+          <a:effectRef idx="0">
+            <a:schemeClr val="accent1"/>
+          </a:effectRef>
+          <a:fontRef idx="minor">
+            <a:schemeClr val="tx1"/>
+          </a:fontRef>
+        </p:style>
+      </p:cxnSp>
+      <p:sp>
+        <p:nvSpPr>
+          <p:cNvPr id="58" name="TextBox 78"/>
+          <p:cNvSpPr txBox="1"/>
+          <p:nvPr/>
+        </p:nvSpPr>
+        <p:spPr>
+          <a:xfrm>
+            <a:off x="3467649" y="2982814"/>
+            <a:ext cx="1039673" cy="184666"/>
+          </a:xfrm>
+          <a:prstGeom prst="rect">
+            <a:avLst/>
+          </a:prstGeom>
+          <a:noFill/>
+        </p:spPr>
+        <p:txBody>
+          <a:bodyPr wrap="square" lIns="0" tIns="0" rIns="0" bIns="0" rtlCol="0">
+            <a:spAutoFit/>
+          </a:bodyPr>
+          <a:lstStyle>
+            <a:defPPr>
+              <a:defRPr lang="en-US"/>
+            </a:defPPr>
+            <a:lvl1pPr algn="r">
+              <a:defRPr sz="1400">
+                <a:solidFill>
+                  <a:srgbClr val="0070C0"/>
+                </a:solidFill>
+              </a:defRPr>
+            </a:lvl1pPr>
+          </a:lstStyle>
+          <a:p>
+            <a:r>
+              <a:rPr lang="en-US" sz="1200" dirty="0" err="1"/>
+              <a:t>c</a:t>
+            </a:r>
+            <a:r>
+              <a:rPr lang="en-US" sz="1200" dirty="0" err="1" smtClean="0"/>
+              <a:t>ommandWord</a:t>
+            </a:r>
+            <a:endParaRPr lang="en-US" sz="1200" dirty="0"/>
+          </a:p>
+        </p:txBody>
+      </p:sp>
+      <p:cxnSp>
+        <p:nvCxnSpPr>
+          <p:cNvPr id="60" name="Straight Arrow Connector 33"/>
+          <p:cNvCxnSpPr/>
+          <p:nvPr/>
+        </p:nvCxnSpPr>
+        <p:spPr>
+          <a:xfrm>
+            <a:off x="3344416" y="3809145"/>
+            <a:ext cx="1229022" cy="0"/>
+          </a:xfrm>
+          <a:prstGeom prst="straightConnector1">
+            <a:avLst/>
+          </a:prstGeom>
+          <a:ln w="19050">
+            <a:solidFill>
+              <a:srgbClr val="0070C0"/>
+            </a:solidFill>
+            <a:prstDash val="sysDash"/>
+            <a:headEnd type="arrow" w="med" len="med"/>
+            <a:tailEnd type="none" w="med" len="med"/>
+          </a:ln>
+        </p:spPr>
+        <p:style>
+          <a:lnRef idx="1">
+            <a:schemeClr val="accent1"/>
+          </a:lnRef>
+          <a:fillRef idx="0">
+            <a:schemeClr val="accent1"/>
+          </a:fillRef>
+          <a:effectRef idx="0">
+            <a:schemeClr val="accent1"/>
+          </a:effectRef>
+          <a:fontRef idx="minor">
+            <a:schemeClr val="tx1"/>
+          </a:fontRef>
+        </p:style>
+      </p:cxnSp>
     </p:spTree>
     <p:extLst>
       <p:ext uri="{BB962C8B-B14F-4D97-AF65-F5344CB8AC3E}">

</xml_diff>

<commit_message>
Add diagram and description for UI component
</commit_message>
<xml_diff>
--- a/docs/diagrams/Diagrams.pptx
+++ b/docs/diagrams/Diagrams.pptx
@@ -8847,8 +8847,8 @@
         </p:nvSpPr>
         <p:spPr>
           <a:xfrm>
-            <a:off x="1217465" y="1447800"/>
-            <a:ext cx="4917083" cy="3962400"/>
+            <a:off x="573395" y="1447798"/>
+            <a:ext cx="5829748" cy="5105402"/>
           </a:xfrm>
           <a:prstGeom prst="roundRect">
             <a:avLst>
@@ -8882,20 +8882,16 @@
           <a:lstStyle/>
           <a:p>
             <a:r>
-              <a:rPr lang="en-US" sz="1200" b="1" dirty="0">
+              <a:rPr lang="en-US" sz="2400" b="1" dirty="0">
                 <a:solidFill>
-                  <a:schemeClr val="accent3">
-                    <a:lumMod val="75000"/>
-                  </a:schemeClr>
+                  <a:srgbClr val="00B050"/>
                 </a:solidFill>
               </a:rPr>
               <a:t>UI</a:t>
             </a:r>
-            <a:endParaRPr lang="en-SG" sz="1200" b="1" dirty="0">
+            <a:endParaRPr lang="en-SG" sz="2400" b="1" dirty="0">
               <a:solidFill>
-                <a:schemeClr val="accent3">
-                  <a:lumMod val="75000"/>
-                </a:schemeClr>
+                <a:srgbClr val="00B050"/>
               </a:solidFill>
             </a:endParaRPr>
           </a:p>
@@ -8909,7 +8905,7 @@
         </p:nvSpPr>
         <p:spPr>
           <a:xfrm>
-            <a:off x="2095948" y="2341220"/>
+            <a:off x="1824691" y="2458438"/>
             <a:ext cx="1093635" cy="346760"/>
           </a:xfrm>
           <a:prstGeom prst="rect">
@@ -8969,7 +8965,7 @@
         </p:nvSpPr>
         <p:spPr>
           <a:xfrm>
-            <a:off x="2592528" y="3179160"/>
+            <a:off x="2924821" y="2941146"/>
             <a:ext cx="1093635" cy="236841"/>
           </a:xfrm>
           <a:prstGeom prst="rect">
@@ -9080,49 +9076,6 @@
           </a:p>
         </p:txBody>
       </p:sp>
-      <p:cxnSp>
-        <p:nvCxnSpPr>
-          <p:cNvPr id="10" name="Elbow Connector 63"/>
-          <p:cNvCxnSpPr>
-            <a:stCxn id="9" idx="2"/>
-            <a:endCxn id="2" idx="0"/>
-          </p:cNvCxnSpPr>
-          <p:nvPr/>
-        </p:nvCxnSpPr>
-        <p:spPr>
-          <a:xfrm rot="16200000" flipH="1">
-            <a:off x="2529445" y="2227899"/>
-            <a:ext cx="223536" cy="3106"/>
-          </a:xfrm>
-          <a:prstGeom prst="bentConnector3">
-            <a:avLst>
-              <a:gd name="adj1" fmla="val 50000"/>
-            </a:avLst>
-          </a:prstGeom>
-          <a:ln w="19050">
-            <a:solidFill>
-              <a:srgbClr val="00B050"/>
-            </a:solidFill>
-            <a:headEnd type="none" w="med" len="med"/>
-            <a:tailEnd type="arrow" w="med" len="med"/>
-          </a:ln>
-          <a:effectLst/>
-        </p:spPr>
-        <p:style>
-          <a:lnRef idx="1">
-            <a:schemeClr val="accent2"/>
-          </a:lnRef>
-          <a:fillRef idx="2">
-            <a:schemeClr val="accent2"/>
-          </a:fillRef>
-          <a:effectRef idx="1">
-            <a:schemeClr val="accent2"/>
-          </a:effectRef>
-          <a:fontRef idx="minor">
-            <a:schemeClr val="dk1"/>
-          </a:fontRef>
-        </p:style>
-      </p:cxnSp>
       <p:sp>
         <p:nvSpPr>
           <p:cNvPr id="16" name="Isosceles Triangle 102"/>
@@ -9130,14 +9083,14 @@
           <p:nvPr/>
         </p:nvSpPr>
         <p:spPr>
-          <a:xfrm rot="10800000" flipV="1">
-            <a:off x="5394717" y="2110477"/>
+          <a:xfrm rot="5400000" flipV="1">
+            <a:off x="1475581" y="4459166"/>
             <a:ext cx="270504" cy="175523"/>
           </a:xfrm>
           <a:prstGeom prst="triangle">
             <a:avLst/>
           </a:prstGeom>
-          <a:ln w="6350">
+          <a:ln w="19050">
             <a:solidFill>
               <a:schemeClr val="accent3"/>
             </a:solidFill>
@@ -9171,49 +9124,6 @@
           </a:p>
         </p:txBody>
       </p:sp>
-      <p:cxnSp>
-        <p:nvCxnSpPr>
-          <p:cNvPr id="19" name="Elbow Connector 122"/>
-          <p:cNvCxnSpPr/>
-          <p:nvPr/>
-        </p:nvCxnSpPr>
-        <p:spPr>
-          <a:xfrm flipV="1">
-            <a:off x="644735" y="2991937"/>
-            <a:ext cx="684904" cy="1"/>
-          </a:xfrm>
-          <a:prstGeom prst="bentConnector3">
-            <a:avLst>
-              <a:gd name="adj1" fmla="val 50000"/>
-            </a:avLst>
-          </a:prstGeom>
-          <a:ln w="19050">
-            <a:solidFill>
-              <a:schemeClr val="bg1">
-                <a:lumMod val="75000"/>
-              </a:schemeClr>
-            </a:solidFill>
-            <a:prstDash val="sysDot"/>
-            <a:headEnd type="none" w="med" len="med"/>
-            <a:tailEnd type="arrow" w="med" len="med"/>
-          </a:ln>
-          <a:effectLst/>
-        </p:spPr>
-        <p:style>
-          <a:lnRef idx="1">
-            <a:schemeClr val="accent2"/>
-          </a:lnRef>
-          <a:fillRef idx="2">
-            <a:schemeClr val="accent2"/>
-          </a:fillRef>
-          <a:effectRef idx="1">
-            <a:schemeClr val="accent2"/>
-          </a:effectRef>
-          <a:fontRef idx="minor">
-            <a:schemeClr val="dk1"/>
-          </a:fontRef>
-        </p:style>
-      </p:cxnSp>
       <p:sp>
         <p:nvSpPr>
           <p:cNvPr id="22" name="Rectangle 65"/>
@@ -9282,7 +9192,7 @@
         </p:nvSpPr>
         <p:spPr>
           <a:xfrm>
-            <a:off x="2592528" y="3649359"/>
+            <a:off x="2592525" y="3499262"/>
             <a:ext cx="1093635" cy="236841"/>
           </a:xfrm>
           <a:prstGeom prst="rect">
@@ -9322,7 +9232,7 @@
                   </a:schemeClr>
                 </a:solidFill>
               </a:rPr>
-              <a:t>BrowserPanel</a:t>
+              <a:t>EventListPanel</a:t>
             </a:r>
             <a:endParaRPr lang="en-SG" sz="1050" b="1" dirty="0">
               <a:solidFill>
@@ -9442,7 +9352,7 @@
                   </a:schemeClr>
                 </a:solidFill>
               </a:rPr>
-              <a:t>TodoListPanel</a:t>
+              <a:t>TaskListPanel</a:t>
             </a:r>
             <a:endParaRPr lang="en-SG" sz="1050" b="1" dirty="0">
               <a:solidFill>
@@ -9462,7 +9372,7 @@
         </p:nvSpPr>
         <p:spPr>
           <a:xfrm>
-            <a:off x="3839323" y="4228801"/>
+            <a:off x="4639696" y="3570601"/>
             <a:ext cx="1040906" cy="236841"/>
           </a:xfrm>
           <a:prstGeom prst="rect">
@@ -9502,7 +9412,7 @@
                   </a:schemeClr>
                 </a:solidFill>
               </a:rPr>
-              <a:t>TodoCard</a:t>
+              <a:t>EventCard</a:t>
             </a:r>
             <a:endParaRPr lang="en-SG" sz="1050" b="1" dirty="0">
               <a:solidFill>
@@ -9582,7 +9492,7 @@
         </p:nvSpPr>
         <p:spPr>
           <a:xfrm>
-            <a:off x="2324548" y="2706452"/>
+            <a:off x="2276711" y="2820541"/>
             <a:ext cx="183156" cy="161573"/>
           </a:xfrm>
           <a:prstGeom prst="flowChartDecision">
@@ -9633,8 +9543,8 @@
         </p:nvCxnSpPr>
         <p:spPr>
           <a:xfrm rot="16200000" flipH="1">
-            <a:off x="2289549" y="2994602"/>
-            <a:ext cx="429556" cy="176402"/>
+            <a:off x="2607829" y="2742574"/>
+            <a:ext cx="77453" cy="556532"/>
           </a:xfrm>
           <a:prstGeom prst="bentConnector2">
             <a:avLst/>
@@ -9671,7 +9581,7 @@
         </p:nvSpPr>
         <p:spPr>
           <a:xfrm>
-            <a:off x="3759694" y="3416961"/>
+            <a:off x="4446083" y="3005401"/>
             <a:ext cx="1040906" cy="236841"/>
           </a:xfrm>
           <a:prstGeom prst="rect">
@@ -9734,8 +9644,8 @@
         </p:nvCxnSpPr>
         <p:spPr>
           <a:xfrm rot="16200000" flipH="1">
-            <a:off x="2054450" y="3229701"/>
-            <a:ext cx="899755" cy="176402"/>
+            <a:off x="2162623" y="3187780"/>
+            <a:ext cx="635569" cy="224236"/>
           </a:xfrm>
           <a:prstGeom prst="bentConnector2">
             <a:avLst/>
@@ -9775,8 +9685,8 @@
         </p:nvCxnSpPr>
         <p:spPr>
           <a:xfrm rot="16200000" flipH="1">
-            <a:off x="1883148" y="3401003"/>
-            <a:ext cx="1242356" cy="176400"/>
+            <a:off x="1916274" y="3434128"/>
+            <a:ext cx="1128267" cy="224237"/>
           </a:xfrm>
           <a:prstGeom prst="bentConnector2">
             <a:avLst/>
@@ -9816,8 +9726,8 @@
         </p:nvCxnSpPr>
         <p:spPr>
           <a:xfrm rot="16200000" flipH="1">
-            <a:off x="1597249" y="3686901"/>
-            <a:ext cx="1814155" cy="176401"/>
+            <a:off x="1630375" y="3720028"/>
+            <a:ext cx="1700066" cy="224238"/>
           </a:xfrm>
           <a:prstGeom prst="bentConnector2">
             <a:avLst/>
@@ -9846,46 +9756,6 @@
           </a:fontRef>
         </p:style>
       </p:cxnSp>
-      <p:cxnSp>
-        <p:nvCxnSpPr>
-          <p:cNvPr id="53" name="Elbow Connector 63"/>
-          <p:cNvCxnSpPr>
-            <a:endCxn id="38" idx="1"/>
-          </p:cNvCxnSpPr>
-          <p:nvPr/>
-        </p:nvCxnSpPr>
-        <p:spPr>
-          <a:xfrm rot="16200000" flipH="1">
-            <a:off x="1184119" y="3676012"/>
-            <a:ext cx="2396440" cy="420377"/>
-          </a:xfrm>
-          <a:prstGeom prst="bentConnector2">
-            <a:avLst/>
-          </a:prstGeom>
-          <a:ln w="19050">
-            <a:solidFill>
-              <a:schemeClr val="accent3"/>
-            </a:solidFill>
-            <a:headEnd type="none" w="med" len="med"/>
-            <a:tailEnd type="arrow" w="med" len="med"/>
-          </a:ln>
-          <a:effectLst/>
-        </p:spPr>
-        <p:style>
-          <a:lnRef idx="1">
-            <a:schemeClr val="accent2"/>
-          </a:lnRef>
-          <a:fillRef idx="2">
-            <a:schemeClr val="accent2"/>
-          </a:fillRef>
-          <a:effectRef idx="1">
-            <a:schemeClr val="accent2"/>
-          </a:effectRef>
-          <a:fontRef idx="minor">
-            <a:schemeClr val="dk1"/>
-          </a:fontRef>
-        </p:style>
-      </p:cxnSp>
       <p:sp>
         <p:nvSpPr>
           <p:cNvPr id="73" name="Rectangle 62"/>
@@ -9894,7 +9764,7 @@
         </p:nvSpPr>
         <p:spPr>
           <a:xfrm>
-            <a:off x="5143948" y="1770924"/>
+            <a:off x="749973" y="4369885"/>
             <a:ext cx="772043" cy="346760"/>
           </a:xfrm>
           <a:prstGeom prst="rect">
@@ -9967,409 +9837,27 @@
       </p:sp>
       <p:cxnSp>
         <p:nvCxnSpPr>
-          <p:cNvPr id="74" name="Elbow Connector 63"/>
-          <p:cNvCxnSpPr>
-            <a:stCxn id="43" idx="3"/>
-            <a:endCxn id="16" idx="3"/>
-          </p:cNvCxnSpPr>
-          <p:nvPr/>
-        </p:nvCxnSpPr>
-        <p:spPr>
-          <a:xfrm flipV="1">
-            <a:off x="4800600" y="2286000"/>
-            <a:ext cx="729369" cy="1249382"/>
-          </a:xfrm>
-          <a:prstGeom prst="bentConnector2">
-            <a:avLst/>
-          </a:prstGeom>
-          <a:ln w="6350">
-            <a:solidFill>
-              <a:schemeClr val="accent3"/>
-            </a:solidFill>
-            <a:headEnd type="none" w="med" len="med"/>
-            <a:tailEnd type="none" w="med" len="med"/>
-          </a:ln>
-          <a:effectLst/>
-        </p:spPr>
-        <p:style>
-          <a:lnRef idx="1">
-            <a:schemeClr val="accent2"/>
-          </a:lnRef>
-          <a:fillRef idx="2">
-            <a:schemeClr val="accent2"/>
-          </a:fillRef>
-          <a:effectRef idx="1">
-            <a:schemeClr val="accent2"/>
-          </a:effectRef>
-          <a:fontRef idx="minor">
-            <a:schemeClr val="dk1"/>
-          </a:fontRef>
-        </p:style>
-      </p:cxnSp>
-      <p:cxnSp>
-        <p:nvCxnSpPr>
-          <p:cNvPr id="77" name="Elbow Connector 63"/>
-          <p:cNvCxnSpPr>
-            <a:stCxn id="16" idx="3"/>
-            <a:endCxn id="37" idx="3"/>
-          </p:cNvCxnSpPr>
-          <p:nvPr/>
-        </p:nvCxnSpPr>
-        <p:spPr>
-          <a:xfrm rot="5400000">
-            <a:off x="4174488" y="2991741"/>
-            <a:ext cx="2061222" cy="649740"/>
-          </a:xfrm>
-          <a:prstGeom prst="bentConnector2">
-            <a:avLst/>
-          </a:prstGeom>
-          <a:ln w="6350">
-            <a:solidFill>
-              <a:schemeClr val="accent3"/>
-            </a:solidFill>
-            <a:headEnd type="none" w="med" len="med"/>
-            <a:tailEnd type="none" w="med" len="med"/>
-          </a:ln>
-          <a:effectLst/>
-        </p:spPr>
-        <p:style>
-          <a:lnRef idx="1">
-            <a:schemeClr val="accent2"/>
-          </a:lnRef>
-          <a:fillRef idx="2">
-            <a:schemeClr val="accent2"/>
-          </a:fillRef>
-          <a:effectRef idx="1">
-            <a:schemeClr val="accent2"/>
-          </a:effectRef>
-          <a:fontRef idx="minor">
-            <a:schemeClr val="dk1"/>
-          </a:fontRef>
-        </p:style>
-      </p:cxnSp>
-      <p:cxnSp>
-        <p:nvCxnSpPr>
-          <p:cNvPr id="82" name="Elbow Connector 63"/>
-          <p:cNvCxnSpPr>
-            <a:stCxn id="16" idx="3"/>
-            <a:endCxn id="34" idx="3"/>
-          </p:cNvCxnSpPr>
-          <p:nvPr/>
-        </p:nvCxnSpPr>
-        <p:spPr>
-          <a:xfrm rot="5400000">
-            <a:off x="3867176" y="2104987"/>
-            <a:ext cx="1481780" cy="1843806"/>
-          </a:xfrm>
-          <a:prstGeom prst="bentConnector2">
-            <a:avLst/>
-          </a:prstGeom>
-          <a:ln w="6350">
-            <a:solidFill>
-              <a:schemeClr val="accent3"/>
-            </a:solidFill>
-            <a:headEnd type="none" w="med" len="med"/>
-            <a:tailEnd type="none" w="med" len="med"/>
-          </a:ln>
-          <a:effectLst/>
-        </p:spPr>
-        <p:style>
-          <a:lnRef idx="1">
-            <a:schemeClr val="accent2"/>
-          </a:lnRef>
-          <a:fillRef idx="2">
-            <a:schemeClr val="accent2"/>
-          </a:fillRef>
-          <a:effectRef idx="1">
-            <a:schemeClr val="accent2"/>
-          </a:effectRef>
-          <a:fontRef idx="minor">
-            <a:schemeClr val="dk1"/>
-          </a:fontRef>
-        </p:style>
-      </p:cxnSp>
-      <p:cxnSp>
-        <p:nvCxnSpPr>
-          <p:cNvPr id="88" name="Elbow Connector 63"/>
-          <p:cNvCxnSpPr>
-            <a:stCxn id="2" idx="3"/>
-            <a:endCxn id="16" idx="3"/>
-          </p:cNvCxnSpPr>
-          <p:nvPr/>
-        </p:nvCxnSpPr>
-        <p:spPr>
-          <a:xfrm flipV="1">
-            <a:off x="3189583" y="2286000"/>
-            <a:ext cx="2340386" cy="228600"/>
-          </a:xfrm>
-          <a:prstGeom prst="bentConnector2">
-            <a:avLst/>
-          </a:prstGeom>
-          <a:ln w="6350">
-            <a:solidFill>
-              <a:schemeClr val="accent3"/>
-            </a:solidFill>
-            <a:headEnd type="none" w="med" len="med"/>
-            <a:tailEnd type="none" w="med" len="med"/>
-          </a:ln>
-          <a:effectLst/>
-        </p:spPr>
-        <p:style>
-          <a:lnRef idx="1">
-            <a:schemeClr val="accent2"/>
-          </a:lnRef>
-          <a:fillRef idx="2">
-            <a:schemeClr val="accent2"/>
-          </a:fillRef>
-          <a:effectRef idx="1">
-            <a:schemeClr val="accent2"/>
-          </a:effectRef>
-          <a:fontRef idx="minor">
-            <a:schemeClr val="dk1"/>
-          </a:fontRef>
-        </p:style>
-      </p:cxnSp>
-      <p:cxnSp>
-        <p:nvCxnSpPr>
-          <p:cNvPr id="91" name="Elbow Connector 63"/>
-          <p:cNvCxnSpPr>
-            <a:stCxn id="16" idx="3"/>
-            <a:endCxn id="35" idx="3"/>
-          </p:cNvCxnSpPr>
-          <p:nvPr/>
-        </p:nvCxnSpPr>
-        <p:spPr>
-          <a:xfrm rot="5400000">
-            <a:off x="3409976" y="2562187"/>
-            <a:ext cx="2396180" cy="1843807"/>
-          </a:xfrm>
-          <a:prstGeom prst="bentConnector2">
-            <a:avLst/>
-          </a:prstGeom>
-          <a:ln w="6350">
-            <a:solidFill>
-              <a:schemeClr val="accent3"/>
-            </a:solidFill>
-            <a:headEnd type="none" w="med" len="med"/>
-            <a:tailEnd type="none" w="med" len="med"/>
-          </a:ln>
-          <a:effectLst/>
-        </p:spPr>
-        <p:style>
-          <a:lnRef idx="1">
-            <a:schemeClr val="accent2"/>
-          </a:lnRef>
-          <a:fillRef idx="2">
-            <a:schemeClr val="accent2"/>
-          </a:fillRef>
-          <a:effectRef idx="1">
-            <a:schemeClr val="accent2"/>
-          </a:effectRef>
-          <a:fontRef idx="minor">
-            <a:schemeClr val="dk1"/>
-          </a:fontRef>
-        </p:style>
-      </p:cxnSp>
-      <p:cxnSp>
-        <p:nvCxnSpPr>
-          <p:cNvPr id="94" name="Elbow Connector 63"/>
-          <p:cNvCxnSpPr>
-            <a:stCxn id="16" idx="3"/>
-            <a:endCxn id="38" idx="3"/>
-          </p:cNvCxnSpPr>
-          <p:nvPr/>
-        </p:nvCxnSpPr>
-        <p:spPr>
-          <a:xfrm rot="5400000">
-            <a:off x="3208856" y="2763307"/>
-            <a:ext cx="2798421" cy="1843806"/>
-          </a:xfrm>
-          <a:prstGeom prst="bentConnector2">
-            <a:avLst/>
-          </a:prstGeom>
-          <a:ln w="6350">
-            <a:solidFill>
-              <a:schemeClr val="accent3"/>
-            </a:solidFill>
-            <a:headEnd type="none" w="med" len="med"/>
-            <a:tailEnd type="none" w="med" len="med"/>
-          </a:ln>
-          <a:effectLst/>
-        </p:spPr>
-        <p:style>
-          <a:lnRef idx="1">
-            <a:schemeClr val="accent2"/>
-          </a:lnRef>
-          <a:fillRef idx="2">
-            <a:schemeClr val="accent2"/>
-          </a:fillRef>
-          <a:effectRef idx="1">
-            <a:schemeClr val="accent2"/>
-          </a:effectRef>
-          <a:fontRef idx="minor">
-            <a:schemeClr val="dk1"/>
-          </a:fontRef>
-        </p:style>
-      </p:cxnSp>
-      <p:sp>
-        <p:nvSpPr>
-          <p:cNvPr id="98" name="Rectangle 62"/>
-          <p:cNvSpPr/>
-          <p:nvPr/>
-        </p:nvSpPr>
-        <p:spPr>
-          <a:xfrm>
-            <a:off x="3657600" y="1770924"/>
-            <a:ext cx="1031399" cy="346760"/>
-          </a:xfrm>
-          <a:prstGeom prst="rect">
-            <a:avLst/>
-          </a:prstGeom>
-          <a:solidFill>
-            <a:srgbClr val="00B050"/>
-          </a:solidFill>
-          <a:ln w="19050">
-            <a:solidFill>
-              <a:srgbClr val="00B050"/>
-            </a:solidFill>
-          </a:ln>
-          <a:effectLst/>
-        </p:spPr>
-        <p:style>
-          <a:lnRef idx="1">
-            <a:schemeClr val="accent2"/>
-          </a:lnRef>
-          <a:fillRef idx="2">
-            <a:schemeClr val="accent2"/>
-          </a:fillRef>
-          <a:effectRef idx="1">
-            <a:schemeClr val="accent2"/>
-          </a:effectRef>
-          <a:fontRef idx="minor">
-            <a:schemeClr val="dk1"/>
-          </a:fontRef>
-        </p:style>
-        <p:txBody>
-          <a:bodyPr rtlCol="0" anchor="ctr"/>
-          <a:lstStyle/>
-          <a:p>
-            <a:pPr algn="ctr"/>
-            <a:r>
-              <a:rPr lang="en-US" sz="1050" dirty="0" err="1">
-                <a:solidFill>
-                  <a:schemeClr val="bg1"/>
-                </a:solidFill>
-              </a:rPr>
-              <a:t>UiPartLoader</a:t>
-            </a:r>
-            <a:endParaRPr lang="en-SG" sz="1050" dirty="0">
-              <a:solidFill>
-                <a:schemeClr val="bg1"/>
-              </a:solidFill>
-            </a:endParaRPr>
-          </a:p>
-        </p:txBody>
-      </p:sp>
-      <p:cxnSp>
-        <p:nvCxnSpPr>
           <p:cNvPr id="107" name="Elbow Connector 106"/>
           <p:cNvCxnSpPr>
-            <a:stCxn id="9" idx="0"/>
+            <a:stCxn id="9" idx="3"/>
           </p:cNvCxnSpPr>
           <p:nvPr/>
         </p:nvCxnSpPr>
         <p:spPr>
-          <a:xfrm rot="5400000" flipH="1" flipV="1">
-            <a:off x="4594921" y="-355061"/>
-            <a:ext cx="170724" cy="4081246"/>
-          </a:xfrm>
-          <a:prstGeom prst="bentConnector2">
-            <a:avLst/>
+          <a:xfrm>
+            <a:off x="3186477" y="1944304"/>
+            <a:ext cx="3534429" cy="6004"/>
+          </a:xfrm>
+          <a:prstGeom prst="bentConnector3">
+            <a:avLst>
+              <a:gd name="adj1" fmla="val 50000"/>
+            </a:avLst>
           </a:prstGeom>
           <a:ln w="19050">
             <a:solidFill>
               <a:srgbClr val="00B050"/>
             </a:solidFill>
             <a:prstDash val="solid"/>
-            <a:headEnd type="none" w="med" len="med"/>
-            <a:tailEnd type="arrow" w="med" len="med"/>
-          </a:ln>
-          <a:effectLst/>
-        </p:spPr>
-        <p:style>
-          <a:lnRef idx="1">
-            <a:schemeClr val="accent2"/>
-          </a:lnRef>
-          <a:fillRef idx="2">
-            <a:schemeClr val="accent2"/>
-          </a:fillRef>
-          <a:effectRef idx="1">
-            <a:schemeClr val="accent2"/>
-          </a:effectRef>
-          <a:fontRef idx="minor">
-            <a:schemeClr val="dk1"/>
-          </a:fontRef>
-        </p:style>
-      </p:cxnSp>
-      <p:cxnSp>
-        <p:nvCxnSpPr>
-          <p:cNvPr id="110" name="Straight Arrow Connector 109"/>
-          <p:cNvCxnSpPr/>
-          <p:nvPr/>
-        </p:nvCxnSpPr>
-        <p:spPr>
-          <a:xfrm flipV="1">
-            <a:off x="3198609" y="1944304"/>
-            <a:ext cx="484448" cy="2308"/>
-          </a:xfrm>
-          <a:prstGeom prst="straightConnector1">
-            <a:avLst/>
-          </a:prstGeom>
-          <a:ln w="19050">
-            <a:solidFill>
-              <a:srgbClr val="00B050"/>
-            </a:solidFill>
-            <a:headEnd type="none" w="med" len="med"/>
-            <a:tailEnd type="arrow" w="med" len="med"/>
-          </a:ln>
-          <a:effectLst/>
-        </p:spPr>
-        <p:style>
-          <a:lnRef idx="1">
-            <a:schemeClr val="accent2"/>
-          </a:lnRef>
-          <a:fillRef idx="2">
-            <a:schemeClr val="accent2"/>
-          </a:fillRef>
-          <a:effectRef idx="1">
-            <a:schemeClr val="accent2"/>
-          </a:effectRef>
-          <a:fontRef idx="minor">
-            <a:schemeClr val="dk1"/>
-          </a:fontRef>
-        </p:style>
-      </p:cxnSp>
-      <p:cxnSp>
-        <p:nvCxnSpPr>
-          <p:cNvPr id="111" name="Straight Arrow Connector 110"/>
-          <p:cNvCxnSpPr>
-            <a:endCxn id="73" idx="1"/>
-          </p:cNvCxnSpPr>
-          <p:nvPr/>
-        </p:nvCxnSpPr>
-        <p:spPr>
-          <a:xfrm flipV="1">
-            <a:off x="4714456" y="1944304"/>
-            <a:ext cx="429492" cy="2308"/>
-          </a:xfrm>
-          <a:prstGeom prst="straightConnector1">
-            <a:avLst/>
-          </a:prstGeom>
-          <a:ln w="19050">
-            <a:solidFill>
-              <a:schemeClr val="accent3"/>
-            </a:solidFill>
-            <a:prstDash val="sysDot"/>
             <a:headEnd type="none" w="med" len="med"/>
             <a:tailEnd type="arrow" w="med" len="med"/>
           </a:ln>
@@ -10568,212 +10056,6 @@
           </a:p>
         </p:txBody>
       </p:sp>
-      <p:cxnSp>
-        <p:nvCxnSpPr>
-          <p:cNvPr id="121" name="Elbow Connector 63"/>
-          <p:cNvCxnSpPr>
-            <a:stCxn id="9" idx="1"/>
-            <a:endCxn id="120" idx="3"/>
-          </p:cNvCxnSpPr>
-          <p:nvPr/>
-        </p:nvCxnSpPr>
-        <p:spPr>
-          <a:xfrm rot="10800000" flipV="1">
-            <a:off x="1503020" y="1944303"/>
-            <a:ext cx="589823" cy="341697"/>
-          </a:xfrm>
-          <a:prstGeom prst="bentConnector2">
-            <a:avLst/>
-          </a:prstGeom>
-          <a:ln w="19050">
-            <a:solidFill>
-              <a:srgbClr val="00B050"/>
-            </a:solidFill>
-            <a:prstDash val="sysDot"/>
-            <a:headEnd type="none" w="med" len="med"/>
-            <a:tailEnd type="none" w="med" len="med"/>
-          </a:ln>
-          <a:effectLst/>
-        </p:spPr>
-        <p:style>
-          <a:lnRef idx="1">
-            <a:schemeClr val="accent2"/>
-          </a:lnRef>
-          <a:fillRef idx="2">
-            <a:schemeClr val="accent2"/>
-          </a:fillRef>
-          <a:effectRef idx="1">
-            <a:schemeClr val="accent2"/>
-          </a:effectRef>
-          <a:fontRef idx="minor">
-            <a:schemeClr val="dk1"/>
-          </a:fontRef>
-        </p:style>
-      </p:cxnSp>
-      <p:cxnSp>
-        <p:nvCxnSpPr>
-          <p:cNvPr id="131" name="Elbow Connector 130"/>
-          <p:cNvCxnSpPr>
-            <a:stCxn id="3" idx="2"/>
-            <a:endCxn id="43" idx="1"/>
-          </p:cNvCxnSpPr>
-          <p:nvPr/>
-        </p:nvCxnSpPr>
-        <p:spPr>
-          <a:xfrm rot="16200000" flipH="1">
-            <a:off x="3389830" y="3165517"/>
-            <a:ext cx="119381" cy="620348"/>
-          </a:xfrm>
-          <a:prstGeom prst="bentConnector2">
-            <a:avLst/>
-          </a:prstGeom>
-          <a:ln w="19050">
-            <a:solidFill>
-              <a:schemeClr val="accent3"/>
-            </a:solidFill>
-            <a:headEnd type="none" w="med" len="med"/>
-            <a:tailEnd type="arrow" w="med" len="med"/>
-          </a:ln>
-          <a:effectLst/>
-        </p:spPr>
-        <p:style>
-          <a:lnRef idx="1">
-            <a:schemeClr val="accent2"/>
-          </a:lnRef>
-          <a:fillRef idx="2">
-            <a:schemeClr val="accent2"/>
-          </a:fillRef>
-          <a:effectRef idx="1">
-            <a:schemeClr val="accent2"/>
-          </a:effectRef>
-          <a:fontRef idx="minor">
-            <a:schemeClr val="dk1"/>
-          </a:fontRef>
-        </p:style>
-      </p:cxnSp>
-      <p:cxnSp>
-        <p:nvCxnSpPr>
-          <p:cNvPr id="132" name="Elbow Connector 63"/>
-          <p:cNvCxnSpPr>
-            <a:stCxn id="16" idx="3"/>
-            <a:endCxn id="3" idx="3"/>
-          </p:cNvCxnSpPr>
-          <p:nvPr/>
-        </p:nvCxnSpPr>
-        <p:spPr>
-          <a:xfrm rot="5400000">
-            <a:off x="4102276" y="1869887"/>
-            <a:ext cx="1011581" cy="1843806"/>
-          </a:xfrm>
-          <a:prstGeom prst="bentConnector2">
-            <a:avLst/>
-          </a:prstGeom>
-          <a:ln w="6350">
-            <a:solidFill>
-              <a:schemeClr val="accent3"/>
-            </a:solidFill>
-            <a:headEnd type="none" w="med" len="med"/>
-            <a:tailEnd type="none" w="med" len="med"/>
-          </a:ln>
-          <a:effectLst/>
-        </p:spPr>
-        <p:style>
-          <a:lnRef idx="1">
-            <a:schemeClr val="accent2"/>
-          </a:lnRef>
-          <a:fillRef idx="2">
-            <a:schemeClr val="accent2"/>
-          </a:fillRef>
-          <a:effectRef idx="1">
-            <a:schemeClr val="accent2"/>
-          </a:effectRef>
-          <a:fontRef idx="minor">
-            <a:schemeClr val="dk1"/>
-          </a:fontRef>
-        </p:style>
-      </p:cxnSp>
-      <p:cxnSp>
-        <p:nvCxnSpPr>
-          <p:cNvPr id="137" name="Elbow Connector 136"/>
-          <p:cNvCxnSpPr>
-            <a:stCxn id="36" idx="2"/>
-            <a:endCxn id="37" idx="1"/>
-          </p:cNvCxnSpPr>
-          <p:nvPr/>
-        </p:nvCxnSpPr>
-        <p:spPr>
-          <a:xfrm rot="16200000" flipH="1">
-            <a:off x="3430123" y="3938021"/>
-            <a:ext cx="118421" cy="699979"/>
-          </a:xfrm>
-          <a:prstGeom prst="bentConnector2">
-            <a:avLst/>
-          </a:prstGeom>
-          <a:ln w="19050">
-            <a:solidFill>
-              <a:schemeClr val="accent3"/>
-            </a:solidFill>
-            <a:headEnd type="none" w="med" len="med"/>
-            <a:tailEnd type="arrow" w="med" len="med"/>
-          </a:ln>
-          <a:effectLst/>
-        </p:spPr>
-        <p:style>
-          <a:lnRef idx="1">
-            <a:schemeClr val="accent2"/>
-          </a:lnRef>
-          <a:fillRef idx="2">
-            <a:schemeClr val="accent2"/>
-          </a:fillRef>
-          <a:effectRef idx="1">
-            <a:schemeClr val="accent2"/>
-          </a:effectRef>
-          <a:fontRef idx="minor">
-            <a:schemeClr val="dk1"/>
-          </a:fontRef>
-        </p:style>
-      </p:cxnSp>
-      <p:cxnSp>
-        <p:nvCxnSpPr>
-          <p:cNvPr id="140" name="Elbow Connector 63"/>
-          <p:cNvCxnSpPr>
-            <a:stCxn id="16" idx="3"/>
-            <a:endCxn id="36" idx="3"/>
-          </p:cNvCxnSpPr>
-          <p:nvPr/>
-        </p:nvCxnSpPr>
-        <p:spPr>
-          <a:xfrm rot="5400000">
-            <a:off x="3695875" y="2276286"/>
-            <a:ext cx="1824381" cy="1843808"/>
-          </a:xfrm>
-          <a:prstGeom prst="bentConnector2">
-            <a:avLst/>
-          </a:prstGeom>
-          <a:ln w="6350">
-            <a:solidFill>
-              <a:schemeClr val="accent3"/>
-            </a:solidFill>
-            <a:headEnd type="none" w="med" len="med"/>
-            <a:tailEnd type="none" w="med" len="med"/>
-          </a:ln>
-          <a:effectLst/>
-        </p:spPr>
-        <p:style>
-          <a:lnRef idx="1">
-            <a:schemeClr val="accent2"/>
-          </a:lnRef>
-          <a:fillRef idx="2">
-            <a:schemeClr val="accent2"/>
-          </a:fillRef>
-          <a:effectRef idx="1">
-            <a:schemeClr val="accent2"/>
-          </a:effectRef>
-          <a:fontRef idx="minor">
-            <a:schemeClr val="dk1"/>
-          </a:fontRef>
-        </p:style>
-      </p:cxnSp>
       <p:sp>
         <p:nvSpPr>
           <p:cNvPr id="143" name="Rectangle 142"/>
@@ -10829,88 +10111,6 @@
       </p:sp>
       <p:sp>
         <p:nvSpPr>
-          <p:cNvPr id="116" name="Freeform 115"/>
-          <p:cNvSpPr/>
-          <p:nvPr/>
-        </p:nvSpPr>
-        <p:spPr>
-          <a:xfrm>
-            <a:off x="3687515" y="2981202"/>
-            <a:ext cx="3048000" cy="203200"/>
-          </a:xfrm>
-          <a:custGeom>
-            <a:avLst/>
-            <a:gdLst>
-              <a:gd name="connsiteX0" fmla="*/ 0 w 3048000"/>
-              <a:gd name="connsiteY0" fmla="*/ 203200 h 203200"/>
-              <a:gd name="connsiteX1" fmla="*/ 221673 w 3048000"/>
-              <a:gd name="connsiteY1" fmla="*/ 0 h 203200"/>
-              <a:gd name="connsiteX2" fmla="*/ 3048000 w 3048000"/>
-              <a:gd name="connsiteY2" fmla="*/ 0 h 203200"/>
-            </a:gdLst>
-            <a:ahLst/>
-            <a:cxnLst>
-              <a:cxn ang="0">
-                <a:pos x="connsiteX0" y="connsiteY0"/>
-              </a:cxn>
-              <a:cxn ang="0">
-                <a:pos x="connsiteX1" y="connsiteY1"/>
-              </a:cxn>
-              <a:cxn ang="0">
-                <a:pos x="connsiteX2" y="connsiteY2"/>
-              </a:cxn>
-            </a:cxnLst>
-            <a:rect l="l" t="t" r="r" b="b"/>
-            <a:pathLst>
-              <a:path w="3048000" h="203200">
-                <a:moveTo>
-                  <a:pt x="0" y="203200"/>
-                </a:moveTo>
-                <a:lnTo>
-                  <a:pt x="221673" y="0"/>
-                </a:lnTo>
-                <a:lnTo>
-                  <a:pt x="3048000" y="0"/>
-                </a:lnTo>
-              </a:path>
-            </a:pathLst>
-          </a:custGeom>
-          <a:noFill/>
-          <a:ln w="19050">
-            <a:solidFill>
-              <a:schemeClr val="accent3"/>
-            </a:solidFill>
-            <a:prstDash val="solid"/>
-            <a:headEnd type="none" w="med" len="med"/>
-            <a:tailEnd type="arrow" w="med" len="med"/>
-          </a:ln>
-          <a:effectLst/>
-        </p:spPr>
-        <p:style>
-          <a:lnRef idx="1">
-            <a:schemeClr val="accent2"/>
-          </a:lnRef>
-          <a:fillRef idx="2">
-            <a:schemeClr val="accent2"/>
-          </a:fillRef>
-          <a:effectRef idx="1">
-            <a:schemeClr val="accent2"/>
-          </a:effectRef>
-          <a:fontRef idx="minor">
-            <a:schemeClr val="dk1"/>
-          </a:fontRef>
-        </p:style>
-        <p:txBody>
-          <a:bodyPr rtlCol="0" anchor="ctr"/>
-          <a:lstStyle/>
-          <a:p>
-            <a:pPr algn="ctr"/>
-            <a:endParaRPr lang="en-SG"/>
-          </a:p>
-        </p:txBody>
-      </p:sp>
-      <p:sp>
-        <p:nvSpPr>
           <p:cNvPr id="144" name="Rectangle 143"/>
           <p:cNvSpPr/>
           <p:nvPr/>
@@ -10964,58 +10164,252 @@
       </p:sp>
       <p:sp>
         <p:nvSpPr>
-          <p:cNvPr id="118" name="Freeform 117"/>
+          <p:cNvPr id="46" name="Rectangle 11"/>
           <p:cNvSpPr/>
           <p:nvPr/>
         </p:nvSpPr>
         <p:spPr>
-          <a:xfrm flipV="1">
-            <a:off x="4114799" y="4472708"/>
-            <a:ext cx="2642195" cy="101600"/>
-          </a:xfrm>
-          <a:custGeom>
-            <a:avLst/>
-            <a:gdLst>
-              <a:gd name="connsiteX0" fmla="*/ 0 w 3048000"/>
-              <a:gd name="connsiteY0" fmla="*/ 203200 h 203200"/>
-              <a:gd name="connsiteX1" fmla="*/ 221673 w 3048000"/>
-              <a:gd name="connsiteY1" fmla="*/ 0 h 203200"/>
-              <a:gd name="connsiteX2" fmla="*/ 3048000 w 3048000"/>
-              <a:gd name="connsiteY2" fmla="*/ 0 h 203200"/>
-            </a:gdLst>
-            <a:ahLst/>
-            <a:cxnLst>
-              <a:cxn ang="0">
-                <a:pos x="connsiteX0" y="connsiteY0"/>
-              </a:cxn>
-              <a:cxn ang="0">
-                <a:pos x="connsiteX1" y="connsiteY1"/>
-              </a:cxn>
-              <a:cxn ang="0">
-                <a:pos x="connsiteX2" y="connsiteY2"/>
-              </a:cxn>
-            </a:cxnLst>
-            <a:rect l="l" t="t" r="r" b="b"/>
-            <a:pathLst>
-              <a:path w="3048000" h="203200">
-                <a:moveTo>
-                  <a:pt x="0" y="203200"/>
-                </a:moveTo>
-                <a:lnTo>
-                  <a:pt x="221673" y="0"/>
-                </a:lnTo>
-                <a:lnTo>
-                  <a:pt x="3048000" y="0"/>
-                </a:lnTo>
-              </a:path>
-            </a:pathLst>
-          </a:custGeom>
-          <a:noFill/>
+          <a:xfrm>
+            <a:off x="1091453" y="6089850"/>
+            <a:ext cx="1093635" cy="236841"/>
+          </a:xfrm>
+          <a:prstGeom prst="rect">
+            <a:avLst/>
+          </a:prstGeom>
           <a:ln w="19050">
             <a:solidFill>
               <a:schemeClr val="accent3"/>
             </a:solidFill>
-            <a:prstDash val="sysDot"/>
+          </a:ln>
+          <a:effectLst/>
+        </p:spPr>
+        <p:style>
+          <a:lnRef idx="1">
+            <a:schemeClr val="accent3"/>
+          </a:lnRef>
+          <a:fillRef idx="2">
+            <a:schemeClr val="accent3"/>
+          </a:fillRef>
+          <a:effectRef idx="1">
+            <a:schemeClr val="accent3"/>
+          </a:effectRef>
+          <a:fontRef idx="minor">
+            <a:schemeClr val="dk1"/>
+          </a:fontRef>
+        </p:style>
+        <p:txBody>
+          <a:bodyPr rtlCol="0" anchor="ctr"/>
+          <a:lstStyle/>
+          <a:p>
+            <a:pPr algn="ctr"/>
+            <a:r>
+              <a:rPr lang="en-US" sz="1050" b="1" dirty="0" err="1">
+                <a:solidFill>
+                  <a:schemeClr val="accent3">
+                    <a:lumMod val="75000"/>
+                  </a:schemeClr>
+                </a:solidFill>
+              </a:rPr>
+              <a:t>UiPartLoader</a:t>
+            </a:r>
+            <a:endParaRPr lang="en-SG" sz="1050" b="1" dirty="0">
+              <a:solidFill>
+                <a:schemeClr val="accent3">
+                  <a:lumMod val="75000"/>
+                </a:schemeClr>
+              </a:solidFill>
+            </a:endParaRPr>
+          </a:p>
+        </p:txBody>
+      </p:sp>
+      <p:cxnSp>
+        <p:nvCxnSpPr>
+          <p:cNvPr id="78" name="Connector: Elbow 77"/>
+          <p:cNvCxnSpPr/>
+          <p:nvPr/>
+        </p:nvCxnSpPr>
+        <p:spPr>
+          <a:xfrm rot="16200000" flipH="1">
+            <a:off x="1600225" y="5916469"/>
+            <a:ext cx="346761" cy="2"/>
+          </a:xfrm>
+          <a:prstGeom prst="bentConnector3">
+            <a:avLst>
+              <a:gd name="adj1" fmla="val 50000"/>
+            </a:avLst>
+          </a:prstGeom>
+          <a:ln w="19050">
+            <a:solidFill>
+              <a:srgbClr val="9BBB59"/>
+            </a:solidFill>
+            <a:prstDash val="sysDash"/>
+            <a:tailEnd type="arrow"/>
+          </a:ln>
+        </p:spPr>
+        <p:style>
+          <a:lnRef idx="1">
+            <a:schemeClr val="accent1"/>
+          </a:lnRef>
+          <a:fillRef idx="0">
+            <a:schemeClr val="accent1"/>
+          </a:fillRef>
+          <a:effectRef idx="0">
+            <a:schemeClr val="accent1"/>
+          </a:effectRef>
+          <a:fontRef idx="minor">
+            <a:schemeClr val="tx1"/>
+          </a:fontRef>
+        </p:style>
+      </p:cxnSp>
+      <p:cxnSp>
+        <p:nvCxnSpPr>
+          <p:cNvPr id="86" name="Connector: Elbow 85"/>
+          <p:cNvCxnSpPr/>
+          <p:nvPr/>
+        </p:nvCxnSpPr>
+        <p:spPr>
+          <a:xfrm rot="16200000" flipH="1">
+            <a:off x="1464889" y="5916468"/>
+            <a:ext cx="346761" cy="2"/>
+          </a:xfrm>
+          <a:prstGeom prst="bentConnector3">
+            <a:avLst>
+              <a:gd name="adj1" fmla="val 50000"/>
+            </a:avLst>
+          </a:prstGeom>
+          <a:ln w="19050">
+            <a:solidFill>
+              <a:srgbClr val="9BBB59"/>
+            </a:solidFill>
+            <a:prstDash val="sysDash"/>
+            <a:tailEnd type="arrow"/>
+          </a:ln>
+        </p:spPr>
+        <p:style>
+          <a:lnRef idx="1">
+            <a:schemeClr val="accent1"/>
+          </a:lnRef>
+          <a:fillRef idx="0">
+            <a:schemeClr val="accent1"/>
+          </a:fillRef>
+          <a:effectRef idx="0">
+            <a:schemeClr val="accent1"/>
+          </a:effectRef>
+          <a:fontRef idx="minor">
+            <a:schemeClr val="tx1"/>
+          </a:fontRef>
+        </p:style>
+      </p:cxnSp>
+      <p:cxnSp>
+        <p:nvCxnSpPr>
+          <p:cNvPr id="87" name="Connector: Elbow 86"/>
+          <p:cNvCxnSpPr/>
+          <p:nvPr/>
+        </p:nvCxnSpPr>
+        <p:spPr>
+          <a:xfrm rot="16200000" flipH="1">
+            <a:off x="1332074" y="5916468"/>
+            <a:ext cx="346761" cy="2"/>
+          </a:xfrm>
+          <a:prstGeom prst="bentConnector3">
+            <a:avLst>
+              <a:gd name="adj1" fmla="val 50000"/>
+            </a:avLst>
+          </a:prstGeom>
+          <a:ln w="19050">
+            <a:solidFill>
+              <a:srgbClr val="9BBB59"/>
+            </a:solidFill>
+            <a:prstDash val="sysDash"/>
+            <a:tailEnd type="arrow"/>
+          </a:ln>
+        </p:spPr>
+        <p:style>
+          <a:lnRef idx="1">
+            <a:schemeClr val="accent1"/>
+          </a:lnRef>
+          <a:fillRef idx="0">
+            <a:schemeClr val="accent1"/>
+          </a:fillRef>
+          <a:effectRef idx="0">
+            <a:schemeClr val="accent1"/>
+          </a:effectRef>
+          <a:fontRef idx="minor">
+            <a:schemeClr val="tx1"/>
+          </a:fontRef>
+        </p:style>
+      </p:cxnSp>
+      <p:sp>
+        <p:nvSpPr>
+          <p:cNvPr id="89" name="Flowchart: Decision 88"/>
+          <p:cNvSpPr/>
+          <p:nvPr/>
+        </p:nvSpPr>
+        <p:spPr>
+          <a:xfrm>
+            <a:off x="2548081" y="2127411"/>
+            <a:ext cx="183156" cy="161573"/>
+          </a:xfrm>
+          <a:prstGeom prst="flowChartDecision">
+            <a:avLst/>
+          </a:prstGeom>
+          <a:solidFill>
+            <a:schemeClr val="accent3"/>
+          </a:solidFill>
+          <a:ln>
+            <a:solidFill>
+              <a:schemeClr val="accent3"/>
+            </a:solidFill>
+          </a:ln>
+        </p:spPr>
+        <p:style>
+          <a:lnRef idx="2">
+            <a:schemeClr val="accent1">
+              <a:shade val="50000"/>
+            </a:schemeClr>
+          </a:lnRef>
+          <a:fillRef idx="1">
+            <a:schemeClr val="accent1"/>
+          </a:fillRef>
+          <a:effectRef idx="0">
+            <a:schemeClr val="accent1"/>
+          </a:effectRef>
+          <a:fontRef idx="minor">
+            <a:schemeClr val="lt1"/>
+          </a:fontRef>
+        </p:style>
+        <p:txBody>
+          <a:bodyPr rtlCol="0" anchor="ctr"/>
+          <a:lstStyle/>
+          <a:p>
+            <a:pPr algn="ctr"/>
+            <a:endParaRPr lang="en-SG"/>
+          </a:p>
+        </p:txBody>
+      </p:sp>
+      <p:cxnSp>
+        <p:nvCxnSpPr>
+          <p:cNvPr id="90" name="Elbow Connector 63"/>
+          <p:cNvCxnSpPr>
+            <a:stCxn id="89" idx="2"/>
+            <a:endCxn id="2" idx="0"/>
+          </p:cNvCxnSpPr>
+          <p:nvPr/>
+        </p:nvCxnSpPr>
+        <p:spPr>
+          <a:xfrm rot="5400000">
+            <a:off x="2420857" y="2239636"/>
+            <a:ext cx="169454" cy="268150"/>
+          </a:xfrm>
+          <a:prstGeom prst="bentConnector3">
+            <a:avLst>
+              <a:gd name="adj1" fmla="val -45557"/>
+            </a:avLst>
+          </a:prstGeom>
+          <a:ln w="19050">
+            <a:solidFill>
+              <a:schemeClr val="accent3"/>
+            </a:solidFill>
             <a:headEnd type="none" w="med" len="med"/>
             <a:tailEnd type="arrow" w="med" len="med"/>
           </a:ln>
@@ -11035,6 +10429,321 @@
             <a:schemeClr val="dk1"/>
           </a:fontRef>
         </p:style>
+      </p:cxnSp>
+      <p:sp>
+        <p:nvSpPr>
+          <p:cNvPr id="127" name="Rectangle 65"/>
+          <p:cNvSpPr/>
+          <p:nvPr/>
+        </p:nvSpPr>
+        <p:spPr>
+          <a:xfrm rot="16200000">
+            <a:off x="6392527" y="5986230"/>
+            <a:ext cx="1022906" cy="328045"/>
+          </a:xfrm>
+          <a:prstGeom prst="roundRect">
+            <a:avLst/>
+          </a:prstGeom>
+          <a:solidFill>
+            <a:srgbClr val="31859C">
+              <a:alpha val="25000"/>
+            </a:srgbClr>
+          </a:solidFill>
+          <a:ln w="19050">
+            <a:noFill/>
+          </a:ln>
+          <a:effectLst/>
+        </p:spPr>
+        <p:style>
+          <a:lnRef idx="1">
+            <a:schemeClr val="accent2"/>
+          </a:lnRef>
+          <a:fillRef idx="2">
+            <a:schemeClr val="accent2"/>
+          </a:fillRef>
+          <a:effectRef idx="1">
+            <a:schemeClr val="accent2"/>
+          </a:effectRef>
+          <a:fontRef idx="minor">
+            <a:schemeClr val="dk1"/>
+          </a:fontRef>
+        </p:style>
+        <p:txBody>
+          <a:bodyPr rtlCol="0" anchor="ctr"/>
+          <a:lstStyle/>
+          <a:p>
+            <a:pPr algn="ctr"/>
+            <a:r>
+              <a:rPr lang="en-US" sz="1100" b="1" dirty="0">
+                <a:solidFill>
+                  <a:schemeClr val="bg1"/>
+                </a:solidFill>
+              </a:rPr>
+              <a:t>Commons</a:t>
+            </a:r>
+            <a:endParaRPr lang="en-SG" sz="1100" b="1" dirty="0">
+              <a:solidFill>
+                <a:schemeClr val="bg1"/>
+              </a:solidFill>
+            </a:endParaRPr>
+          </a:p>
+        </p:txBody>
+      </p:sp>
+      <p:grpSp>
+        <p:nvGrpSpPr>
+          <p:cNvPr id="109" name="Group 108"/>
+          <p:cNvGrpSpPr/>
+          <p:nvPr/>
+        </p:nvGrpSpPr>
+        <p:grpSpPr>
+          <a:xfrm rot="16200000">
+            <a:off x="6442449" y="5964272"/>
+            <a:ext cx="268153" cy="346762"/>
+            <a:chOff x="6060035" y="6038840"/>
+            <a:chExt cx="268153" cy="346762"/>
+          </a:xfrm>
+        </p:grpSpPr>
+        <p:cxnSp>
+          <p:nvCxnSpPr>
+            <p:cNvPr id="129" name="Connector: Elbow 128"/>
+            <p:cNvCxnSpPr/>
+            <p:nvPr/>
+          </p:nvCxnSpPr>
+          <p:spPr>
+            <a:xfrm rot="16200000" flipH="1">
+              <a:off x="6154806" y="6212221"/>
+              <a:ext cx="346761" cy="2"/>
+            </a:xfrm>
+            <a:prstGeom prst="bentConnector3">
+              <a:avLst>
+                <a:gd name="adj1" fmla="val 50000"/>
+              </a:avLst>
+            </a:prstGeom>
+            <a:ln w="19050">
+              <a:solidFill>
+                <a:srgbClr val="9BBB59"/>
+              </a:solidFill>
+              <a:prstDash val="sysDash"/>
+              <a:tailEnd type="arrow"/>
+            </a:ln>
+          </p:spPr>
+          <p:style>
+            <a:lnRef idx="1">
+              <a:schemeClr val="accent1"/>
+            </a:lnRef>
+            <a:fillRef idx="0">
+              <a:schemeClr val="accent1"/>
+            </a:fillRef>
+            <a:effectRef idx="0">
+              <a:schemeClr val="accent1"/>
+            </a:effectRef>
+            <a:fontRef idx="minor">
+              <a:schemeClr val="tx1"/>
+            </a:fontRef>
+          </p:style>
+        </p:cxnSp>
+        <p:cxnSp>
+          <p:nvCxnSpPr>
+            <p:cNvPr id="130" name="Connector: Elbow 129"/>
+            <p:cNvCxnSpPr/>
+            <p:nvPr/>
+          </p:nvCxnSpPr>
+          <p:spPr>
+            <a:xfrm rot="16200000" flipH="1">
+              <a:off x="6019470" y="6212220"/>
+              <a:ext cx="346761" cy="2"/>
+            </a:xfrm>
+            <a:prstGeom prst="bentConnector3">
+              <a:avLst>
+                <a:gd name="adj1" fmla="val 50000"/>
+              </a:avLst>
+            </a:prstGeom>
+            <a:ln w="19050">
+              <a:solidFill>
+                <a:srgbClr val="9BBB59"/>
+              </a:solidFill>
+              <a:prstDash val="sysDash"/>
+              <a:tailEnd type="arrow"/>
+            </a:ln>
+          </p:spPr>
+          <p:style>
+            <a:lnRef idx="1">
+              <a:schemeClr val="accent1"/>
+            </a:lnRef>
+            <a:fillRef idx="0">
+              <a:schemeClr val="accent1"/>
+            </a:fillRef>
+            <a:effectRef idx="0">
+              <a:schemeClr val="accent1"/>
+            </a:effectRef>
+            <a:fontRef idx="minor">
+              <a:schemeClr val="tx1"/>
+            </a:fontRef>
+          </p:style>
+        </p:cxnSp>
+        <p:cxnSp>
+          <p:nvCxnSpPr>
+            <p:cNvPr id="133" name="Connector: Elbow 132"/>
+            <p:cNvCxnSpPr/>
+            <p:nvPr/>
+          </p:nvCxnSpPr>
+          <p:spPr>
+            <a:xfrm rot="16200000" flipH="1">
+              <a:off x="5886655" y="6212220"/>
+              <a:ext cx="346761" cy="2"/>
+            </a:xfrm>
+            <a:prstGeom prst="bentConnector3">
+              <a:avLst>
+                <a:gd name="adj1" fmla="val 50000"/>
+              </a:avLst>
+            </a:prstGeom>
+            <a:ln w="19050">
+              <a:solidFill>
+                <a:srgbClr val="9BBB59"/>
+              </a:solidFill>
+              <a:prstDash val="sysDash"/>
+              <a:tailEnd type="arrow"/>
+            </a:ln>
+          </p:spPr>
+          <p:style>
+            <a:lnRef idx="1">
+              <a:schemeClr val="accent1"/>
+            </a:lnRef>
+            <a:fillRef idx="0">
+              <a:schemeClr val="accent1"/>
+            </a:fillRef>
+            <a:effectRef idx="0">
+              <a:schemeClr val="accent1"/>
+            </a:effectRef>
+            <a:fontRef idx="minor">
+              <a:schemeClr val="tx1"/>
+            </a:fontRef>
+          </p:style>
+        </p:cxnSp>
+      </p:grpSp>
+      <p:cxnSp>
+        <p:nvCxnSpPr>
+          <p:cNvPr id="134" name="Elbow Connector 63"/>
+          <p:cNvCxnSpPr>
+            <a:stCxn id="39" idx="2"/>
+            <a:endCxn id="38" idx="1"/>
+          </p:cNvCxnSpPr>
+          <p:nvPr/>
+        </p:nvCxnSpPr>
+        <p:spPr>
+          <a:xfrm rot="16200000" flipH="1">
+            <a:off x="1429255" y="3921147"/>
+            <a:ext cx="2102307" cy="224239"/>
+          </a:xfrm>
+          <a:prstGeom prst="bentConnector2">
+            <a:avLst/>
+          </a:prstGeom>
+          <a:ln w="19050">
+            <a:solidFill>
+              <a:schemeClr val="accent3"/>
+            </a:solidFill>
+            <a:headEnd type="none" w="med" len="med"/>
+            <a:tailEnd type="arrow" w="med" len="med"/>
+          </a:ln>
+          <a:effectLst/>
+        </p:spPr>
+        <p:style>
+          <a:lnRef idx="1">
+            <a:schemeClr val="accent2"/>
+          </a:lnRef>
+          <a:fillRef idx="2">
+            <a:schemeClr val="accent2"/>
+          </a:fillRef>
+          <a:effectRef idx="1">
+            <a:schemeClr val="accent2"/>
+          </a:effectRef>
+          <a:fontRef idx="minor">
+            <a:schemeClr val="dk1"/>
+          </a:fontRef>
+        </p:style>
+      </p:cxnSp>
+      <p:cxnSp>
+        <p:nvCxnSpPr>
+          <p:cNvPr id="138" name="Connector: Elbow 137"/>
+          <p:cNvCxnSpPr>
+            <a:endCxn id="119" idx="0"/>
+          </p:cNvCxnSpPr>
+          <p:nvPr/>
+        </p:nvCxnSpPr>
+        <p:spPr>
+          <a:xfrm flipV="1">
+            <a:off x="442359" y="3034582"/>
+            <a:ext cx="887281" cy="682"/>
+          </a:xfrm>
+          <a:prstGeom prst="bentConnector3">
+            <a:avLst>
+              <a:gd name="adj1" fmla="val 50000"/>
+            </a:avLst>
+          </a:prstGeom>
+          <a:ln w="19050">
+            <a:solidFill>
+              <a:schemeClr val="tx1">
+                <a:alpha val="25000"/>
+              </a:schemeClr>
+            </a:solidFill>
+            <a:prstDash val="sysDash"/>
+            <a:tailEnd type="arrow"/>
+          </a:ln>
+        </p:spPr>
+        <p:style>
+          <a:lnRef idx="1">
+            <a:schemeClr val="accent1"/>
+          </a:lnRef>
+          <a:fillRef idx="0">
+            <a:schemeClr val="accent1"/>
+          </a:fillRef>
+          <a:effectRef idx="0">
+            <a:schemeClr val="accent1"/>
+          </a:effectRef>
+          <a:fontRef idx="minor">
+            <a:schemeClr val="tx1"/>
+          </a:fontRef>
+        </p:style>
+      </p:cxnSp>
+      <p:sp>
+        <p:nvSpPr>
+          <p:cNvPr id="147" name="Flowchart: Decision 146"/>
+          <p:cNvSpPr/>
+          <p:nvPr/>
+        </p:nvSpPr>
+        <p:spPr>
+          <a:xfrm>
+            <a:off x="3973361" y="3068616"/>
+            <a:ext cx="183156" cy="161573"/>
+          </a:xfrm>
+          <a:prstGeom prst="flowChartDecision">
+            <a:avLst/>
+          </a:prstGeom>
+          <a:solidFill>
+            <a:schemeClr val="accent3"/>
+          </a:solidFill>
+          <a:ln>
+            <a:solidFill>
+              <a:schemeClr val="accent3"/>
+            </a:solidFill>
+          </a:ln>
+        </p:spPr>
+        <p:style>
+          <a:lnRef idx="2">
+            <a:schemeClr val="accent1">
+              <a:shade val="50000"/>
+            </a:schemeClr>
+          </a:lnRef>
+          <a:fillRef idx="1">
+            <a:schemeClr val="accent1"/>
+          </a:fillRef>
+          <a:effectRef idx="0">
+            <a:schemeClr val="accent1"/>
+          </a:effectRef>
+          <a:fontRef idx="minor">
+            <a:schemeClr val="lt1"/>
+          </a:fontRef>
+        </p:style>
         <p:txBody>
           <a:bodyPr rtlCol="0" anchor="ctr"/>
           <a:lstStyle/>
@@ -11044,6 +10753,1568 @@
           </a:p>
         </p:txBody>
       </p:sp>
+      <p:cxnSp>
+        <p:nvCxnSpPr>
+          <p:cNvPr id="148" name="Elbow Connector 63"/>
+          <p:cNvCxnSpPr>
+            <a:stCxn id="147" idx="3"/>
+            <a:endCxn id="43" idx="1"/>
+          </p:cNvCxnSpPr>
+          <p:nvPr/>
+        </p:nvCxnSpPr>
+        <p:spPr>
+          <a:xfrm flipV="1">
+            <a:off x="4156517" y="3123822"/>
+            <a:ext cx="289566" cy="25581"/>
+          </a:xfrm>
+          <a:prstGeom prst="bentConnector3">
+            <a:avLst>
+              <a:gd name="adj1" fmla="val 50000"/>
+            </a:avLst>
+          </a:prstGeom>
+          <a:ln w="19050">
+            <a:solidFill>
+              <a:schemeClr val="accent3"/>
+            </a:solidFill>
+            <a:headEnd type="none" w="med" len="med"/>
+            <a:tailEnd type="arrow" w="med" len="med"/>
+          </a:ln>
+          <a:effectLst/>
+        </p:spPr>
+        <p:style>
+          <a:lnRef idx="1">
+            <a:schemeClr val="accent2"/>
+          </a:lnRef>
+          <a:fillRef idx="2">
+            <a:schemeClr val="accent2"/>
+          </a:fillRef>
+          <a:effectRef idx="1">
+            <a:schemeClr val="accent2"/>
+          </a:effectRef>
+          <a:fontRef idx="minor">
+            <a:schemeClr val="dk1"/>
+          </a:fontRef>
+        </p:style>
+      </p:cxnSp>
+      <p:sp>
+        <p:nvSpPr>
+          <p:cNvPr id="154" name="Flowchart: Decision 153"/>
+          <p:cNvSpPr/>
+          <p:nvPr/>
+        </p:nvSpPr>
+        <p:spPr>
+          <a:xfrm>
+            <a:off x="3693938" y="3523734"/>
+            <a:ext cx="183156" cy="161573"/>
+          </a:xfrm>
+          <a:prstGeom prst="flowChartDecision">
+            <a:avLst/>
+          </a:prstGeom>
+          <a:solidFill>
+            <a:schemeClr val="accent3"/>
+          </a:solidFill>
+          <a:ln>
+            <a:solidFill>
+              <a:schemeClr val="accent3"/>
+            </a:solidFill>
+          </a:ln>
+        </p:spPr>
+        <p:style>
+          <a:lnRef idx="2">
+            <a:schemeClr val="accent1">
+              <a:shade val="50000"/>
+            </a:schemeClr>
+          </a:lnRef>
+          <a:fillRef idx="1">
+            <a:schemeClr val="accent1"/>
+          </a:fillRef>
+          <a:effectRef idx="0">
+            <a:schemeClr val="accent1"/>
+          </a:effectRef>
+          <a:fontRef idx="minor">
+            <a:schemeClr val="lt1"/>
+          </a:fontRef>
+        </p:style>
+        <p:txBody>
+          <a:bodyPr rtlCol="0" anchor="ctr"/>
+          <a:lstStyle/>
+          <a:p>
+            <a:pPr algn="ctr"/>
+            <a:endParaRPr lang="en-SG"/>
+          </a:p>
+        </p:txBody>
+      </p:sp>
+      <p:cxnSp>
+        <p:nvCxnSpPr>
+          <p:cNvPr id="155" name="Elbow Connector 63"/>
+          <p:cNvCxnSpPr>
+            <a:stCxn id="154" idx="3"/>
+            <a:endCxn id="37" idx="1"/>
+          </p:cNvCxnSpPr>
+          <p:nvPr/>
+        </p:nvCxnSpPr>
+        <p:spPr>
+          <a:xfrm>
+            <a:off x="3877094" y="3604521"/>
+            <a:ext cx="762602" cy="84501"/>
+          </a:xfrm>
+          <a:prstGeom prst="bentConnector3">
+            <a:avLst>
+              <a:gd name="adj1" fmla="val 50000"/>
+            </a:avLst>
+          </a:prstGeom>
+          <a:ln w="19050">
+            <a:solidFill>
+              <a:schemeClr val="accent3"/>
+            </a:solidFill>
+            <a:headEnd type="none" w="med" len="med"/>
+            <a:tailEnd type="arrow" w="med" len="med"/>
+          </a:ln>
+          <a:effectLst/>
+        </p:spPr>
+        <p:style>
+          <a:lnRef idx="1">
+            <a:schemeClr val="accent2"/>
+          </a:lnRef>
+          <a:fillRef idx="2">
+            <a:schemeClr val="accent2"/>
+          </a:fillRef>
+          <a:effectRef idx="1">
+            <a:schemeClr val="accent2"/>
+          </a:effectRef>
+          <a:fontRef idx="minor">
+            <a:schemeClr val="dk1"/>
+          </a:fontRef>
+        </p:style>
+      </p:cxnSp>
+      <p:sp>
+        <p:nvSpPr>
+          <p:cNvPr id="167" name="Rectangle 11"/>
+          <p:cNvSpPr/>
+          <p:nvPr/>
+        </p:nvSpPr>
+        <p:spPr>
+          <a:xfrm>
+            <a:off x="4709645" y="4001889"/>
+            <a:ext cx="1040906" cy="236841"/>
+          </a:xfrm>
+          <a:prstGeom prst="rect">
+            <a:avLst/>
+          </a:prstGeom>
+          <a:ln w="19050">
+            <a:solidFill>
+              <a:schemeClr val="accent3"/>
+            </a:solidFill>
+          </a:ln>
+          <a:effectLst/>
+        </p:spPr>
+        <p:style>
+          <a:lnRef idx="1">
+            <a:schemeClr val="accent3"/>
+          </a:lnRef>
+          <a:fillRef idx="2">
+            <a:schemeClr val="accent3"/>
+          </a:fillRef>
+          <a:effectRef idx="1">
+            <a:schemeClr val="accent3"/>
+          </a:effectRef>
+          <a:fontRef idx="minor">
+            <a:schemeClr val="dk1"/>
+          </a:fontRef>
+        </p:style>
+        <p:txBody>
+          <a:bodyPr rtlCol="0" anchor="ctr"/>
+          <a:lstStyle/>
+          <a:p>
+            <a:pPr algn="ctr"/>
+            <a:r>
+              <a:rPr lang="en-US" sz="1050" b="1" dirty="0" err="1">
+                <a:solidFill>
+                  <a:schemeClr val="accent3">
+                    <a:lumMod val="75000"/>
+                  </a:schemeClr>
+                </a:solidFill>
+              </a:rPr>
+              <a:t>TaskCard</a:t>
+            </a:r>
+            <a:endParaRPr lang="en-SG" sz="1050" b="1" dirty="0">
+              <a:solidFill>
+                <a:schemeClr val="accent3">
+                  <a:lumMod val="75000"/>
+                </a:schemeClr>
+              </a:solidFill>
+            </a:endParaRPr>
+          </a:p>
+        </p:txBody>
+      </p:sp>
+      <p:sp>
+        <p:nvSpPr>
+          <p:cNvPr id="168" name="Flowchart: Decision 167"/>
+          <p:cNvSpPr/>
+          <p:nvPr/>
+        </p:nvSpPr>
+        <p:spPr>
+          <a:xfrm>
+            <a:off x="3686161" y="4039729"/>
+            <a:ext cx="183156" cy="161573"/>
+          </a:xfrm>
+          <a:prstGeom prst="flowChartDecision">
+            <a:avLst/>
+          </a:prstGeom>
+          <a:solidFill>
+            <a:schemeClr val="accent3"/>
+          </a:solidFill>
+          <a:ln>
+            <a:solidFill>
+              <a:schemeClr val="accent3"/>
+            </a:solidFill>
+          </a:ln>
+        </p:spPr>
+        <p:style>
+          <a:lnRef idx="2">
+            <a:schemeClr val="accent1">
+              <a:shade val="50000"/>
+            </a:schemeClr>
+          </a:lnRef>
+          <a:fillRef idx="1">
+            <a:schemeClr val="accent1"/>
+          </a:fillRef>
+          <a:effectRef idx="0">
+            <a:schemeClr val="accent1"/>
+          </a:effectRef>
+          <a:fontRef idx="minor">
+            <a:schemeClr val="lt1"/>
+          </a:fontRef>
+        </p:style>
+        <p:txBody>
+          <a:bodyPr rtlCol="0" anchor="ctr"/>
+          <a:lstStyle/>
+          <a:p>
+            <a:pPr algn="ctr"/>
+            <a:endParaRPr lang="en-SG"/>
+          </a:p>
+        </p:txBody>
+      </p:sp>
+      <p:cxnSp>
+        <p:nvCxnSpPr>
+          <p:cNvPr id="169" name="Elbow Connector 63"/>
+          <p:cNvCxnSpPr>
+            <a:stCxn id="168" idx="3"/>
+            <a:endCxn id="167" idx="1"/>
+          </p:cNvCxnSpPr>
+          <p:nvPr/>
+        </p:nvCxnSpPr>
+        <p:spPr>
+          <a:xfrm flipV="1">
+            <a:off x="3869317" y="4120310"/>
+            <a:ext cx="840328" cy="206"/>
+          </a:xfrm>
+          <a:prstGeom prst="bentConnector3">
+            <a:avLst>
+              <a:gd name="adj1" fmla="val 50000"/>
+            </a:avLst>
+          </a:prstGeom>
+          <a:ln w="19050">
+            <a:solidFill>
+              <a:schemeClr val="accent3"/>
+            </a:solidFill>
+            <a:headEnd type="none" w="med" len="med"/>
+            <a:tailEnd type="arrow" w="med" len="med"/>
+          </a:ln>
+          <a:effectLst/>
+        </p:spPr>
+        <p:style>
+          <a:lnRef idx="1">
+            <a:schemeClr val="accent2"/>
+          </a:lnRef>
+          <a:fillRef idx="2">
+            <a:schemeClr val="accent2"/>
+          </a:fillRef>
+          <a:effectRef idx="1">
+            <a:schemeClr val="accent2"/>
+          </a:effectRef>
+          <a:fontRef idx="minor">
+            <a:schemeClr val="dk1"/>
+          </a:fontRef>
+        </p:style>
+      </p:cxnSp>
+      <p:sp>
+        <p:nvSpPr>
+          <p:cNvPr id="170" name="Rectangle 11"/>
+          <p:cNvSpPr/>
+          <p:nvPr/>
+        </p:nvSpPr>
+        <p:spPr>
+          <a:xfrm>
+            <a:off x="2297074" y="6076932"/>
+            <a:ext cx="1034555" cy="400068"/>
+          </a:xfrm>
+          <a:prstGeom prst="rect">
+            <a:avLst/>
+          </a:prstGeom>
+          <a:ln w="19050">
+            <a:solidFill>
+              <a:schemeClr val="accent3"/>
+            </a:solidFill>
+          </a:ln>
+          <a:effectLst/>
+        </p:spPr>
+        <p:style>
+          <a:lnRef idx="1">
+            <a:schemeClr val="accent3"/>
+          </a:lnRef>
+          <a:fillRef idx="2">
+            <a:schemeClr val="accent3"/>
+          </a:fillRef>
+          <a:effectRef idx="1">
+            <a:schemeClr val="accent3"/>
+          </a:effectRef>
+          <a:fontRef idx="minor">
+            <a:schemeClr val="dk1"/>
+          </a:fontRef>
+        </p:style>
+        <p:txBody>
+          <a:bodyPr rtlCol="0" anchor="ctr"/>
+          <a:lstStyle/>
+          <a:p>
+            <a:pPr algn="ctr"/>
+            <a:r>
+              <a:rPr lang="en-US" sz="1050" b="1" dirty="0" err="1">
+                <a:solidFill>
+                  <a:schemeClr val="accent3">
+                    <a:lumMod val="75000"/>
+                  </a:schemeClr>
+                </a:solidFill>
+              </a:rPr>
+              <a:t>ToDoCardStyleManager</a:t>
+            </a:r>
+            <a:endParaRPr lang="en-SG" sz="1050" b="1" dirty="0">
+              <a:solidFill>
+                <a:schemeClr val="accent3">
+                  <a:lumMod val="75000"/>
+                </a:schemeClr>
+              </a:solidFill>
+            </a:endParaRPr>
+          </a:p>
+        </p:txBody>
+      </p:sp>
+      <p:cxnSp>
+        <p:nvCxnSpPr>
+          <p:cNvPr id="171" name="Connector: Elbow 170"/>
+          <p:cNvCxnSpPr/>
+          <p:nvPr/>
+        </p:nvCxnSpPr>
+        <p:spPr>
+          <a:xfrm rot="16200000" flipH="1">
+            <a:off x="2805846" y="5903551"/>
+            <a:ext cx="346761" cy="2"/>
+          </a:xfrm>
+          <a:prstGeom prst="bentConnector3">
+            <a:avLst>
+              <a:gd name="adj1" fmla="val 50000"/>
+            </a:avLst>
+          </a:prstGeom>
+          <a:ln w="19050">
+            <a:solidFill>
+              <a:srgbClr val="9BBB59"/>
+            </a:solidFill>
+            <a:prstDash val="sysDash"/>
+            <a:tailEnd type="arrow"/>
+          </a:ln>
+        </p:spPr>
+        <p:style>
+          <a:lnRef idx="1">
+            <a:schemeClr val="accent1"/>
+          </a:lnRef>
+          <a:fillRef idx="0">
+            <a:schemeClr val="accent1"/>
+          </a:fillRef>
+          <a:effectRef idx="0">
+            <a:schemeClr val="accent1"/>
+          </a:effectRef>
+          <a:fontRef idx="minor">
+            <a:schemeClr val="tx1"/>
+          </a:fontRef>
+        </p:style>
+      </p:cxnSp>
+      <p:cxnSp>
+        <p:nvCxnSpPr>
+          <p:cNvPr id="172" name="Connector: Elbow 171"/>
+          <p:cNvCxnSpPr/>
+          <p:nvPr/>
+        </p:nvCxnSpPr>
+        <p:spPr>
+          <a:xfrm rot="16200000" flipH="1">
+            <a:off x="2670510" y="5903550"/>
+            <a:ext cx="346761" cy="2"/>
+          </a:xfrm>
+          <a:prstGeom prst="bentConnector3">
+            <a:avLst>
+              <a:gd name="adj1" fmla="val 50000"/>
+            </a:avLst>
+          </a:prstGeom>
+          <a:ln w="19050">
+            <a:solidFill>
+              <a:srgbClr val="9BBB59"/>
+            </a:solidFill>
+            <a:prstDash val="sysDash"/>
+            <a:tailEnd type="arrow"/>
+          </a:ln>
+        </p:spPr>
+        <p:style>
+          <a:lnRef idx="1">
+            <a:schemeClr val="accent1"/>
+          </a:lnRef>
+          <a:fillRef idx="0">
+            <a:schemeClr val="accent1"/>
+          </a:fillRef>
+          <a:effectRef idx="0">
+            <a:schemeClr val="accent1"/>
+          </a:effectRef>
+          <a:fontRef idx="minor">
+            <a:schemeClr val="tx1"/>
+          </a:fontRef>
+        </p:style>
+      </p:cxnSp>
+      <p:cxnSp>
+        <p:nvCxnSpPr>
+          <p:cNvPr id="173" name="Connector: Elbow 172"/>
+          <p:cNvCxnSpPr/>
+          <p:nvPr/>
+        </p:nvCxnSpPr>
+        <p:spPr>
+          <a:xfrm rot="16200000" flipH="1">
+            <a:off x="2537695" y="5903550"/>
+            <a:ext cx="346761" cy="2"/>
+          </a:xfrm>
+          <a:prstGeom prst="bentConnector3">
+            <a:avLst>
+              <a:gd name="adj1" fmla="val 50000"/>
+            </a:avLst>
+          </a:prstGeom>
+          <a:ln w="19050">
+            <a:solidFill>
+              <a:srgbClr val="9BBB59"/>
+            </a:solidFill>
+            <a:prstDash val="sysDash"/>
+            <a:tailEnd type="arrow"/>
+          </a:ln>
+        </p:spPr>
+        <p:style>
+          <a:lnRef idx="1">
+            <a:schemeClr val="accent1"/>
+          </a:lnRef>
+          <a:fillRef idx="0">
+            <a:schemeClr val="accent1"/>
+          </a:fillRef>
+          <a:effectRef idx="0">
+            <a:schemeClr val="accent1"/>
+          </a:effectRef>
+          <a:fontRef idx="minor">
+            <a:schemeClr val="tx1"/>
+          </a:fontRef>
+        </p:style>
+      </p:cxnSp>
+      <p:cxnSp>
+        <p:nvCxnSpPr>
+          <p:cNvPr id="175" name="Elbow Connector 63"/>
+          <p:cNvCxnSpPr>
+            <a:stCxn id="37" idx="3"/>
+          </p:cNvCxnSpPr>
+          <p:nvPr/>
+        </p:nvCxnSpPr>
+        <p:spPr>
+          <a:xfrm>
+            <a:off x="5680602" y="3689022"/>
+            <a:ext cx="1067787" cy="409022"/>
+          </a:xfrm>
+          <a:prstGeom prst="bentConnector3">
+            <a:avLst>
+              <a:gd name="adj1" fmla="val 50000"/>
+            </a:avLst>
+          </a:prstGeom>
+          <a:ln w="19050">
+            <a:solidFill>
+              <a:schemeClr val="accent3"/>
+            </a:solidFill>
+            <a:prstDash val="sysDash"/>
+            <a:headEnd type="none" w="med" len="med"/>
+            <a:tailEnd type="arrow" w="med" len="med"/>
+          </a:ln>
+          <a:effectLst/>
+        </p:spPr>
+        <p:style>
+          <a:lnRef idx="1">
+            <a:schemeClr val="accent2"/>
+          </a:lnRef>
+          <a:fillRef idx="2">
+            <a:schemeClr val="accent2"/>
+          </a:fillRef>
+          <a:effectRef idx="1">
+            <a:schemeClr val="accent2"/>
+          </a:effectRef>
+          <a:fontRef idx="minor">
+            <a:schemeClr val="dk1"/>
+          </a:fontRef>
+        </p:style>
+      </p:cxnSp>
+      <p:cxnSp>
+        <p:nvCxnSpPr>
+          <p:cNvPr id="178" name="Elbow Connector 63"/>
+          <p:cNvCxnSpPr>
+            <a:stCxn id="167" idx="3"/>
+          </p:cNvCxnSpPr>
+          <p:nvPr/>
+        </p:nvCxnSpPr>
+        <p:spPr>
+          <a:xfrm>
+            <a:off x="5750551" y="4120310"/>
+            <a:ext cx="970355" cy="401227"/>
+          </a:xfrm>
+          <a:prstGeom prst="bentConnector3">
+            <a:avLst>
+              <a:gd name="adj1" fmla="val 33313"/>
+            </a:avLst>
+          </a:prstGeom>
+          <a:ln w="19050">
+            <a:solidFill>
+              <a:schemeClr val="accent3"/>
+            </a:solidFill>
+            <a:prstDash val="sysDash"/>
+            <a:headEnd type="none" w="med" len="med"/>
+            <a:tailEnd type="arrow" w="med" len="med"/>
+          </a:ln>
+          <a:effectLst/>
+        </p:spPr>
+        <p:style>
+          <a:lnRef idx="1">
+            <a:schemeClr val="accent2"/>
+          </a:lnRef>
+          <a:fillRef idx="2">
+            <a:schemeClr val="accent2"/>
+          </a:fillRef>
+          <a:effectRef idx="1">
+            <a:schemeClr val="accent2"/>
+          </a:effectRef>
+          <a:fontRef idx="minor">
+            <a:schemeClr val="dk1"/>
+          </a:fontRef>
+        </p:style>
+      </p:cxnSp>
+      <p:cxnSp>
+        <p:nvCxnSpPr>
+          <p:cNvPr id="189" name="Connector: Elbow 188"/>
+          <p:cNvCxnSpPr>
+            <a:stCxn id="9" idx="1"/>
+          </p:cNvCxnSpPr>
+          <p:nvPr/>
+        </p:nvCxnSpPr>
+        <p:spPr>
+          <a:xfrm rot="10800000" flipV="1">
+            <a:off x="1503020" y="1944304"/>
+            <a:ext cx="589823" cy="328236"/>
+          </a:xfrm>
+          <a:prstGeom prst="bentConnector3">
+            <a:avLst>
+              <a:gd name="adj1" fmla="val 98447"/>
+            </a:avLst>
+          </a:prstGeom>
+          <a:ln w="19050">
+            <a:solidFill>
+              <a:srgbClr val="00B050"/>
+            </a:solidFill>
+            <a:prstDash val="sysDash"/>
+            <a:tailEnd type="none"/>
+          </a:ln>
+        </p:spPr>
+        <p:style>
+          <a:lnRef idx="1">
+            <a:schemeClr val="accent1"/>
+          </a:lnRef>
+          <a:fillRef idx="0">
+            <a:schemeClr val="accent1"/>
+          </a:fillRef>
+          <a:effectRef idx="0">
+            <a:schemeClr val="accent1"/>
+          </a:effectRef>
+          <a:fontRef idx="minor">
+            <a:schemeClr val="tx1"/>
+          </a:fontRef>
+        </p:style>
+      </p:cxnSp>
+      <p:cxnSp>
+        <p:nvCxnSpPr>
+          <p:cNvPr id="194" name="Elbow Connector 63"/>
+          <p:cNvCxnSpPr>
+            <a:endCxn id="38" idx="2"/>
+          </p:cNvCxnSpPr>
+          <p:nvPr/>
+        </p:nvCxnSpPr>
+        <p:spPr>
+          <a:xfrm>
+            <a:off x="1698595" y="4554612"/>
+            <a:ext cx="1440751" cy="648229"/>
+          </a:xfrm>
+          <a:prstGeom prst="bentConnector4">
+            <a:avLst>
+              <a:gd name="adj1" fmla="val 31023"/>
+              <a:gd name="adj2" fmla="val 135265"/>
+            </a:avLst>
+          </a:prstGeom>
+          <a:ln w="19050">
+            <a:solidFill>
+              <a:schemeClr val="accent3"/>
+            </a:solidFill>
+            <a:prstDash val="sysDash"/>
+            <a:headEnd type="none" w="med" len="med"/>
+            <a:tailEnd type="none" w="med" len="med"/>
+          </a:ln>
+          <a:effectLst/>
+        </p:spPr>
+        <p:style>
+          <a:lnRef idx="1">
+            <a:schemeClr val="accent2"/>
+          </a:lnRef>
+          <a:fillRef idx="2">
+            <a:schemeClr val="accent2"/>
+          </a:fillRef>
+          <a:effectRef idx="1">
+            <a:schemeClr val="accent2"/>
+          </a:effectRef>
+          <a:fontRef idx="minor">
+            <a:schemeClr val="dk1"/>
+          </a:fontRef>
+        </p:style>
+      </p:cxnSp>
+      <p:cxnSp>
+        <p:nvCxnSpPr>
+          <p:cNvPr id="253" name="Elbow Connector 63"/>
+          <p:cNvCxnSpPr>
+            <a:endCxn id="35" idx="0"/>
+          </p:cNvCxnSpPr>
+          <p:nvPr/>
+        </p:nvCxnSpPr>
+        <p:spPr>
+          <a:xfrm>
+            <a:off x="2154945" y="4378722"/>
+            <a:ext cx="984400" cy="185037"/>
+          </a:xfrm>
+          <a:prstGeom prst="bentConnector2">
+            <a:avLst/>
+          </a:prstGeom>
+          <a:ln w="19050">
+            <a:solidFill>
+              <a:schemeClr val="accent3"/>
+            </a:solidFill>
+            <a:prstDash val="sysDash"/>
+            <a:headEnd type="none" w="med" len="med"/>
+            <a:tailEnd type="none" w="med" len="med"/>
+          </a:ln>
+          <a:effectLst/>
+        </p:spPr>
+        <p:style>
+          <a:lnRef idx="1">
+            <a:schemeClr val="accent2"/>
+          </a:lnRef>
+          <a:fillRef idx="2">
+            <a:schemeClr val="accent2"/>
+          </a:fillRef>
+          <a:effectRef idx="1">
+            <a:schemeClr val="accent2"/>
+          </a:effectRef>
+          <a:fontRef idx="minor">
+            <a:schemeClr val="dk1"/>
+          </a:fontRef>
+        </p:style>
+      </p:cxnSp>
+      <p:cxnSp>
+        <p:nvCxnSpPr>
+          <p:cNvPr id="260" name="Elbow Connector 63"/>
+          <p:cNvCxnSpPr>
+            <a:endCxn id="167" idx="2"/>
+          </p:cNvCxnSpPr>
+          <p:nvPr/>
+        </p:nvCxnSpPr>
+        <p:spPr>
+          <a:xfrm flipV="1">
+            <a:off x="3136526" y="4238730"/>
+            <a:ext cx="2093572" cy="130582"/>
+          </a:xfrm>
+          <a:prstGeom prst="bentConnector2">
+            <a:avLst/>
+          </a:prstGeom>
+          <a:ln w="19050">
+            <a:solidFill>
+              <a:schemeClr val="accent3"/>
+            </a:solidFill>
+            <a:prstDash val="sysDash"/>
+            <a:headEnd type="none" w="med" len="med"/>
+            <a:tailEnd type="none" w="med" len="med"/>
+          </a:ln>
+          <a:effectLst/>
+        </p:spPr>
+        <p:style>
+          <a:lnRef idx="1">
+            <a:schemeClr val="accent2"/>
+          </a:lnRef>
+          <a:fillRef idx="2">
+            <a:schemeClr val="accent2"/>
+          </a:fillRef>
+          <a:effectRef idx="1">
+            <a:schemeClr val="accent2"/>
+          </a:effectRef>
+          <a:fontRef idx="minor">
+            <a:schemeClr val="dk1"/>
+          </a:fontRef>
+        </p:style>
+      </p:cxnSp>
+      <p:cxnSp>
+        <p:nvCxnSpPr>
+          <p:cNvPr id="267" name="Elbow Connector 63"/>
+          <p:cNvCxnSpPr>
+            <a:endCxn id="37" idx="2"/>
+          </p:cNvCxnSpPr>
+          <p:nvPr/>
+        </p:nvCxnSpPr>
+        <p:spPr>
+          <a:xfrm flipV="1">
+            <a:off x="2154945" y="3807442"/>
+            <a:ext cx="3005204" cy="133350"/>
+          </a:xfrm>
+          <a:prstGeom prst="bentConnector2">
+            <a:avLst/>
+          </a:prstGeom>
+          <a:ln w="19050">
+            <a:solidFill>
+              <a:schemeClr val="accent3"/>
+            </a:solidFill>
+            <a:prstDash val="sysDash"/>
+            <a:headEnd type="none" w="med" len="med"/>
+            <a:tailEnd type="none" w="med" len="med"/>
+          </a:ln>
+          <a:effectLst/>
+        </p:spPr>
+        <p:style>
+          <a:lnRef idx="1">
+            <a:schemeClr val="accent2"/>
+          </a:lnRef>
+          <a:fillRef idx="2">
+            <a:schemeClr val="accent2"/>
+          </a:fillRef>
+          <a:effectRef idx="1">
+            <a:schemeClr val="accent2"/>
+          </a:effectRef>
+          <a:fontRef idx="minor">
+            <a:schemeClr val="dk1"/>
+          </a:fontRef>
+        </p:style>
+      </p:cxnSp>
+      <p:cxnSp>
+        <p:nvCxnSpPr>
+          <p:cNvPr id="272" name="Elbow Connector 63"/>
+          <p:cNvCxnSpPr>
+            <a:endCxn id="34" idx="2"/>
+          </p:cNvCxnSpPr>
+          <p:nvPr/>
+        </p:nvCxnSpPr>
+        <p:spPr>
+          <a:xfrm rot="16200000" flipV="1">
+            <a:off x="3051014" y="3824433"/>
+            <a:ext cx="179657" cy="2998"/>
+          </a:xfrm>
+          <a:prstGeom prst="bentConnector3">
+            <a:avLst>
+              <a:gd name="adj1" fmla="val 50000"/>
+            </a:avLst>
+          </a:prstGeom>
+          <a:ln w="19050">
+            <a:solidFill>
+              <a:schemeClr val="accent3"/>
+            </a:solidFill>
+            <a:prstDash val="sysDash"/>
+            <a:headEnd type="none" w="med" len="med"/>
+            <a:tailEnd type="none" w="med" len="med"/>
+          </a:ln>
+          <a:effectLst/>
+        </p:spPr>
+        <p:style>
+          <a:lnRef idx="1">
+            <a:schemeClr val="accent2"/>
+          </a:lnRef>
+          <a:fillRef idx="2">
+            <a:schemeClr val="accent2"/>
+          </a:fillRef>
+          <a:effectRef idx="1">
+            <a:schemeClr val="accent2"/>
+          </a:effectRef>
+          <a:fontRef idx="minor">
+            <a:schemeClr val="dk1"/>
+          </a:fontRef>
+        </p:style>
+      </p:cxnSp>
+      <p:cxnSp>
+        <p:nvCxnSpPr>
+          <p:cNvPr id="275" name="Elbow Connector 63"/>
+          <p:cNvCxnSpPr>
+            <a:endCxn id="43" idx="2"/>
+          </p:cNvCxnSpPr>
+          <p:nvPr/>
+        </p:nvCxnSpPr>
+        <p:spPr>
+          <a:xfrm flipV="1">
+            <a:off x="2185088" y="3242242"/>
+            <a:ext cx="2781448" cy="157590"/>
+          </a:xfrm>
+          <a:prstGeom prst="bentConnector2">
+            <a:avLst/>
+          </a:prstGeom>
+          <a:ln w="19050">
+            <a:solidFill>
+              <a:schemeClr val="accent3"/>
+            </a:solidFill>
+            <a:prstDash val="sysDash"/>
+            <a:headEnd type="none" w="med" len="med"/>
+            <a:tailEnd type="none" w="med" len="med"/>
+          </a:ln>
+          <a:effectLst/>
+        </p:spPr>
+        <p:style>
+          <a:lnRef idx="1">
+            <a:schemeClr val="accent2"/>
+          </a:lnRef>
+          <a:fillRef idx="2">
+            <a:schemeClr val="accent2"/>
+          </a:fillRef>
+          <a:effectRef idx="1">
+            <a:schemeClr val="accent2"/>
+          </a:effectRef>
+          <a:fontRef idx="minor">
+            <a:schemeClr val="dk1"/>
+          </a:fontRef>
+        </p:style>
+      </p:cxnSp>
+      <p:cxnSp>
+        <p:nvCxnSpPr>
+          <p:cNvPr id="307" name="Elbow Connector 63"/>
+          <p:cNvCxnSpPr/>
+          <p:nvPr/>
+        </p:nvCxnSpPr>
+        <p:spPr>
+          <a:xfrm rot="5400000" flipH="1" flipV="1">
+            <a:off x="1581937" y="3951460"/>
+            <a:ext cx="1161334" cy="44968"/>
+          </a:xfrm>
+          <a:prstGeom prst="bentConnector3">
+            <a:avLst>
+              <a:gd name="adj1" fmla="val 100031"/>
+            </a:avLst>
+          </a:prstGeom>
+          <a:ln w="19050">
+            <a:solidFill>
+              <a:schemeClr val="accent3"/>
+            </a:solidFill>
+            <a:prstDash val="sysDash"/>
+            <a:headEnd type="none" w="med" len="med"/>
+            <a:tailEnd type="none" w="med" len="med"/>
+          </a:ln>
+          <a:effectLst/>
+        </p:spPr>
+        <p:style>
+          <a:lnRef idx="1">
+            <a:schemeClr val="accent2"/>
+          </a:lnRef>
+          <a:fillRef idx="2">
+            <a:schemeClr val="accent2"/>
+          </a:fillRef>
+          <a:effectRef idx="1">
+            <a:schemeClr val="accent2"/>
+          </a:effectRef>
+          <a:fontRef idx="minor">
+            <a:schemeClr val="dk1"/>
+          </a:fontRef>
+        </p:style>
+      </p:cxnSp>
+      <p:cxnSp>
+        <p:nvCxnSpPr>
+          <p:cNvPr id="314" name="Elbow Connector 63"/>
+          <p:cNvCxnSpPr/>
+          <p:nvPr/>
+        </p:nvCxnSpPr>
+        <p:spPr>
+          <a:xfrm rot="5400000" flipH="1" flipV="1">
+            <a:off x="3333956" y="3285998"/>
+            <a:ext cx="189807" cy="4736"/>
+          </a:xfrm>
+          <a:prstGeom prst="bentConnector3">
+            <a:avLst>
+              <a:gd name="adj1" fmla="val 50000"/>
+            </a:avLst>
+          </a:prstGeom>
+          <a:ln w="19050">
+            <a:solidFill>
+              <a:schemeClr val="accent3"/>
+            </a:solidFill>
+            <a:prstDash val="sysDash"/>
+            <a:headEnd type="none" w="med" len="med"/>
+            <a:tailEnd type="none" w="med" len="med"/>
+          </a:ln>
+          <a:effectLst/>
+        </p:spPr>
+        <p:style>
+          <a:lnRef idx="1">
+            <a:schemeClr val="accent2"/>
+          </a:lnRef>
+          <a:fillRef idx="2">
+            <a:schemeClr val="accent2"/>
+          </a:fillRef>
+          <a:effectRef idx="1">
+            <a:schemeClr val="accent2"/>
+          </a:effectRef>
+          <a:fontRef idx="minor">
+            <a:schemeClr val="dk1"/>
+          </a:fontRef>
+        </p:style>
+      </p:cxnSp>
+      <p:cxnSp>
+        <p:nvCxnSpPr>
+          <p:cNvPr id="317" name="Elbow Connector 63"/>
+          <p:cNvCxnSpPr>
+            <a:endCxn id="36" idx="2"/>
+          </p:cNvCxnSpPr>
+          <p:nvPr/>
+        </p:nvCxnSpPr>
+        <p:spPr>
+          <a:xfrm rot="5400000" flipH="1" flipV="1">
+            <a:off x="3067679" y="4297649"/>
+            <a:ext cx="140513" cy="2818"/>
+          </a:xfrm>
+          <a:prstGeom prst="bentConnector3">
+            <a:avLst>
+              <a:gd name="adj1" fmla="val 50000"/>
+            </a:avLst>
+          </a:prstGeom>
+          <a:ln w="19050">
+            <a:solidFill>
+              <a:schemeClr val="accent3"/>
+            </a:solidFill>
+            <a:prstDash val="sysDash"/>
+            <a:headEnd type="none" w="med" len="med"/>
+            <a:tailEnd type="none" w="med" len="med"/>
+          </a:ln>
+          <a:effectLst/>
+        </p:spPr>
+        <p:style>
+          <a:lnRef idx="1">
+            <a:schemeClr val="accent2"/>
+          </a:lnRef>
+          <a:fillRef idx="2">
+            <a:schemeClr val="accent2"/>
+          </a:fillRef>
+          <a:effectRef idx="1">
+            <a:schemeClr val="accent2"/>
+          </a:effectRef>
+          <a:fontRef idx="minor">
+            <a:schemeClr val="dk1"/>
+          </a:fontRef>
+        </p:style>
+      </p:cxnSp>
+      <p:grpSp>
+        <p:nvGrpSpPr>
+          <p:cNvPr id="322" name="Group 321"/>
+          <p:cNvGrpSpPr/>
+          <p:nvPr/>
+        </p:nvGrpSpPr>
+        <p:grpSpPr>
+          <a:xfrm>
+            <a:off x="4251322" y="5303384"/>
+            <a:ext cx="1745273" cy="1116005"/>
+            <a:chOff x="3512527" y="5314098"/>
+            <a:chExt cx="2787315" cy="1116005"/>
+          </a:xfrm>
+        </p:grpSpPr>
+        <p:sp>
+          <p:nvSpPr>
+            <p:cNvPr id="320" name="Rectangle 65"/>
+            <p:cNvSpPr/>
+            <p:nvPr/>
+          </p:nvSpPr>
+          <p:spPr>
+            <a:xfrm>
+              <a:off x="3512527" y="5422958"/>
+              <a:ext cx="2787315" cy="1007145"/>
+            </a:xfrm>
+            <a:prstGeom prst="roundRect">
+              <a:avLst>
+                <a:gd name="adj" fmla="val 0"/>
+              </a:avLst>
+            </a:prstGeom>
+            <a:solidFill>
+              <a:schemeClr val="bg1">
+                <a:alpha val="50000"/>
+              </a:schemeClr>
+            </a:solidFill>
+            <a:ln w="19050">
+              <a:solidFill>
+                <a:srgbClr val="9BBB59">
+                  <a:alpha val="50000"/>
+                </a:srgbClr>
+              </a:solidFill>
+            </a:ln>
+            <a:effectLst/>
+          </p:spPr>
+          <p:style>
+            <a:lnRef idx="1">
+              <a:schemeClr val="accent2"/>
+            </a:lnRef>
+            <a:fillRef idx="2">
+              <a:schemeClr val="accent2"/>
+            </a:fillRef>
+            <a:effectRef idx="1">
+              <a:schemeClr val="accent2"/>
+            </a:effectRef>
+            <a:fontRef idx="minor">
+              <a:schemeClr val="dk1"/>
+            </a:fontRef>
+          </p:style>
+          <p:txBody>
+            <a:bodyPr rtlCol="0" anchor="t"/>
+            <a:lstStyle/>
+            <a:p>
+              <a:r>
+                <a:rPr lang="en-US" sz="1200" b="1" dirty="0">
+                  <a:solidFill>
+                    <a:srgbClr val="9BBB59"/>
+                  </a:solidFill>
+                </a:rPr>
+                <a:t>resources/view</a:t>
+              </a:r>
+              <a:endParaRPr lang="en-SG" sz="1200" b="1" dirty="0">
+                <a:solidFill>
+                  <a:srgbClr val="9BBB59"/>
+                </a:solidFill>
+              </a:endParaRPr>
+            </a:p>
+          </p:txBody>
+        </p:sp>
+        <p:sp>
+          <p:nvSpPr>
+            <p:cNvPr id="321" name="Rectangle 65"/>
+            <p:cNvSpPr/>
+            <p:nvPr/>
+          </p:nvSpPr>
+          <p:spPr>
+            <a:xfrm>
+              <a:off x="3512527" y="5314098"/>
+              <a:ext cx="467895" cy="108285"/>
+            </a:xfrm>
+            <a:prstGeom prst="roundRect">
+              <a:avLst>
+                <a:gd name="adj" fmla="val 3484"/>
+              </a:avLst>
+            </a:prstGeom>
+            <a:solidFill>
+              <a:schemeClr val="bg1">
+                <a:alpha val="50000"/>
+              </a:schemeClr>
+            </a:solidFill>
+            <a:ln w="19050">
+              <a:solidFill>
+                <a:srgbClr val="9BBB59">
+                  <a:alpha val="50000"/>
+                </a:srgbClr>
+              </a:solidFill>
+            </a:ln>
+            <a:effectLst/>
+          </p:spPr>
+          <p:style>
+            <a:lnRef idx="1">
+              <a:schemeClr val="accent2"/>
+            </a:lnRef>
+            <a:fillRef idx="2">
+              <a:schemeClr val="accent2"/>
+            </a:fillRef>
+            <a:effectRef idx="1">
+              <a:schemeClr val="accent2"/>
+            </a:effectRef>
+            <a:fontRef idx="minor">
+              <a:schemeClr val="dk1"/>
+            </a:fontRef>
+          </p:style>
+          <p:txBody>
+            <a:bodyPr rtlCol="0" anchor="t"/>
+            <a:lstStyle/>
+            <a:p>
+              <a:endParaRPr lang="en-SG" sz="1200" b="1" dirty="0">
+                <a:solidFill>
+                  <a:srgbClr val="9BBB59"/>
+                </a:solidFill>
+              </a:endParaRPr>
+            </a:p>
+          </p:txBody>
+        </p:sp>
+      </p:grpSp>
+      <p:sp>
+        <p:nvSpPr>
+          <p:cNvPr id="323" name="Rectangle 322"/>
+          <p:cNvSpPr/>
+          <p:nvPr/>
+        </p:nvSpPr>
+        <p:spPr>
+          <a:xfrm>
+            <a:off x="4605253" y="5798817"/>
+            <a:ext cx="464166" cy="299848"/>
+          </a:xfrm>
+          <a:prstGeom prst="rect">
+            <a:avLst/>
+          </a:prstGeom>
+          <a:solidFill>
+            <a:srgbClr val="92D050"/>
+          </a:solidFill>
+          <a:ln w="6350">
+            <a:solidFill>
+              <a:schemeClr val="bg1"/>
+            </a:solidFill>
+          </a:ln>
+        </p:spPr>
+        <p:style>
+          <a:lnRef idx="2">
+            <a:schemeClr val="accent1">
+              <a:shade val="50000"/>
+            </a:schemeClr>
+          </a:lnRef>
+          <a:fillRef idx="1">
+            <a:schemeClr val="accent1"/>
+          </a:fillRef>
+          <a:effectRef idx="0">
+            <a:schemeClr val="accent1"/>
+          </a:effectRef>
+          <a:fontRef idx="minor">
+            <a:schemeClr val="lt1"/>
+          </a:fontRef>
+        </p:style>
+        <p:txBody>
+          <a:bodyPr rtlCol="0" anchor="ctr"/>
+          <a:lstStyle/>
+          <a:p>
+            <a:pPr algn="ctr"/>
+            <a:endParaRPr lang="en-SG"/>
+          </a:p>
+        </p:txBody>
+      </p:sp>
+      <p:sp>
+        <p:nvSpPr>
+          <p:cNvPr id="324" name="Rectangle 323"/>
+          <p:cNvSpPr/>
+          <p:nvPr/>
+        </p:nvSpPr>
+        <p:spPr>
+          <a:xfrm>
+            <a:off x="4648016" y="5840040"/>
+            <a:ext cx="464166" cy="299848"/>
+          </a:xfrm>
+          <a:prstGeom prst="rect">
+            <a:avLst/>
+          </a:prstGeom>
+          <a:solidFill>
+            <a:srgbClr val="92D050"/>
+          </a:solidFill>
+          <a:ln w="6350">
+            <a:solidFill>
+              <a:schemeClr val="bg1"/>
+            </a:solidFill>
+          </a:ln>
+        </p:spPr>
+        <p:style>
+          <a:lnRef idx="2">
+            <a:schemeClr val="accent1">
+              <a:shade val="50000"/>
+            </a:schemeClr>
+          </a:lnRef>
+          <a:fillRef idx="1">
+            <a:schemeClr val="accent1"/>
+          </a:fillRef>
+          <a:effectRef idx="0">
+            <a:schemeClr val="accent1"/>
+          </a:effectRef>
+          <a:fontRef idx="minor">
+            <a:schemeClr val="lt1"/>
+          </a:fontRef>
+        </p:style>
+        <p:txBody>
+          <a:bodyPr rtlCol="0" anchor="ctr"/>
+          <a:lstStyle/>
+          <a:p>
+            <a:pPr algn="ctr"/>
+            <a:endParaRPr lang="en-SG"/>
+          </a:p>
+        </p:txBody>
+      </p:sp>
+      <p:sp>
+        <p:nvSpPr>
+          <p:cNvPr id="325" name="Rectangle 324"/>
+          <p:cNvSpPr/>
+          <p:nvPr/>
+        </p:nvSpPr>
+        <p:spPr>
+          <a:xfrm>
+            <a:off x="4698997" y="5886579"/>
+            <a:ext cx="464166" cy="299848"/>
+          </a:xfrm>
+          <a:prstGeom prst="rect">
+            <a:avLst/>
+          </a:prstGeom>
+          <a:solidFill>
+            <a:srgbClr val="92D050"/>
+          </a:solidFill>
+          <a:ln w="6350">
+            <a:solidFill>
+              <a:schemeClr val="bg1"/>
+            </a:solidFill>
+          </a:ln>
+        </p:spPr>
+        <p:style>
+          <a:lnRef idx="2">
+            <a:schemeClr val="accent1">
+              <a:shade val="50000"/>
+            </a:schemeClr>
+          </a:lnRef>
+          <a:fillRef idx="1">
+            <a:schemeClr val="accent1"/>
+          </a:fillRef>
+          <a:effectRef idx="0">
+            <a:schemeClr val="accent1"/>
+          </a:effectRef>
+          <a:fontRef idx="minor">
+            <a:schemeClr val="lt1"/>
+          </a:fontRef>
+        </p:style>
+        <p:txBody>
+          <a:bodyPr rtlCol="0" anchor="ctr"/>
+          <a:lstStyle/>
+          <a:p>
+            <a:pPr algn="ctr"/>
+            <a:endParaRPr lang="en-SG" dirty="0"/>
+          </a:p>
+        </p:txBody>
+      </p:sp>
+      <p:sp>
+        <p:nvSpPr>
+          <p:cNvPr id="326" name="Rectangle 325"/>
+          <p:cNvSpPr/>
+          <p:nvPr/>
+        </p:nvSpPr>
+        <p:spPr>
+          <a:xfrm>
+            <a:off x="5254044" y="5789867"/>
+            <a:ext cx="464166" cy="299848"/>
+          </a:xfrm>
+          <a:prstGeom prst="rect">
+            <a:avLst/>
+          </a:prstGeom>
+          <a:solidFill>
+            <a:srgbClr val="92D050"/>
+          </a:solidFill>
+          <a:ln w="6350">
+            <a:solidFill>
+              <a:schemeClr val="bg1"/>
+            </a:solidFill>
+          </a:ln>
+        </p:spPr>
+        <p:style>
+          <a:lnRef idx="2">
+            <a:schemeClr val="accent1">
+              <a:shade val="50000"/>
+            </a:schemeClr>
+          </a:lnRef>
+          <a:fillRef idx="1">
+            <a:schemeClr val="accent1"/>
+          </a:fillRef>
+          <a:effectRef idx="0">
+            <a:schemeClr val="accent1"/>
+          </a:effectRef>
+          <a:fontRef idx="minor">
+            <a:schemeClr val="lt1"/>
+          </a:fontRef>
+        </p:style>
+        <p:txBody>
+          <a:bodyPr rtlCol="0" anchor="ctr"/>
+          <a:lstStyle/>
+          <a:p>
+            <a:pPr algn="ctr"/>
+            <a:endParaRPr lang="en-SG"/>
+          </a:p>
+        </p:txBody>
+      </p:sp>
+      <p:sp>
+        <p:nvSpPr>
+          <p:cNvPr id="327" name="Rectangle 326"/>
+          <p:cNvSpPr/>
+          <p:nvPr/>
+        </p:nvSpPr>
+        <p:spPr>
+          <a:xfrm>
+            <a:off x="5296807" y="5831090"/>
+            <a:ext cx="464166" cy="299848"/>
+          </a:xfrm>
+          <a:prstGeom prst="rect">
+            <a:avLst/>
+          </a:prstGeom>
+          <a:solidFill>
+            <a:srgbClr val="92D050"/>
+          </a:solidFill>
+          <a:ln w="6350">
+            <a:solidFill>
+              <a:schemeClr val="bg1"/>
+            </a:solidFill>
+          </a:ln>
+        </p:spPr>
+        <p:style>
+          <a:lnRef idx="2">
+            <a:schemeClr val="accent1">
+              <a:shade val="50000"/>
+            </a:schemeClr>
+          </a:lnRef>
+          <a:fillRef idx="1">
+            <a:schemeClr val="accent1"/>
+          </a:fillRef>
+          <a:effectRef idx="0">
+            <a:schemeClr val="accent1"/>
+          </a:effectRef>
+          <a:fontRef idx="minor">
+            <a:schemeClr val="lt1"/>
+          </a:fontRef>
+        </p:style>
+        <p:txBody>
+          <a:bodyPr rtlCol="0" anchor="ctr"/>
+          <a:lstStyle/>
+          <a:p>
+            <a:pPr algn="ctr"/>
+            <a:endParaRPr lang="en-SG"/>
+          </a:p>
+        </p:txBody>
+      </p:sp>
+      <p:sp>
+        <p:nvSpPr>
+          <p:cNvPr id="328" name="Rectangle 327"/>
+          <p:cNvSpPr/>
+          <p:nvPr/>
+        </p:nvSpPr>
+        <p:spPr>
+          <a:xfrm>
+            <a:off x="5347788" y="5877629"/>
+            <a:ext cx="464166" cy="299848"/>
+          </a:xfrm>
+          <a:prstGeom prst="rect">
+            <a:avLst/>
+          </a:prstGeom>
+          <a:solidFill>
+            <a:srgbClr val="92D050"/>
+          </a:solidFill>
+          <a:ln w="6350">
+            <a:solidFill>
+              <a:schemeClr val="bg1"/>
+            </a:solidFill>
+          </a:ln>
+        </p:spPr>
+        <p:style>
+          <a:lnRef idx="2">
+            <a:schemeClr val="accent1">
+              <a:shade val="50000"/>
+            </a:schemeClr>
+          </a:lnRef>
+          <a:fillRef idx="1">
+            <a:schemeClr val="accent1"/>
+          </a:fillRef>
+          <a:effectRef idx="0">
+            <a:schemeClr val="accent1"/>
+          </a:effectRef>
+          <a:fontRef idx="minor">
+            <a:schemeClr val="lt1"/>
+          </a:fontRef>
+        </p:style>
+        <p:txBody>
+          <a:bodyPr rtlCol="0" anchor="ctr"/>
+          <a:lstStyle/>
+          <a:p>
+            <a:pPr algn="ctr"/>
+            <a:endParaRPr lang="en-SG"/>
+          </a:p>
+        </p:txBody>
+      </p:sp>
+      <p:sp>
+        <p:nvSpPr>
+          <p:cNvPr id="330" name="TextBox 329"/>
+          <p:cNvSpPr txBox="1"/>
+          <p:nvPr/>
+        </p:nvSpPr>
+        <p:spPr>
+          <a:xfrm>
+            <a:off x="4648016" y="5906291"/>
+            <a:ext cx="522900" cy="253916"/>
+          </a:xfrm>
+          <a:prstGeom prst="rect">
+            <a:avLst/>
+          </a:prstGeom>
+          <a:noFill/>
+        </p:spPr>
+        <p:txBody>
+          <a:bodyPr wrap="none" rtlCol="0">
+            <a:spAutoFit/>
+          </a:bodyPr>
+          <a:lstStyle/>
+          <a:p>
+            <a:r>
+              <a:rPr lang="en-SG" sz="1050" dirty="0">
+                <a:solidFill>
+                  <a:schemeClr val="bg1"/>
+                </a:solidFill>
+              </a:rPr>
+              <a:t>*.</a:t>
+            </a:r>
+            <a:r>
+              <a:rPr lang="en-SG" sz="1050" dirty="0" err="1">
+                <a:solidFill>
+                  <a:schemeClr val="bg1"/>
+                </a:solidFill>
+              </a:rPr>
+              <a:t>fxml</a:t>
+            </a:r>
+            <a:endParaRPr lang="en-SG" sz="1050" dirty="0">
+              <a:solidFill>
+                <a:schemeClr val="bg1"/>
+              </a:solidFill>
+            </a:endParaRPr>
+          </a:p>
+        </p:txBody>
+      </p:sp>
+      <p:sp>
+        <p:nvSpPr>
+          <p:cNvPr id="331" name="TextBox 330"/>
+          <p:cNvSpPr txBox="1"/>
+          <p:nvPr/>
+        </p:nvSpPr>
+        <p:spPr>
+          <a:xfrm>
+            <a:off x="5309798" y="5909545"/>
+            <a:ext cx="449162" cy="253916"/>
+          </a:xfrm>
+          <a:prstGeom prst="rect">
+            <a:avLst/>
+          </a:prstGeom>
+          <a:noFill/>
+        </p:spPr>
+        <p:txBody>
+          <a:bodyPr wrap="none" rtlCol="0">
+            <a:spAutoFit/>
+          </a:bodyPr>
+          <a:lstStyle/>
+          <a:p>
+            <a:r>
+              <a:rPr lang="en-SG" sz="1050" dirty="0">
+                <a:solidFill>
+                  <a:schemeClr val="bg1"/>
+                </a:solidFill>
+              </a:rPr>
+              <a:t>*.</a:t>
+            </a:r>
+            <a:r>
+              <a:rPr lang="en-SG" sz="1050" dirty="0" err="1">
+                <a:solidFill>
+                  <a:schemeClr val="bg1"/>
+                </a:solidFill>
+              </a:rPr>
+              <a:t>css</a:t>
+            </a:r>
+            <a:endParaRPr lang="en-SG" sz="1050" dirty="0">
+              <a:solidFill>
+                <a:schemeClr val="bg1"/>
+              </a:solidFill>
+            </a:endParaRPr>
+          </a:p>
+        </p:txBody>
+      </p:sp>
+      <p:cxnSp>
+        <p:nvCxnSpPr>
+          <p:cNvPr id="343" name="Elbow Connector 63"/>
+          <p:cNvCxnSpPr>
+            <a:stCxn id="3" idx="0"/>
+          </p:cNvCxnSpPr>
+          <p:nvPr/>
+        </p:nvCxnSpPr>
+        <p:spPr>
+          <a:xfrm rot="5400000" flipH="1" flipV="1">
+            <a:off x="5046208" y="1266447"/>
+            <a:ext cx="100131" cy="3249269"/>
+          </a:xfrm>
+          <a:prstGeom prst="bentConnector2">
+            <a:avLst/>
+          </a:prstGeom>
+          <a:ln w="19050">
+            <a:solidFill>
+              <a:schemeClr val="accent3"/>
+            </a:solidFill>
+            <a:headEnd type="none" w="med" len="med"/>
+            <a:tailEnd type="arrow" w="med" len="med"/>
+          </a:ln>
+          <a:effectLst/>
+        </p:spPr>
+        <p:style>
+          <a:lnRef idx="1">
+            <a:schemeClr val="accent2"/>
+          </a:lnRef>
+          <a:fillRef idx="2">
+            <a:schemeClr val="accent2"/>
+          </a:fillRef>
+          <a:effectRef idx="1">
+            <a:schemeClr val="accent2"/>
+          </a:effectRef>
+          <a:fontRef idx="minor">
+            <a:schemeClr val="dk1"/>
+          </a:fontRef>
+        </p:style>
+      </p:cxnSp>
+      <p:cxnSp>
+        <p:nvCxnSpPr>
+          <p:cNvPr id="346" name="Elbow Connector 63"/>
+          <p:cNvCxnSpPr>
+            <a:stCxn id="2" idx="3"/>
+          </p:cNvCxnSpPr>
+          <p:nvPr/>
+        </p:nvCxnSpPr>
+        <p:spPr>
+          <a:xfrm flipV="1">
+            <a:off x="2918326" y="2288851"/>
+            <a:ext cx="3802582" cy="342967"/>
+          </a:xfrm>
+          <a:prstGeom prst="bentConnector3">
+            <a:avLst>
+              <a:gd name="adj1" fmla="val 14932"/>
+            </a:avLst>
+          </a:prstGeom>
+          <a:ln w="19050">
+            <a:solidFill>
+              <a:schemeClr val="accent3"/>
+            </a:solidFill>
+            <a:headEnd type="none" w="med" len="med"/>
+            <a:tailEnd type="arrow" w="med" len="med"/>
+          </a:ln>
+          <a:effectLst/>
+        </p:spPr>
+        <p:style>
+          <a:lnRef idx="1">
+            <a:schemeClr val="accent2"/>
+          </a:lnRef>
+          <a:fillRef idx="2">
+            <a:schemeClr val="accent2"/>
+          </a:fillRef>
+          <a:effectRef idx="1">
+            <a:schemeClr val="accent2"/>
+          </a:effectRef>
+          <a:fontRef idx="minor">
+            <a:schemeClr val="dk1"/>
+          </a:fontRef>
+        </p:style>
+      </p:cxnSp>
     </p:spTree>
     <p:extLst>
       <p:ext uri="{BB962C8B-B14F-4D97-AF65-F5344CB8AC3E}">

</xml_diff>

<commit_message>
Add diagram and description for Logic component
</commit_message>
<xml_diff>
--- a/docs/diagrams/Diagrams.pptx
+++ b/docs/diagrams/Diagrams.pptx
@@ -13,7 +13,7 @@
     <p:sldId id="268" r:id="rId4"/>
     <p:sldId id="269" r:id="rId5"/>
     <p:sldId id="260" r:id="rId6"/>
-    <p:sldId id="261" r:id="rId7"/>
+    <p:sldId id="270" r:id="rId7"/>
     <p:sldId id="267" r:id="rId8"/>
     <p:sldId id="263" r:id="rId9"/>
     <p:sldId id="264" r:id="rId10"/>
@@ -9090,6 +9090,9 @@
           <a:prstGeom prst="triangle">
             <a:avLst/>
           </a:prstGeom>
+          <a:solidFill>
+            <a:srgbClr val="F1F5E9"/>
+          </a:solidFill>
           <a:ln w="19050">
             <a:solidFill>
               <a:schemeClr val="accent3"/>
@@ -9770,7 +9773,7 @@
           <a:prstGeom prst="rect">
             <a:avLst/>
           </a:prstGeom>
-          <a:ln w="6350">
+          <a:ln w="19050">
             <a:solidFill>
               <a:schemeClr val="accent3"/>
             </a:solidFill>
@@ -10022,6 +10025,9 @@
           <a:prstGeom prst="triangle">
             <a:avLst/>
           </a:prstGeom>
+          <a:solidFill>
+            <a:srgbClr val="F1F5E9"/>
+          </a:solidFill>
           <a:ln w="19050">
             <a:solidFill>
               <a:srgbClr val="00B050"/>
@@ -12347,14 +12353,14 @@
       </p:grpSpPr>
       <p:sp>
         <p:nvSpPr>
-          <p:cNvPr id="3" name="Rectangle 65"/>
+          <p:cNvPr id="2" name="Rectangle 65"/>
           <p:cNvSpPr/>
           <p:nvPr/>
         </p:nvSpPr>
         <p:spPr>
           <a:xfrm>
-            <a:off x="1103085" y="2057399"/>
-            <a:ext cx="6288315" cy="2272167"/>
+            <a:off x="573395" y="1447798"/>
+            <a:ext cx="5829748" cy="4191002"/>
           </a:xfrm>
           <a:prstGeom prst="roundRect">
             <a:avLst>
@@ -12362,10 +12368,7 @@
             </a:avLst>
           </a:prstGeom>
           <a:solidFill>
-            <a:schemeClr val="accent1">
-              <a:lumMod val="20000"/>
-              <a:lumOff val="80000"/>
-            </a:schemeClr>
+            <a:srgbClr val="F1F5E9"/>
           </a:solidFill>
           <a:ln w="19050">
             <a:noFill/>
@@ -12391,14 +12394,14 @@
           <a:lstStyle/>
           <a:p>
             <a:r>
-              <a:rPr lang="en-US" sz="1200" b="1" dirty="0">
+              <a:rPr lang="en-US" sz="2400" b="1" dirty="0">
                 <a:solidFill>
                   <a:srgbClr val="0070C0"/>
                 </a:solidFill>
               </a:rPr>
               <a:t>Logic</a:t>
             </a:r>
-            <a:endParaRPr lang="en-SG" sz="1200" b="1" dirty="0">
+            <a:endParaRPr lang="en-SG" sz="2400" b="1" dirty="0">
               <a:solidFill>
                 <a:srgbClr val="0070C0"/>
               </a:solidFill>
@@ -12408,93 +12411,53 @@
       </p:sp>
       <p:sp>
         <p:nvSpPr>
-          <p:cNvPr id="4" name="Rectangle 8"/>
+          <p:cNvPr id="3" name="Rectangle 8"/>
           <p:cNvSpPr/>
           <p:nvPr/>
         </p:nvSpPr>
         <p:spPr>
           <a:xfrm>
-            <a:off x="2095948" y="2548840"/>
-            <a:ext cx="1093635" cy="346760"/>
+            <a:off x="3918263" y="2327498"/>
+            <a:ext cx="1311835" cy="247346"/>
           </a:xfrm>
           <a:prstGeom prst="rect">
             <a:avLst/>
           </a:prstGeom>
-          <a:solidFill>
-            <a:srgbClr val="0070C0"/>
-          </a:solidFill>
-          <a:ln w="19050">
-            <a:solidFill>
-              <a:srgbClr val="0070C0"/>
+          <a:gradFill>
+            <a:gsLst>
+              <a:gs pos="0">
+                <a:srgbClr val="AFCBFF"/>
+              </a:gs>
+              <a:gs pos="35000">
+                <a:srgbClr val="AFCBFF"/>
+              </a:gs>
+              <a:gs pos="100000">
+                <a:srgbClr val="AFCBFF">
+                  <a:alpha val="0"/>
+                </a:srgbClr>
+              </a:gs>
+            </a:gsLst>
+            <a:lin ang="16200000" scaled="1"/>
+          </a:gradFill>
+          <a:ln w="19050">
+            <a:solidFill>
+              <a:schemeClr val="tx2">
+                <a:lumMod val="60000"/>
+                <a:lumOff val="40000"/>
+              </a:schemeClr>
             </a:solidFill>
           </a:ln>
           <a:effectLst/>
         </p:spPr>
         <p:style>
           <a:lnRef idx="1">
-            <a:schemeClr val="accent2"/>
+            <a:schemeClr val="accent3"/>
           </a:lnRef>
           <a:fillRef idx="2">
-            <a:schemeClr val="accent2"/>
+            <a:schemeClr val="accent3"/>
           </a:fillRef>
           <a:effectRef idx="1">
-            <a:schemeClr val="accent2"/>
-          </a:effectRef>
-          <a:fontRef idx="minor">
-            <a:schemeClr val="dk1"/>
-          </a:fontRef>
-        </p:style>
-        <p:txBody>
-          <a:bodyPr rtlCol="0" anchor="ctr"/>
-          <a:lstStyle/>
-          <a:p>
-            <a:pPr algn="ctr"/>
-            <a:r>
-              <a:rPr lang="en-US" sz="1050" dirty="0" err="1">
-                <a:solidFill>
-                  <a:schemeClr val="bg1"/>
-                </a:solidFill>
-              </a:rPr>
-              <a:t>CommandResult</a:t>
-            </a:r>
-            <a:endParaRPr lang="en-SG" sz="1050" dirty="0">
-              <a:solidFill>
-                <a:schemeClr val="bg1"/>
-              </a:solidFill>
-            </a:endParaRPr>
-          </a:p>
-        </p:txBody>
-      </p:sp>
-      <p:sp>
-        <p:nvSpPr>
-          <p:cNvPr id="5" name="Rectangle 11"/>
-          <p:cNvSpPr/>
-          <p:nvPr/>
-        </p:nvSpPr>
-        <p:spPr>
-          <a:xfrm flipH="1">
-            <a:off x="6180592" y="2648528"/>
-            <a:ext cx="1093635" cy="346760"/>
-          </a:xfrm>
-          <a:prstGeom prst="rect">
-            <a:avLst/>
-          </a:prstGeom>
-          <a:ln w="19050">
-            <a:solidFill>
-              <a:srgbClr val="0070C0"/>
-            </a:solidFill>
-          </a:ln>
-          <a:effectLst/>
-        </p:spPr>
-        <p:style>
-          <a:lnRef idx="1">
-            <a:schemeClr val="accent1"/>
-          </a:lnRef>
-          <a:fillRef idx="2">
-            <a:schemeClr val="accent1"/>
-          </a:fillRef>
-          <a:effectRef idx="1">
-            <a:schemeClr val="accent1"/>
+            <a:schemeClr val="accent3"/>
           </a:effectRef>
           <a:fontRef idx="minor">
             <a:schemeClr val="dk1"/>
@@ -12511,7 +12474,7 @@
                   <a:srgbClr val="0070C0"/>
                 </a:solidFill>
               </a:rPr>
-              <a:t>AddCommand</a:t>
+              <a:t>CommandFactory</a:t>
             </a:r>
             <a:endParaRPr lang="en-SG" sz="1050" b="1" dirty="0">
               <a:solidFill>
@@ -12523,13 +12486,13 @@
       </p:sp>
       <p:sp>
         <p:nvSpPr>
-          <p:cNvPr id="6" name="Rectangle 62"/>
+          <p:cNvPr id="5" name="Rectangle 62"/>
           <p:cNvSpPr/>
           <p:nvPr/>
         </p:nvSpPr>
         <p:spPr>
           <a:xfrm>
-            <a:off x="2015218" y="3763620"/>
+            <a:off x="2092842" y="1770924"/>
             <a:ext cx="1093635" cy="346760"/>
           </a:xfrm>
           <a:prstGeom prst="rect">
@@ -12538,10 +12501,8 @@
           <a:solidFill>
             <a:srgbClr val="0070C0"/>
           </a:solidFill>
-          <a:ln w="19050">
-            <a:solidFill>
-              <a:srgbClr val="0070C0"/>
-            </a:solidFill>
+          <a:ln w="0">
+            <a:noFill/>
           </a:ln>
           <a:effectLst/>
         </p:spPr>
@@ -12580,79 +12541,39 @@
           </a:p>
         </p:txBody>
       </p:sp>
-      <p:cxnSp>
-        <p:nvCxnSpPr>
-          <p:cNvPr id="7" name="Elbow Connector 63"/>
-          <p:cNvCxnSpPr>
-            <a:endCxn id="4" idx="3"/>
-          </p:cNvCxnSpPr>
-          <p:nvPr/>
-        </p:nvCxnSpPr>
-        <p:spPr>
-          <a:xfrm rot="10800000">
-            <a:off x="3189584" y="2722220"/>
-            <a:ext cx="2296817" cy="1187104"/>
-          </a:xfrm>
-          <a:prstGeom prst="bentConnector3">
-            <a:avLst>
-              <a:gd name="adj1" fmla="val -267"/>
-            </a:avLst>
-          </a:prstGeom>
-          <a:ln w="19050">
-            <a:solidFill>
-              <a:srgbClr val="0070C0"/>
-            </a:solidFill>
-            <a:prstDash val="sysDot"/>
-            <a:headEnd type="none" w="med" len="med"/>
-            <a:tailEnd type="arrow" w="med" len="med"/>
+      <p:sp>
+        <p:nvSpPr>
+          <p:cNvPr id="6" name="Isosceles Triangle 102"/>
+          <p:cNvSpPr/>
+          <p:nvPr/>
+        </p:nvSpPr>
+        <p:spPr>
+          <a:xfrm rot="16200000" flipV="1">
+            <a:off x="2457387" y="3161932"/>
+            <a:ext cx="270504" cy="175523"/>
+          </a:xfrm>
+          <a:prstGeom prst="triangle">
+            <a:avLst/>
+          </a:prstGeom>
+          <a:solidFill>
+            <a:srgbClr val="F1F5E9"/>
+          </a:solidFill>
+          <a:ln w="19050">
+            <a:solidFill>
+              <a:srgbClr val="558ED5"/>
+            </a:solidFill>
           </a:ln>
           <a:effectLst/>
         </p:spPr>
         <p:style>
           <a:lnRef idx="1">
-            <a:schemeClr val="accent2"/>
+            <a:schemeClr val="accent3"/>
           </a:lnRef>
           <a:fillRef idx="2">
-            <a:schemeClr val="accent2"/>
+            <a:schemeClr val="accent3"/>
           </a:fillRef>
           <a:effectRef idx="1">
-            <a:schemeClr val="accent2"/>
-          </a:effectRef>
-          <a:fontRef idx="minor">
-            <a:schemeClr val="dk1"/>
-          </a:fontRef>
-        </p:style>
-      </p:cxnSp>
-      <p:sp>
-        <p:nvSpPr>
-          <p:cNvPr id="8" name="Isosceles Triangle 102"/>
-          <p:cNvSpPr/>
-          <p:nvPr/>
-        </p:nvSpPr>
-        <p:spPr>
-          <a:xfrm rot="5400000" flipV="1">
-            <a:off x="5563388" y="3813212"/>
-            <a:ext cx="270504" cy="175523"/>
-          </a:xfrm>
-          <a:prstGeom prst="triangle">
-            <a:avLst/>
-          </a:prstGeom>
-          <a:ln w="19050">
-            <a:solidFill>
-              <a:srgbClr val="0070C0"/>
-            </a:solidFill>
-          </a:ln>
-          <a:effectLst/>
-        </p:spPr>
-        <p:style>
-          <a:lnRef idx="1">
-            <a:schemeClr val="accent1"/>
-          </a:lnRef>
-          <a:fillRef idx="2">
-            <a:schemeClr val="accent1"/>
-          </a:fillRef>
-          <a:effectRef idx="1">
-            <a:schemeClr val="accent1"/>
+            <a:schemeClr val="accent3"/>
           </a:effectRef>
           <a:fontRef idx="minor">
             <a:schemeClr val="dk1"/>
@@ -12671,68 +12592,24 @@
           </a:p>
         </p:txBody>
       </p:sp>
-      <p:cxnSp>
-        <p:nvCxnSpPr>
-          <p:cNvPr id="9" name="Elbow Connector 122"/>
-          <p:cNvCxnSpPr>
-            <a:endCxn id="4" idx="1"/>
-          </p:cNvCxnSpPr>
-          <p:nvPr/>
-        </p:nvCxnSpPr>
-        <p:spPr>
-          <a:xfrm>
-            <a:off x="1676400" y="2719360"/>
-            <a:ext cx="419548" cy="2860"/>
-          </a:xfrm>
-          <a:prstGeom prst="bentConnector3">
-            <a:avLst>
-              <a:gd name="adj1" fmla="val 50000"/>
-            </a:avLst>
-          </a:prstGeom>
-          <a:ln w="19050">
-            <a:solidFill>
-              <a:srgbClr val="0070C0"/>
-            </a:solidFill>
-            <a:prstDash val="sysDot"/>
-            <a:headEnd type="none" w="med" len="med"/>
-            <a:tailEnd type="arrow" w="med" len="med"/>
-          </a:ln>
-          <a:effectLst/>
-        </p:spPr>
-        <p:style>
-          <a:lnRef idx="1">
-            <a:schemeClr val="accent2"/>
-          </a:lnRef>
-          <a:fillRef idx="2">
-            <a:schemeClr val="accent2"/>
-          </a:fillRef>
-          <a:effectRef idx="1">
-            <a:schemeClr val="accent2"/>
-          </a:effectRef>
-          <a:fontRef idx="minor">
-            <a:schemeClr val="dk1"/>
-          </a:fontRef>
-        </p:style>
-      </p:cxnSp>
-      <p:sp>
-        <p:nvSpPr>
-          <p:cNvPr id="10" name="Rectangle 65"/>
+      <p:sp>
+        <p:nvSpPr>
+          <p:cNvPr id="7" name="Rectangle 65"/>
           <p:cNvSpPr/>
           <p:nvPr/>
         </p:nvSpPr>
         <p:spPr>
-          <a:xfrm>
-            <a:off x="1103085" y="4548755"/>
-            <a:ext cx="6288315" cy="328045"/>
+          <a:xfrm rot="16200000">
+            <a:off x="6408096" y="1760608"/>
+            <a:ext cx="953667" cy="328045"/>
           </a:xfrm>
           <a:prstGeom prst="roundRect">
             <a:avLst/>
           </a:prstGeom>
           <a:solidFill>
-            <a:schemeClr val="accent4">
-              <a:lumMod val="20000"/>
-              <a:lumOff val="80000"/>
-            </a:schemeClr>
+            <a:srgbClr val="E46C0A">
+              <a:alpha val="25000"/>
+            </a:srgbClr>
           </a:solidFill>
           <a:ln w="19050">
             <a:noFill/>
@@ -12764,7 +12641,7 @@
                   <a:schemeClr val="bg1"/>
                 </a:solidFill>
               </a:rPr>
-              <a:t>Model</a:t>
+              <a:t>Storage</a:t>
             </a:r>
             <a:endParaRPr lang="en-SG" sz="1100" b="1" dirty="0">
               <a:solidFill>
@@ -12776,146 +12653,53 @@
       </p:sp>
       <p:sp>
         <p:nvSpPr>
-          <p:cNvPr id="11" name="Rectangle 11"/>
+          <p:cNvPr id="19" name="Rectangle 62"/>
           <p:cNvSpPr/>
           <p:nvPr/>
         </p:nvSpPr>
         <p:spPr>
-          <a:xfrm flipH="1">
-            <a:off x="6180592" y="3054928"/>
-            <a:ext cx="1093635" cy="346760"/>
+          <a:xfrm>
+            <a:off x="2689186" y="3006865"/>
+            <a:ext cx="1041942" cy="346760"/>
           </a:xfrm>
           <a:prstGeom prst="rect">
             <a:avLst/>
           </a:prstGeom>
-          <a:ln w="19050">
-            <a:solidFill>
-              <a:srgbClr val="0070C0"/>
+          <a:gradFill>
+            <a:gsLst>
+              <a:gs pos="0">
+                <a:srgbClr val="AFCBFF"/>
+              </a:gs>
+              <a:gs pos="35000">
+                <a:srgbClr val="AFCBFF"/>
+              </a:gs>
+              <a:gs pos="100000">
+                <a:srgbClr val="AFCBFF">
+                  <a:alpha val="0"/>
+                </a:srgbClr>
+              </a:gs>
+            </a:gsLst>
+            <a:lin ang="16200000" scaled="1"/>
+          </a:gradFill>
+          <a:ln w="19050">
+            <a:solidFill>
+              <a:schemeClr val="tx2">
+                <a:lumMod val="60000"/>
+                <a:lumOff val="40000"/>
+              </a:schemeClr>
             </a:solidFill>
           </a:ln>
           <a:effectLst/>
         </p:spPr>
         <p:style>
           <a:lnRef idx="1">
-            <a:schemeClr val="accent1"/>
+            <a:schemeClr val="accent3"/>
           </a:lnRef>
           <a:fillRef idx="2">
-            <a:schemeClr val="accent1"/>
+            <a:schemeClr val="accent3"/>
           </a:fillRef>
           <a:effectRef idx="1">
-            <a:schemeClr val="accent1"/>
-          </a:effectRef>
-          <a:fontRef idx="minor">
-            <a:schemeClr val="dk1"/>
-          </a:fontRef>
-        </p:style>
-        <p:txBody>
-          <a:bodyPr rtlCol="0" anchor="ctr"/>
-          <a:lstStyle/>
-          <a:p>
-            <a:pPr algn="ctr"/>
-            <a:r>
-              <a:rPr lang="en-US" sz="1050" b="1" dirty="0" err="1">
-                <a:solidFill>
-                  <a:srgbClr val="0070C0"/>
-                </a:solidFill>
-              </a:rPr>
-              <a:t>ListCommand</a:t>
-            </a:r>
-            <a:endParaRPr lang="en-SG" sz="1050" b="1" dirty="0">
-              <a:solidFill>
-                <a:srgbClr val="0070C0"/>
-              </a:solidFill>
-            </a:endParaRPr>
-          </a:p>
-        </p:txBody>
-      </p:sp>
-      <p:sp>
-        <p:nvSpPr>
-          <p:cNvPr id="12" name="Rectangle 11"/>
-          <p:cNvSpPr/>
-          <p:nvPr/>
-        </p:nvSpPr>
-        <p:spPr>
-          <a:xfrm flipH="1">
-            <a:off x="6180590" y="3860800"/>
-            <a:ext cx="1093635" cy="346760"/>
-          </a:xfrm>
-          <a:prstGeom prst="rect">
-            <a:avLst/>
-          </a:prstGeom>
-          <a:ln w="19050">
-            <a:solidFill>
-              <a:srgbClr val="0070C0"/>
-            </a:solidFill>
-          </a:ln>
-          <a:effectLst/>
-        </p:spPr>
-        <p:style>
-          <a:lnRef idx="1">
-            <a:schemeClr val="accent1"/>
-          </a:lnRef>
-          <a:fillRef idx="2">
-            <a:schemeClr val="accent1"/>
-          </a:fillRef>
-          <a:effectRef idx="1">
-            <a:schemeClr val="accent1"/>
-          </a:effectRef>
-          <a:fontRef idx="minor">
-            <a:schemeClr val="dk1"/>
-          </a:fontRef>
-        </p:style>
-        <p:txBody>
-          <a:bodyPr rtlCol="0" anchor="ctr"/>
-          <a:lstStyle/>
-          <a:p>
-            <a:pPr algn="ctr"/>
-            <a:r>
-              <a:rPr lang="en-US" sz="1050" b="1" dirty="0">
-                <a:solidFill>
-                  <a:srgbClr val="0070C0"/>
-                </a:solidFill>
-              </a:rPr>
-              <a:t>…</a:t>
-            </a:r>
-            <a:endParaRPr lang="en-SG" sz="1050" b="1" dirty="0">
-              <a:solidFill>
-                <a:srgbClr val="0070C0"/>
-              </a:solidFill>
-            </a:endParaRPr>
-          </a:p>
-        </p:txBody>
-      </p:sp>
-      <p:sp>
-        <p:nvSpPr>
-          <p:cNvPr id="14" name="Rectangle 62"/>
-          <p:cNvSpPr/>
-          <p:nvPr/>
-        </p:nvSpPr>
-        <p:spPr>
-          <a:xfrm>
-            <a:off x="4815685" y="3765721"/>
-            <a:ext cx="772043" cy="346760"/>
-          </a:xfrm>
-          <a:prstGeom prst="rect">
-            <a:avLst/>
-          </a:prstGeom>
-          <a:ln w="19050">
-            <a:solidFill>
-              <a:srgbClr val="0070C0"/>
-            </a:solidFill>
-          </a:ln>
-          <a:effectLst/>
-        </p:spPr>
-        <p:style>
-          <a:lnRef idx="1">
-            <a:schemeClr val="accent1"/>
-          </a:lnRef>
-          <a:fillRef idx="2">
-            <a:schemeClr val="accent1"/>
-          </a:fillRef>
-          <a:effectRef idx="1">
-            <a:schemeClr val="accent1"/>
+            <a:schemeClr val="accent3"/>
           </a:effectRef>
           <a:fontRef idx="minor">
             <a:schemeClr val="dk1"/>
@@ -12959,29 +12743,29 @@
       </p:sp>
       <p:cxnSp>
         <p:nvCxnSpPr>
-          <p:cNvPr id="15" name="Elbow Connector 63"/>
+          <p:cNvPr id="20" name="Elbow Connector 106"/>
           <p:cNvCxnSpPr>
             <a:stCxn id="5" idx="3"/>
-            <a:endCxn id="8" idx="3"/>
           </p:cNvCxnSpPr>
           <p:nvPr/>
         </p:nvCxnSpPr>
         <p:spPr>
-          <a:xfrm rot="10800000" flipV="1">
-            <a:off x="5786402" y="2821908"/>
-            <a:ext cx="394190" cy="1079066"/>
+          <a:xfrm flipV="1">
+            <a:off x="3186477" y="1628992"/>
+            <a:ext cx="3549039" cy="315312"/>
           </a:xfrm>
           <a:prstGeom prst="bentConnector3">
             <a:avLst>
-              <a:gd name="adj1" fmla="val 50000"/>
+              <a:gd name="adj1" fmla="val 86768"/>
             </a:avLst>
           </a:prstGeom>
           <a:ln w="19050">
             <a:solidFill>
               <a:srgbClr val="0070C0"/>
             </a:solidFill>
+            <a:prstDash val="solid"/>
             <a:headEnd type="none" w="med" len="med"/>
-            <a:tailEnd type="none" w="med" len="med"/>
+            <a:tailEnd type="arrow" w="med" len="med"/>
           </a:ln>
           <a:effectLst/>
         </p:spPr>
@@ -13000,31 +12784,28 @@
           </a:fontRef>
         </p:style>
       </p:cxnSp>
-      <p:cxnSp>
-        <p:nvCxnSpPr>
-          <p:cNvPr id="16" name="Elbow Connector 63"/>
-          <p:cNvCxnSpPr>
-            <a:stCxn id="8" idx="3"/>
-            <a:endCxn id="12" idx="3"/>
-          </p:cNvCxnSpPr>
-          <p:nvPr/>
-        </p:nvCxnSpPr>
-        <p:spPr>
-          <a:xfrm>
-            <a:off x="5786402" y="3900974"/>
-            <a:ext cx="394188" cy="133206"/>
-          </a:xfrm>
-          <a:prstGeom prst="bentConnector3">
-            <a:avLst>
-              <a:gd name="adj1" fmla="val 50000"/>
-            </a:avLst>
-          </a:prstGeom>
-          <a:ln w="19050">
-            <a:solidFill>
-              <a:srgbClr val="0070C0"/>
-            </a:solidFill>
-            <a:headEnd type="none" w="med" len="med"/>
-            <a:tailEnd type="none" w="med" len="med"/>
+      <p:sp>
+        <p:nvSpPr>
+          <p:cNvPr id="21" name="Rectangle 65"/>
+          <p:cNvSpPr/>
+          <p:nvPr/>
+        </p:nvSpPr>
+        <p:spPr>
+          <a:xfrm rot="16200000">
+            <a:off x="5937082" y="3286200"/>
+            <a:ext cx="1924917" cy="328045"/>
+          </a:xfrm>
+          <a:prstGeom prst="roundRect">
+            <a:avLst/>
+          </a:prstGeom>
+          <a:solidFill>
+            <a:schemeClr val="accent4">
+              <a:lumMod val="20000"/>
+              <a:lumOff val="80000"/>
+            </a:schemeClr>
+          </a:solidFill>
+          <a:ln w="19050">
+            <a:noFill/>
           </a:ln>
           <a:effectLst/>
         </p:spPr>
@@ -13042,102 +12823,20 @@
             <a:schemeClr val="dk1"/>
           </a:fontRef>
         </p:style>
-      </p:cxnSp>
-      <p:cxnSp>
-        <p:nvCxnSpPr>
-          <p:cNvPr id="17" name="Elbow Connector 63"/>
-          <p:cNvCxnSpPr>
-            <a:stCxn id="8" idx="3"/>
-            <a:endCxn id="11" idx="3"/>
-          </p:cNvCxnSpPr>
-          <p:nvPr/>
-        </p:nvCxnSpPr>
-        <p:spPr>
-          <a:xfrm flipV="1">
-            <a:off x="5786402" y="3228308"/>
-            <a:ext cx="394190" cy="672666"/>
-          </a:xfrm>
-          <a:prstGeom prst="bentConnector3">
-            <a:avLst>
-              <a:gd name="adj1" fmla="val 50000"/>
-            </a:avLst>
-          </a:prstGeom>
-          <a:ln w="19050">
-            <a:solidFill>
-              <a:srgbClr val="0070C0"/>
-            </a:solidFill>
-            <a:headEnd type="none" w="med" len="med"/>
-            <a:tailEnd type="none" w="med" len="med"/>
-          </a:ln>
-          <a:effectLst/>
-        </p:spPr>
-        <p:style>
-          <a:lnRef idx="1">
-            <a:schemeClr val="accent2"/>
-          </a:lnRef>
-          <a:fillRef idx="2">
-            <a:schemeClr val="accent2"/>
-          </a:fillRef>
-          <a:effectRef idx="1">
-            <a:schemeClr val="accent2"/>
-          </a:effectRef>
-          <a:fontRef idx="minor">
-            <a:schemeClr val="dk1"/>
-          </a:fontRef>
-        </p:style>
-      </p:cxnSp>
-      <p:sp>
-        <p:nvSpPr>
-          <p:cNvPr id="18" name="Rectangle 62"/>
-          <p:cNvSpPr/>
-          <p:nvPr/>
-        </p:nvSpPr>
-        <p:spPr>
-          <a:xfrm>
-            <a:off x="3527828" y="3766159"/>
-            <a:ext cx="585450" cy="346760"/>
-          </a:xfrm>
-          <a:prstGeom prst="rect">
-            <a:avLst/>
-          </a:prstGeom>
-          <a:solidFill>
-            <a:srgbClr val="0070C0"/>
-          </a:solidFill>
-          <a:ln w="19050">
-            <a:solidFill>
-              <a:srgbClr val="0070C0"/>
-            </a:solidFill>
-          </a:ln>
-          <a:effectLst/>
-        </p:spPr>
-        <p:style>
-          <a:lnRef idx="1">
-            <a:schemeClr val="accent2"/>
-          </a:lnRef>
-          <a:fillRef idx="2">
-            <a:schemeClr val="accent2"/>
-          </a:fillRef>
-          <a:effectRef idx="1">
-            <a:schemeClr val="accent2"/>
-          </a:effectRef>
-          <a:fontRef idx="minor">
-            <a:schemeClr val="dk1"/>
-          </a:fontRef>
-        </p:style>
         <p:txBody>
           <a:bodyPr rtlCol="0" anchor="ctr"/>
           <a:lstStyle/>
           <a:p>
             <a:pPr algn="ctr"/>
             <a:r>
-              <a:rPr lang="en-US" sz="1050" dirty="0">
+              <a:rPr lang="en-US" sz="1100" b="1">
                 <a:solidFill>
                   <a:schemeClr val="bg1"/>
                 </a:solidFill>
               </a:rPr>
-              <a:t>Parser</a:t>
-            </a:r>
-            <a:endParaRPr lang="en-SG" sz="1050" dirty="0">
+              <a:t>Model</a:t>
+            </a:r>
+            <a:endParaRPr lang="en-SG" sz="1100" b="1" dirty="0">
               <a:solidFill>
                 <a:schemeClr val="bg1"/>
               </a:solidFill>
@@ -13145,94 +12844,9 @@
           </a:p>
         </p:txBody>
       </p:sp>
-      <p:cxnSp>
-        <p:nvCxnSpPr>
-          <p:cNvPr id="19" name="Elbow Connector 106"/>
-          <p:cNvCxnSpPr>
-            <a:stCxn id="6" idx="3"/>
-            <a:endCxn id="18" idx="1"/>
-          </p:cNvCxnSpPr>
-          <p:nvPr/>
-        </p:nvCxnSpPr>
-        <p:spPr>
-          <a:xfrm>
-            <a:off x="3108853" y="3937000"/>
-            <a:ext cx="418975" cy="2539"/>
-          </a:xfrm>
-          <a:prstGeom prst="bentConnector3">
-            <a:avLst>
-              <a:gd name="adj1" fmla="val 50000"/>
-            </a:avLst>
-          </a:prstGeom>
-          <a:ln w="19050">
-            <a:solidFill>
-              <a:srgbClr val="0070C0"/>
-            </a:solidFill>
-            <a:prstDash val="solid"/>
-            <a:headEnd type="none" w="med" len="med"/>
-            <a:tailEnd type="arrow" w="med" len="med"/>
-          </a:ln>
-          <a:effectLst/>
-        </p:spPr>
-        <p:style>
-          <a:lnRef idx="1">
-            <a:schemeClr val="accent2"/>
-          </a:lnRef>
-          <a:fillRef idx="2">
-            <a:schemeClr val="accent2"/>
-          </a:fillRef>
-          <a:effectRef idx="1">
-            <a:schemeClr val="accent2"/>
-          </a:effectRef>
-          <a:fontRef idx="minor">
-            <a:schemeClr val="dk1"/>
-          </a:fontRef>
-        </p:style>
-      </p:cxnSp>
-      <p:cxnSp>
-        <p:nvCxnSpPr>
-          <p:cNvPr id="20" name="Straight Arrow Connector 110"/>
-          <p:cNvCxnSpPr>
-            <a:stCxn id="14" idx="2"/>
-          </p:cNvCxnSpPr>
-          <p:nvPr/>
-        </p:nvCxnSpPr>
-        <p:spPr>
-          <a:xfrm>
-            <a:off x="5201707" y="4112481"/>
-            <a:ext cx="1" cy="436274"/>
-          </a:xfrm>
-          <a:prstGeom prst="straightConnector1">
-            <a:avLst/>
-          </a:prstGeom>
-          <a:ln w="19050">
-            <a:solidFill>
-              <a:srgbClr val="0070C0"/>
-            </a:solidFill>
-            <a:prstDash val="sysDot"/>
-            <a:headEnd type="none" w="med" len="med"/>
-            <a:tailEnd type="arrow" w="med" len="med"/>
-          </a:ln>
-          <a:effectLst/>
-        </p:spPr>
-        <p:style>
-          <a:lnRef idx="1">
-            <a:schemeClr val="accent2"/>
-          </a:lnRef>
-          <a:fillRef idx="2">
-            <a:schemeClr val="accent2"/>
-          </a:fillRef>
-          <a:effectRef idx="1">
-            <a:schemeClr val="accent2"/>
-          </a:effectRef>
-          <a:fontRef idx="minor">
-            <a:schemeClr val="dk1"/>
-          </a:fontRef>
-        </p:style>
-      </p:cxnSp>
-      <p:sp>
-        <p:nvSpPr>
-          <p:cNvPr id="21" name="Rectangle 62"/>
+      <p:sp>
+        <p:nvSpPr>
+          <p:cNvPr id="22" name="Rectangle 62"/>
           <p:cNvSpPr/>
           <p:nvPr/>
         </p:nvSpPr>
@@ -13247,10 +12861,8 @@
           <a:solidFill>
             <a:srgbClr val="0070C0"/>
           </a:solidFill>
-          <a:ln w="19050">
-            <a:solidFill>
-              <a:srgbClr val="0070C0"/>
-            </a:solidFill>
+          <a:ln w="0">
+            <a:noFill/>
           </a:ln>
           <a:effectLst/>
         </p:spPr>
@@ -13302,16 +12914,120 @@
       </p:sp>
       <p:sp>
         <p:nvSpPr>
-          <p:cNvPr id="22" name="Isosceles Triangle 102"/>
+          <p:cNvPr id="23" name="Isosceles Triangle 102"/>
           <p:cNvSpPr/>
           <p:nvPr/>
         </p:nvSpPr>
         <p:spPr>
-          <a:xfrm>
-            <a:off x="1359039" y="3581400"/>
+          <a:xfrm flipV="1">
+            <a:off x="1367767" y="2286001"/>
             <a:ext cx="270504" cy="175523"/>
           </a:xfrm>
           <a:prstGeom prst="triangle">
+            <a:avLst/>
+          </a:prstGeom>
+          <a:solidFill>
+            <a:srgbClr val="F1F5E9"/>
+          </a:solidFill>
+          <a:ln w="19050">
+            <a:solidFill>
+              <a:srgbClr val="0070C0"/>
+            </a:solidFill>
+          </a:ln>
+          <a:effectLst/>
+        </p:spPr>
+        <p:style>
+          <a:lnRef idx="1">
+            <a:schemeClr val="accent3"/>
+          </a:lnRef>
+          <a:fillRef idx="2">
+            <a:schemeClr val="accent3"/>
+          </a:fillRef>
+          <a:effectRef idx="1">
+            <a:schemeClr val="accent3"/>
+          </a:effectRef>
+          <a:fontRef idx="minor">
+            <a:schemeClr val="dk1"/>
+          </a:fontRef>
+        </p:style>
+        <p:txBody>
+          <a:bodyPr rtlCol="0" anchor="ctr"/>
+          <a:lstStyle/>
+          <a:p>
+            <a:pPr algn="ctr"/>
+            <a:endParaRPr lang="en-SG" sz="1050" b="1">
+              <a:solidFill>
+                <a:srgbClr val="0070C0"/>
+              </a:solidFill>
+            </a:endParaRPr>
+          </a:p>
+        </p:txBody>
+      </p:sp>
+      <p:sp>
+        <p:nvSpPr>
+          <p:cNvPr id="24" name="Rectangle 142"/>
+          <p:cNvSpPr/>
+          <p:nvPr/>
+        </p:nvSpPr>
+        <p:spPr>
+          <a:xfrm>
+            <a:off x="5435896" y="2895600"/>
+            <a:ext cx="229325" cy="166560"/>
+          </a:xfrm>
+          <a:prstGeom prst="rect">
+            <a:avLst/>
+          </a:prstGeom>
+          <a:solidFill>
+            <a:schemeClr val="accent3">
+              <a:lumMod val="20000"/>
+              <a:lumOff val="80000"/>
+              <a:alpha val="80000"/>
+            </a:schemeClr>
+          </a:solidFill>
+          <a:ln>
+            <a:noFill/>
+          </a:ln>
+          <a:effectLst>
+            <a:softEdge rad="31750"/>
+          </a:effectLst>
+        </p:spPr>
+        <p:style>
+          <a:lnRef idx="2">
+            <a:schemeClr val="accent1">
+              <a:shade val="50000"/>
+            </a:schemeClr>
+          </a:lnRef>
+          <a:fillRef idx="1">
+            <a:schemeClr val="accent1"/>
+          </a:fillRef>
+          <a:effectRef idx="0">
+            <a:schemeClr val="accent1"/>
+          </a:effectRef>
+          <a:fontRef idx="minor">
+            <a:schemeClr val="lt1"/>
+          </a:fontRef>
+        </p:style>
+        <p:txBody>
+          <a:bodyPr rtlCol="0" anchor="ctr"/>
+          <a:lstStyle/>
+          <a:p>
+            <a:pPr algn="ctr"/>
+            <a:endParaRPr lang="en-SG"/>
+          </a:p>
+        </p:txBody>
+      </p:sp>
+      <p:sp>
+        <p:nvSpPr>
+          <p:cNvPr id="30" name="Flowchart: Decision 88"/>
+          <p:cNvSpPr/>
+          <p:nvPr/>
+        </p:nvSpPr>
+        <p:spPr>
+          <a:xfrm>
+            <a:off x="2975057" y="2102181"/>
+            <a:ext cx="183156" cy="161573"/>
+          </a:xfrm>
+          <a:prstGeom prst="flowChartDecision">
             <a:avLst/>
           </a:prstGeom>
           <a:solidFill>
@@ -13320,25 +13036,29 @@
               <a:lumOff val="40000"/>
             </a:schemeClr>
           </a:solidFill>
-          <a:ln w="19050">
-            <a:solidFill>
-              <a:srgbClr val="0070C0"/>
-            </a:solidFill>
-          </a:ln>
-          <a:effectLst/>
-        </p:spPr>
-        <p:style>
-          <a:lnRef idx="1">
-            <a:schemeClr val="accent1"/>
-          </a:lnRef>
-          <a:fillRef idx="2">
-            <a:schemeClr val="accent1"/>
-          </a:fillRef>
-          <a:effectRef idx="1">
-            <a:schemeClr val="accent1"/>
-          </a:effectRef>
-          <a:fontRef idx="minor">
-            <a:schemeClr val="dk1"/>
+          <a:ln>
+            <a:solidFill>
+              <a:schemeClr val="tx2">
+                <a:lumMod val="60000"/>
+                <a:lumOff val="40000"/>
+              </a:schemeClr>
+            </a:solidFill>
+          </a:ln>
+        </p:spPr>
+        <p:style>
+          <a:lnRef idx="2">
+            <a:schemeClr val="accent1">
+              <a:shade val="50000"/>
+            </a:schemeClr>
+          </a:lnRef>
+          <a:fillRef idx="1">
+            <a:schemeClr val="accent1"/>
+          </a:fillRef>
+          <a:effectRef idx="0">
+            <a:schemeClr val="accent1"/>
+          </a:effectRef>
+          <a:fontRef idx="minor">
+            <a:schemeClr val="lt1"/>
           </a:fontRef>
         </p:style>
         <p:txBody>
@@ -13346,148 +13066,23 @@
           <a:lstStyle/>
           <a:p>
             <a:pPr algn="ctr"/>
-            <a:endParaRPr lang="en-SG" sz="1050" b="1">
-              <a:solidFill>
-                <a:srgbClr val="92D050"/>
-              </a:solidFill>
-            </a:endParaRPr>
+            <a:endParaRPr lang="en-SG"/>
           </a:p>
         </p:txBody>
       </p:sp>
       <p:cxnSp>
         <p:nvCxnSpPr>
-          <p:cNvPr id="23" name="Elbow Connector 63"/>
+          <p:cNvPr id="31" name="Elbow Connector 63"/>
           <p:cNvCxnSpPr>
-            <a:stCxn id="6" idx="1"/>
-            <a:endCxn id="22" idx="3"/>
+            <a:stCxn id="30" idx="3"/>
+            <a:endCxn id="3" idx="1"/>
           </p:cNvCxnSpPr>
           <p:nvPr/>
         </p:nvCxnSpPr>
         <p:spPr>
-          <a:xfrm rot="10800000">
-            <a:off x="1494292" y="3756924"/>
-            <a:ext cx="520927" cy="180077"/>
-          </a:xfrm>
-          <a:prstGeom prst="bentConnector2">
-            <a:avLst/>
-          </a:prstGeom>
-          <a:ln w="19050">
-            <a:solidFill>
-              <a:srgbClr val="0070C0"/>
-            </a:solidFill>
-            <a:prstDash val="sysDot"/>
-            <a:headEnd type="none" w="med" len="med"/>
-            <a:tailEnd type="none" w="med" len="med"/>
-          </a:ln>
-          <a:effectLst/>
-        </p:spPr>
-        <p:style>
-          <a:lnRef idx="1">
-            <a:schemeClr val="accent2"/>
-          </a:lnRef>
-          <a:fillRef idx="2">
-            <a:schemeClr val="accent2"/>
-          </a:fillRef>
-          <a:effectRef idx="1">
-            <a:schemeClr val="accent2"/>
-          </a:effectRef>
-          <a:fontRef idx="minor">
-            <a:schemeClr val="dk1"/>
-          </a:fontRef>
-        </p:style>
-      </p:cxnSp>
-      <p:cxnSp>
-        <p:nvCxnSpPr>
-          <p:cNvPr id="24" name="Straight Arrow Connector 54"/>
-          <p:cNvCxnSpPr>
-            <a:stCxn id="18" idx="3"/>
-            <a:endCxn id="14" idx="1"/>
-          </p:cNvCxnSpPr>
-          <p:nvPr/>
-        </p:nvCxnSpPr>
-        <p:spPr>
-          <a:xfrm flipV="1">
-            <a:off x="4113278" y="3939101"/>
-            <a:ext cx="702407" cy="438"/>
-          </a:xfrm>
-          <a:prstGeom prst="straightConnector1">
-            <a:avLst/>
-          </a:prstGeom>
-          <a:ln w="19050">
-            <a:solidFill>
-              <a:srgbClr val="0070C0"/>
-            </a:solidFill>
-            <a:prstDash val="sysDot"/>
-            <a:headEnd type="none" w="med" len="med"/>
-            <a:tailEnd type="arrow" w="med" len="med"/>
-          </a:ln>
-          <a:effectLst/>
-        </p:spPr>
-        <p:style>
-          <a:lnRef idx="1">
-            <a:schemeClr val="accent2"/>
-          </a:lnRef>
-          <a:fillRef idx="2">
-            <a:schemeClr val="accent2"/>
-          </a:fillRef>
-          <a:effectRef idx="1">
-            <a:schemeClr val="accent2"/>
-          </a:effectRef>
-          <a:fontRef idx="minor">
-            <a:schemeClr val="dk1"/>
-          </a:fontRef>
-        </p:style>
-      </p:cxnSp>
-      <p:cxnSp>
-        <p:nvCxnSpPr>
-          <p:cNvPr id="25" name="Straight Arrow Connector 57"/>
-          <p:cNvCxnSpPr>
-            <a:stCxn id="6" idx="2"/>
-          </p:cNvCxnSpPr>
-          <p:nvPr/>
-        </p:nvCxnSpPr>
-        <p:spPr>
-          <a:xfrm flipH="1">
-            <a:off x="2562035" y="4110380"/>
-            <a:ext cx="1" cy="438375"/>
-          </a:xfrm>
-          <a:prstGeom prst="straightConnector1">
-            <a:avLst/>
-          </a:prstGeom>
-          <a:ln w="19050">
-            <a:solidFill>
-              <a:srgbClr val="0070C0"/>
-            </a:solidFill>
-            <a:headEnd type="none" w="med" len="med"/>
-            <a:tailEnd type="arrow" w="med" len="med"/>
-          </a:ln>
-          <a:effectLst/>
-        </p:spPr>
-        <p:style>
-          <a:lnRef idx="1">
-            <a:schemeClr val="accent2"/>
-          </a:lnRef>
-          <a:fillRef idx="2">
-            <a:schemeClr val="accent2"/>
-          </a:fillRef>
-          <a:effectRef idx="1">
-            <a:schemeClr val="accent2"/>
-          </a:effectRef>
-          <a:fontRef idx="minor">
-            <a:schemeClr val="dk1"/>
-          </a:fontRef>
-        </p:style>
-      </p:cxnSp>
-      <p:cxnSp>
-        <p:nvCxnSpPr>
-          <p:cNvPr id="28" name="Elbow Connector 122"/>
-          <p:cNvCxnSpPr/>
-          <p:nvPr/>
-        </p:nvCxnSpPr>
-        <p:spPr>
-          <a:xfrm>
-            <a:off x="893311" y="2984905"/>
-            <a:ext cx="419548" cy="2860"/>
+          <a:xfrm>
+            <a:off x="3158213" y="2182968"/>
+            <a:ext cx="760050" cy="268203"/>
           </a:xfrm>
           <a:prstGeom prst="bentConnector3">
             <a:avLst>
@@ -13496,11 +13091,11 @@
           </a:prstGeom>
           <a:ln w="19050">
             <a:solidFill>
-              <a:schemeClr val="bg1">
-                <a:lumMod val="75000"/>
+              <a:schemeClr val="tx2">
+                <a:lumMod val="60000"/>
+                <a:lumOff val="40000"/>
               </a:schemeClr>
             </a:solidFill>
-            <a:prstDash val="sysDot"/>
             <a:headEnd type="none" w="med" len="med"/>
             <a:tailEnd type="arrow" w="med" len="med"/>
           </a:ln>
@@ -13523,455 +13118,2015 @@
       </p:cxnSp>
       <p:cxnSp>
         <p:nvCxnSpPr>
-          <p:cNvPr id="29" name="Elbow Connector 63"/>
+          <p:cNvPr id="38" name="Elbow Connector 137"/>
           <p:cNvCxnSpPr>
-            <a:stCxn id="6" idx="0"/>
-            <a:endCxn id="14" idx="0"/>
+            <a:endCxn id="22" idx="0"/>
           </p:cNvCxnSpPr>
           <p:nvPr/>
         </p:nvCxnSpPr>
         <p:spPr>
-          <a:xfrm rot="16200000" flipH="1">
-            <a:off x="3880820" y="2444835"/>
-            <a:ext cx="2101" cy="2639671"/>
+          <a:xfrm flipV="1">
+            <a:off x="442359" y="3034582"/>
+            <a:ext cx="887281" cy="682"/>
           </a:xfrm>
           <a:prstGeom prst="bentConnector3">
             <a:avLst>
-              <a:gd name="adj1" fmla="val -10880533"/>
+              <a:gd name="adj1" fmla="val 50000"/>
             </a:avLst>
           </a:prstGeom>
           <a:ln w="19050">
             <a:solidFill>
-              <a:srgbClr val="0070C0"/>
-            </a:solidFill>
-            <a:prstDash val="sysDot"/>
-            <a:headEnd type="none" w="med" len="med"/>
-            <a:tailEnd type="arrow" w="med" len="med"/>
+              <a:schemeClr val="tx1">
+                <a:alpha val="25000"/>
+              </a:schemeClr>
+            </a:solidFill>
+            <a:prstDash val="sysDash"/>
+            <a:tailEnd type="arrow"/>
+          </a:ln>
+        </p:spPr>
+        <p:style>
+          <a:lnRef idx="1">
+            <a:schemeClr val="accent1"/>
+          </a:lnRef>
+          <a:fillRef idx="0">
+            <a:schemeClr val="accent1"/>
+          </a:fillRef>
+          <a:effectRef idx="0">
+            <a:schemeClr val="accent1"/>
+          </a:effectRef>
+          <a:fontRef idx="minor">
+            <a:schemeClr val="tx1"/>
+          </a:fontRef>
+        </p:style>
+      </p:cxnSp>
+      <p:sp>
+        <p:nvSpPr>
+          <p:cNvPr id="43" name="Rectangle 11"/>
+          <p:cNvSpPr/>
+          <p:nvPr/>
+        </p:nvSpPr>
+        <p:spPr>
+          <a:xfrm>
+            <a:off x="2879067" y="3550404"/>
+            <a:ext cx="1040906" cy="236841"/>
+          </a:xfrm>
+          <a:prstGeom prst="rect">
+            <a:avLst/>
+          </a:prstGeom>
+          <a:gradFill>
+            <a:gsLst>
+              <a:gs pos="0">
+                <a:srgbClr val="AFCBFF"/>
+              </a:gs>
+              <a:gs pos="35000">
+                <a:srgbClr val="AFCBFF"/>
+              </a:gs>
+              <a:gs pos="100000">
+                <a:srgbClr val="AFCBFF">
+                  <a:alpha val="0"/>
+                </a:srgbClr>
+              </a:gs>
+            </a:gsLst>
+            <a:lin ang="16200000" scaled="1"/>
+          </a:gradFill>
+          <a:ln w="19050">
+            <a:solidFill>
+              <a:schemeClr val="tx2">
+                <a:lumMod val="60000"/>
+                <a:lumOff val="40000"/>
+              </a:schemeClr>
+            </a:solidFill>
           </a:ln>
           <a:effectLst/>
         </p:spPr>
         <p:style>
           <a:lnRef idx="1">
-            <a:schemeClr val="accent2"/>
+            <a:schemeClr val="accent3"/>
           </a:lnRef>
           <a:fillRef idx="2">
-            <a:schemeClr val="accent2"/>
+            <a:schemeClr val="accent3"/>
           </a:fillRef>
           <a:effectRef idx="1">
-            <a:schemeClr val="accent2"/>
+            <a:schemeClr val="accent3"/>
           </a:effectRef>
           <a:fontRef idx="minor">
             <a:schemeClr val="dk1"/>
           </a:fontRef>
         </p:style>
-      </p:cxnSp>
-      <p:grpSp>
-        <p:nvGrpSpPr>
-          <p:cNvPr id="35" name="Group 34"/>
-          <p:cNvGrpSpPr/>
-          <p:nvPr/>
-        </p:nvGrpSpPr>
-        <p:grpSpPr>
-          <a:xfrm>
-            <a:off x="4064583" y="3334635"/>
-            <a:ext cx="889000" cy="230832"/>
-            <a:chOff x="2895600" y="807932"/>
-            <a:chExt cx="889000" cy="230832"/>
-          </a:xfrm>
-        </p:grpSpPr>
-        <p:sp>
-          <p:nvSpPr>
-            <p:cNvPr id="33" name="TextBox 32"/>
-            <p:cNvSpPr txBox="1"/>
-            <p:nvPr/>
-          </p:nvSpPr>
-          <p:spPr>
-            <a:xfrm>
-              <a:off x="2895600" y="807932"/>
-              <a:ext cx="728806" cy="230832"/>
-            </a:xfrm>
-            <a:prstGeom prst="rect">
-              <a:avLst/>
-            </a:prstGeom>
-            <a:noFill/>
-          </p:spPr>
-          <p:txBody>
-            <a:bodyPr wrap="square" lIns="0" tIns="0" rIns="0" bIns="0" rtlCol="0">
-              <a:noAutofit/>
-            </a:bodyPr>
-            <a:lstStyle/>
-            <a:p>
-              <a:pPr algn="r"/>
-              <a:r>
-                <a:rPr lang="en-US" sz="1100" dirty="0">
-                  <a:solidFill>
-                    <a:srgbClr val="0070C0"/>
-                  </a:solidFill>
-                </a:rPr>
-                <a:t>executes</a:t>
-              </a:r>
-              <a:endParaRPr lang="en-SG" sz="1100" dirty="0">
+        <p:txBody>
+          <a:bodyPr rtlCol="0" anchor="ctr"/>
+          <a:lstStyle/>
+          <a:p>
+            <a:pPr algn="ctr"/>
+            <a:r>
+              <a:rPr lang="en-SG" sz="1050" b="1" dirty="0" err="1">
                 <a:solidFill>
                   <a:srgbClr val="0070C0"/>
                 </a:solidFill>
-              </a:endParaRPr>
-            </a:p>
-          </p:txBody>
-        </p:sp>
-        <p:sp>
-          <p:nvSpPr>
-            <p:cNvPr id="34" name="Isosceles Triangle 33"/>
-            <p:cNvSpPr/>
+              </a:rPr>
+              <a:t>AddCommand</a:t>
+            </a:r>
+            <a:endParaRPr lang="en-SG" sz="1050" b="1" dirty="0">
+              <a:solidFill>
+                <a:srgbClr val="0070C0"/>
+              </a:solidFill>
+            </a:endParaRPr>
+          </a:p>
+        </p:txBody>
+      </p:sp>
+      <p:cxnSp>
+        <p:nvCxnSpPr>
+          <p:cNvPr id="50" name="Elbow Connector 63"/>
+          <p:cNvCxnSpPr>
+            <a:stCxn id="3" idx="2"/>
+            <a:endCxn id="19" idx="3"/>
+          </p:cNvCxnSpPr>
+          <p:nvPr/>
+        </p:nvCxnSpPr>
+        <p:spPr>
+          <a:xfrm rot="5400000">
+            <a:off x="3849955" y="2456018"/>
+            <a:ext cx="605401" cy="843053"/>
+          </a:xfrm>
+          <a:prstGeom prst="bentConnector2">
+            <a:avLst/>
+          </a:prstGeom>
+          <a:ln w="19050">
+            <a:solidFill>
+              <a:schemeClr val="tx2">
+                <a:lumMod val="60000"/>
+                <a:lumOff val="40000"/>
+              </a:schemeClr>
+            </a:solidFill>
+            <a:prstDash val="sysDash"/>
+            <a:headEnd type="none" w="med" len="med"/>
+            <a:tailEnd type="arrow" w="med" len="med"/>
+          </a:ln>
+          <a:effectLst/>
+        </p:spPr>
+        <p:style>
+          <a:lnRef idx="1">
+            <a:schemeClr val="accent2"/>
+          </a:lnRef>
+          <a:fillRef idx="2">
+            <a:schemeClr val="accent2"/>
+          </a:fillRef>
+          <a:effectRef idx="1">
+            <a:schemeClr val="accent2"/>
+          </a:effectRef>
+          <a:fontRef idx="minor">
+            <a:schemeClr val="dk1"/>
+          </a:fontRef>
+        </p:style>
+      </p:cxnSp>
+      <p:cxnSp>
+        <p:nvCxnSpPr>
+          <p:cNvPr id="52" name="Elbow Connector 188"/>
+          <p:cNvCxnSpPr>
+            <a:stCxn id="5" idx="1"/>
+          </p:cNvCxnSpPr>
+          <p:nvPr/>
+        </p:nvCxnSpPr>
+        <p:spPr>
+          <a:xfrm rot="10800000" flipV="1">
+            <a:off x="1503020" y="1944304"/>
+            <a:ext cx="589823" cy="328236"/>
+          </a:xfrm>
+          <a:prstGeom prst="bentConnector3">
+            <a:avLst>
+              <a:gd name="adj1" fmla="val 98447"/>
+            </a:avLst>
+          </a:prstGeom>
+          <a:ln w="19050">
+            <a:solidFill>
+              <a:srgbClr val="0070C0"/>
+            </a:solidFill>
+            <a:prstDash val="sysDash"/>
+            <a:tailEnd type="none"/>
+          </a:ln>
+        </p:spPr>
+        <p:style>
+          <a:lnRef idx="1">
+            <a:schemeClr val="accent1"/>
+          </a:lnRef>
+          <a:fillRef idx="0">
+            <a:schemeClr val="accent1"/>
+          </a:fillRef>
+          <a:effectRef idx="0">
+            <a:schemeClr val="accent1"/>
+          </a:effectRef>
+          <a:fontRef idx="minor">
+            <a:schemeClr val="tx1"/>
+          </a:fontRef>
+        </p:style>
+      </p:cxnSp>
+      <p:cxnSp>
+        <p:nvCxnSpPr>
+          <p:cNvPr id="75" name="Elbow Connector 106"/>
+          <p:cNvCxnSpPr/>
+          <p:nvPr/>
+        </p:nvCxnSpPr>
+        <p:spPr>
+          <a:xfrm>
+            <a:off x="3186477" y="2057400"/>
+            <a:ext cx="3534429" cy="685800"/>
+          </a:xfrm>
+          <a:prstGeom prst="bentConnector3">
+            <a:avLst>
+              <a:gd name="adj1" fmla="val 87459"/>
+            </a:avLst>
+          </a:prstGeom>
+          <a:ln w="19050">
+            <a:solidFill>
+              <a:srgbClr val="0070C0"/>
+            </a:solidFill>
+            <a:prstDash val="solid"/>
+            <a:headEnd type="none" w="med" len="med"/>
+            <a:tailEnd type="arrow" w="med" len="med"/>
+          </a:ln>
+          <a:effectLst/>
+        </p:spPr>
+        <p:style>
+          <a:lnRef idx="1">
+            <a:schemeClr val="accent2"/>
+          </a:lnRef>
+          <a:fillRef idx="2">
+            <a:schemeClr val="accent2"/>
+          </a:fillRef>
+          <a:effectRef idx="1">
+            <a:schemeClr val="accent2"/>
+          </a:effectRef>
+          <a:fontRef idx="minor">
+            <a:schemeClr val="dk1"/>
+          </a:fontRef>
+        </p:style>
+      </p:cxnSp>
+      <p:sp>
+        <p:nvSpPr>
+          <p:cNvPr id="92" name="Flowchart: Decision 88"/>
+          <p:cNvSpPr/>
+          <p:nvPr/>
+        </p:nvSpPr>
+        <p:spPr>
+          <a:xfrm>
+            <a:off x="5237364" y="2327498"/>
+            <a:ext cx="183156" cy="161573"/>
+          </a:xfrm>
+          <a:prstGeom prst="flowChartDecision">
+            <a:avLst/>
+          </a:prstGeom>
+          <a:solidFill>
+            <a:schemeClr val="tx2">
+              <a:lumMod val="60000"/>
+              <a:lumOff val="40000"/>
+            </a:schemeClr>
+          </a:solidFill>
+          <a:ln>
+            <a:solidFill>
+              <a:schemeClr val="tx2">
+                <a:lumMod val="60000"/>
+                <a:lumOff val="40000"/>
+              </a:schemeClr>
+            </a:solidFill>
+          </a:ln>
+        </p:spPr>
+        <p:style>
+          <a:lnRef idx="2">
+            <a:schemeClr val="accent1">
+              <a:shade val="50000"/>
+            </a:schemeClr>
+          </a:lnRef>
+          <a:fillRef idx="1">
+            <a:schemeClr val="accent1"/>
+          </a:fillRef>
+          <a:effectRef idx="0">
+            <a:schemeClr val="accent1"/>
+          </a:effectRef>
+          <a:fontRef idx="minor">
+            <a:schemeClr val="lt1"/>
+          </a:fontRef>
+        </p:style>
+        <p:txBody>
+          <a:bodyPr rtlCol="0" anchor="ctr"/>
+          <a:lstStyle/>
+          <a:p>
+            <a:pPr algn="ctr"/>
+            <a:endParaRPr lang="en-SG"/>
+          </a:p>
+        </p:txBody>
+      </p:sp>
+      <p:cxnSp>
+        <p:nvCxnSpPr>
+          <p:cNvPr id="99" name="Elbow Connector 63"/>
+          <p:cNvCxnSpPr>
+            <a:stCxn id="92" idx="2"/>
+            <a:endCxn id="104" idx="0"/>
+          </p:cNvCxnSpPr>
+          <p:nvPr/>
+        </p:nvCxnSpPr>
+        <p:spPr>
+          <a:xfrm rot="16200000" flipH="1">
+            <a:off x="5302223" y="2515790"/>
+            <a:ext cx="233027" cy="179588"/>
+          </a:xfrm>
+          <a:prstGeom prst="bentConnector3">
+            <a:avLst>
+              <a:gd name="adj1" fmla="val 50000"/>
+            </a:avLst>
+          </a:prstGeom>
+          <a:ln w="19050">
+            <a:solidFill>
+              <a:schemeClr val="tx2">
+                <a:lumMod val="60000"/>
+                <a:lumOff val="40000"/>
+              </a:schemeClr>
+            </a:solidFill>
+            <a:headEnd type="none" w="med" len="med"/>
+            <a:tailEnd type="arrow" w="med" len="med"/>
+          </a:ln>
+          <a:effectLst/>
+        </p:spPr>
+        <p:style>
+          <a:lnRef idx="1">
+            <a:schemeClr val="accent2"/>
+          </a:lnRef>
+          <a:fillRef idx="2">
+            <a:schemeClr val="accent2"/>
+          </a:fillRef>
+          <a:effectRef idx="1">
+            <a:schemeClr val="accent2"/>
+          </a:effectRef>
+          <a:fontRef idx="minor">
+            <a:schemeClr val="dk1"/>
+          </a:fontRef>
+        </p:style>
+      </p:cxnSp>
+      <p:sp>
+        <p:nvSpPr>
+          <p:cNvPr id="104" name="Rectangle 8"/>
+          <p:cNvSpPr/>
+          <p:nvPr/>
+        </p:nvSpPr>
+        <p:spPr>
+          <a:xfrm>
+            <a:off x="4925875" y="2722098"/>
+            <a:ext cx="1165309" cy="252028"/>
+          </a:xfrm>
+          <a:prstGeom prst="rect">
+            <a:avLst/>
+          </a:prstGeom>
+          <a:gradFill>
+            <a:gsLst>
+              <a:gs pos="0">
+                <a:srgbClr val="AFCBFF"/>
+              </a:gs>
+              <a:gs pos="35000">
+                <a:srgbClr val="AFCBFF"/>
+              </a:gs>
+              <a:gs pos="100000">
+                <a:srgbClr val="AFCBFF">
+                  <a:alpha val="0"/>
+                </a:srgbClr>
+              </a:gs>
+            </a:gsLst>
+            <a:lin ang="16200000" scaled="1"/>
+          </a:gradFill>
+          <a:ln w="19050">
+            <a:solidFill>
+              <a:schemeClr val="tx2">
+                <a:lumMod val="60000"/>
+                <a:lumOff val="40000"/>
+              </a:schemeClr>
+            </a:solidFill>
+          </a:ln>
+          <a:effectLst/>
+        </p:spPr>
+        <p:style>
+          <a:lnRef idx="1">
+            <a:schemeClr val="accent3"/>
+          </a:lnRef>
+          <a:fillRef idx="2">
+            <a:schemeClr val="accent3"/>
+          </a:fillRef>
+          <a:effectRef idx="1">
+            <a:schemeClr val="accent3"/>
+          </a:effectRef>
+          <a:fontRef idx="minor">
+            <a:schemeClr val="dk1"/>
+          </a:fontRef>
+        </p:style>
+        <p:txBody>
+          <a:bodyPr rtlCol="0" anchor="ctr"/>
+          <a:lstStyle/>
+          <a:p>
+            <a:pPr algn="ctr"/>
+            <a:r>
+              <a:rPr lang="en-US" sz="1050" b="1" dirty="0" err="1">
+                <a:solidFill>
+                  <a:srgbClr val="0070C0"/>
+                </a:solidFill>
+              </a:rPr>
+              <a:t>CommandParser</a:t>
+            </a:r>
+            <a:endParaRPr lang="en-SG" sz="1050" b="1" dirty="0">
+              <a:solidFill>
+                <a:srgbClr val="0070C0"/>
+              </a:solidFill>
+            </a:endParaRPr>
+          </a:p>
+        </p:txBody>
+      </p:sp>
+      <p:sp>
+        <p:nvSpPr>
+          <p:cNvPr id="109" name="Flowchart: Decision 88"/>
+          <p:cNvSpPr/>
+          <p:nvPr/>
+        </p:nvSpPr>
+        <p:spPr>
+          <a:xfrm>
+            <a:off x="5444972" y="2992195"/>
+            <a:ext cx="183156" cy="161573"/>
+          </a:xfrm>
+          <a:prstGeom prst="flowChartDecision">
+            <a:avLst/>
+          </a:prstGeom>
+          <a:solidFill>
+            <a:schemeClr val="tx2">
+              <a:lumMod val="60000"/>
+              <a:lumOff val="40000"/>
+            </a:schemeClr>
+          </a:solidFill>
+          <a:ln>
+            <a:solidFill>
+              <a:schemeClr val="tx2">
+                <a:lumMod val="60000"/>
+                <a:lumOff val="40000"/>
+              </a:schemeClr>
+            </a:solidFill>
+          </a:ln>
+        </p:spPr>
+        <p:style>
+          <a:lnRef idx="2">
+            <a:schemeClr val="accent1">
+              <a:shade val="50000"/>
+            </a:schemeClr>
+          </a:lnRef>
+          <a:fillRef idx="1">
+            <a:schemeClr val="accent1"/>
+          </a:fillRef>
+          <a:effectRef idx="0">
+            <a:schemeClr val="accent1"/>
+          </a:effectRef>
+          <a:fontRef idx="minor">
+            <a:schemeClr val="lt1"/>
+          </a:fontRef>
+        </p:style>
+        <p:txBody>
+          <a:bodyPr rtlCol="0" anchor="ctr"/>
+          <a:lstStyle/>
+          <a:p>
+            <a:pPr algn="ctr"/>
+            <a:endParaRPr lang="en-SG"/>
+          </a:p>
+        </p:txBody>
+      </p:sp>
+      <p:sp>
+        <p:nvSpPr>
+          <p:cNvPr id="110" name="Rectangle 8"/>
+          <p:cNvSpPr/>
+          <p:nvPr/>
+        </p:nvSpPr>
+        <p:spPr>
+          <a:xfrm>
+            <a:off x="5161573" y="3448434"/>
+            <a:ext cx="1165309" cy="265931"/>
+          </a:xfrm>
+          <a:prstGeom prst="rect">
+            <a:avLst/>
+          </a:prstGeom>
+          <a:gradFill>
+            <a:gsLst>
+              <a:gs pos="0">
+                <a:srgbClr val="AFCBFF"/>
+              </a:gs>
+              <a:gs pos="35000">
+                <a:srgbClr val="AFCBFF"/>
+              </a:gs>
+              <a:gs pos="100000">
+                <a:srgbClr val="AFCBFF">
+                  <a:alpha val="0"/>
+                </a:srgbClr>
+              </a:gs>
+            </a:gsLst>
+            <a:lin ang="16200000" scaled="1"/>
+          </a:gradFill>
+          <a:ln w="19050">
+            <a:solidFill>
+              <a:schemeClr val="tx2">
+                <a:lumMod val="60000"/>
+                <a:lumOff val="40000"/>
+              </a:schemeClr>
+            </a:solidFill>
+          </a:ln>
+          <a:effectLst/>
+        </p:spPr>
+        <p:style>
+          <a:lnRef idx="1">
+            <a:schemeClr val="accent3"/>
+          </a:lnRef>
+          <a:fillRef idx="2">
+            <a:schemeClr val="accent3"/>
+          </a:fillRef>
+          <a:effectRef idx="1">
+            <a:schemeClr val="accent3"/>
+          </a:effectRef>
+          <a:fontRef idx="minor">
+            <a:schemeClr val="dk1"/>
+          </a:fontRef>
+        </p:style>
+        <p:txBody>
+          <a:bodyPr rtlCol="0" anchor="ctr"/>
+          <a:lstStyle/>
+          <a:p>
+            <a:pPr algn="ctr"/>
+            <a:r>
+              <a:rPr lang="en-US" sz="1050" b="1" dirty="0" err="1">
+                <a:solidFill>
+                  <a:srgbClr val="0070C0"/>
+                </a:solidFill>
+              </a:rPr>
+              <a:t>DateTimeParser</a:t>
+            </a:r>
+            <a:endParaRPr lang="en-SG" sz="1050" b="1" dirty="0">
+              <a:solidFill>
+                <a:srgbClr val="0070C0"/>
+              </a:solidFill>
+            </a:endParaRPr>
+          </a:p>
+        </p:txBody>
+      </p:sp>
+      <p:cxnSp>
+        <p:nvCxnSpPr>
+          <p:cNvPr id="113" name="Elbow Connector 63"/>
+          <p:cNvCxnSpPr>
+            <a:stCxn id="109" idx="2"/>
+            <a:endCxn id="110" idx="0"/>
+          </p:cNvCxnSpPr>
+          <p:nvPr/>
+        </p:nvCxnSpPr>
+        <p:spPr>
+          <a:xfrm rot="16200000" flipH="1">
+            <a:off x="5493056" y="3197262"/>
+            <a:ext cx="294666" cy="207678"/>
+          </a:xfrm>
+          <a:prstGeom prst="bentConnector3">
+            <a:avLst>
+              <a:gd name="adj1" fmla="val 50000"/>
+            </a:avLst>
+          </a:prstGeom>
+          <a:ln w="19050">
+            <a:solidFill>
+              <a:schemeClr val="tx2">
+                <a:lumMod val="60000"/>
+                <a:lumOff val="40000"/>
+              </a:schemeClr>
+            </a:solidFill>
+            <a:headEnd type="none" w="med" len="med"/>
+            <a:tailEnd type="arrow" w="med" len="med"/>
+          </a:ln>
+          <a:effectLst/>
+        </p:spPr>
+        <p:style>
+          <a:lnRef idx="1">
+            <a:schemeClr val="accent2"/>
+          </a:lnRef>
+          <a:fillRef idx="2">
+            <a:schemeClr val="accent2"/>
+          </a:fillRef>
+          <a:effectRef idx="1">
+            <a:schemeClr val="accent2"/>
+          </a:effectRef>
+          <a:fontRef idx="minor">
+            <a:schemeClr val="dk1"/>
+          </a:fontRef>
+        </p:style>
+      </p:cxnSp>
+      <p:sp>
+        <p:nvSpPr>
+          <p:cNvPr id="120" name="TextBox 119"/>
+          <p:cNvSpPr txBox="1"/>
+          <p:nvPr/>
+        </p:nvSpPr>
+        <p:spPr>
+          <a:xfrm>
+            <a:off x="3990256" y="2951820"/>
+            <a:ext cx="728806" cy="230832"/>
+          </a:xfrm>
+          <a:prstGeom prst="rect">
+            <a:avLst/>
+          </a:prstGeom>
+          <a:noFill/>
+          <a:ln>
+            <a:noFill/>
+          </a:ln>
+        </p:spPr>
+        <p:txBody>
+          <a:bodyPr wrap="square" lIns="0" tIns="0" rIns="0" bIns="0" rtlCol="0">
+            <a:noAutofit/>
+          </a:bodyPr>
+          <a:lstStyle/>
+          <a:p>
+            <a:r>
+              <a:rPr lang="en-US" sz="1100" dirty="0">
+                <a:solidFill>
+                  <a:srgbClr val="0070C0"/>
+                </a:solidFill>
+              </a:rPr>
+              <a:t>creates</a:t>
+            </a:r>
+            <a:endParaRPr lang="en-SG" sz="1100" dirty="0">
+              <a:solidFill>
+                <a:srgbClr val="0070C0"/>
+              </a:solidFill>
+            </a:endParaRPr>
+          </a:p>
+        </p:txBody>
+      </p:sp>
+      <p:sp>
+        <p:nvSpPr>
+          <p:cNvPr id="121" name="Isosceles Triangle 120"/>
+          <p:cNvSpPr/>
+          <p:nvPr/>
+        </p:nvSpPr>
+        <p:spPr>
+          <a:xfrm rot="16200000" flipH="1">
+            <a:off x="3855287" y="3009433"/>
+            <a:ext cx="125951" cy="76201"/>
+          </a:xfrm>
+          <a:prstGeom prst="triangle">
+            <a:avLst/>
+          </a:prstGeom>
+          <a:solidFill>
+            <a:srgbClr val="0070C0"/>
+          </a:solidFill>
+          <a:ln>
+            <a:noFill/>
+          </a:ln>
+        </p:spPr>
+        <p:style>
+          <a:lnRef idx="2">
+            <a:schemeClr val="accent1">
+              <a:shade val="50000"/>
+            </a:schemeClr>
+          </a:lnRef>
+          <a:fillRef idx="1">
+            <a:schemeClr val="accent1"/>
+          </a:fillRef>
+          <a:effectRef idx="0">
+            <a:schemeClr val="accent1"/>
+          </a:effectRef>
+          <a:fontRef idx="minor">
+            <a:schemeClr val="lt1"/>
+          </a:fontRef>
+        </p:style>
+        <p:txBody>
+          <a:bodyPr rtlCol="0" anchor="ctr"/>
+          <a:lstStyle/>
+          <a:p>
+            <a:pPr algn="ctr"/>
+            <a:endParaRPr lang="en-SG"/>
+          </a:p>
+        </p:txBody>
+      </p:sp>
+      <p:cxnSp>
+        <p:nvCxnSpPr>
+          <p:cNvPr id="128" name="Elbow Connector 63"/>
+          <p:cNvCxnSpPr>
+            <a:endCxn id="19" idx="0"/>
+          </p:cNvCxnSpPr>
+          <p:nvPr/>
+        </p:nvCxnSpPr>
+        <p:spPr>
+          <a:xfrm rot="16200000" flipH="1">
+            <a:off x="2384107" y="2180814"/>
+            <a:ext cx="881367" cy="770733"/>
+          </a:xfrm>
+          <a:prstGeom prst="bentConnector3">
+            <a:avLst>
+              <a:gd name="adj1" fmla="val 50000"/>
+            </a:avLst>
+          </a:prstGeom>
+          <a:ln w="19050">
+            <a:solidFill>
+              <a:schemeClr val="tx2">
+                <a:lumMod val="60000"/>
+                <a:lumOff val="40000"/>
+              </a:schemeClr>
+            </a:solidFill>
+            <a:prstDash val="sysDash"/>
+            <a:headEnd type="none" w="med" len="med"/>
+            <a:tailEnd type="arrow" w="med" len="med"/>
+          </a:ln>
+          <a:effectLst/>
+        </p:spPr>
+        <p:style>
+          <a:lnRef idx="1">
+            <a:schemeClr val="accent2"/>
+          </a:lnRef>
+          <a:fillRef idx="2">
+            <a:schemeClr val="accent2"/>
+          </a:fillRef>
+          <a:effectRef idx="1">
+            <a:schemeClr val="accent2"/>
+          </a:effectRef>
+          <a:fontRef idx="minor">
+            <a:schemeClr val="dk1"/>
+          </a:fontRef>
+        </p:style>
+      </p:cxnSp>
+      <p:sp>
+        <p:nvSpPr>
+          <p:cNvPr id="133" name="TextBox 132"/>
+          <p:cNvSpPr txBox="1"/>
+          <p:nvPr/>
+        </p:nvSpPr>
+        <p:spPr>
+          <a:xfrm>
+            <a:off x="2495962" y="2357448"/>
+            <a:ext cx="728806" cy="230832"/>
+          </a:xfrm>
+          <a:prstGeom prst="rect">
+            <a:avLst/>
+          </a:prstGeom>
+          <a:noFill/>
+        </p:spPr>
+        <p:txBody>
+          <a:bodyPr wrap="square" lIns="0" tIns="0" rIns="0" bIns="0" rtlCol="0">
+            <a:noAutofit/>
+          </a:bodyPr>
+          <a:lstStyle/>
+          <a:p>
+            <a:r>
+              <a:rPr lang="en-US" sz="1100" dirty="0">
+                <a:solidFill>
+                  <a:srgbClr val="0070C0"/>
+                </a:solidFill>
+              </a:rPr>
+              <a:t>executes</a:t>
+            </a:r>
+            <a:endParaRPr lang="en-SG" sz="1100" dirty="0">
+              <a:solidFill>
+                <a:srgbClr val="0070C0"/>
+              </a:solidFill>
+            </a:endParaRPr>
+          </a:p>
+        </p:txBody>
+      </p:sp>
+      <p:sp>
+        <p:nvSpPr>
+          <p:cNvPr id="134" name="Isosceles Triangle 133"/>
+          <p:cNvSpPr/>
+          <p:nvPr/>
+        </p:nvSpPr>
+        <p:spPr>
+          <a:xfrm rot="5400000" flipH="1">
+            <a:off x="3007827" y="2425175"/>
+            <a:ext cx="125951" cy="76201"/>
+          </a:xfrm>
+          <a:prstGeom prst="triangle">
+            <a:avLst/>
+          </a:prstGeom>
+          <a:solidFill>
+            <a:srgbClr val="0070C0"/>
+          </a:solidFill>
+          <a:ln>
+            <a:noFill/>
+          </a:ln>
+        </p:spPr>
+        <p:style>
+          <a:lnRef idx="2">
+            <a:schemeClr val="accent1">
+              <a:shade val="50000"/>
+            </a:schemeClr>
+          </a:lnRef>
+          <a:fillRef idx="1">
+            <a:schemeClr val="accent1"/>
+          </a:fillRef>
+          <a:effectRef idx="0">
+            <a:schemeClr val="accent1"/>
+          </a:effectRef>
+          <a:fontRef idx="minor">
+            <a:schemeClr val="lt1"/>
+          </a:fontRef>
+        </p:style>
+        <p:txBody>
+          <a:bodyPr rtlCol="0" anchor="ctr"/>
+          <a:lstStyle/>
+          <a:p>
+            <a:pPr algn="ctr"/>
+            <a:endParaRPr lang="en-SG"/>
+          </a:p>
+        </p:txBody>
+      </p:sp>
+      <p:cxnSp>
+        <p:nvCxnSpPr>
+          <p:cNvPr id="141" name="Elbow Connector 63"/>
+          <p:cNvCxnSpPr>
+            <a:endCxn id="6" idx="3"/>
+          </p:cNvCxnSpPr>
+          <p:nvPr/>
+        </p:nvCxnSpPr>
+        <p:spPr>
+          <a:xfrm rot="5400000" flipH="1" flipV="1">
+            <a:off x="1411580" y="4235789"/>
+            <a:ext cx="2079392" cy="107203"/>
+          </a:xfrm>
+          <a:prstGeom prst="bentConnector2">
+            <a:avLst/>
+          </a:prstGeom>
+          <a:ln w="19050">
+            <a:solidFill>
+              <a:schemeClr val="tx2">
+                <a:lumMod val="60000"/>
+                <a:lumOff val="40000"/>
+              </a:schemeClr>
+            </a:solidFill>
+            <a:prstDash val="solid"/>
+            <a:headEnd type="none" w="med" len="med"/>
+            <a:tailEnd type="none" w="med" len="med"/>
+          </a:ln>
+          <a:effectLst/>
+        </p:spPr>
+        <p:style>
+          <a:lnRef idx="1">
+            <a:schemeClr val="accent2"/>
+          </a:lnRef>
+          <a:fillRef idx="2">
+            <a:schemeClr val="accent2"/>
+          </a:fillRef>
+          <a:effectRef idx="1">
+            <a:schemeClr val="accent2"/>
+          </a:effectRef>
+          <a:fontRef idx="minor">
+            <a:schemeClr val="dk1"/>
+          </a:fontRef>
+        </p:style>
+      </p:cxnSp>
+      <p:cxnSp>
+        <p:nvCxnSpPr>
+          <p:cNvPr id="167" name="Elbow Connector 85"/>
+          <p:cNvCxnSpPr>
+            <a:endCxn id="43" idx="1"/>
+          </p:cNvCxnSpPr>
+          <p:nvPr/>
+        </p:nvCxnSpPr>
+        <p:spPr>
+          <a:xfrm>
+            <a:off x="2415096" y="3665491"/>
+            <a:ext cx="463971" cy="3334"/>
+          </a:xfrm>
+          <a:prstGeom prst="bentConnector3">
+            <a:avLst>
+              <a:gd name="adj1" fmla="val 50000"/>
+            </a:avLst>
+          </a:prstGeom>
+          <a:ln w="19050">
+            <a:solidFill>
+              <a:schemeClr val="tx2">
+                <a:lumMod val="60000"/>
+                <a:lumOff val="40000"/>
+              </a:schemeClr>
+            </a:solidFill>
+            <a:prstDash val="solid"/>
+            <a:tailEnd type="none"/>
+          </a:ln>
+        </p:spPr>
+        <p:style>
+          <a:lnRef idx="1">
+            <a:schemeClr val="accent1"/>
+          </a:lnRef>
+          <a:fillRef idx="0">
+            <a:schemeClr val="accent1"/>
+          </a:fillRef>
+          <a:effectRef idx="0">
+            <a:schemeClr val="accent1"/>
+          </a:effectRef>
+          <a:fontRef idx="minor">
+            <a:schemeClr val="tx1"/>
+          </a:fontRef>
+        </p:style>
+      </p:cxnSp>
+      <p:sp>
+        <p:nvSpPr>
+          <p:cNvPr id="173" name="Rectangle 11"/>
+          <p:cNvSpPr/>
+          <p:nvPr/>
+        </p:nvSpPr>
+        <p:spPr>
+          <a:xfrm>
+            <a:off x="2870577" y="3863122"/>
+            <a:ext cx="1040906" cy="236841"/>
+          </a:xfrm>
+          <a:prstGeom prst="rect">
+            <a:avLst/>
+          </a:prstGeom>
+          <a:gradFill>
+            <a:gsLst>
+              <a:gs pos="0">
+                <a:srgbClr val="AFCBFF"/>
+              </a:gs>
+              <a:gs pos="35000">
+                <a:srgbClr val="AFCBFF"/>
+              </a:gs>
+              <a:gs pos="100000">
+                <a:srgbClr val="AFCBFF">
+                  <a:alpha val="0"/>
+                </a:srgbClr>
+              </a:gs>
+            </a:gsLst>
+            <a:lin ang="16200000" scaled="1"/>
+          </a:gradFill>
+          <a:ln w="19050">
+            <a:solidFill>
+              <a:schemeClr val="tx2">
+                <a:lumMod val="60000"/>
+                <a:lumOff val="40000"/>
+              </a:schemeClr>
+            </a:solidFill>
+          </a:ln>
+          <a:effectLst/>
+        </p:spPr>
+        <p:style>
+          <a:lnRef idx="1">
+            <a:schemeClr val="accent3"/>
+          </a:lnRef>
+          <a:fillRef idx="2">
+            <a:schemeClr val="accent3"/>
+          </a:fillRef>
+          <a:effectRef idx="1">
+            <a:schemeClr val="accent3"/>
+          </a:effectRef>
+          <a:fontRef idx="minor">
+            <a:schemeClr val="dk1"/>
+          </a:fontRef>
+        </p:style>
+        <p:txBody>
+          <a:bodyPr rtlCol="0" anchor="ctr"/>
+          <a:lstStyle/>
+          <a:p>
+            <a:pPr algn="ctr"/>
+            <a:r>
+              <a:rPr lang="en-SG" sz="1050" b="1" dirty="0" err="1">
+                <a:solidFill>
+                  <a:srgbClr val="0070C0"/>
+                </a:solidFill>
+              </a:rPr>
+              <a:t>ClearCommand</a:t>
+            </a:r>
+            <a:endParaRPr lang="en-SG" sz="1050" b="1" dirty="0">
+              <a:solidFill>
+                <a:srgbClr val="0070C0"/>
+              </a:solidFill>
+            </a:endParaRPr>
+          </a:p>
+        </p:txBody>
+      </p:sp>
+      <p:cxnSp>
+        <p:nvCxnSpPr>
+          <p:cNvPr id="174" name="Elbow Connector 85"/>
+          <p:cNvCxnSpPr>
+            <a:endCxn id="173" idx="1"/>
+          </p:cNvCxnSpPr>
+          <p:nvPr/>
+        </p:nvCxnSpPr>
+        <p:spPr>
+          <a:xfrm flipV="1">
+            <a:off x="2382119" y="3981543"/>
+            <a:ext cx="488458" cy="3030"/>
+          </a:xfrm>
+          <a:prstGeom prst="bentConnector3">
+            <a:avLst>
+              <a:gd name="adj1" fmla="val 50000"/>
+            </a:avLst>
+          </a:prstGeom>
+          <a:ln w="19050">
+            <a:solidFill>
+              <a:schemeClr val="tx2">
+                <a:lumMod val="60000"/>
+                <a:lumOff val="40000"/>
+              </a:schemeClr>
+            </a:solidFill>
+            <a:prstDash val="solid"/>
+            <a:tailEnd type="none"/>
+          </a:ln>
+        </p:spPr>
+        <p:style>
+          <a:lnRef idx="1">
+            <a:schemeClr val="accent1"/>
+          </a:lnRef>
+          <a:fillRef idx="0">
+            <a:schemeClr val="accent1"/>
+          </a:fillRef>
+          <a:effectRef idx="0">
+            <a:schemeClr val="accent1"/>
+          </a:effectRef>
+          <a:fontRef idx="minor">
+            <a:schemeClr val="tx1"/>
+          </a:fontRef>
+        </p:style>
+      </p:cxnSp>
+      <p:sp>
+        <p:nvSpPr>
+          <p:cNvPr id="178" name="Rectangle 11"/>
+          <p:cNvSpPr/>
+          <p:nvPr/>
+        </p:nvSpPr>
+        <p:spPr>
+          <a:xfrm>
+            <a:off x="2870576" y="4175840"/>
+            <a:ext cx="1169733" cy="236841"/>
+          </a:xfrm>
+          <a:prstGeom prst="rect">
+            <a:avLst/>
+          </a:prstGeom>
+          <a:gradFill>
+            <a:gsLst>
+              <a:gs pos="0">
+                <a:srgbClr val="AFCBFF"/>
+              </a:gs>
+              <a:gs pos="35000">
+                <a:srgbClr val="AFCBFF"/>
+              </a:gs>
+              <a:gs pos="100000">
+                <a:srgbClr val="AFCBFF">
+                  <a:alpha val="0"/>
+                </a:srgbClr>
+              </a:gs>
+            </a:gsLst>
+            <a:lin ang="16200000" scaled="1"/>
+          </a:gradFill>
+          <a:ln w="19050">
+            <a:solidFill>
+              <a:schemeClr val="tx2">
+                <a:lumMod val="60000"/>
+                <a:lumOff val="40000"/>
+              </a:schemeClr>
+            </a:solidFill>
+          </a:ln>
+          <a:effectLst/>
+        </p:spPr>
+        <p:style>
+          <a:lnRef idx="1">
+            <a:schemeClr val="accent3"/>
+          </a:lnRef>
+          <a:fillRef idx="2">
+            <a:schemeClr val="accent3"/>
+          </a:fillRef>
+          <a:effectRef idx="1">
+            <a:schemeClr val="accent3"/>
+          </a:effectRef>
+          <a:fontRef idx="minor">
+            <a:schemeClr val="dk1"/>
+          </a:fontRef>
+        </p:style>
+        <p:txBody>
+          <a:bodyPr rtlCol="0" anchor="ctr"/>
+          <a:lstStyle/>
+          <a:p>
+            <a:pPr algn="ctr"/>
+            <a:r>
+              <a:rPr lang="en-SG" sz="1050" b="1" dirty="0" err="1">
+                <a:solidFill>
+                  <a:srgbClr val="0070C0"/>
+                </a:solidFill>
+              </a:rPr>
+              <a:t>DeleteCommand</a:t>
+            </a:r>
+            <a:endParaRPr lang="en-SG" sz="1050" b="1" dirty="0">
+              <a:solidFill>
+                <a:srgbClr val="0070C0"/>
+              </a:solidFill>
+            </a:endParaRPr>
+          </a:p>
+        </p:txBody>
+      </p:sp>
+      <p:cxnSp>
+        <p:nvCxnSpPr>
+          <p:cNvPr id="179" name="Elbow Connector 85"/>
+          <p:cNvCxnSpPr>
+            <a:endCxn id="178" idx="1"/>
+          </p:cNvCxnSpPr>
+          <p:nvPr/>
+        </p:nvCxnSpPr>
+        <p:spPr>
+          <a:xfrm flipV="1">
+            <a:off x="2382119" y="4294261"/>
+            <a:ext cx="488457" cy="3003"/>
+          </a:xfrm>
+          <a:prstGeom prst="bentConnector3">
+            <a:avLst>
+              <a:gd name="adj1" fmla="val 50000"/>
+            </a:avLst>
+          </a:prstGeom>
+          <a:ln w="19050">
+            <a:solidFill>
+              <a:schemeClr val="tx2">
+                <a:lumMod val="60000"/>
+                <a:lumOff val="40000"/>
+              </a:schemeClr>
+            </a:solidFill>
+            <a:prstDash val="solid"/>
+            <a:tailEnd type="none"/>
+          </a:ln>
+        </p:spPr>
+        <p:style>
+          <a:lnRef idx="1">
+            <a:schemeClr val="accent1"/>
+          </a:lnRef>
+          <a:fillRef idx="0">
+            <a:schemeClr val="accent1"/>
+          </a:fillRef>
+          <a:effectRef idx="0">
+            <a:schemeClr val="accent1"/>
+          </a:effectRef>
+          <a:fontRef idx="minor">
+            <a:schemeClr val="tx1"/>
+          </a:fontRef>
+        </p:style>
+      </p:cxnSp>
+      <p:sp>
+        <p:nvSpPr>
+          <p:cNvPr id="192" name="Rectangle 11"/>
+          <p:cNvSpPr/>
+          <p:nvPr/>
+        </p:nvSpPr>
+        <p:spPr>
+          <a:xfrm>
+            <a:off x="2861519" y="4585256"/>
+            <a:ext cx="1161242" cy="236841"/>
+          </a:xfrm>
+          <a:prstGeom prst="rect">
+            <a:avLst/>
+          </a:prstGeom>
+          <a:gradFill>
+            <a:gsLst>
+              <a:gs pos="0">
+                <a:srgbClr val="AFCBFF"/>
+              </a:gs>
+              <a:gs pos="35000">
+                <a:srgbClr val="AFCBFF"/>
+              </a:gs>
+              <a:gs pos="100000">
+                <a:srgbClr val="AFCBFF">
+                  <a:alpha val="0"/>
+                </a:srgbClr>
+              </a:gs>
+            </a:gsLst>
+            <a:lin ang="16200000" scaled="1"/>
+          </a:gradFill>
+          <a:ln w="19050">
+            <a:solidFill>
+              <a:schemeClr val="tx2">
+                <a:lumMod val="60000"/>
+                <a:lumOff val="40000"/>
+              </a:schemeClr>
+            </a:solidFill>
+          </a:ln>
+          <a:effectLst/>
+        </p:spPr>
+        <p:style>
+          <a:lnRef idx="1">
+            <a:schemeClr val="accent3"/>
+          </a:lnRef>
+          <a:fillRef idx="2">
+            <a:schemeClr val="accent3"/>
+          </a:fillRef>
+          <a:effectRef idx="1">
+            <a:schemeClr val="accent3"/>
+          </a:effectRef>
+          <a:fontRef idx="minor">
+            <a:schemeClr val="dk1"/>
+          </a:fontRef>
+        </p:style>
+        <p:txBody>
+          <a:bodyPr rtlCol="0" anchor="ctr"/>
+          <a:lstStyle/>
+          <a:p>
+            <a:pPr algn="ctr"/>
+            <a:r>
+              <a:rPr lang="en-SG" sz="1050" b="1" dirty="0" err="1">
+                <a:solidFill>
+                  <a:srgbClr val="0070C0"/>
+                </a:solidFill>
+              </a:rPr>
+              <a:t>StoreCommand</a:t>
+            </a:r>
+            <a:endParaRPr lang="en-SG" sz="1050" b="1" dirty="0">
+              <a:solidFill>
+                <a:srgbClr val="0070C0"/>
+              </a:solidFill>
+            </a:endParaRPr>
+          </a:p>
+        </p:txBody>
+      </p:sp>
+      <p:cxnSp>
+        <p:nvCxnSpPr>
+          <p:cNvPr id="193" name="Elbow Connector 85"/>
+          <p:cNvCxnSpPr>
+            <a:endCxn id="192" idx="1"/>
+          </p:cNvCxnSpPr>
+          <p:nvPr/>
+        </p:nvCxnSpPr>
+        <p:spPr>
+          <a:xfrm>
+            <a:off x="2423586" y="4678152"/>
+            <a:ext cx="437933" cy="25525"/>
+          </a:xfrm>
+          <a:prstGeom prst="bentConnector3">
+            <a:avLst>
+              <a:gd name="adj1" fmla="val 100025"/>
+            </a:avLst>
+          </a:prstGeom>
+          <a:ln w="19050">
+            <a:solidFill>
+              <a:schemeClr val="tx2">
+                <a:lumMod val="60000"/>
+                <a:lumOff val="40000"/>
+              </a:schemeClr>
+            </a:solidFill>
+            <a:prstDash val="solid"/>
+            <a:tailEnd type="none"/>
+          </a:ln>
+        </p:spPr>
+        <p:style>
+          <a:lnRef idx="1">
+            <a:schemeClr val="accent1"/>
+          </a:lnRef>
+          <a:fillRef idx="0">
+            <a:schemeClr val="accent1"/>
+          </a:fillRef>
+          <a:effectRef idx="0">
+            <a:schemeClr val="accent1"/>
+          </a:effectRef>
+          <a:fontRef idx="minor">
+            <a:schemeClr val="tx1"/>
+          </a:fontRef>
+        </p:style>
+      </p:cxnSp>
+      <p:sp>
+        <p:nvSpPr>
+          <p:cNvPr id="194" name="Rectangle 11"/>
+          <p:cNvSpPr/>
+          <p:nvPr/>
+        </p:nvSpPr>
+        <p:spPr>
+          <a:xfrm>
+            <a:off x="2853029" y="4897974"/>
+            <a:ext cx="1169732" cy="236841"/>
+          </a:xfrm>
+          <a:prstGeom prst="rect">
+            <a:avLst/>
+          </a:prstGeom>
+          <a:gradFill>
+            <a:gsLst>
+              <a:gs pos="0">
+                <a:srgbClr val="AFCBFF"/>
+              </a:gs>
+              <a:gs pos="35000">
+                <a:srgbClr val="AFCBFF"/>
+              </a:gs>
+              <a:gs pos="100000">
+                <a:srgbClr val="AFCBFF">
+                  <a:alpha val="0"/>
+                </a:srgbClr>
+              </a:gs>
+            </a:gsLst>
+            <a:lin ang="16200000" scaled="1"/>
+          </a:gradFill>
+          <a:ln w="19050">
+            <a:solidFill>
+              <a:schemeClr val="tx2">
+                <a:lumMod val="60000"/>
+                <a:lumOff val="40000"/>
+              </a:schemeClr>
+            </a:solidFill>
+          </a:ln>
+          <a:effectLst/>
+        </p:spPr>
+        <p:style>
+          <a:lnRef idx="1">
+            <a:schemeClr val="accent3"/>
+          </a:lnRef>
+          <a:fillRef idx="2">
+            <a:schemeClr val="accent3"/>
+          </a:fillRef>
+          <a:effectRef idx="1">
+            <a:schemeClr val="accent3"/>
+          </a:effectRef>
+          <a:fontRef idx="minor">
+            <a:schemeClr val="dk1"/>
+          </a:fontRef>
+        </p:style>
+        <p:txBody>
+          <a:bodyPr rtlCol="0" anchor="ctr"/>
+          <a:lstStyle/>
+          <a:p>
+            <a:pPr algn="ctr"/>
+            <a:r>
+              <a:rPr lang="en-SG" sz="1050" b="1" dirty="0" err="1">
+                <a:solidFill>
+                  <a:srgbClr val="0070C0"/>
+                </a:solidFill>
+              </a:rPr>
+              <a:t>UndoCommand</a:t>
+            </a:r>
+            <a:endParaRPr lang="en-SG" sz="1050" b="1" dirty="0">
+              <a:solidFill>
+                <a:srgbClr val="0070C0"/>
+              </a:solidFill>
+            </a:endParaRPr>
+          </a:p>
+        </p:txBody>
+      </p:sp>
+      <p:cxnSp>
+        <p:nvCxnSpPr>
+          <p:cNvPr id="195" name="Elbow Connector 85"/>
+          <p:cNvCxnSpPr>
+            <a:endCxn id="194" idx="1"/>
+          </p:cNvCxnSpPr>
+          <p:nvPr/>
+        </p:nvCxnSpPr>
+        <p:spPr>
+          <a:xfrm>
+            <a:off x="2415096" y="4990870"/>
+            <a:ext cx="437933" cy="25525"/>
+          </a:xfrm>
+          <a:prstGeom prst="bentConnector3">
+            <a:avLst>
+              <a:gd name="adj1" fmla="val 97850"/>
+            </a:avLst>
+          </a:prstGeom>
+          <a:ln w="19050">
+            <a:solidFill>
+              <a:schemeClr val="tx2">
+                <a:lumMod val="60000"/>
+                <a:lumOff val="40000"/>
+              </a:schemeClr>
+            </a:solidFill>
+            <a:prstDash val="solid"/>
+            <a:tailEnd type="none"/>
+          </a:ln>
+        </p:spPr>
+        <p:style>
+          <a:lnRef idx="1">
+            <a:schemeClr val="accent1"/>
+          </a:lnRef>
+          <a:fillRef idx="0">
+            <a:schemeClr val="accent1"/>
+          </a:fillRef>
+          <a:effectRef idx="0">
+            <a:schemeClr val="accent1"/>
+          </a:effectRef>
+          <a:fontRef idx="minor">
+            <a:schemeClr val="tx1"/>
+          </a:fontRef>
+        </p:style>
+      </p:cxnSp>
+      <p:sp>
+        <p:nvSpPr>
+          <p:cNvPr id="196" name="Rectangle 11"/>
+          <p:cNvSpPr/>
+          <p:nvPr/>
+        </p:nvSpPr>
+        <p:spPr>
+          <a:xfrm>
+            <a:off x="2853028" y="5210692"/>
+            <a:ext cx="1337972" cy="236841"/>
+          </a:xfrm>
+          <a:prstGeom prst="rect">
+            <a:avLst/>
+          </a:prstGeom>
+          <a:gradFill>
+            <a:gsLst>
+              <a:gs pos="0">
+                <a:srgbClr val="AFCBFF"/>
+              </a:gs>
+              <a:gs pos="35000">
+                <a:srgbClr val="AFCBFF"/>
+              </a:gs>
+              <a:gs pos="100000">
+                <a:srgbClr val="AFCBFF">
+                  <a:alpha val="0"/>
+                </a:srgbClr>
+              </a:gs>
+            </a:gsLst>
+            <a:lin ang="16200000" scaled="1"/>
+          </a:gradFill>
+          <a:ln w="19050">
+            <a:solidFill>
+              <a:schemeClr val="tx2">
+                <a:lumMod val="60000"/>
+                <a:lumOff val="40000"/>
+              </a:schemeClr>
+            </a:solidFill>
+          </a:ln>
+          <a:effectLst/>
+        </p:spPr>
+        <p:style>
+          <a:lnRef idx="1">
+            <a:schemeClr val="accent3"/>
+          </a:lnRef>
+          <a:fillRef idx="2">
+            <a:schemeClr val="accent3"/>
+          </a:fillRef>
+          <a:effectRef idx="1">
+            <a:schemeClr val="accent3"/>
+          </a:effectRef>
+          <a:fontRef idx="minor">
+            <a:schemeClr val="dk1"/>
+          </a:fontRef>
+        </p:style>
+        <p:txBody>
+          <a:bodyPr rtlCol="0" anchor="ctr"/>
+          <a:lstStyle/>
+          <a:p>
+            <a:pPr algn="ctr"/>
+            <a:r>
+              <a:rPr lang="en-SG" sz="1050" b="1" dirty="0" err="1">
+                <a:solidFill>
+                  <a:srgbClr val="0070C0"/>
+                </a:solidFill>
+              </a:rPr>
+              <a:t>UnfinishCommand</a:t>
+            </a:r>
+            <a:endParaRPr lang="en-SG" sz="1050" b="1" dirty="0">
+              <a:solidFill>
+                <a:srgbClr val="0070C0"/>
+              </a:solidFill>
+            </a:endParaRPr>
+          </a:p>
+        </p:txBody>
+      </p:sp>
+      <p:cxnSp>
+        <p:nvCxnSpPr>
+          <p:cNvPr id="197" name="Elbow Connector 85"/>
+          <p:cNvCxnSpPr>
+            <a:endCxn id="196" idx="1"/>
+          </p:cNvCxnSpPr>
+          <p:nvPr/>
+        </p:nvCxnSpPr>
+        <p:spPr>
+          <a:xfrm>
+            <a:off x="2423586" y="5329086"/>
+            <a:ext cx="429442" cy="27"/>
+          </a:xfrm>
+          <a:prstGeom prst="bentConnector3">
+            <a:avLst>
+              <a:gd name="adj1" fmla="val 50000"/>
+            </a:avLst>
+          </a:prstGeom>
+          <a:ln w="19050">
+            <a:solidFill>
+              <a:schemeClr val="tx2">
+                <a:lumMod val="60000"/>
+                <a:lumOff val="40000"/>
+              </a:schemeClr>
+            </a:solidFill>
+            <a:prstDash val="solid"/>
+            <a:tailEnd type="none"/>
+          </a:ln>
+        </p:spPr>
+        <p:style>
+          <a:lnRef idx="1">
+            <a:schemeClr val="accent1"/>
+          </a:lnRef>
+          <a:fillRef idx="0">
+            <a:schemeClr val="accent1"/>
+          </a:fillRef>
+          <a:effectRef idx="0">
+            <a:schemeClr val="accent1"/>
+          </a:effectRef>
+          <a:fontRef idx="minor">
+            <a:schemeClr val="tx1"/>
+          </a:fontRef>
+        </p:style>
+      </p:cxnSp>
+      <p:sp>
+        <p:nvSpPr>
+          <p:cNvPr id="207" name="TextBox 206"/>
+          <p:cNvSpPr txBox="1"/>
+          <p:nvPr/>
+        </p:nvSpPr>
+        <p:spPr>
+          <a:xfrm>
+            <a:off x="3311503" y="4275543"/>
+            <a:ext cx="728806" cy="230832"/>
+          </a:xfrm>
+          <a:prstGeom prst="rect">
+            <a:avLst/>
+          </a:prstGeom>
+          <a:noFill/>
+          <a:ln>
+            <a:noFill/>
+          </a:ln>
+        </p:spPr>
+        <p:txBody>
+          <a:bodyPr wrap="square" lIns="0" tIns="0" rIns="0" bIns="0" rtlCol="0">
+            <a:noAutofit/>
+          </a:bodyPr>
+          <a:lstStyle/>
+          <a:p>
+            <a:r>
+              <a:rPr lang="en-US" sz="2000" dirty="0">
+                <a:solidFill>
+                  <a:srgbClr val="0070C0"/>
+                </a:solidFill>
+              </a:rPr>
+              <a:t>…</a:t>
+            </a:r>
+            <a:endParaRPr lang="en-SG" sz="2000" dirty="0">
+              <a:solidFill>
+                <a:srgbClr val="0070C0"/>
+              </a:solidFill>
+            </a:endParaRPr>
+          </a:p>
+        </p:txBody>
+      </p:sp>
+      <p:cxnSp>
+        <p:nvCxnSpPr>
+          <p:cNvPr id="208" name="Elbow Connector 63"/>
+          <p:cNvCxnSpPr/>
+          <p:nvPr/>
+        </p:nvCxnSpPr>
+        <p:spPr>
+          <a:xfrm>
+            <a:off x="3941151" y="3657600"/>
+            <a:ext cx="2794365" cy="518240"/>
+          </a:xfrm>
+          <a:prstGeom prst="bentConnector3">
+            <a:avLst>
+              <a:gd name="adj1" fmla="val 35343"/>
+            </a:avLst>
+          </a:prstGeom>
+          <a:ln w="19050">
+            <a:solidFill>
+              <a:schemeClr val="tx2">
+                <a:lumMod val="60000"/>
+                <a:lumOff val="40000"/>
+              </a:schemeClr>
+            </a:solidFill>
+            <a:prstDash val="solid"/>
+            <a:headEnd type="none" w="med" len="med"/>
+            <a:tailEnd type="arrow" w="med" len="med"/>
+          </a:ln>
+          <a:effectLst/>
+        </p:spPr>
+        <p:style>
+          <a:lnRef idx="1">
+            <a:schemeClr val="accent2"/>
+          </a:lnRef>
+          <a:fillRef idx="2">
+            <a:schemeClr val="accent2"/>
+          </a:fillRef>
+          <a:effectRef idx="1">
+            <a:schemeClr val="accent2"/>
+          </a:effectRef>
+          <a:fontRef idx="minor">
+            <a:schemeClr val="dk1"/>
+          </a:fontRef>
+        </p:style>
+      </p:cxnSp>
+      <p:cxnSp>
+        <p:nvCxnSpPr>
+          <p:cNvPr id="215" name="Elbow Connector 63"/>
+          <p:cNvCxnSpPr>
+            <a:stCxn id="196" idx="3"/>
+          </p:cNvCxnSpPr>
+          <p:nvPr/>
+        </p:nvCxnSpPr>
+        <p:spPr>
+          <a:xfrm flipV="1">
+            <a:off x="4191000" y="4175840"/>
+            <a:ext cx="734875" cy="1153273"/>
+          </a:xfrm>
+          <a:prstGeom prst="bentConnector2">
+            <a:avLst/>
+          </a:prstGeom>
+          <a:ln w="19050">
+            <a:solidFill>
+              <a:schemeClr val="tx2">
+                <a:lumMod val="60000"/>
+                <a:lumOff val="40000"/>
+              </a:schemeClr>
+            </a:solidFill>
+            <a:prstDash val="solid"/>
+            <a:headEnd type="none" w="med" len="med"/>
+            <a:tailEnd type="none" w="med" len="med"/>
+          </a:ln>
+          <a:effectLst/>
+        </p:spPr>
+        <p:style>
+          <a:lnRef idx="1">
+            <a:schemeClr val="accent2"/>
+          </a:lnRef>
+          <a:fillRef idx="2">
+            <a:schemeClr val="accent2"/>
+          </a:fillRef>
+          <a:effectRef idx="1">
+            <a:schemeClr val="accent2"/>
+          </a:effectRef>
+          <a:fontRef idx="minor">
+            <a:schemeClr val="dk1"/>
+          </a:fontRef>
+        </p:style>
+      </p:cxnSp>
+      <p:cxnSp>
+        <p:nvCxnSpPr>
+          <p:cNvPr id="220" name="Straight Connector 219"/>
+          <p:cNvCxnSpPr/>
+          <p:nvPr/>
+        </p:nvCxnSpPr>
+        <p:spPr>
+          <a:xfrm>
+            <a:off x="3926094" y="3966572"/>
+            <a:ext cx="999781" cy="0"/>
+          </a:xfrm>
+          <a:prstGeom prst="line">
+            <a:avLst/>
+          </a:prstGeom>
+          <a:ln w="19050">
+            <a:solidFill>
+              <a:schemeClr val="tx2">
+                <a:lumMod val="60000"/>
+                <a:lumOff val="40000"/>
+              </a:schemeClr>
+            </a:solidFill>
+            <a:prstDash val="solid"/>
+          </a:ln>
+        </p:spPr>
+        <p:style>
+          <a:lnRef idx="1">
+            <a:schemeClr val="accent1"/>
+          </a:lnRef>
+          <a:fillRef idx="0">
+            <a:schemeClr val="accent1"/>
+          </a:fillRef>
+          <a:effectRef idx="0">
+            <a:schemeClr val="accent1"/>
+          </a:effectRef>
+          <a:fontRef idx="minor">
+            <a:schemeClr val="tx1"/>
+          </a:fontRef>
+        </p:style>
+      </p:cxnSp>
+      <p:cxnSp>
+        <p:nvCxnSpPr>
+          <p:cNvPr id="223" name="Straight Connector 222"/>
+          <p:cNvCxnSpPr/>
+          <p:nvPr/>
+        </p:nvCxnSpPr>
+        <p:spPr>
+          <a:xfrm>
+            <a:off x="4038600" y="4267200"/>
+            <a:ext cx="887275" cy="0"/>
+          </a:xfrm>
+          <a:prstGeom prst="line">
+            <a:avLst/>
+          </a:prstGeom>
+          <a:ln w="19050">
+            <a:solidFill>
+              <a:schemeClr val="tx2">
+                <a:lumMod val="60000"/>
+                <a:lumOff val="40000"/>
+              </a:schemeClr>
+            </a:solidFill>
+            <a:prstDash val="solid"/>
+          </a:ln>
+        </p:spPr>
+        <p:style>
+          <a:lnRef idx="1">
+            <a:schemeClr val="accent1"/>
+          </a:lnRef>
+          <a:fillRef idx="0">
+            <a:schemeClr val="accent1"/>
+          </a:fillRef>
+          <a:effectRef idx="0">
+            <a:schemeClr val="accent1"/>
+          </a:effectRef>
+          <a:fontRef idx="minor">
+            <a:schemeClr val="tx1"/>
+          </a:fontRef>
+        </p:style>
+      </p:cxnSp>
+      <p:cxnSp>
+        <p:nvCxnSpPr>
+          <p:cNvPr id="226" name="Straight Connector 225"/>
+          <p:cNvCxnSpPr/>
+          <p:nvPr/>
+        </p:nvCxnSpPr>
+        <p:spPr>
+          <a:xfrm>
+            <a:off x="4038600" y="4724400"/>
+            <a:ext cx="887275" cy="0"/>
+          </a:xfrm>
+          <a:prstGeom prst="line">
+            <a:avLst/>
+          </a:prstGeom>
+          <a:ln w="19050">
+            <a:solidFill>
+              <a:schemeClr val="tx2">
+                <a:lumMod val="60000"/>
+                <a:lumOff val="40000"/>
+              </a:schemeClr>
+            </a:solidFill>
+            <a:prstDash val="solid"/>
+          </a:ln>
+        </p:spPr>
+        <p:style>
+          <a:lnRef idx="1">
+            <a:schemeClr val="accent1"/>
+          </a:lnRef>
+          <a:fillRef idx="0">
+            <a:schemeClr val="accent1"/>
+          </a:fillRef>
+          <a:effectRef idx="0">
+            <a:schemeClr val="accent1"/>
+          </a:effectRef>
+          <a:fontRef idx="minor">
+            <a:schemeClr val="tx1"/>
+          </a:fontRef>
+        </p:style>
+      </p:cxnSp>
+      <p:cxnSp>
+        <p:nvCxnSpPr>
+          <p:cNvPr id="229" name="Straight Connector 228"/>
+          <p:cNvCxnSpPr/>
+          <p:nvPr/>
+        </p:nvCxnSpPr>
+        <p:spPr>
+          <a:xfrm flipV="1">
+            <a:off x="4022761" y="5003632"/>
+            <a:ext cx="903114" cy="12762"/>
+          </a:xfrm>
+          <a:prstGeom prst="line">
+            <a:avLst/>
+          </a:prstGeom>
+          <a:ln w="19050">
+            <a:solidFill>
+              <a:schemeClr val="tx2">
+                <a:lumMod val="60000"/>
+                <a:lumOff val="40000"/>
+              </a:schemeClr>
+            </a:solidFill>
+            <a:prstDash val="solid"/>
+          </a:ln>
+        </p:spPr>
+        <p:style>
+          <a:lnRef idx="1">
+            <a:schemeClr val="accent1"/>
+          </a:lnRef>
+          <a:fillRef idx="0">
+            <a:schemeClr val="accent1"/>
+          </a:fillRef>
+          <a:effectRef idx="0">
+            <a:schemeClr val="accent1"/>
+          </a:effectRef>
+          <a:fontRef idx="minor">
+            <a:schemeClr val="tx1"/>
+          </a:fontRef>
+        </p:style>
+      </p:cxnSp>
+      <p:sp>
+        <p:nvSpPr>
+          <p:cNvPr id="233" name="Rectangle 65"/>
+          <p:cNvSpPr/>
+          <p:nvPr/>
+        </p:nvSpPr>
+        <p:spPr>
+          <a:xfrm rot="16200000">
+            <a:off x="6396082" y="4824612"/>
+            <a:ext cx="1000993" cy="328045"/>
+          </a:xfrm>
+          <a:prstGeom prst="roundRect">
+            <a:avLst/>
+          </a:prstGeom>
+          <a:solidFill>
+            <a:srgbClr val="31859C">
+              <a:alpha val="25000"/>
+            </a:srgbClr>
+          </a:solidFill>
+          <a:ln w="19050">
+            <a:noFill/>
+          </a:ln>
+          <a:effectLst/>
+        </p:spPr>
+        <p:style>
+          <a:lnRef idx="1">
+            <a:schemeClr val="accent2"/>
+          </a:lnRef>
+          <a:fillRef idx="2">
+            <a:schemeClr val="accent2"/>
+          </a:fillRef>
+          <a:effectRef idx="1">
+            <a:schemeClr val="accent2"/>
+          </a:effectRef>
+          <a:fontRef idx="minor">
+            <a:schemeClr val="dk1"/>
+          </a:fontRef>
+        </p:style>
+        <p:txBody>
+          <a:bodyPr rtlCol="0" anchor="ctr"/>
+          <a:lstStyle/>
+          <a:p>
+            <a:pPr algn="ctr"/>
+            <a:r>
+              <a:rPr lang="en-US" sz="1100" b="1" dirty="0">
+                <a:solidFill>
+                  <a:schemeClr val="bg1"/>
+                </a:solidFill>
+              </a:rPr>
+              <a:t>Commons</a:t>
+            </a:r>
+            <a:endParaRPr lang="en-SG" sz="1100" b="1" dirty="0">
+              <a:solidFill>
+                <a:schemeClr val="bg1"/>
+              </a:solidFill>
+            </a:endParaRPr>
+          </a:p>
+        </p:txBody>
+      </p:sp>
+      <p:grpSp>
+        <p:nvGrpSpPr>
+          <p:cNvPr id="234" name="Group 108"/>
+          <p:cNvGrpSpPr/>
+          <p:nvPr/>
+        </p:nvGrpSpPr>
+        <p:grpSpPr>
+          <a:xfrm rot="16200000">
+            <a:off x="6437919" y="4794570"/>
+            <a:ext cx="262409" cy="346762"/>
+            <a:chOff x="6060035" y="6038840"/>
+            <a:chExt cx="268153" cy="346762"/>
+          </a:xfrm>
+        </p:grpSpPr>
+        <p:cxnSp>
+          <p:nvCxnSpPr>
+            <p:cNvPr id="235" name="Connector: Elbow 234"/>
+            <p:cNvCxnSpPr/>
             <p:nvPr/>
-          </p:nvSpPr>
+          </p:nvCxnSpPr>
           <p:spPr>
-            <a:xfrm rot="5400000">
-              <a:off x="3683524" y="866776"/>
-              <a:ext cx="125951" cy="76201"/>
+            <a:xfrm rot="16200000" flipH="1">
+              <a:off x="6154806" y="6212221"/>
+              <a:ext cx="346761" cy="2"/>
             </a:xfrm>
-            <a:prstGeom prst="triangle">
-              <a:avLst/>
+            <a:prstGeom prst="bentConnector3">
+              <a:avLst>
+                <a:gd name="adj1" fmla="val 50000"/>
+              </a:avLst>
             </a:prstGeom>
-            <a:solidFill>
-              <a:srgbClr val="0070C0"/>
-            </a:solidFill>
-            <a:ln>
-              <a:noFill/>
+            <a:ln w="19050">
+              <a:solidFill>
+                <a:schemeClr val="accent1">
+                  <a:lumMod val="60000"/>
+                  <a:lumOff val="40000"/>
+                </a:schemeClr>
+              </a:solidFill>
+              <a:prstDash val="sysDash"/>
+              <a:tailEnd type="arrow"/>
             </a:ln>
           </p:spPr>
           <p:style>
-            <a:lnRef idx="2">
-              <a:schemeClr val="accent1">
-                <a:shade val="50000"/>
-              </a:schemeClr>
+            <a:lnRef idx="1">
+              <a:schemeClr val="accent1"/>
             </a:lnRef>
-            <a:fillRef idx="1">
+            <a:fillRef idx="0">
               <a:schemeClr val="accent1"/>
             </a:fillRef>
             <a:effectRef idx="0">
               <a:schemeClr val="accent1"/>
             </a:effectRef>
             <a:fontRef idx="minor">
-              <a:schemeClr val="lt1"/>
+              <a:schemeClr val="tx1"/>
             </a:fontRef>
           </p:style>
-          <p:txBody>
-            <a:bodyPr rtlCol="0" anchor="ctr"/>
-            <a:lstStyle/>
-            <a:p>
-              <a:pPr algn="ctr"/>
-              <a:endParaRPr lang="en-SG"/>
-            </a:p>
-          </p:txBody>
-        </p:sp>
-      </p:grpSp>
-      <p:grpSp>
-        <p:nvGrpSpPr>
-          <p:cNvPr id="36" name="Group 35"/>
-          <p:cNvGrpSpPr/>
-          <p:nvPr/>
-        </p:nvGrpSpPr>
-        <p:grpSpPr>
-          <a:xfrm>
-            <a:off x="3973516" y="2512368"/>
-            <a:ext cx="868568" cy="230832"/>
-            <a:chOff x="2755838" y="789460"/>
-            <a:chExt cx="868568" cy="230832"/>
-          </a:xfrm>
-        </p:grpSpPr>
-        <p:sp>
-          <p:nvSpPr>
-            <p:cNvPr id="37" name="TextBox 36"/>
-            <p:cNvSpPr txBox="1"/>
+        </p:cxnSp>
+        <p:cxnSp>
+          <p:nvCxnSpPr>
+            <p:cNvPr id="236" name="Connector: Elbow 235"/>
+            <p:cNvCxnSpPr/>
             <p:nvPr/>
-          </p:nvSpPr>
-          <p:spPr>
-            <a:xfrm>
-              <a:off x="2895600" y="789460"/>
-              <a:ext cx="728806" cy="230832"/>
-            </a:xfrm>
-            <a:prstGeom prst="rect">
-              <a:avLst/>
-            </a:prstGeom>
-            <a:noFill/>
-          </p:spPr>
-          <p:txBody>
-            <a:bodyPr wrap="square" lIns="0" tIns="0" rIns="0" bIns="0" rtlCol="0">
-              <a:noAutofit/>
-            </a:bodyPr>
-            <a:lstStyle/>
-            <a:p>
-              <a:r>
-                <a:rPr lang="en-US" sz="1100" dirty="0">
-                  <a:solidFill>
-                    <a:srgbClr val="0070C0"/>
-                  </a:solidFill>
-                </a:rPr>
-                <a:t>produces</a:t>
-              </a:r>
-              <a:endParaRPr lang="en-SG" sz="1100" dirty="0">
-                <a:solidFill>
-                  <a:srgbClr val="0070C0"/>
-                </a:solidFill>
-              </a:endParaRPr>
-            </a:p>
-          </p:txBody>
-        </p:sp>
-        <p:sp>
-          <p:nvSpPr>
-            <p:cNvPr id="38" name="Isosceles Triangle 37"/>
-            <p:cNvSpPr/>
-            <p:nvPr/>
-          </p:nvSpPr>
+          </p:nvCxnSpPr>
           <p:spPr>
             <a:xfrm rot="16200000" flipH="1">
-              <a:off x="2730963" y="857181"/>
-              <a:ext cx="125951" cy="76201"/>
+              <a:off x="6019470" y="6212220"/>
+              <a:ext cx="346761" cy="2"/>
             </a:xfrm>
-            <a:prstGeom prst="triangle">
-              <a:avLst/>
+            <a:prstGeom prst="bentConnector3">
+              <a:avLst>
+                <a:gd name="adj1" fmla="val 50000"/>
+              </a:avLst>
             </a:prstGeom>
-            <a:solidFill>
-              <a:srgbClr val="0070C0"/>
-            </a:solidFill>
-            <a:ln>
-              <a:noFill/>
+            <a:ln w="19050">
+              <a:solidFill>
+                <a:schemeClr val="accent1">
+                  <a:lumMod val="60000"/>
+                  <a:lumOff val="40000"/>
+                </a:schemeClr>
+              </a:solidFill>
+              <a:prstDash val="sysDash"/>
+              <a:tailEnd type="arrow"/>
             </a:ln>
           </p:spPr>
           <p:style>
-            <a:lnRef idx="2">
-              <a:schemeClr val="accent1">
-                <a:shade val="50000"/>
-              </a:schemeClr>
+            <a:lnRef idx="1">
+              <a:schemeClr val="accent1"/>
             </a:lnRef>
-            <a:fillRef idx="1">
+            <a:fillRef idx="0">
               <a:schemeClr val="accent1"/>
             </a:fillRef>
             <a:effectRef idx="0">
               <a:schemeClr val="accent1"/>
             </a:effectRef>
             <a:fontRef idx="minor">
-              <a:schemeClr val="lt1"/>
+              <a:schemeClr val="tx1"/>
             </a:fontRef>
           </p:style>
-          <p:txBody>
-            <a:bodyPr rtlCol="0" anchor="ctr"/>
-            <a:lstStyle/>
-            <a:p>
-              <a:pPr algn="ctr"/>
-              <a:endParaRPr lang="en-SG"/>
-            </a:p>
-          </p:txBody>
-        </p:sp>
-      </p:grpSp>
-      <p:sp>
-        <p:nvSpPr>
-          <p:cNvPr id="39" name="TextBox 38"/>
-          <p:cNvSpPr txBox="1"/>
-          <p:nvPr/>
-        </p:nvSpPr>
-        <p:spPr>
-          <a:xfrm>
-            <a:off x="3210180" y="2423264"/>
-            <a:ext cx="131116" cy="230832"/>
-          </a:xfrm>
-          <a:prstGeom prst="rect">
-            <a:avLst/>
-          </a:prstGeom>
-          <a:noFill/>
-        </p:spPr>
-        <p:txBody>
-          <a:bodyPr wrap="square" lIns="0" tIns="0" rIns="0" bIns="0" rtlCol="0">
-            <a:noAutofit/>
-          </a:bodyPr>
-          <a:lstStyle/>
-          <a:p>
-            <a:pPr algn="r"/>
-            <a:r>
-              <a:rPr lang="en-US" sz="1100" dirty="0">
-                <a:solidFill>
-                  <a:srgbClr val="0070C0"/>
-                </a:solidFill>
-              </a:rPr>
-              <a:t>1</a:t>
-            </a:r>
-            <a:endParaRPr lang="en-SG" sz="1100" dirty="0">
+        </p:cxnSp>
+        <p:cxnSp>
+          <p:nvCxnSpPr>
+            <p:cNvPr id="237" name="Connector: Elbow 236"/>
+            <p:cNvCxnSpPr/>
+            <p:nvPr/>
+          </p:nvCxnSpPr>
+          <p:spPr>
+            <a:xfrm rot="16200000" flipH="1">
+              <a:off x="5886655" y="6212220"/>
+              <a:ext cx="346761" cy="2"/>
+            </a:xfrm>
+            <a:prstGeom prst="bentConnector3">
+              <a:avLst>
+                <a:gd name="adj1" fmla="val 50000"/>
+              </a:avLst>
+            </a:prstGeom>
+            <a:ln w="19050">
               <a:solidFill>
-                <a:srgbClr val="0070C0"/>
+                <a:schemeClr val="accent1">
+                  <a:lumMod val="60000"/>
+                  <a:lumOff val="40000"/>
+                </a:schemeClr>
               </a:solidFill>
-            </a:endParaRPr>
-          </a:p>
-        </p:txBody>
-      </p:sp>
-      <p:sp>
-        <p:nvSpPr>
-          <p:cNvPr id="40" name="TextBox 39"/>
-          <p:cNvSpPr txBox="1"/>
-          <p:nvPr/>
-        </p:nvSpPr>
-        <p:spPr>
-          <a:xfrm>
-            <a:off x="3341296" y="3700114"/>
-            <a:ext cx="131116" cy="230832"/>
-          </a:xfrm>
-          <a:prstGeom prst="rect">
-            <a:avLst/>
-          </a:prstGeom>
-          <a:noFill/>
-        </p:spPr>
-        <p:txBody>
-          <a:bodyPr wrap="square" lIns="0" tIns="0" rIns="0" bIns="0" rtlCol="0">
-            <a:noAutofit/>
-          </a:bodyPr>
-          <a:lstStyle/>
-          <a:p>
-            <a:pPr algn="r"/>
-            <a:r>
-              <a:rPr lang="en-US" sz="1100" dirty="0">
-                <a:solidFill>
-                  <a:srgbClr val="0070C0"/>
-                </a:solidFill>
-              </a:rPr>
-              <a:t>1</a:t>
-            </a:r>
-            <a:endParaRPr lang="en-SG" sz="1100" dirty="0">
-              <a:solidFill>
-                <a:srgbClr val="0070C0"/>
-              </a:solidFill>
-            </a:endParaRPr>
-          </a:p>
-        </p:txBody>
-      </p:sp>
-      <p:grpSp>
-        <p:nvGrpSpPr>
-          <p:cNvPr id="41" name="Group 40"/>
-          <p:cNvGrpSpPr/>
-          <p:nvPr/>
-        </p:nvGrpSpPr>
-        <p:grpSpPr>
-          <a:xfrm>
-            <a:off x="4038600" y="3962400"/>
-            <a:ext cx="685800" cy="230832"/>
-            <a:chOff x="2797314" y="807932"/>
-            <a:chExt cx="685800" cy="230832"/>
-          </a:xfrm>
-        </p:grpSpPr>
-        <p:sp>
-          <p:nvSpPr>
-            <p:cNvPr id="42" name="TextBox 41"/>
-            <p:cNvSpPr txBox="1"/>
-            <p:nvPr/>
-          </p:nvSpPr>
-          <p:spPr>
-            <a:xfrm>
-              <a:off x="2797314" y="807932"/>
-              <a:ext cx="555487" cy="230832"/>
-            </a:xfrm>
-            <a:prstGeom prst="rect">
-              <a:avLst/>
-            </a:prstGeom>
-            <a:noFill/>
-          </p:spPr>
-          <p:txBody>
-            <a:bodyPr wrap="square" lIns="0" tIns="0" rIns="0" bIns="0" rtlCol="0">
-              <a:noAutofit/>
-            </a:bodyPr>
-            <a:lstStyle/>
-            <a:p>
-              <a:pPr algn="r"/>
-              <a:r>
-                <a:rPr lang="en-US" sz="1100" dirty="0">
-                  <a:solidFill>
-                    <a:srgbClr val="0070C0"/>
-                  </a:solidFill>
-                </a:rPr>
-                <a:t>creates</a:t>
-              </a:r>
-              <a:endParaRPr lang="en-SG" sz="1100" dirty="0">
-                <a:solidFill>
-                  <a:srgbClr val="0070C0"/>
-                </a:solidFill>
-              </a:endParaRPr>
-            </a:p>
-          </p:txBody>
-        </p:sp>
-        <p:sp>
-          <p:nvSpPr>
-            <p:cNvPr id="43" name="Isosceles Triangle 42"/>
-            <p:cNvSpPr/>
-            <p:nvPr/>
-          </p:nvSpPr>
-          <p:spPr>
-            <a:xfrm rot="5400000">
-              <a:off x="3382038" y="866776"/>
-              <a:ext cx="125951" cy="76201"/>
-            </a:xfrm>
-            <a:prstGeom prst="triangle">
-              <a:avLst/>
-            </a:prstGeom>
-            <a:solidFill>
-              <a:srgbClr val="0070C0"/>
-            </a:solidFill>
-            <a:ln>
-              <a:noFill/>
+              <a:prstDash val="sysDash"/>
+              <a:tailEnd type="arrow"/>
             </a:ln>
           </p:spPr>
           <p:style>
-            <a:lnRef idx="2">
-              <a:schemeClr val="accent1">
-                <a:shade val="50000"/>
-              </a:schemeClr>
+            <a:lnRef idx="1">
+              <a:schemeClr val="accent1"/>
             </a:lnRef>
-            <a:fillRef idx="1">
+            <a:fillRef idx="0">
               <a:schemeClr val="accent1"/>
             </a:fillRef>
             <a:effectRef idx="0">
               <a:schemeClr val="accent1"/>
             </a:effectRef>
             <a:fontRef idx="minor">
-              <a:schemeClr val="lt1"/>
+              <a:schemeClr val="tx1"/>
             </a:fontRef>
           </p:style>
-          <p:txBody>
-            <a:bodyPr rtlCol="0" anchor="ctr"/>
-            <a:lstStyle/>
-            <a:p>
-              <a:pPr algn="ctr"/>
-              <a:endParaRPr lang="en-SG"/>
-            </a:p>
-          </p:txBody>
-        </p:sp>
+        </p:cxnSp>
       </p:grpSp>
       <p:sp>
         <p:nvSpPr>
-          <p:cNvPr id="44" name="Rectangle 11"/>
+          <p:cNvPr id="238" name="Rectangle 11"/>
           <p:cNvSpPr/>
           <p:nvPr/>
         </p:nvSpPr>
         <p:spPr>
-          <a:xfrm flipH="1">
-            <a:off x="6185390" y="3458098"/>
-            <a:ext cx="1093635" cy="346760"/>
+          <a:xfrm>
+            <a:off x="903667" y="4031895"/>
+            <a:ext cx="1151755" cy="236841"/>
           </a:xfrm>
           <a:prstGeom prst="rect">
             <a:avLst/>
           </a:prstGeom>
-          <a:ln w="19050">
-            <a:solidFill>
-              <a:srgbClr val="0070C0"/>
-            </a:solidFill>
+          <a:solidFill>
+            <a:srgbClr val="0070C0"/>
+          </a:solidFill>
+          <a:ln w="0">
+            <a:noFill/>
           </a:ln>
           <a:effectLst/>
         </p:spPr>
         <p:style>
           <a:lnRef idx="1">
-            <a:schemeClr val="accent1"/>
+            <a:schemeClr val="accent3"/>
           </a:lnRef>
           <a:fillRef idx="2">
-            <a:schemeClr val="accent1"/>
+            <a:schemeClr val="accent3"/>
           </a:fillRef>
           <a:effectRef idx="1">
-            <a:schemeClr val="accent1"/>
+            <a:schemeClr val="accent3"/>
           </a:effectRef>
           <a:fontRef idx="minor">
             <a:schemeClr val="dk1"/>
@@ -13983,29 +15138,96 @@
           <a:p>
             <a:pPr algn="ctr"/>
             <a:r>
-              <a:rPr lang="en-US" sz="1050" b="1" dirty="0">
+              <a:rPr lang="en-SG" sz="1050" dirty="0" err="1">
+                <a:solidFill>
+                  <a:schemeClr val="bg1"/>
+                </a:solidFill>
+              </a:rPr>
+              <a:t>CommandResult</a:t>
+            </a:r>
+            <a:endParaRPr lang="en-SG" sz="1050" dirty="0">
+              <a:solidFill>
+                <a:schemeClr val="bg1"/>
+              </a:solidFill>
+            </a:endParaRPr>
+          </a:p>
+        </p:txBody>
+      </p:sp>
+      <p:cxnSp>
+        <p:nvCxnSpPr>
+          <p:cNvPr id="241" name="Elbow Connector 63"/>
+          <p:cNvCxnSpPr/>
+          <p:nvPr/>
+        </p:nvCxnSpPr>
+        <p:spPr>
+          <a:xfrm rot="5400000">
+            <a:off x="1776341" y="3119822"/>
+            <a:ext cx="966860" cy="806034"/>
+          </a:xfrm>
+          <a:prstGeom prst="bentConnector3">
+            <a:avLst>
+              <a:gd name="adj1" fmla="val 743"/>
+            </a:avLst>
+          </a:prstGeom>
+          <a:ln w="19050">
+            <a:solidFill>
+              <a:schemeClr val="tx2">
+                <a:lumMod val="60000"/>
+                <a:lumOff val="40000"/>
+              </a:schemeClr>
+            </a:solidFill>
+            <a:prstDash val="sysDash"/>
+            <a:headEnd type="none" w="med" len="med"/>
+            <a:tailEnd type="arrow" w="med" len="med"/>
+          </a:ln>
+          <a:effectLst/>
+        </p:spPr>
+        <p:style>
+          <a:lnRef idx="1">
+            <a:schemeClr val="accent2"/>
+          </a:lnRef>
+          <a:fillRef idx="2">
+            <a:schemeClr val="accent2"/>
+          </a:fillRef>
+          <a:effectRef idx="1">
+            <a:schemeClr val="accent2"/>
+          </a:effectRef>
+          <a:fontRef idx="minor">
+            <a:schemeClr val="dk1"/>
+          </a:fontRef>
+        </p:style>
+      </p:cxnSp>
+      <p:sp>
+        <p:nvSpPr>
+          <p:cNvPr id="242" name="TextBox 241"/>
+          <p:cNvSpPr txBox="1"/>
+          <p:nvPr/>
+        </p:nvSpPr>
+        <p:spPr>
+          <a:xfrm>
+            <a:off x="2033270" y="2824591"/>
+            <a:ext cx="589809" cy="230832"/>
+          </a:xfrm>
+          <a:prstGeom prst="rect">
+            <a:avLst/>
+          </a:prstGeom>
+          <a:noFill/>
+        </p:spPr>
+        <p:txBody>
+          <a:bodyPr wrap="square" lIns="0" tIns="0" rIns="0" bIns="0" rtlCol="0">
+            <a:noAutofit/>
+          </a:bodyPr>
+          <a:lstStyle/>
+          <a:p>
+            <a:r>
+              <a:rPr lang="en-US" sz="1100" dirty="0">
                 <a:solidFill>
                   <a:srgbClr val="0070C0"/>
                 </a:solidFill>
               </a:rPr>
-              <a:t>Incorrect</a:t>
-            </a:r>
-            <a:br>
-              <a:rPr lang="en-US" sz="1050" b="1" dirty="0">
-                <a:solidFill>
-                  <a:srgbClr val="0070C0"/>
-                </a:solidFill>
-              </a:rPr>
-            </a:br>
-            <a:r>
-              <a:rPr lang="en-US" sz="1050" b="1" dirty="0">
-                <a:solidFill>
-                  <a:srgbClr val="0070C0"/>
-                </a:solidFill>
-              </a:rPr>
-              <a:t>Command</a:t>
-            </a:r>
-            <a:endParaRPr lang="en-SG" sz="1050" b="1" dirty="0">
+              <a:t>produces</a:t>
+            </a:r>
+            <a:endParaRPr lang="en-SG" sz="1100" dirty="0">
               <a:solidFill>
                 <a:srgbClr val="0070C0"/>
               </a:solidFill>
@@ -14013,94 +15235,56 @@
           </a:p>
         </p:txBody>
       </p:sp>
-      <p:cxnSp>
-        <p:nvCxnSpPr>
-          <p:cNvPr id="45" name="Elbow Connector 63"/>
-          <p:cNvCxnSpPr>
-            <a:stCxn id="8" idx="3"/>
-            <a:endCxn id="44" idx="3"/>
-          </p:cNvCxnSpPr>
-          <p:nvPr/>
-        </p:nvCxnSpPr>
-        <p:spPr>
-          <a:xfrm flipV="1">
-            <a:off x="5786402" y="3631478"/>
-            <a:ext cx="398988" cy="269496"/>
-          </a:xfrm>
-          <a:prstGeom prst="bentConnector3">
-            <a:avLst>
-              <a:gd name="adj1" fmla="val 50000"/>
-            </a:avLst>
-          </a:prstGeom>
-          <a:ln w="19050">
-            <a:solidFill>
-              <a:srgbClr val="0070C0"/>
-            </a:solidFill>
-            <a:headEnd type="none" w="med" len="med"/>
-            <a:tailEnd type="none" w="med" len="med"/>
-          </a:ln>
-          <a:effectLst/>
-        </p:spPr>
-        <p:style>
-          <a:lnRef idx="1">
-            <a:schemeClr val="accent2"/>
-          </a:lnRef>
-          <a:fillRef idx="2">
-            <a:schemeClr val="accent2"/>
-          </a:fillRef>
-          <a:effectRef idx="1">
-            <a:schemeClr val="accent2"/>
-          </a:effectRef>
-          <a:fontRef idx="minor">
-            <a:schemeClr val="dk1"/>
-          </a:fontRef>
-        </p:style>
-      </p:cxnSp>
-      <p:cxnSp>
-        <p:nvCxnSpPr>
-          <p:cNvPr id="46" name="Elbow Connector 122"/>
-          <p:cNvCxnSpPr/>
-          <p:nvPr/>
-        </p:nvCxnSpPr>
-        <p:spPr>
-          <a:xfrm rot="5400000" flipH="1" flipV="1">
-            <a:off x="1807196" y="3315772"/>
-            <a:ext cx="882304" cy="12700"/>
-          </a:xfrm>
-          <a:prstGeom prst="bentConnector3">
-            <a:avLst>
-              <a:gd name="adj1" fmla="val 50000"/>
-            </a:avLst>
-          </a:prstGeom>
-          <a:ln w="19050">
-            <a:solidFill>
-              <a:srgbClr val="0070C0"/>
-            </a:solidFill>
-            <a:prstDash val="sysDot"/>
-            <a:headEnd type="none" w="med" len="med"/>
-            <a:tailEnd type="arrow" w="med" len="med"/>
-          </a:ln>
-          <a:effectLst/>
-        </p:spPr>
-        <p:style>
-          <a:lnRef idx="1">
-            <a:schemeClr val="accent2"/>
-          </a:lnRef>
-          <a:fillRef idx="2">
-            <a:schemeClr val="accent2"/>
-          </a:fillRef>
-          <a:effectRef idx="1">
-            <a:schemeClr val="accent2"/>
-          </a:effectRef>
-          <a:fontRef idx="minor">
-            <a:schemeClr val="dk1"/>
-          </a:fontRef>
-        </p:style>
-      </p:cxnSp>
+      <p:sp>
+        <p:nvSpPr>
+          <p:cNvPr id="243" name="Isosceles Triangle 242"/>
+          <p:cNvSpPr/>
+          <p:nvPr/>
+        </p:nvSpPr>
+        <p:spPr>
+          <a:xfrm rot="16200000" flipH="1">
+            <a:off x="1866676" y="2891119"/>
+            <a:ext cx="125951" cy="76201"/>
+          </a:xfrm>
+          <a:prstGeom prst="triangle">
+            <a:avLst/>
+          </a:prstGeom>
+          <a:solidFill>
+            <a:srgbClr val="0070C0"/>
+          </a:solidFill>
+          <a:ln>
+            <a:noFill/>
+          </a:ln>
+        </p:spPr>
+        <p:style>
+          <a:lnRef idx="2">
+            <a:schemeClr val="accent1">
+              <a:shade val="50000"/>
+            </a:schemeClr>
+          </a:lnRef>
+          <a:fillRef idx="1">
+            <a:schemeClr val="accent1"/>
+          </a:fillRef>
+          <a:effectRef idx="0">
+            <a:schemeClr val="accent1"/>
+          </a:effectRef>
+          <a:fontRef idx="minor">
+            <a:schemeClr val="lt1"/>
+          </a:fontRef>
+        </p:style>
+        <p:txBody>
+          <a:bodyPr rtlCol="0" anchor="ctr"/>
+          <a:lstStyle/>
+          <a:p>
+            <a:pPr algn="ctr"/>
+            <a:endParaRPr lang="en-SG"/>
+          </a:p>
+        </p:txBody>
+      </p:sp>
     </p:spTree>
     <p:extLst>
       <p:ext uri="{BB962C8B-B14F-4D97-AF65-F5344CB8AC3E}">
-        <p14:creationId xmlns:p14="http://schemas.microsoft.com/office/powerpoint/2010/main" val="599777654"/>
+        <p14:creationId xmlns:p14="http://schemas.microsoft.com/office/powerpoint/2010/main" val="2578790820"/>
       </p:ext>
     </p:extLst>
   </p:cSld>

</xml_diff>

<commit_message>
Add diagram and description for Storage
</commit_message>
<xml_diff>
--- a/docs/diagrams/Diagrams.pptx
+++ b/docs/diagrams/Diagrams.pptx
@@ -5,7 +5,7 @@
     <p:sldMasterId id="2147483648" r:id="rId1"/>
   </p:sldMasterIdLst>
   <p:notesMasterIdLst>
-    <p:notesMasterId r:id="rId13"/>
+    <p:notesMasterId r:id="rId11"/>
   </p:notesMasterIdLst>
   <p:sldIdLst>
     <p:sldId id="256" r:id="rId2"/>
@@ -16,9 +16,7 @@
     <p:sldId id="270" r:id="rId7"/>
     <p:sldId id="267" r:id="rId8"/>
     <p:sldId id="271" r:id="rId9"/>
-    <p:sldId id="263" r:id="rId10"/>
-    <p:sldId id="264" r:id="rId11"/>
-    <p:sldId id="265" r:id="rId12"/>
+    <p:sldId id="272" r:id="rId10"/>
   </p:sldIdLst>
   <p:sldSz cx="9144000" cy="6858000" type="screen4x3"/>
   <p:notesSz cx="6858000" cy="9144000"/>
@@ -3594,1423 +3592,6 @@
 </p:sld>
 </file>
 
-<file path=ppt/slides/slide10.xml><?xml version="1.0" encoding="utf-8"?>
-<p:sld xmlns:a="http://schemas.openxmlformats.org/drawingml/2006/main" xmlns:r="http://schemas.openxmlformats.org/officeDocument/2006/relationships" xmlns:p="http://schemas.openxmlformats.org/presentationml/2006/main">
-  <p:cSld>
-    <p:spTree>
-      <p:nvGrpSpPr>
-        <p:cNvPr id="1" name=""/>
-        <p:cNvGrpSpPr/>
-        <p:nvPr/>
-      </p:nvGrpSpPr>
-      <p:grpSpPr>
-        <a:xfrm>
-          <a:off x="0" y="0"/>
-          <a:ext cx="0" cy="0"/>
-          <a:chOff x="0" y="0"/>
-          <a:chExt cx="0" cy="0"/>
-        </a:xfrm>
-      </p:grpSpPr>
-      <p:sp>
-        <p:nvSpPr>
-          <p:cNvPr id="118" name="Rectangle 65"/>
-          <p:cNvSpPr/>
-          <p:nvPr/>
-        </p:nvSpPr>
-        <p:spPr>
-          <a:xfrm>
-            <a:off x="1119865" y="2086382"/>
-            <a:ext cx="7871735" cy="1723618"/>
-          </a:xfrm>
-          <a:prstGeom prst="roundRect">
-            <a:avLst>
-              <a:gd name="adj" fmla="val 3484"/>
-            </a:avLst>
-          </a:prstGeom>
-          <a:solidFill>
-            <a:schemeClr val="accent6">
-              <a:lumMod val="20000"/>
-              <a:lumOff val="80000"/>
-            </a:schemeClr>
-          </a:solidFill>
-          <a:ln w="19050">
-            <a:noFill/>
-          </a:ln>
-          <a:effectLst/>
-        </p:spPr>
-        <p:style>
-          <a:lnRef idx="1">
-            <a:schemeClr val="accent2"/>
-          </a:lnRef>
-          <a:fillRef idx="2">
-            <a:schemeClr val="accent2"/>
-          </a:fillRef>
-          <a:effectRef idx="1">
-            <a:schemeClr val="accent2"/>
-          </a:effectRef>
-          <a:fontRef idx="minor">
-            <a:schemeClr val="dk1"/>
-          </a:fontRef>
-        </p:style>
-        <p:txBody>
-          <a:bodyPr rtlCol="0" anchor="t"/>
-          <a:lstStyle/>
-          <a:p>
-            <a:r>
-              <a:rPr lang="en-US" sz="1200" b="1" dirty="0">
-                <a:solidFill>
-                  <a:schemeClr val="accent6">
-                    <a:lumMod val="75000"/>
-                  </a:schemeClr>
-                </a:solidFill>
-              </a:rPr>
-              <a:t>Storage</a:t>
-            </a:r>
-            <a:endParaRPr lang="en-SG" sz="1200" b="1" dirty="0">
-              <a:solidFill>
-                <a:schemeClr val="accent6">
-                  <a:lumMod val="75000"/>
-                </a:schemeClr>
-              </a:solidFill>
-            </a:endParaRPr>
-          </a:p>
-        </p:txBody>
-      </p:sp>
-      <p:sp>
-        <p:nvSpPr>
-          <p:cNvPr id="2" name="Rectangle 8"/>
-          <p:cNvSpPr/>
-          <p:nvPr/>
-        </p:nvSpPr>
-        <p:spPr>
-          <a:xfrm>
-            <a:off x="2877180" y="3158440"/>
-            <a:ext cx="1323049" cy="346760"/>
-          </a:xfrm>
-          <a:prstGeom prst="rect">
-            <a:avLst/>
-          </a:prstGeom>
-          <a:solidFill>
-            <a:schemeClr val="accent6">
-              <a:lumMod val="75000"/>
-            </a:schemeClr>
-          </a:solidFill>
-          <a:ln w="19050">
-            <a:solidFill>
-              <a:schemeClr val="accent6">
-                <a:lumMod val="75000"/>
-              </a:schemeClr>
-            </a:solidFill>
-          </a:ln>
-          <a:effectLst/>
-        </p:spPr>
-        <p:style>
-          <a:lnRef idx="1">
-            <a:schemeClr val="accent2"/>
-          </a:lnRef>
-          <a:fillRef idx="2">
-            <a:schemeClr val="accent2"/>
-          </a:fillRef>
-          <a:effectRef idx="1">
-            <a:schemeClr val="accent2"/>
-          </a:effectRef>
-          <a:fontRef idx="minor">
-            <a:schemeClr val="dk1"/>
-          </a:fontRef>
-        </p:style>
-        <p:txBody>
-          <a:bodyPr rtlCol="0" anchor="ctr"/>
-          <a:lstStyle/>
-          <a:p>
-            <a:pPr algn="ctr"/>
-            <a:r>
-              <a:rPr lang="en-US" sz="1050" dirty="0">
-                <a:solidFill>
-                  <a:schemeClr val="bg1"/>
-                </a:solidFill>
-              </a:rPr>
-              <a:t>&lt;&lt;interface&gt;&gt;</a:t>
-            </a:r>
-            <a:br>
-              <a:rPr lang="en-US" sz="1050" dirty="0">
-                <a:solidFill>
-                  <a:schemeClr val="bg1"/>
-                </a:solidFill>
-              </a:rPr>
-            </a:br>
-            <a:r>
-              <a:rPr lang="en-US" sz="1050" dirty="0" err="1">
-                <a:solidFill>
-                  <a:schemeClr val="bg1"/>
-                </a:solidFill>
-              </a:rPr>
-              <a:t>TodoListStorage</a:t>
-            </a:r>
-            <a:endParaRPr lang="en-SG" sz="1050" dirty="0">
-              <a:solidFill>
-                <a:schemeClr val="bg1"/>
-              </a:solidFill>
-            </a:endParaRPr>
-          </a:p>
-        </p:txBody>
-      </p:sp>
-      <p:sp>
-        <p:nvSpPr>
-          <p:cNvPr id="9" name="Rectangle 62"/>
-          <p:cNvSpPr/>
-          <p:nvPr/>
-        </p:nvSpPr>
-        <p:spPr>
-          <a:xfrm rot="16200000">
-            <a:off x="1683963" y="2868687"/>
-            <a:ext cx="1093635" cy="346760"/>
-          </a:xfrm>
-          <a:prstGeom prst="rect">
-            <a:avLst/>
-          </a:prstGeom>
-          <a:solidFill>
-            <a:schemeClr val="accent6">
-              <a:lumMod val="75000"/>
-            </a:schemeClr>
-          </a:solidFill>
-          <a:ln w="19050">
-            <a:solidFill>
-              <a:schemeClr val="accent6">
-                <a:lumMod val="75000"/>
-              </a:schemeClr>
-            </a:solidFill>
-          </a:ln>
-          <a:effectLst/>
-        </p:spPr>
-        <p:style>
-          <a:lnRef idx="1">
-            <a:schemeClr val="accent2"/>
-          </a:lnRef>
-          <a:fillRef idx="2">
-            <a:schemeClr val="accent2"/>
-          </a:fillRef>
-          <a:effectRef idx="1">
-            <a:schemeClr val="accent2"/>
-          </a:effectRef>
-          <a:fontRef idx="minor">
-            <a:schemeClr val="dk1"/>
-          </a:fontRef>
-        </p:style>
-        <p:txBody>
-          <a:bodyPr rtlCol="0" anchor="ctr"/>
-          <a:lstStyle/>
-          <a:p>
-            <a:pPr algn="ctr"/>
-            <a:r>
-              <a:rPr lang="en-US" sz="1050" dirty="0" err="1">
-                <a:solidFill>
-                  <a:schemeClr val="bg1"/>
-                </a:solidFill>
-              </a:rPr>
-              <a:t>StorageManager</a:t>
-            </a:r>
-            <a:endParaRPr lang="en-SG" sz="1050" dirty="0">
-              <a:solidFill>
-                <a:schemeClr val="bg1"/>
-              </a:solidFill>
-            </a:endParaRPr>
-          </a:p>
-        </p:txBody>
-      </p:sp>
-      <p:sp>
-        <p:nvSpPr>
-          <p:cNvPr id="119" name="Rectangle 62"/>
-          <p:cNvSpPr/>
-          <p:nvPr/>
-        </p:nvSpPr>
-        <p:spPr>
-          <a:xfrm rot="16200000">
-            <a:off x="956202" y="2861202"/>
-            <a:ext cx="1093635" cy="346760"/>
-          </a:xfrm>
-          <a:prstGeom prst="rect">
-            <a:avLst/>
-          </a:prstGeom>
-          <a:solidFill>
-            <a:schemeClr val="accent6">
-              <a:lumMod val="75000"/>
-            </a:schemeClr>
-          </a:solidFill>
-          <a:ln w="19050">
-            <a:solidFill>
-              <a:schemeClr val="accent6">
-                <a:lumMod val="75000"/>
-              </a:schemeClr>
-            </a:solidFill>
-          </a:ln>
-          <a:effectLst/>
-        </p:spPr>
-        <p:style>
-          <a:lnRef idx="1">
-            <a:schemeClr val="accent2"/>
-          </a:lnRef>
-          <a:fillRef idx="2">
-            <a:schemeClr val="accent2"/>
-          </a:fillRef>
-          <a:effectRef idx="1">
-            <a:schemeClr val="accent2"/>
-          </a:effectRef>
-          <a:fontRef idx="minor">
-            <a:schemeClr val="dk1"/>
-          </a:fontRef>
-        </p:style>
-        <p:txBody>
-          <a:bodyPr rtlCol="0" anchor="ctr"/>
-          <a:lstStyle/>
-          <a:p>
-            <a:pPr algn="ctr"/>
-            <a:r>
-              <a:rPr lang="en-US" sz="1050" dirty="0">
-                <a:solidFill>
-                  <a:schemeClr val="bg1"/>
-                </a:solidFill>
-              </a:rPr>
-              <a:t>&lt;&lt;interface&gt;&gt;</a:t>
-            </a:r>
-          </a:p>
-          <a:p>
-            <a:pPr algn="ctr"/>
-            <a:r>
-              <a:rPr lang="en-US" sz="1050" dirty="0">
-                <a:solidFill>
-                  <a:schemeClr val="bg1"/>
-                </a:solidFill>
-              </a:rPr>
-              <a:t>Storage</a:t>
-            </a:r>
-            <a:endParaRPr lang="en-SG" sz="1050" dirty="0">
-              <a:solidFill>
-                <a:schemeClr val="bg1"/>
-              </a:solidFill>
-            </a:endParaRPr>
-          </a:p>
-        </p:txBody>
-      </p:sp>
-      <p:sp>
-        <p:nvSpPr>
-          <p:cNvPr id="120" name="Isosceles Triangle 102"/>
-          <p:cNvSpPr/>
-          <p:nvPr/>
-        </p:nvSpPr>
-        <p:spPr>
-          <a:xfrm rot="16200000">
-            <a:off x="1626910" y="2952291"/>
-            <a:ext cx="270504" cy="175523"/>
-          </a:xfrm>
-          <a:prstGeom prst="triangle">
-            <a:avLst/>
-          </a:prstGeom>
-          <a:solidFill>
-            <a:schemeClr val="accent6">
-              <a:lumMod val="75000"/>
-            </a:schemeClr>
-          </a:solidFill>
-          <a:ln w="19050">
-            <a:solidFill>
-              <a:schemeClr val="accent6">
-                <a:lumMod val="75000"/>
-              </a:schemeClr>
-            </a:solidFill>
-          </a:ln>
-          <a:effectLst/>
-        </p:spPr>
-        <p:style>
-          <a:lnRef idx="1">
-            <a:schemeClr val="accent2"/>
-          </a:lnRef>
-          <a:fillRef idx="2">
-            <a:schemeClr val="accent2"/>
-          </a:fillRef>
-          <a:effectRef idx="1">
-            <a:schemeClr val="accent2"/>
-          </a:effectRef>
-          <a:fontRef idx="minor">
-            <a:schemeClr val="dk1"/>
-          </a:fontRef>
-        </p:style>
-        <p:txBody>
-          <a:bodyPr rtlCol="0" anchor="ctr"/>
-          <a:lstStyle/>
-          <a:p>
-            <a:pPr algn="ctr"/>
-            <a:endParaRPr lang="en-SG" sz="1050">
-              <a:solidFill>
-                <a:schemeClr val="bg1"/>
-              </a:solidFill>
-            </a:endParaRPr>
-          </a:p>
-        </p:txBody>
-      </p:sp>
-      <p:cxnSp>
-        <p:nvCxnSpPr>
-          <p:cNvPr id="58" name="Straight Arrow Connector 57"/>
-          <p:cNvCxnSpPr>
-            <a:stCxn id="42" idx="3"/>
-            <a:endCxn id="2" idx="1"/>
-          </p:cNvCxnSpPr>
-          <p:nvPr/>
-        </p:nvCxnSpPr>
-        <p:spPr>
-          <a:xfrm>
-            <a:off x="2656370" y="3326536"/>
-            <a:ext cx="220810" cy="5284"/>
-          </a:xfrm>
-          <a:prstGeom prst="straightConnector1">
-            <a:avLst/>
-          </a:prstGeom>
-          <a:ln w="19050">
-            <a:solidFill>
-              <a:schemeClr val="accent6">
-                <a:lumMod val="75000"/>
-              </a:schemeClr>
-            </a:solidFill>
-            <a:headEnd type="none" w="med" len="med"/>
-            <a:tailEnd type="arrow" w="med" len="med"/>
-          </a:ln>
-          <a:effectLst/>
-        </p:spPr>
-        <p:style>
-          <a:lnRef idx="1">
-            <a:schemeClr val="accent2"/>
-          </a:lnRef>
-          <a:fillRef idx="2">
-            <a:schemeClr val="accent2"/>
-          </a:fillRef>
-          <a:effectRef idx="1">
-            <a:schemeClr val="accent2"/>
-          </a:effectRef>
-          <a:fontRef idx="minor">
-            <a:schemeClr val="dk1"/>
-          </a:fontRef>
-        </p:style>
-      </p:cxnSp>
-      <p:cxnSp>
-        <p:nvCxnSpPr>
-          <p:cNvPr id="75" name="Elbow Connector 122"/>
-          <p:cNvCxnSpPr/>
-          <p:nvPr/>
-        </p:nvCxnSpPr>
-        <p:spPr>
-          <a:xfrm>
-            <a:off x="910091" y="3040053"/>
-            <a:ext cx="419548" cy="2860"/>
-          </a:xfrm>
-          <a:prstGeom prst="bentConnector3">
-            <a:avLst>
-              <a:gd name="adj1" fmla="val 50000"/>
-            </a:avLst>
-          </a:prstGeom>
-          <a:ln w="19050">
-            <a:solidFill>
-              <a:schemeClr val="bg1">
-                <a:lumMod val="75000"/>
-              </a:schemeClr>
-            </a:solidFill>
-            <a:prstDash val="sysDot"/>
-            <a:headEnd type="none" w="med" len="med"/>
-            <a:tailEnd type="arrow" w="med" len="med"/>
-          </a:ln>
-          <a:effectLst/>
-        </p:spPr>
-        <p:style>
-          <a:lnRef idx="1">
-            <a:schemeClr val="accent2"/>
-          </a:lnRef>
-          <a:fillRef idx="2">
-            <a:schemeClr val="accent2"/>
-          </a:fillRef>
-          <a:effectRef idx="1">
-            <a:schemeClr val="accent2"/>
-          </a:effectRef>
-          <a:fontRef idx="minor">
-            <a:schemeClr val="dk1"/>
-          </a:fontRef>
-        </p:style>
-      </p:cxnSp>
-      <p:cxnSp>
-        <p:nvCxnSpPr>
-          <p:cNvPr id="21" name="Straight Connector 20"/>
-          <p:cNvCxnSpPr>
-            <a:stCxn id="120" idx="3"/>
-          </p:cNvCxnSpPr>
-          <p:nvPr/>
-        </p:nvCxnSpPr>
-        <p:spPr>
-          <a:xfrm flipV="1">
-            <a:off x="1849924" y="3040052"/>
-            <a:ext cx="216105" cy="1"/>
-          </a:xfrm>
-          <a:prstGeom prst="line">
-            <a:avLst/>
-          </a:prstGeom>
-          <a:ln w="19050">
-            <a:solidFill>
-              <a:schemeClr val="accent6">
-                <a:lumMod val="75000"/>
-              </a:schemeClr>
-            </a:solidFill>
-            <a:prstDash val="sysDot"/>
-            <a:headEnd type="none" w="med" len="med"/>
-            <a:tailEnd type="none" w="med" len="med"/>
-          </a:ln>
-          <a:effectLst/>
-        </p:spPr>
-        <p:style>
-          <a:lnRef idx="1">
-            <a:schemeClr val="accent2"/>
-          </a:lnRef>
-          <a:fillRef idx="2">
-            <a:schemeClr val="accent2"/>
-          </a:fillRef>
-          <a:effectRef idx="1">
-            <a:schemeClr val="accent2"/>
-          </a:effectRef>
-          <a:fontRef idx="minor">
-            <a:schemeClr val="dk1"/>
-          </a:fontRef>
-        </p:style>
-      </p:cxnSp>
-      <p:sp>
-        <p:nvSpPr>
-          <p:cNvPr id="42" name="Flowchart: Decision 96"/>
-          <p:cNvSpPr/>
-          <p:nvPr/>
-        </p:nvSpPr>
-        <p:spPr>
-          <a:xfrm>
-            <a:off x="2420322" y="3239846"/>
-            <a:ext cx="236048" cy="173380"/>
-          </a:xfrm>
-          <a:prstGeom prst="flowChartDecision">
-            <a:avLst/>
-          </a:prstGeom>
-          <a:noFill/>
-          <a:ln w="19050">
-            <a:solidFill>
-              <a:schemeClr val="accent6">
-                <a:lumMod val="75000"/>
-              </a:schemeClr>
-            </a:solidFill>
-          </a:ln>
-          <a:effectLst/>
-        </p:spPr>
-        <p:style>
-          <a:lnRef idx="1">
-            <a:schemeClr val="accent2"/>
-          </a:lnRef>
-          <a:fillRef idx="2">
-            <a:schemeClr val="accent2"/>
-          </a:fillRef>
-          <a:effectRef idx="1">
-            <a:schemeClr val="accent2"/>
-          </a:effectRef>
-          <a:fontRef idx="minor">
-            <a:schemeClr val="dk1"/>
-          </a:fontRef>
-        </p:style>
-        <p:txBody>
-          <a:bodyPr rtlCol="0" anchor="ctr"/>
-          <a:lstStyle/>
-          <a:p>
-            <a:pPr algn="ctr"/>
-            <a:endParaRPr lang="en-US" sz="1050">
-              <a:solidFill>
-                <a:schemeClr val="bg1"/>
-              </a:solidFill>
-            </a:endParaRPr>
-          </a:p>
-        </p:txBody>
-      </p:sp>
-      <p:cxnSp>
-        <p:nvCxnSpPr>
-          <p:cNvPr id="97" name="Elbow Connector 63"/>
-          <p:cNvCxnSpPr>
-            <a:stCxn id="99" idx="3"/>
-            <a:endCxn id="50" idx="1"/>
-          </p:cNvCxnSpPr>
-          <p:nvPr/>
-        </p:nvCxnSpPr>
-        <p:spPr>
-          <a:xfrm flipV="1">
-            <a:off x="4398041" y="3331820"/>
-            <a:ext cx="223324" cy="1"/>
-          </a:xfrm>
-          <a:prstGeom prst="bentConnector3">
-            <a:avLst>
-              <a:gd name="adj1" fmla="val 50000"/>
-            </a:avLst>
-          </a:prstGeom>
-          <a:ln w="19050">
-            <a:solidFill>
-              <a:schemeClr val="accent6">
-                <a:lumMod val="75000"/>
-              </a:schemeClr>
-            </a:solidFill>
-            <a:prstDash val="sysDot"/>
-            <a:headEnd type="none" w="med" len="med"/>
-            <a:tailEnd type="none" w="med" len="med"/>
-          </a:ln>
-          <a:effectLst/>
-        </p:spPr>
-        <p:style>
-          <a:lnRef idx="1">
-            <a:schemeClr val="accent2"/>
-          </a:lnRef>
-          <a:fillRef idx="2">
-            <a:schemeClr val="accent2"/>
-          </a:fillRef>
-          <a:effectRef idx="1">
-            <a:schemeClr val="accent2"/>
-          </a:effectRef>
-          <a:fontRef idx="minor">
-            <a:schemeClr val="dk1"/>
-          </a:fontRef>
-        </p:style>
-      </p:cxnSp>
-      <p:sp>
-        <p:nvSpPr>
-          <p:cNvPr id="99" name="Isosceles Triangle 102"/>
-          <p:cNvSpPr/>
-          <p:nvPr/>
-        </p:nvSpPr>
-        <p:spPr>
-          <a:xfrm rot="5400000" flipV="1">
-            <a:off x="4175027" y="3244059"/>
-            <a:ext cx="270504" cy="175523"/>
-          </a:xfrm>
-          <a:prstGeom prst="triangle">
-            <a:avLst/>
-          </a:prstGeom>
-          <a:solidFill>
-            <a:schemeClr val="accent6">
-              <a:lumMod val="75000"/>
-            </a:schemeClr>
-          </a:solidFill>
-          <a:ln w="19050">
-            <a:solidFill>
-              <a:schemeClr val="accent6">
-                <a:lumMod val="75000"/>
-              </a:schemeClr>
-            </a:solidFill>
-          </a:ln>
-          <a:effectLst/>
-        </p:spPr>
-        <p:style>
-          <a:lnRef idx="1">
-            <a:schemeClr val="accent2"/>
-          </a:lnRef>
-          <a:fillRef idx="2">
-            <a:schemeClr val="accent2"/>
-          </a:fillRef>
-          <a:effectRef idx="1">
-            <a:schemeClr val="accent2"/>
-          </a:effectRef>
-          <a:fontRef idx="minor">
-            <a:schemeClr val="dk1"/>
-          </a:fontRef>
-        </p:style>
-        <p:txBody>
-          <a:bodyPr rtlCol="0" anchor="ctr"/>
-          <a:lstStyle/>
-          <a:p>
-            <a:pPr algn="ctr"/>
-            <a:endParaRPr lang="en-SG" sz="1050">
-              <a:solidFill>
-                <a:schemeClr val="bg1"/>
-              </a:solidFill>
-            </a:endParaRPr>
-          </a:p>
-        </p:txBody>
-      </p:sp>
-      <p:cxnSp>
-        <p:nvCxnSpPr>
-          <p:cNvPr id="124" name="Elbow Connector 122"/>
-          <p:cNvCxnSpPr>
-            <a:stCxn id="50" idx="3"/>
-            <a:endCxn id="66" idx="1"/>
-          </p:cNvCxnSpPr>
-          <p:nvPr/>
-        </p:nvCxnSpPr>
-        <p:spPr>
-          <a:xfrm>
-            <a:off x="5791200" y="3331820"/>
-            <a:ext cx="228600" cy="1970"/>
-          </a:xfrm>
-          <a:prstGeom prst="bentConnector3">
-            <a:avLst>
-              <a:gd name="adj1" fmla="val 50000"/>
-            </a:avLst>
-          </a:prstGeom>
-          <a:ln w="19050">
-            <a:solidFill>
-              <a:schemeClr val="accent6">
-                <a:lumMod val="75000"/>
-              </a:schemeClr>
-            </a:solidFill>
-            <a:prstDash val="sysDot"/>
-            <a:headEnd type="none" w="med" len="med"/>
-            <a:tailEnd type="arrow" w="med" len="med"/>
-          </a:ln>
-          <a:effectLst/>
-        </p:spPr>
-        <p:style>
-          <a:lnRef idx="1">
-            <a:schemeClr val="accent2"/>
-          </a:lnRef>
-          <a:fillRef idx="2">
-            <a:schemeClr val="accent2"/>
-          </a:fillRef>
-          <a:effectRef idx="1">
-            <a:schemeClr val="accent2"/>
-          </a:effectRef>
-          <a:fontRef idx="minor">
-            <a:schemeClr val="dk1"/>
-          </a:fontRef>
-        </p:style>
-      </p:cxnSp>
-      <p:sp>
-        <p:nvSpPr>
-          <p:cNvPr id="50" name="Rectangle 8"/>
-          <p:cNvSpPr/>
-          <p:nvPr/>
-        </p:nvSpPr>
-        <p:spPr>
-          <a:xfrm>
-            <a:off x="4621365" y="3158440"/>
-            <a:ext cx="1169835" cy="346760"/>
-          </a:xfrm>
-          <a:prstGeom prst="rect">
-            <a:avLst/>
-          </a:prstGeom>
-          <a:ln w="19050"/>
-          <a:effectLst/>
-        </p:spPr>
-        <p:style>
-          <a:lnRef idx="1">
-            <a:schemeClr val="accent6"/>
-          </a:lnRef>
-          <a:fillRef idx="2">
-            <a:schemeClr val="accent6"/>
-          </a:fillRef>
-          <a:effectRef idx="1">
-            <a:schemeClr val="accent6"/>
-          </a:effectRef>
-          <a:fontRef idx="minor">
-            <a:schemeClr val="dk1"/>
-          </a:fontRef>
-        </p:style>
-        <p:txBody>
-          <a:bodyPr rtlCol="0" anchor="ctr"/>
-          <a:lstStyle/>
-          <a:p>
-            <a:pPr algn="ctr"/>
-            <a:r>
-              <a:rPr lang="en-US" sz="1050" b="1" dirty="0" err="1">
-                <a:solidFill>
-                  <a:schemeClr val="accent6">
-                    <a:lumMod val="75000"/>
-                  </a:schemeClr>
-                </a:solidFill>
-              </a:rPr>
-              <a:t>XmlTodoList</a:t>
-            </a:r>
-            <a:br>
-              <a:rPr lang="en-US" sz="1050" b="1" dirty="0">
-                <a:solidFill>
-                  <a:schemeClr val="accent6">
-                    <a:lumMod val="75000"/>
-                  </a:schemeClr>
-                </a:solidFill>
-              </a:rPr>
-            </a:br>
-            <a:r>
-              <a:rPr lang="en-US" sz="1050" b="1" dirty="0">
-                <a:solidFill>
-                  <a:schemeClr val="accent6">
-                    <a:lumMod val="75000"/>
-                  </a:schemeClr>
-                </a:solidFill>
-              </a:rPr>
-              <a:t>Storage</a:t>
-            </a:r>
-            <a:endParaRPr lang="en-SG" sz="1050" b="1" dirty="0">
-              <a:solidFill>
-                <a:schemeClr val="accent6">
-                  <a:lumMod val="75000"/>
-                </a:schemeClr>
-              </a:solidFill>
-            </a:endParaRPr>
-          </a:p>
-        </p:txBody>
-      </p:sp>
-      <p:sp>
-        <p:nvSpPr>
-          <p:cNvPr id="52" name="Rectangle 8"/>
-          <p:cNvSpPr/>
-          <p:nvPr/>
-        </p:nvSpPr>
-        <p:spPr>
-          <a:xfrm>
-            <a:off x="2873943" y="2558040"/>
-            <a:ext cx="1323049" cy="346760"/>
-          </a:xfrm>
-          <a:prstGeom prst="rect">
-            <a:avLst/>
-          </a:prstGeom>
-          <a:solidFill>
-            <a:schemeClr val="accent6">
-              <a:lumMod val="75000"/>
-            </a:schemeClr>
-          </a:solidFill>
-          <a:ln w="19050">
-            <a:solidFill>
-              <a:schemeClr val="accent6">
-                <a:lumMod val="75000"/>
-              </a:schemeClr>
-            </a:solidFill>
-          </a:ln>
-          <a:effectLst/>
-        </p:spPr>
-        <p:style>
-          <a:lnRef idx="1">
-            <a:schemeClr val="accent2"/>
-          </a:lnRef>
-          <a:fillRef idx="2">
-            <a:schemeClr val="accent2"/>
-          </a:fillRef>
-          <a:effectRef idx="1">
-            <a:schemeClr val="accent2"/>
-          </a:effectRef>
-          <a:fontRef idx="minor">
-            <a:schemeClr val="dk1"/>
-          </a:fontRef>
-        </p:style>
-        <p:txBody>
-          <a:bodyPr rtlCol="0" anchor="ctr"/>
-          <a:lstStyle/>
-          <a:p>
-            <a:pPr algn="ctr"/>
-            <a:r>
-              <a:rPr lang="en-US" sz="1050" dirty="0">
-                <a:solidFill>
-                  <a:schemeClr val="bg1"/>
-                </a:solidFill>
-              </a:rPr>
-              <a:t>&lt;&lt;interface&gt;&gt;</a:t>
-            </a:r>
-            <a:br>
-              <a:rPr lang="en-US" sz="1050" dirty="0">
-                <a:solidFill>
-                  <a:schemeClr val="bg1"/>
-                </a:solidFill>
-              </a:rPr>
-            </a:br>
-            <a:r>
-              <a:rPr lang="en-US" sz="1050" dirty="0" err="1">
-                <a:solidFill>
-                  <a:schemeClr val="bg1"/>
-                </a:solidFill>
-              </a:rPr>
-              <a:t>UserPrefsStorage</a:t>
-            </a:r>
-            <a:endParaRPr lang="en-SG" sz="1050" dirty="0">
-              <a:solidFill>
-                <a:schemeClr val="bg1"/>
-              </a:solidFill>
-            </a:endParaRPr>
-          </a:p>
-        </p:txBody>
-      </p:sp>
-      <p:cxnSp>
-        <p:nvCxnSpPr>
-          <p:cNvPr id="54" name="Straight Arrow Connector 53"/>
-          <p:cNvCxnSpPr>
-            <a:stCxn id="56" idx="3"/>
-            <a:endCxn id="52" idx="1"/>
-          </p:cNvCxnSpPr>
-          <p:nvPr/>
-        </p:nvCxnSpPr>
-        <p:spPr>
-          <a:xfrm>
-            <a:off x="2653133" y="2726136"/>
-            <a:ext cx="220810" cy="5284"/>
-          </a:xfrm>
-          <a:prstGeom prst="straightConnector1">
-            <a:avLst/>
-          </a:prstGeom>
-          <a:ln w="19050">
-            <a:solidFill>
-              <a:schemeClr val="accent6">
-                <a:lumMod val="75000"/>
-              </a:schemeClr>
-            </a:solidFill>
-            <a:headEnd type="none" w="med" len="med"/>
-            <a:tailEnd type="arrow" w="med" len="med"/>
-          </a:ln>
-          <a:effectLst/>
-        </p:spPr>
-        <p:style>
-          <a:lnRef idx="1">
-            <a:schemeClr val="accent2"/>
-          </a:lnRef>
-          <a:fillRef idx="2">
-            <a:schemeClr val="accent2"/>
-          </a:fillRef>
-          <a:effectRef idx="1">
-            <a:schemeClr val="accent2"/>
-          </a:effectRef>
-          <a:fontRef idx="minor">
-            <a:schemeClr val="dk1"/>
-          </a:fontRef>
-        </p:style>
-      </p:cxnSp>
-      <p:sp>
-        <p:nvSpPr>
-          <p:cNvPr id="56" name="Flowchart: Decision 96"/>
-          <p:cNvSpPr/>
-          <p:nvPr/>
-        </p:nvSpPr>
-        <p:spPr>
-          <a:xfrm>
-            <a:off x="2417085" y="2639446"/>
-            <a:ext cx="236048" cy="173380"/>
-          </a:xfrm>
-          <a:prstGeom prst="flowChartDecision">
-            <a:avLst/>
-          </a:prstGeom>
-          <a:noFill/>
-          <a:ln w="19050">
-            <a:solidFill>
-              <a:schemeClr val="accent6">
-                <a:lumMod val="75000"/>
-              </a:schemeClr>
-            </a:solidFill>
-          </a:ln>
-          <a:effectLst/>
-        </p:spPr>
-        <p:style>
-          <a:lnRef idx="1">
-            <a:schemeClr val="accent2"/>
-          </a:lnRef>
-          <a:fillRef idx="2">
-            <a:schemeClr val="accent2"/>
-          </a:fillRef>
-          <a:effectRef idx="1">
-            <a:schemeClr val="accent2"/>
-          </a:effectRef>
-          <a:fontRef idx="minor">
-            <a:schemeClr val="dk1"/>
-          </a:fontRef>
-        </p:style>
-        <p:txBody>
-          <a:bodyPr rtlCol="0" anchor="ctr"/>
-          <a:lstStyle/>
-          <a:p>
-            <a:pPr algn="ctr"/>
-            <a:endParaRPr lang="en-US" sz="1050">
-              <a:solidFill>
-                <a:schemeClr val="bg1"/>
-              </a:solidFill>
-            </a:endParaRPr>
-          </a:p>
-        </p:txBody>
-      </p:sp>
-      <p:cxnSp>
-        <p:nvCxnSpPr>
-          <p:cNvPr id="60" name="Elbow Connector 63"/>
-          <p:cNvCxnSpPr>
-            <a:stCxn id="61" idx="3"/>
-            <a:endCxn id="65" idx="1"/>
-          </p:cNvCxnSpPr>
-          <p:nvPr/>
-        </p:nvCxnSpPr>
-        <p:spPr>
-          <a:xfrm flipV="1">
-            <a:off x="4394804" y="2731420"/>
-            <a:ext cx="223324" cy="1"/>
-          </a:xfrm>
-          <a:prstGeom prst="bentConnector3">
-            <a:avLst>
-              <a:gd name="adj1" fmla="val 50000"/>
-            </a:avLst>
-          </a:prstGeom>
-          <a:ln w="19050">
-            <a:solidFill>
-              <a:schemeClr val="accent6">
-                <a:lumMod val="75000"/>
-              </a:schemeClr>
-            </a:solidFill>
-            <a:prstDash val="sysDot"/>
-            <a:headEnd type="none" w="med" len="med"/>
-            <a:tailEnd type="none" w="med" len="med"/>
-          </a:ln>
-          <a:effectLst/>
-        </p:spPr>
-        <p:style>
-          <a:lnRef idx="1">
-            <a:schemeClr val="accent2"/>
-          </a:lnRef>
-          <a:fillRef idx="2">
-            <a:schemeClr val="accent2"/>
-          </a:fillRef>
-          <a:effectRef idx="1">
-            <a:schemeClr val="accent2"/>
-          </a:effectRef>
-          <a:fontRef idx="minor">
-            <a:schemeClr val="dk1"/>
-          </a:fontRef>
-        </p:style>
-      </p:cxnSp>
-      <p:sp>
-        <p:nvSpPr>
-          <p:cNvPr id="61" name="Isosceles Triangle 102"/>
-          <p:cNvSpPr/>
-          <p:nvPr/>
-        </p:nvSpPr>
-        <p:spPr>
-          <a:xfrm rot="5400000" flipV="1">
-            <a:off x="4171790" y="2643659"/>
-            <a:ext cx="270504" cy="175523"/>
-          </a:xfrm>
-          <a:prstGeom prst="triangle">
-            <a:avLst/>
-          </a:prstGeom>
-          <a:solidFill>
-            <a:schemeClr val="accent6">
-              <a:lumMod val="75000"/>
-            </a:schemeClr>
-          </a:solidFill>
-          <a:ln w="19050">
-            <a:solidFill>
-              <a:schemeClr val="accent6">
-                <a:lumMod val="75000"/>
-              </a:schemeClr>
-            </a:solidFill>
-          </a:ln>
-          <a:effectLst/>
-        </p:spPr>
-        <p:style>
-          <a:lnRef idx="1">
-            <a:schemeClr val="accent2"/>
-          </a:lnRef>
-          <a:fillRef idx="2">
-            <a:schemeClr val="accent2"/>
-          </a:fillRef>
-          <a:effectRef idx="1">
-            <a:schemeClr val="accent2"/>
-          </a:effectRef>
-          <a:fontRef idx="minor">
-            <a:schemeClr val="dk1"/>
-          </a:fontRef>
-        </p:style>
-        <p:txBody>
-          <a:bodyPr rtlCol="0" anchor="ctr"/>
-          <a:lstStyle/>
-          <a:p>
-            <a:pPr algn="ctr"/>
-            <a:endParaRPr lang="en-SG" sz="1050">
-              <a:solidFill>
-                <a:schemeClr val="bg1"/>
-              </a:solidFill>
-            </a:endParaRPr>
-          </a:p>
-        </p:txBody>
-      </p:sp>
-      <p:sp>
-        <p:nvSpPr>
-          <p:cNvPr id="65" name="Rectangle 8"/>
-          <p:cNvSpPr/>
-          <p:nvPr/>
-        </p:nvSpPr>
-        <p:spPr>
-          <a:xfrm>
-            <a:off x="4618128" y="2558040"/>
-            <a:ext cx="1093635" cy="346760"/>
-          </a:xfrm>
-          <a:prstGeom prst="rect">
-            <a:avLst/>
-          </a:prstGeom>
-          <a:solidFill>
-            <a:schemeClr val="accent6">
-              <a:lumMod val="75000"/>
-            </a:schemeClr>
-          </a:solidFill>
-          <a:ln w="19050">
-            <a:solidFill>
-              <a:schemeClr val="accent6">
-                <a:lumMod val="75000"/>
-              </a:schemeClr>
-            </a:solidFill>
-          </a:ln>
-          <a:effectLst/>
-        </p:spPr>
-        <p:style>
-          <a:lnRef idx="1">
-            <a:schemeClr val="accent2"/>
-          </a:lnRef>
-          <a:fillRef idx="2">
-            <a:schemeClr val="accent2"/>
-          </a:fillRef>
-          <a:effectRef idx="1">
-            <a:schemeClr val="accent2"/>
-          </a:effectRef>
-          <a:fontRef idx="minor">
-            <a:schemeClr val="dk1"/>
-          </a:fontRef>
-        </p:style>
-        <p:txBody>
-          <a:bodyPr rtlCol="0" anchor="ctr"/>
-          <a:lstStyle/>
-          <a:p>
-            <a:pPr algn="ctr"/>
-            <a:r>
-              <a:rPr lang="en-US" sz="1050" dirty="0" err="1">
-                <a:solidFill>
-                  <a:schemeClr val="bg1"/>
-                </a:solidFill>
-              </a:rPr>
-              <a:t>JsonUserPrefs</a:t>
-            </a:r>
-            <a:br>
-              <a:rPr lang="en-US" sz="1050" dirty="0">
-                <a:solidFill>
-                  <a:schemeClr val="bg1"/>
-                </a:solidFill>
-              </a:rPr>
-            </a:br>
-            <a:r>
-              <a:rPr lang="en-US" sz="1050" dirty="0">
-                <a:solidFill>
-                  <a:schemeClr val="bg1"/>
-                </a:solidFill>
-              </a:rPr>
-              <a:t>Storage</a:t>
-            </a:r>
-            <a:endParaRPr lang="en-SG" sz="1050" dirty="0">
-              <a:solidFill>
-                <a:schemeClr val="bg1"/>
-              </a:solidFill>
-            </a:endParaRPr>
-          </a:p>
-        </p:txBody>
-      </p:sp>
-      <p:sp>
-        <p:nvSpPr>
-          <p:cNvPr id="66" name="Rectangle 8"/>
-          <p:cNvSpPr/>
-          <p:nvPr/>
-        </p:nvSpPr>
-        <p:spPr>
-          <a:xfrm>
-            <a:off x="6019800" y="3160410"/>
-            <a:ext cx="1200707" cy="346760"/>
-          </a:xfrm>
-          <a:prstGeom prst="rect">
-            <a:avLst/>
-          </a:prstGeom>
-          <a:ln w="19050"/>
-          <a:effectLst/>
-        </p:spPr>
-        <p:style>
-          <a:lnRef idx="1">
-            <a:schemeClr val="accent6"/>
-          </a:lnRef>
-          <a:fillRef idx="2">
-            <a:schemeClr val="accent6"/>
-          </a:fillRef>
-          <a:effectRef idx="1">
-            <a:schemeClr val="accent6"/>
-          </a:effectRef>
-          <a:fontRef idx="minor">
-            <a:schemeClr val="dk1"/>
-          </a:fontRef>
-        </p:style>
-        <p:txBody>
-          <a:bodyPr rtlCol="0" anchor="ctr"/>
-          <a:lstStyle/>
-          <a:p>
-            <a:pPr algn="ctr"/>
-            <a:r>
-              <a:rPr lang="en-US" sz="1050" b="1" dirty="0" err="1">
-                <a:solidFill>
-                  <a:schemeClr val="accent6">
-                    <a:lumMod val="75000"/>
-                  </a:schemeClr>
-                </a:solidFill>
-              </a:rPr>
-              <a:t>XmlSerializable</a:t>
-            </a:r>
-            <a:br>
-              <a:rPr lang="en-US" sz="1050" b="1" dirty="0">
-                <a:solidFill>
-                  <a:schemeClr val="accent6">
-                    <a:lumMod val="75000"/>
-                  </a:schemeClr>
-                </a:solidFill>
-              </a:rPr>
-            </a:br>
-            <a:r>
-              <a:rPr lang="en-US" sz="1050" b="1" dirty="0" err="1">
-                <a:solidFill>
-                  <a:schemeClr val="accent6">
-                    <a:lumMod val="75000"/>
-                  </a:schemeClr>
-                </a:solidFill>
-              </a:rPr>
-              <a:t>TodoList</a:t>
-            </a:r>
-            <a:endParaRPr lang="en-SG" sz="1050" b="1" dirty="0">
-              <a:solidFill>
-                <a:schemeClr val="accent6">
-                  <a:lumMod val="75000"/>
-                </a:schemeClr>
-              </a:solidFill>
-            </a:endParaRPr>
-          </a:p>
-        </p:txBody>
-      </p:sp>
-      <p:cxnSp>
-        <p:nvCxnSpPr>
-          <p:cNvPr id="70" name="Elbow Connector 122"/>
-          <p:cNvCxnSpPr>
-            <a:stCxn id="74" idx="0"/>
-            <a:endCxn id="73" idx="2"/>
-          </p:cNvCxnSpPr>
-          <p:nvPr/>
-        </p:nvCxnSpPr>
-        <p:spPr>
-          <a:xfrm rot="5400000" flipH="1" flipV="1">
-            <a:off x="8077993" y="2992020"/>
-            <a:ext cx="335208" cy="12700"/>
-          </a:xfrm>
-          <a:prstGeom prst="bentConnector3">
-            <a:avLst>
-              <a:gd name="adj1" fmla="val 50000"/>
-            </a:avLst>
-          </a:prstGeom>
-          <a:ln w="19050">
-            <a:prstDash val="sysDot"/>
-            <a:headEnd type="none" w="med" len="med"/>
-            <a:tailEnd type="arrow" w="med" len="med"/>
-          </a:ln>
-          <a:effectLst/>
-        </p:spPr>
-        <p:style>
-          <a:lnRef idx="1">
-            <a:schemeClr val="accent6"/>
-          </a:lnRef>
-          <a:fillRef idx="2">
-            <a:schemeClr val="accent6"/>
-          </a:fillRef>
-          <a:effectRef idx="1">
-            <a:schemeClr val="accent6"/>
-          </a:effectRef>
-          <a:fontRef idx="minor">
-            <a:schemeClr val="dk1"/>
-          </a:fontRef>
-        </p:style>
-      </p:cxnSp>
-      <p:sp>
-        <p:nvSpPr>
-          <p:cNvPr id="73" name="Rectangle 8"/>
-          <p:cNvSpPr/>
-          <p:nvPr/>
-        </p:nvSpPr>
-        <p:spPr>
-          <a:xfrm>
-            <a:off x="7615738" y="2477656"/>
-            <a:ext cx="1259718" cy="346760"/>
-          </a:xfrm>
-          <a:prstGeom prst="rect">
-            <a:avLst/>
-          </a:prstGeom>
-          <a:ln w="19050"/>
-          <a:effectLst/>
-        </p:spPr>
-        <p:style>
-          <a:lnRef idx="1">
-            <a:schemeClr val="accent6"/>
-          </a:lnRef>
-          <a:fillRef idx="2">
-            <a:schemeClr val="accent6"/>
-          </a:fillRef>
-          <a:effectRef idx="1">
-            <a:schemeClr val="accent6"/>
-          </a:effectRef>
-          <a:fontRef idx="minor">
-            <a:schemeClr val="dk1"/>
-          </a:fontRef>
-        </p:style>
-        <p:txBody>
-          <a:bodyPr rtlCol="0" anchor="ctr"/>
-          <a:lstStyle/>
-          <a:p>
-            <a:pPr algn="ctr"/>
-            <a:r>
-              <a:rPr lang="en-US" sz="1050" b="1" dirty="0" err="1">
-                <a:solidFill>
-                  <a:schemeClr val="accent6">
-                    <a:lumMod val="75000"/>
-                  </a:schemeClr>
-                </a:solidFill>
-              </a:rPr>
-              <a:t>XmlAdaptedTag</a:t>
-            </a:r>
-            <a:endParaRPr lang="en-SG" sz="1050" b="1" dirty="0">
-              <a:solidFill>
-                <a:schemeClr val="accent6">
-                  <a:lumMod val="75000"/>
-                </a:schemeClr>
-              </a:solidFill>
-            </a:endParaRPr>
-          </a:p>
-        </p:txBody>
-      </p:sp>
-      <p:sp>
-        <p:nvSpPr>
-          <p:cNvPr id="74" name="Rectangle 8"/>
-          <p:cNvSpPr/>
-          <p:nvPr/>
-        </p:nvSpPr>
-        <p:spPr>
-          <a:xfrm>
-            <a:off x="7615738" y="3159624"/>
-            <a:ext cx="1259718" cy="346760"/>
-          </a:xfrm>
-          <a:prstGeom prst="rect">
-            <a:avLst/>
-          </a:prstGeom>
-          <a:ln w="19050"/>
-          <a:effectLst/>
-        </p:spPr>
-        <p:style>
-          <a:lnRef idx="1">
-            <a:schemeClr val="accent6"/>
-          </a:lnRef>
-          <a:fillRef idx="2">
-            <a:schemeClr val="accent6"/>
-          </a:fillRef>
-          <a:effectRef idx="1">
-            <a:schemeClr val="accent6"/>
-          </a:effectRef>
-          <a:fontRef idx="minor">
-            <a:schemeClr val="dk1"/>
-          </a:fontRef>
-        </p:style>
-        <p:txBody>
-          <a:bodyPr rtlCol="0" anchor="ctr"/>
-          <a:lstStyle/>
-          <a:p>
-            <a:pPr algn="ctr"/>
-            <a:r>
-              <a:rPr lang="en-US" sz="1050" b="1" dirty="0" err="1">
-                <a:solidFill>
-                  <a:schemeClr val="accent6">
-                    <a:lumMod val="75000"/>
-                  </a:schemeClr>
-                </a:solidFill>
-              </a:rPr>
-              <a:t>XmlAdaptedTodo</a:t>
-            </a:r>
-            <a:endParaRPr lang="en-SG" sz="1050" b="1" dirty="0">
-              <a:solidFill>
-                <a:schemeClr val="accent6">
-                  <a:lumMod val="75000"/>
-                </a:schemeClr>
-              </a:solidFill>
-            </a:endParaRPr>
-          </a:p>
-        </p:txBody>
-      </p:sp>
-      <p:cxnSp>
-        <p:nvCxnSpPr>
-          <p:cNvPr id="77" name="Elbow Connector 122"/>
-          <p:cNvCxnSpPr>
-            <a:stCxn id="66" idx="3"/>
-            <a:endCxn id="74" idx="1"/>
-          </p:cNvCxnSpPr>
-          <p:nvPr/>
-        </p:nvCxnSpPr>
-        <p:spPr>
-          <a:xfrm flipV="1">
-            <a:off x="7220507" y="3333004"/>
-            <a:ext cx="395231" cy="786"/>
-          </a:xfrm>
-          <a:prstGeom prst="bentConnector3">
-            <a:avLst>
-              <a:gd name="adj1" fmla="val 50000"/>
-            </a:avLst>
-          </a:prstGeom>
-          <a:ln w="19050">
-            <a:prstDash val="sysDot"/>
-            <a:headEnd type="none" w="med" len="med"/>
-            <a:tailEnd type="arrow" w="med" len="med"/>
-          </a:ln>
-          <a:effectLst/>
-        </p:spPr>
-        <p:style>
-          <a:lnRef idx="1">
-            <a:schemeClr val="accent6"/>
-          </a:lnRef>
-          <a:fillRef idx="2">
-            <a:schemeClr val="accent6"/>
-          </a:fillRef>
-          <a:effectRef idx="1">
-            <a:schemeClr val="accent6"/>
-          </a:effectRef>
-          <a:fontRef idx="minor">
-            <a:schemeClr val="dk1"/>
-          </a:fontRef>
-        </p:style>
-      </p:cxnSp>
-    </p:spTree>
-    <p:extLst>
-      <p:ext uri="{BB962C8B-B14F-4D97-AF65-F5344CB8AC3E}">
-        <p14:creationId xmlns:p14="http://schemas.microsoft.com/office/powerpoint/2010/main" val="1478832369"/>
-      </p:ext>
-    </p:extLst>
-  </p:cSld>
-  <p:clrMapOvr>
-    <a:masterClrMapping/>
-  </p:clrMapOvr>
-</p:sld>
-</file>
-
-<file path=ppt/slides/slide11.xml><?xml version="1.0" encoding="utf-8"?>
-<p:sld xmlns:a="http://schemas.openxmlformats.org/drawingml/2006/main" xmlns:r="http://schemas.openxmlformats.org/officeDocument/2006/relationships" xmlns:p="http://schemas.openxmlformats.org/presentationml/2006/main">
-  <p:cSld>
-    <p:spTree>
-      <p:nvGrpSpPr>
-        <p:cNvPr id="1" name=""/>
-        <p:cNvGrpSpPr/>
-        <p:nvPr/>
-      </p:nvGrpSpPr>
-      <p:grpSpPr>
-        <a:xfrm>
-          <a:off x="0" y="0"/>
-          <a:ext cx="0" cy="0"/>
-          <a:chOff x="0" y="0"/>
-          <a:chExt cx="0" cy="0"/>
-        </a:xfrm>
-      </p:grpSpPr>
-    </p:spTree>
-    <p:extLst>
-      <p:ext uri="{BB962C8B-B14F-4D97-AF65-F5344CB8AC3E}">
-        <p14:creationId xmlns:p14="http://schemas.microsoft.com/office/powerpoint/2010/main" val="2978036214"/>
-      </p:ext>
-    </p:extLst>
-  </p:cSld>
-  <p:clrMapOvr>
-    <a:masterClrMapping/>
-  </p:clrMapOvr>
-</p:sld>
-</file>
-
 <file path=ppt/slides/slide2.xml><?xml version="1.0" encoding="utf-8"?>
 <p:sld xmlns:a="http://schemas.openxmlformats.org/drawingml/2006/main" xmlns:r="http://schemas.openxmlformats.org/officeDocument/2006/relationships" xmlns:p="http://schemas.openxmlformats.org/presentationml/2006/main">
   <p:cSld>
@@ -20047,10 +18628,9 @@
             </a:prstGeom>
             <a:ln w="19050">
               <a:solidFill>
-                <a:schemeClr val="accent1">
-                  <a:lumMod val="60000"/>
-                  <a:lumOff val="40000"/>
-                </a:schemeClr>
+                <a:srgbClr val="7030A0">
+                  <a:alpha val="50000"/>
+                </a:srgbClr>
               </a:solidFill>
               <a:prstDash val="sysDash"/>
               <a:tailEnd type="arrow"/>
@@ -20089,10 +18669,9 @@
             </a:prstGeom>
             <a:ln w="19050">
               <a:solidFill>
-                <a:schemeClr val="accent1">
-                  <a:lumMod val="60000"/>
-                  <a:lumOff val="40000"/>
-                </a:schemeClr>
+                <a:srgbClr val="7030A0">
+                  <a:alpha val="50000"/>
+                </a:srgbClr>
               </a:solidFill>
               <a:prstDash val="sysDash"/>
               <a:tailEnd type="arrow"/>
@@ -20131,10 +18710,9 @@
             </a:prstGeom>
             <a:ln w="19050">
               <a:solidFill>
-                <a:schemeClr val="accent1">
-                  <a:lumMod val="60000"/>
-                  <a:lumOff val="40000"/>
-                </a:schemeClr>
+                <a:srgbClr val="7030A0">
+                  <a:alpha val="50000"/>
+                </a:srgbClr>
               </a:solidFill>
               <a:prstDash val="sysDash"/>
               <a:tailEnd type="arrow"/>
@@ -20164,7 +18742,7 @@
         </p:nvSpPr>
         <p:spPr>
           <a:xfrm>
-            <a:off x="5300818" y="2419901"/>
+            <a:off x="5179701" y="2408641"/>
             <a:ext cx="728806" cy="230832"/>
           </a:xfrm>
           <a:prstGeom prst="rect">
@@ -22001,25 +20579,81 @@
       </p:grpSpPr>
       <p:sp>
         <p:nvSpPr>
-          <p:cNvPr id="2" name="Rectangle 8"/>
+          <p:cNvPr id="2" name="Rectangle 65"/>
           <p:cNvSpPr/>
           <p:nvPr/>
         </p:nvSpPr>
         <p:spPr>
           <a:xfrm>
-            <a:off x="2877180" y="3158440"/>
-            <a:ext cx="1093635" cy="346760"/>
-          </a:xfrm>
-          <a:prstGeom prst="rect">
-            <a:avLst/>
+            <a:off x="565994" y="1258779"/>
+            <a:ext cx="5829748" cy="3315564"/>
+          </a:xfrm>
+          <a:prstGeom prst="roundRect">
+            <a:avLst>
+              <a:gd name="adj" fmla="val 3484"/>
+            </a:avLst>
           </a:prstGeom>
           <a:solidFill>
-            <a:srgbClr val="7030A0"/>
+            <a:srgbClr val="F1F5E9"/>
           </a:solidFill>
           <a:ln w="19050">
-            <a:solidFill>
-              <a:srgbClr val="7030A0"/>
-            </a:solidFill>
+            <a:noFill/>
+          </a:ln>
+          <a:effectLst/>
+        </p:spPr>
+        <p:style>
+          <a:lnRef idx="1">
+            <a:schemeClr val="accent2"/>
+          </a:lnRef>
+          <a:fillRef idx="2">
+            <a:schemeClr val="accent2"/>
+          </a:fillRef>
+          <a:effectRef idx="1">
+            <a:schemeClr val="accent2"/>
+          </a:effectRef>
+          <a:fontRef idx="minor">
+            <a:schemeClr val="dk1"/>
+          </a:fontRef>
+        </p:style>
+        <p:txBody>
+          <a:bodyPr rtlCol="0" anchor="t"/>
+          <a:lstStyle/>
+          <a:p>
+            <a:r>
+              <a:rPr lang="en-US" sz="2400" b="1" dirty="0">
+                <a:solidFill>
+                  <a:srgbClr val="E46C0A"/>
+                </a:solidFill>
+              </a:rPr>
+              <a:t>Storage</a:t>
+            </a:r>
+            <a:endParaRPr lang="en-SG" sz="2400" b="1" dirty="0">
+              <a:solidFill>
+                <a:srgbClr val="E46C0A"/>
+              </a:solidFill>
+            </a:endParaRPr>
+          </a:p>
+        </p:txBody>
+      </p:sp>
+      <p:sp>
+        <p:nvSpPr>
+          <p:cNvPr id="4" name="Rectangle 62"/>
+          <p:cNvSpPr/>
+          <p:nvPr/>
+        </p:nvSpPr>
+        <p:spPr>
+          <a:xfrm>
+            <a:off x="1943850" y="1770924"/>
+            <a:ext cx="1242627" cy="346760"/>
+          </a:xfrm>
+          <a:prstGeom prst="rect">
+            <a:avLst/>
+          </a:prstGeom>
+          <a:solidFill>
+            <a:srgbClr val="E46C0A"/>
+          </a:solidFill>
+          <a:ln w="0">
+            <a:noFill/>
           </a:ln>
           <a:effectLst/>
         </p:spPr>
@@ -22048,7 +20682,7 @@
                   <a:schemeClr val="bg1"/>
                 </a:solidFill>
               </a:rPr>
-              <a:t>UserPref</a:t>
+              <a:t>StorageManager</a:t>
             </a:r>
             <a:endParaRPr lang="en-SG" sz="1050" dirty="0">
               <a:solidFill>
@@ -22060,152 +20694,7 @@
       </p:sp>
       <p:sp>
         <p:nvSpPr>
-          <p:cNvPr id="9" name="Rectangle 62"/>
-          <p:cNvSpPr/>
-          <p:nvPr/>
-        </p:nvSpPr>
-        <p:spPr>
-          <a:xfrm rot="16200000">
-            <a:off x="1683963" y="2868687"/>
-            <a:ext cx="1093635" cy="346760"/>
-          </a:xfrm>
-          <a:prstGeom prst="rect">
-            <a:avLst/>
-          </a:prstGeom>
-          <a:solidFill>
-            <a:srgbClr val="7030A0"/>
-          </a:solidFill>
-          <a:ln w="19050">
-            <a:solidFill>
-              <a:srgbClr val="7030A0"/>
-            </a:solidFill>
-          </a:ln>
-          <a:effectLst/>
-        </p:spPr>
-        <p:style>
-          <a:lnRef idx="1">
-            <a:schemeClr val="accent2"/>
-          </a:lnRef>
-          <a:fillRef idx="2">
-            <a:schemeClr val="accent2"/>
-          </a:fillRef>
-          <a:effectRef idx="1">
-            <a:schemeClr val="accent2"/>
-          </a:effectRef>
-          <a:fontRef idx="minor">
-            <a:schemeClr val="dk1"/>
-          </a:fontRef>
-        </p:style>
-        <p:txBody>
-          <a:bodyPr rtlCol="0" anchor="ctr"/>
-          <a:lstStyle/>
-          <a:p>
-            <a:pPr algn="ctr"/>
-            <a:r>
-              <a:rPr lang="en-US" sz="1050" dirty="0" err="1">
-                <a:solidFill>
-                  <a:schemeClr val="bg1"/>
-                </a:solidFill>
-              </a:rPr>
-              <a:t>ModelManager</a:t>
-            </a:r>
-            <a:endParaRPr lang="en-SG" sz="1050" dirty="0">
-              <a:solidFill>
-                <a:schemeClr val="bg1"/>
-              </a:solidFill>
-            </a:endParaRPr>
-          </a:p>
-        </p:txBody>
-      </p:sp>
-      <p:cxnSp>
-        <p:nvCxnSpPr>
-          <p:cNvPr id="53" name="Elbow Connector 63"/>
-          <p:cNvCxnSpPr>
-            <a:stCxn id="71" idx="3"/>
-            <a:endCxn id="62" idx="2"/>
-          </p:cNvCxnSpPr>
-          <p:nvPr/>
-        </p:nvCxnSpPr>
-        <p:spPr>
-          <a:xfrm flipV="1">
-            <a:off x="6477000" y="2952155"/>
-            <a:ext cx="188848" cy="658490"/>
-          </a:xfrm>
-          <a:prstGeom prst="bentConnector2">
-            <a:avLst/>
-          </a:prstGeom>
-          <a:ln w="19050">
-            <a:solidFill>
-              <a:srgbClr val="7030A0"/>
-            </a:solidFill>
-            <a:prstDash val="sysDot"/>
-            <a:headEnd type="none" w="med" len="med"/>
-            <a:tailEnd type="none" w="med" len="med"/>
-          </a:ln>
-          <a:effectLst/>
-        </p:spPr>
-        <p:style>
-          <a:lnRef idx="1">
-            <a:schemeClr val="accent2"/>
-          </a:lnRef>
-          <a:fillRef idx="2">
-            <a:schemeClr val="accent2"/>
-          </a:fillRef>
-          <a:effectRef idx="1">
-            <a:schemeClr val="accent2"/>
-          </a:effectRef>
-          <a:fontRef idx="minor">
-            <a:schemeClr val="dk1"/>
-          </a:fontRef>
-        </p:style>
-      </p:cxnSp>
-      <p:cxnSp>
-        <p:nvCxnSpPr>
-          <p:cNvPr id="107" name="Elbow Connector 106"/>
-          <p:cNvCxnSpPr>
-            <a:stCxn id="9" idx="1"/>
-          </p:cNvCxnSpPr>
-          <p:nvPr/>
-        </p:nvCxnSpPr>
-        <p:spPr>
-          <a:xfrm rot="5400000" flipH="1" flipV="1">
-            <a:off x="4242165" y="939993"/>
-            <a:ext cx="637507" cy="4660277"/>
-          </a:xfrm>
-          <a:prstGeom prst="bentConnector4">
-            <a:avLst>
-              <a:gd name="adj1" fmla="val -62819"/>
-              <a:gd name="adj2" fmla="val 99978"/>
-            </a:avLst>
-          </a:prstGeom>
-          <a:ln w="19050">
-            <a:solidFill>
-              <a:srgbClr val="7030A0"/>
-            </a:solidFill>
-            <a:prstDash val="solid"/>
-            <a:headEnd type="none" w="med" len="med"/>
-            <a:tailEnd type="arrow" w="med" len="med"/>
-          </a:ln>
-          <a:effectLst/>
-        </p:spPr>
-        <p:style>
-          <a:lnRef idx="1">
-            <a:schemeClr val="accent2"/>
-          </a:lnRef>
-          <a:fillRef idx="2">
-            <a:schemeClr val="accent2"/>
-          </a:fillRef>
-          <a:effectRef idx="1">
-            <a:schemeClr val="accent2"/>
-          </a:effectRef>
-          <a:fontRef idx="minor">
-            <a:schemeClr val="dk1"/>
-          </a:fontRef>
-        </p:style>
-      </p:cxnSp>
-      <p:sp>
-        <p:nvSpPr>
-          <p:cNvPr id="119" name="Rectangle 62"/>
+          <p:cNvPr id="6" name="Rectangle 62"/>
           <p:cNvSpPr/>
           <p:nvPr/>
         </p:nvSpPr>
@@ -22218,12 +20707,10 @@
             <a:avLst/>
           </a:prstGeom>
           <a:solidFill>
-            <a:srgbClr val="7030A0"/>
+            <a:srgbClr val="E46C0A"/>
           </a:solidFill>
-          <a:ln w="19050">
-            <a:solidFill>
-              <a:srgbClr val="7030A0"/>
-            </a:solidFill>
+          <a:ln w="0">
+            <a:noFill/>
           </a:ln>
           <a:effectLst/>
         </p:spPr>
@@ -22263,7 +20750,7 @@
                   <a:schemeClr val="bg1"/>
                 </a:solidFill>
               </a:rPr>
-              <a:t>Model</a:t>
+              <a:t>Storage</a:t>
             </a:r>
             <a:endParaRPr lang="en-SG" sz="1050" dirty="0">
               <a:solidFill>
@@ -22275,167 +20762,37 @@
       </p:sp>
       <p:sp>
         <p:nvSpPr>
-          <p:cNvPr id="120" name="Isosceles Triangle 102"/>
+          <p:cNvPr id="7" name="Isosceles Triangle 102"/>
           <p:cNvSpPr/>
           <p:nvPr/>
         </p:nvSpPr>
         <p:spPr>
-          <a:xfrm rot="16200000">
-            <a:off x="1626910" y="2952291"/>
+          <a:xfrm flipV="1">
+            <a:off x="1367767" y="2286001"/>
             <a:ext cx="270504" cy="175523"/>
           </a:xfrm>
           <a:prstGeom prst="triangle">
             <a:avLst/>
           </a:prstGeom>
           <a:solidFill>
-            <a:srgbClr val="7030A0"/>
+            <a:srgbClr val="F1F5E9"/>
           </a:solidFill>
           <a:ln w="19050">
             <a:solidFill>
-              <a:srgbClr val="7030A0"/>
+              <a:srgbClr val="E46C0A"/>
             </a:solidFill>
           </a:ln>
           <a:effectLst/>
         </p:spPr>
         <p:style>
           <a:lnRef idx="1">
-            <a:schemeClr val="accent6"/>
+            <a:schemeClr val="accent3"/>
           </a:lnRef>
           <a:fillRef idx="2">
-            <a:schemeClr val="accent6"/>
+            <a:schemeClr val="accent3"/>
           </a:fillRef>
           <a:effectRef idx="1">
-            <a:schemeClr val="accent6"/>
-          </a:effectRef>
-          <a:fontRef idx="minor">
-            <a:schemeClr val="dk1"/>
-          </a:fontRef>
-        </p:style>
-        <p:txBody>
-          <a:bodyPr rtlCol="0" anchor="ctr"/>
-          <a:lstStyle/>
-          <a:p>
-            <a:pPr algn="ctr"/>
-            <a:endParaRPr lang="en-SG" sz="1050"/>
-          </a:p>
-        </p:txBody>
-      </p:sp>
-      <p:cxnSp>
-        <p:nvCxnSpPr>
-          <p:cNvPr id="55" name="Straight Arrow Connector 54"/>
-          <p:cNvCxnSpPr>
-            <a:stCxn id="62" idx="0"/>
-            <a:endCxn id="67" idx="2"/>
-          </p:cNvCxnSpPr>
-          <p:nvPr/>
-        </p:nvCxnSpPr>
-        <p:spPr>
-          <a:xfrm flipV="1">
-            <a:off x="6665848" y="2379673"/>
-            <a:ext cx="1612" cy="225722"/>
-          </a:xfrm>
-          <a:prstGeom prst="straightConnector1">
-            <a:avLst/>
-          </a:prstGeom>
-          <a:ln w="19050">
-            <a:solidFill>
-              <a:srgbClr val="7030A0"/>
-            </a:solidFill>
-            <a:prstDash val="sysDot"/>
-            <a:headEnd type="none" w="med" len="med"/>
-            <a:tailEnd type="arrow" w="med" len="med"/>
-          </a:ln>
-          <a:effectLst/>
-        </p:spPr>
-        <p:style>
-          <a:lnRef idx="1">
-            <a:schemeClr val="accent2"/>
-          </a:lnRef>
-          <a:fillRef idx="2">
-            <a:schemeClr val="accent2"/>
-          </a:fillRef>
-          <a:effectRef idx="1">
-            <a:schemeClr val="accent2"/>
-          </a:effectRef>
-          <a:fontRef idx="minor">
-            <a:schemeClr val="dk1"/>
-          </a:fontRef>
-        </p:style>
-      </p:cxnSp>
-      <p:cxnSp>
-        <p:nvCxnSpPr>
-          <p:cNvPr id="58" name="Straight Arrow Connector 57"/>
-          <p:cNvCxnSpPr>
-            <a:stCxn id="42" idx="3"/>
-            <a:endCxn id="2" idx="1"/>
-          </p:cNvCxnSpPr>
-          <p:nvPr/>
-        </p:nvCxnSpPr>
-        <p:spPr>
-          <a:xfrm>
-            <a:off x="2656370" y="3326536"/>
-            <a:ext cx="220810" cy="5284"/>
-          </a:xfrm>
-          <a:prstGeom prst="straightConnector1">
-            <a:avLst/>
-          </a:prstGeom>
-          <a:ln w="19050">
-            <a:solidFill>
-              <a:srgbClr val="7030A0"/>
-            </a:solidFill>
-            <a:headEnd type="none" w="med" len="med"/>
-            <a:tailEnd type="arrow" w="med" len="med"/>
-          </a:ln>
-          <a:effectLst/>
-        </p:spPr>
-        <p:style>
-          <a:lnRef idx="1">
-            <a:schemeClr val="accent2"/>
-          </a:lnRef>
-          <a:fillRef idx="2">
-            <a:schemeClr val="accent2"/>
-          </a:fillRef>
-          <a:effectRef idx="1">
-            <a:schemeClr val="accent2"/>
-          </a:effectRef>
-          <a:fontRef idx="minor">
-            <a:schemeClr val="dk1"/>
-          </a:fontRef>
-        </p:style>
-      </p:cxnSp>
-      <p:sp>
-        <p:nvSpPr>
-          <p:cNvPr id="71" name="Isosceles Triangle 102"/>
-          <p:cNvSpPr/>
-          <p:nvPr/>
-        </p:nvSpPr>
-        <p:spPr>
-          <a:xfrm rot="5400000" flipV="1">
-            <a:off x="6253986" y="3522883"/>
-            <a:ext cx="270504" cy="175523"/>
-          </a:xfrm>
-          <a:prstGeom prst="triangle">
-            <a:avLst/>
-          </a:prstGeom>
-          <a:solidFill>
-            <a:srgbClr val="7030A0"/>
-          </a:solidFill>
-          <a:ln w="19050">
-            <a:solidFill>
-              <a:srgbClr val="7030A0"/>
-            </a:solidFill>
-          </a:ln>
-          <a:effectLst/>
-        </p:spPr>
-        <p:style>
-          <a:lnRef idx="1">
-            <a:schemeClr val="accent4"/>
-          </a:lnRef>
-          <a:fillRef idx="2">
-            <a:schemeClr val="accent4"/>
-          </a:fillRef>
-          <a:effectRef idx="1">
-            <a:schemeClr val="accent4"/>
+            <a:schemeClr val="accent3"/>
           </a:effectRef>
           <a:fontRef idx="minor">
             <a:schemeClr val="dk1"/>
@@ -22448,7 +20805,7 @@
             <a:pPr algn="ctr"/>
             <a:endParaRPr lang="en-SG" sz="1050" b="1">
               <a:solidFill>
-                <a:srgbClr val="92D050"/>
+                <a:srgbClr val="0070C0"/>
               </a:solidFill>
             </a:endParaRPr>
           </a:p>
@@ -22456,14 +20813,16 @@
       </p:sp>
       <p:cxnSp>
         <p:nvCxnSpPr>
-          <p:cNvPr id="75" name="Elbow Connector 122"/>
-          <p:cNvCxnSpPr/>
+          <p:cNvPr id="11" name="Elbow Connector 137"/>
+          <p:cNvCxnSpPr>
+            <a:endCxn id="6" idx="0"/>
+          </p:cNvCxnSpPr>
           <p:nvPr/>
         </p:nvCxnSpPr>
         <p:spPr>
-          <a:xfrm>
-            <a:off x="910091" y="3040053"/>
-            <a:ext cx="419548" cy="2860"/>
+          <a:xfrm flipV="1">
+            <a:off x="442359" y="3034582"/>
+            <a:ext cx="887281" cy="682"/>
           </a:xfrm>
           <a:prstGeom prst="bentConnector3">
             <a:avLst>
@@ -22472,54 +20831,91 @@
           </a:prstGeom>
           <a:ln w="19050">
             <a:solidFill>
-              <a:schemeClr val="bg1">
-                <a:lumMod val="75000"/>
+              <a:schemeClr val="tx1">
+                <a:alpha val="25000"/>
               </a:schemeClr>
             </a:solidFill>
-            <a:prstDash val="sysDot"/>
-            <a:headEnd type="none" w="med" len="med"/>
-            <a:tailEnd type="arrow" w="med" len="med"/>
-          </a:ln>
-          <a:effectLst/>
-        </p:spPr>
-        <p:style>
-          <a:lnRef idx="1">
-            <a:schemeClr val="accent2"/>
-          </a:lnRef>
-          <a:fillRef idx="2">
-            <a:schemeClr val="accent2"/>
-          </a:fillRef>
-          <a:effectRef idx="1">
-            <a:schemeClr val="accent2"/>
-          </a:effectRef>
-          <a:fontRef idx="minor">
-            <a:schemeClr val="dk1"/>
+            <a:prstDash val="sysDash"/>
+            <a:tailEnd type="arrow"/>
+          </a:ln>
+        </p:spPr>
+        <p:style>
+          <a:lnRef idx="1">
+            <a:schemeClr val="accent1"/>
+          </a:lnRef>
+          <a:fillRef idx="0">
+            <a:schemeClr val="accent1"/>
+          </a:fillRef>
+          <a:effectRef idx="0">
+            <a:schemeClr val="accent1"/>
+          </a:effectRef>
+          <a:fontRef idx="minor">
+            <a:schemeClr val="tx1"/>
           </a:fontRef>
         </p:style>
       </p:cxnSp>
       <p:cxnSp>
         <p:nvCxnSpPr>
-          <p:cNvPr id="21" name="Straight Connector 20"/>
+          <p:cNvPr id="12" name="Elbow Connector 188"/>
           <p:cNvCxnSpPr>
-            <a:stCxn id="120" idx="3"/>
+            <a:stCxn id="4" idx="1"/>
           </p:cNvCxnSpPr>
           <p:nvPr/>
         </p:nvCxnSpPr>
         <p:spPr>
-          <a:xfrm flipV="1">
-            <a:off x="1849924" y="3040052"/>
-            <a:ext cx="216105" cy="1"/>
-          </a:xfrm>
-          <a:prstGeom prst="line">
-            <a:avLst/>
+          <a:xfrm rot="10800000" flipV="1">
+            <a:off x="1503024" y="1944304"/>
+            <a:ext cx="440827" cy="328236"/>
+          </a:xfrm>
+          <a:prstGeom prst="bentConnector3">
+            <a:avLst>
+              <a:gd name="adj1" fmla="val 104018"/>
+            </a:avLst>
           </a:prstGeom>
           <a:ln w="19050">
             <a:solidFill>
-              <a:srgbClr val="7030A0"/>
-            </a:solidFill>
-            <a:prstDash val="sysDot"/>
-            <a:headEnd type="none" w="med" len="med"/>
-            <a:tailEnd type="none" w="med" len="med"/>
+              <a:srgbClr val="E46C0A"/>
+            </a:solidFill>
+            <a:prstDash val="sysDash"/>
+            <a:tailEnd type="none"/>
+          </a:ln>
+        </p:spPr>
+        <p:style>
+          <a:lnRef idx="1">
+            <a:schemeClr val="accent1"/>
+          </a:lnRef>
+          <a:fillRef idx="0">
+            <a:schemeClr val="accent1"/>
+          </a:fillRef>
+          <a:effectRef idx="0">
+            <a:schemeClr val="accent1"/>
+          </a:effectRef>
+          <a:fontRef idx="minor">
+            <a:schemeClr val="tx1"/>
+          </a:fontRef>
+        </p:style>
+      </p:cxnSp>
+      <p:sp>
+        <p:nvSpPr>
+          <p:cNvPr id="16" name="Rectangle 65"/>
+          <p:cNvSpPr/>
+          <p:nvPr/>
+        </p:nvSpPr>
+        <p:spPr>
+          <a:xfrm rot="16200000">
+            <a:off x="6376551" y="3900299"/>
+            <a:ext cx="1000993" cy="328045"/>
+          </a:xfrm>
+          <a:prstGeom prst="roundRect">
+            <a:avLst/>
+          </a:prstGeom>
+          <a:solidFill>
+            <a:srgbClr val="31859C">
+              <a:alpha val="25000"/>
+            </a:srgbClr>
+          </a:solidFill>
+          <a:ln w="19050">
+            <a:noFill/>
           </a:ln>
           <a:effectLst/>
         </p:spPr>
@@ -22537,131 +20933,209 @@
             <a:schemeClr val="dk1"/>
           </a:fontRef>
         </p:style>
-      </p:cxnSp>
-      <p:sp>
-        <p:nvSpPr>
-          <p:cNvPr id="42" name="Flowchart: Decision 96"/>
-          <p:cNvSpPr/>
-          <p:nvPr/>
-        </p:nvSpPr>
-        <p:spPr>
-          <a:xfrm>
-            <a:off x="2420322" y="3239846"/>
-            <a:ext cx="236048" cy="173380"/>
-          </a:xfrm>
-          <a:prstGeom prst="flowChartDecision">
-            <a:avLst/>
-          </a:prstGeom>
-          <a:noFill/>
-          <a:ln w="19050">
-            <a:solidFill>
-              <a:srgbClr val="7030A0"/>
-            </a:solidFill>
-          </a:ln>
-          <a:effectLst/>
-        </p:spPr>
-        <p:style>
-          <a:lnRef idx="1">
-            <a:schemeClr val="accent6"/>
-          </a:lnRef>
-          <a:fillRef idx="2">
-            <a:schemeClr val="accent6"/>
-          </a:fillRef>
-          <a:effectRef idx="1">
-            <a:schemeClr val="accent6"/>
-          </a:effectRef>
-          <a:fontRef idx="minor">
-            <a:schemeClr val="dk1"/>
-          </a:fontRef>
-        </p:style>
         <p:txBody>
           <a:bodyPr rtlCol="0" anchor="ctr"/>
           <a:lstStyle/>
           <a:p>
             <a:pPr algn="ctr"/>
-            <a:endParaRPr lang="en-US" sz="1050"/>
-          </a:p>
-        </p:txBody>
-      </p:sp>
-      <p:sp>
-        <p:nvSpPr>
-          <p:cNvPr id="46" name="Rectangle 8"/>
-          <p:cNvSpPr/>
-          <p:nvPr/>
-        </p:nvSpPr>
-        <p:spPr>
-          <a:xfrm>
-            <a:off x="2879490" y="2627420"/>
-            <a:ext cx="1093635" cy="346760"/>
-          </a:xfrm>
-          <a:prstGeom prst="rect">
-            <a:avLst/>
-          </a:prstGeom>
-          <a:ln w="19050">
-            <a:solidFill>
-              <a:srgbClr val="7030A0"/>
-            </a:solidFill>
-          </a:ln>
-          <a:effectLst/>
-        </p:spPr>
-        <p:style>
-          <a:lnRef idx="1">
-            <a:schemeClr val="accent4"/>
-          </a:lnRef>
-          <a:fillRef idx="2">
-            <a:schemeClr val="accent4"/>
-          </a:fillRef>
-          <a:effectRef idx="1">
-            <a:schemeClr val="accent4"/>
-          </a:effectRef>
-          <a:fontRef idx="minor">
-            <a:schemeClr val="dk1"/>
-          </a:fontRef>
-        </p:style>
-        <p:txBody>
-          <a:bodyPr rtlCol="0" anchor="ctr"/>
-          <a:lstStyle/>
-          <a:p>
-            <a:pPr algn="ctr"/>
-            <a:r>
-              <a:rPr lang="en-US" sz="1050" dirty="0" err="1">
+            <a:r>
+              <a:rPr lang="en-US" sz="1100" b="1" dirty="0">
                 <a:solidFill>
-                  <a:srgbClr val="7030A0"/>
+                  <a:schemeClr val="bg1"/>
                 </a:solidFill>
               </a:rPr>
-              <a:t>TodoList</a:t>
-            </a:r>
-            <a:endParaRPr lang="en-SG" sz="1050" dirty="0">
+              <a:t>Commons</a:t>
+            </a:r>
+            <a:endParaRPr lang="en-SG" sz="1100" b="1" dirty="0">
               <a:solidFill>
-                <a:srgbClr val="7030A0"/>
+                <a:schemeClr val="bg1"/>
               </a:solidFill>
             </a:endParaRPr>
           </a:p>
         </p:txBody>
       </p:sp>
-      <p:cxnSp>
-        <p:nvCxnSpPr>
-          <p:cNvPr id="47" name="Straight Arrow Connector 46"/>
-          <p:cNvCxnSpPr>
-            <a:stCxn id="48" idx="3"/>
-            <a:endCxn id="46" idx="1"/>
-          </p:cNvCxnSpPr>
-          <p:nvPr/>
-        </p:nvCxnSpPr>
-        <p:spPr>
-          <a:xfrm>
-            <a:off x="2658680" y="2795516"/>
-            <a:ext cx="220810" cy="5284"/>
-          </a:xfrm>
-          <a:prstGeom prst="straightConnector1">
-            <a:avLst/>
-          </a:prstGeom>
+      <p:grpSp>
+        <p:nvGrpSpPr>
+          <p:cNvPr id="17" name="Group 108"/>
+          <p:cNvGrpSpPr/>
+          <p:nvPr/>
+        </p:nvGrpSpPr>
+        <p:grpSpPr>
+          <a:xfrm rot="16200000">
+            <a:off x="6418388" y="3870257"/>
+            <a:ext cx="262409" cy="346762"/>
+            <a:chOff x="6060035" y="6038840"/>
+            <a:chExt cx="268153" cy="346762"/>
+          </a:xfrm>
+        </p:grpSpPr>
+        <p:cxnSp>
+          <p:nvCxnSpPr>
+            <p:cNvPr id="18" name="Connector: Elbow 17"/>
+            <p:cNvCxnSpPr/>
+            <p:nvPr/>
+          </p:nvCxnSpPr>
+          <p:spPr>
+            <a:xfrm rot="16200000" flipH="1">
+              <a:off x="6154806" y="6212221"/>
+              <a:ext cx="346761" cy="2"/>
+            </a:xfrm>
+            <a:prstGeom prst="bentConnector3">
+              <a:avLst>
+                <a:gd name="adj1" fmla="val 50000"/>
+              </a:avLst>
+            </a:prstGeom>
+            <a:ln w="19050">
+              <a:solidFill>
+                <a:srgbClr val="E46C0A">
+                  <a:alpha val="50000"/>
+                </a:srgbClr>
+              </a:solidFill>
+              <a:prstDash val="sysDash"/>
+              <a:tailEnd type="arrow"/>
+            </a:ln>
+          </p:spPr>
+          <p:style>
+            <a:lnRef idx="1">
+              <a:schemeClr val="accent1"/>
+            </a:lnRef>
+            <a:fillRef idx="0">
+              <a:schemeClr val="accent1"/>
+            </a:fillRef>
+            <a:effectRef idx="0">
+              <a:schemeClr val="accent1"/>
+            </a:effectRef>
+            <a:fontRef idx="minor">
+              <a:schemeClr val="tx1"/>
+            </a:fontRef>
+          </p:style>
+        </p:cxnSp>
+        <p:cxnSp>
+          <p:nvCxnSpPr>
+            <p:cNvPr id="19" name="Connector: Elbow 18"/>
+            <p:cNvCxnSpPr/>
+            <p:nvPr/>
+          </p:nvCxnSpPr>
+          <p:spPr>
+            <a:xfrm rot="16200000" flipH="1">
+              <a:off x="6019470" y="6212220"/>
+              <a:ext cx="346761" cy="2"/>
+            </a:xfrm>
+            <a:prstGeom prst="bentConnector3">
+              <a:avLst>
+                <a:gd name="adj1" fmla="val 50000"/>
+              </a:avLst>
+            </a:prstGeom>
+            <a:ln w="19050">
+              <a:solidFill>
+                <a:srgbClr val="E46C0A">
+                  <a:alpha val="50000"/>
+                </a:srgbClr>
+              </a:solidFill>
+              <a:prstDash val="sysDash"/>
+              <a:tailEnd type="arrow"/>
+            </a:ln>
+          </p:spPr>
+          <p:style>
+            <a:lnRef idx="1">
+              <a:schemeClr val="accent1"/>
+            </a:lnRef>
+            <a:fillRef idx="0">
+              <a:schemeClr val="accent1"/>
+            </a:fillRef>
+            <a:effectRef idx="0">
+              <a:schemeClr val="accent1"/>
+            </a:effectRef>
+            <a:fontRef idx="minor">
+              <a:schemeClr val="tx1"/>
+            </a:fontRef>
+          </p:style>
+        </p:cxnSp>
+        <p:cxnSp>
+          <p:nvCxnSpPr>
+            <p:cNvPr id="20" name="Connector: Elbow 19"/>
+            <p:cNvCxnSpPr/>
+            <p:nvPr/>
+          </p:nvCxnSpPr>
+          <p:spPr>
+            <a:xfrm rot="16200000" flipH="1">
+              <a:off x="5886655" y="6212220"/>
+              <a:ext cx="346761" cy="2"/>
+            </a:xfrm>
+            <a:prstGeom prst="bentConnector3">
+              <a:avLst>
+                <a:gd name="adj1" fmla="val 50000"/>
+              </a:avLst>
+            </a:prstGeom>
+            <a:ln w="19050">
+              <a:solidFill>
+                <a:srgbClr val="E46C0A">
+                  <a:alpha val="50000"/>
+                </a:srgbClr>
+              </a:solidFill>
+              <a:prstDash val="sysDash"/>
+              <a:tailEnd type="arrow"/>
+            </a:ln>
+          </p:spPr>
+          <p:style>
+            <a:lnRef idx="1">
+              <a:schemeClr val="accent1"/>
+            </a:lnRef>
+            <a:fillRef idx="0">
+              <a:schemeClr val="accent1"/>
+            </a:fillRef>
+            <a:effectRef idx="0">
+              <a:schemeClr val="accent1"/>
+            </a:effectRef>
+            <a:fontRef idx="minor">
+              <a:schemeClr val="tx1"/>
+            </a:fontRef>
+          </p:style>
+        </p:cxnSp>
+      </p:grpSp>
+      <p:sp>
+        <p:nvSpPr>
+          <p:cNvPr id="60" name="Rectangle 8"/>
+          <p:cNvSpPr/>
+          <p:nvPr/>
+        </p:nvSpPr>
+        <p:spPr>
+          <a:xfrm>
+            <a:off x="2651441" y="3940186"/>
+            <a:ext cx="1323049" cy="346760"/>
+          </a:xfrm>
+          <a:prstGeom prst="rect">
+            <a:avLst/>
+          </a:prstGeom>
+          <a:gradFill>
+            <a:gsLst>
+              <a:gs pos="0">
+                <a:schemeClr val="accent6">
+                  <a:lumMod val="60000"/>
+                  <a:lumOff val="40000"/>
+                </a:schemeClr>
+              </a:gs>
+              <a:gs pos="35000">
+                <a:schemeClr val="accent6">
+                  <a:lumMod val="40000"/>
+                  <a:lumOff val="60000"/>
+                </a:schemeClr>
+              </a:gs>
+              <a:gs pos="100000">
+                <a:schemeClr val="accent3">
+                  <a:tint val="15000"/>
+                  <a:satMod val="350000"/>
+                </a:schemeClr>
+              </a:gs>
+            </a:gsLst>
+            <a:lin ang="16200000" scaled="1"/>
+          </a:gradFill>
           <a:ln w="19050">
             <a:solidFill>
-              <a:srgbClr val="7030A0"/>
-            </a:solidFill>
-            <a:headEnd type="none" w="med" len="med"/>
-            <a:tailEnd type="arrow" w="med" len="med"/>
+              <a:schemeClr val="accent6">
+                <a:lumMod val="75000"/>
+                <a:alpha val="50000"/>
+              </a:schemeClr>
+            </a:solidFill>
           </a:ln>
           <a:effectLst/>
         </p:spPr>
@@ -22679,460 +21153,37 @@
             <a:schemeClr val="dk1"/>
           </a:fontRef>
         </p:style>
-      </p:cxnSp>
-      <p:sp>
-        <p:nvSpPr>
-          <p:cNvPr id="48" name="Flowchart: Decision 96"/>
-          <p:cNvSpPr/>
-          <p:nvPr/>
-        </p:nvSpPr>
-        <p:spPr>
-          <a:xfrm>
-            <a:off x="2422632" y="2708826"/>
-            <a:ext cx="236048" cy="173380"/>
-          </a:xfrm>
-          <a:prstGeom prst="flowChartDecision">
-            <a:avLst/>
-          </a:prstGeom>
-          <a:noFill/>
-          <a:ln w="19050">
-            <a:solidFill>
-              <a:srgbClr val="7030A0"/>
-            </a:solidFill>
-          </a:ln>
-          <a:effectLst/>
-        </p:spPr>
-        <p:style>
-          <a:lnRef idx="1">
-            <a:schemeClr val="accent6"/>
-          </a:lnRef>
-          <a:fillRef idx="2">
-            <a:schemeClr val="accent6"/>
-          </a:fillRef>
-          <a:effectRef idx="1">
-            <a:schemeClr val="accent6"/>
-          </a:effectRef>
-          <a:fontRef idx="minor">
-            <a:schemeClr val="dk1"/>
-          </a:fontRef>
-        </p:style>
         <p:txBody>
           <a:bodyPr rtlCol="0" anchor="ctr"/>
           <a:lstStyle/>
           <a:p>
             <a:pPr algn="ctr"/>
-            <a:endParaRPr lang="en-US" sz="1050"/>
-          </a:p>
-        </p:txBody>
-      </p:sp>
-      <p:sp>
-        <p:nvSpPr>
-          <p:cNvPr id="49" name="Rectangle 8"/>
-          <p:cNvSpPr/>
-          <p:nvPr/>
-        </p:nvSpPr>
-        <p:spPr>
-          <a:xfrm>
-            <a:off x="4487017" y="2583815"/>
-            <a:ext cx="1156969" cy="346760"/>
-          </a:xfrm>
-          <a:prstGeom prst="rect">
-            <a:avLst/>
-          </a:prstGeom>
-          <a:ln w="19050">
-            <a:solidFill>
-              <a:srgbClr val="7030A0"/>
-            </a:solidFill>
-          </a:ln>
-          <a:effectLst/>
-        </p:spPr>
-        <p:style>
-          <a:lnRef idx="1">
-            <a:schemeClr val="accent4"/>
-          </a:lnRef>
-          <a:fillRef idx="2">
-            <a:schemeClr val="accent4"/>
-          </a:fillRef>
-          <a:effectRef idx="1">
-            <a:schemeClr val="accent4"/>
-          </a:effectRef>
-          <a:fontRef idx="minor">
-            <a:schemeClr val="dk1"/>
-          </a:fontRef>
-        </p:style>
-        <p:txBody>
-          <a:bodyPr rtlCol="0" anchor="ctr"/>
-          <a:lstStyle/>
-          <a:p>
-            <a:pPr algn="ctr"/>
-            <a:r>
-              <a:rPr lang="en-US" sz="1050" dirty="0" err="1">
+            <a:r>
+              <a:rPr lang="en-US" sz="1050" b="1" dirty="0">
                 <a:solidFill>
-                  <a:srgbClr val="7030A0"/>
-                </a:solidFill>
-              </a:rPr>
-              <a:t>UniqueTodoList</a:t>
-            </a:r>
-            <a:endParaRPr lang="en-SG" sz="1050" dirty="0">
-              <a:solidFill>
-                <a:srgbClr val="7030A0"/>
-              </a:solidFill>
-            </a:endParaRPr>
-          </a:p>
-        </p:txBody>
-      </p:sp>
-      <p:sp>
-        <p:nvSpPr>
-          <p:cNvPr id="51" name="Flowchart: Decision 96"/>
-          <p:cNvSpPr/>
-          <p:nvPr/>
-        </p:nvSpPr>
-        <p:spPr>
-          <a:xfrm>
-            <a:off x="3984303" y="2673991"/>
-            <a:ext cx="236048" cy="173380"/>
-          </a:xfrm>
-          <a:prstGeom prst="flowChartDecision">
-            <a:avLst/>
-          </a:prstGeom>
-          <a:solidFill>
-            <a:srgbClr val="7030A0"/>
-          </a:solidFill>
-          <a:ln w="19050">
-            <a:solidFill>
-              <a:srgbClr val="7030A0"/>
-            </a:solidFill>
-          </a:ln>
-          <a:effectLst/>
-        </p:spPr>
-        <p:style>
-          <a:lnRef idx="1">
-            <a:schemeClr val="accent6"/>
-          </a:lnRef>
-          <a:fillRef idx="2">
-            <a:schemeClr val="accent6"/>
-          </a:fillRef>
-          <a:effectRef idx="1">
-            <a:schemeClr val="accent6"/>
-          </a:effectRef>
-          <a:fontRef idx="minor">
-            <a:schemeClr val="dk1"/>
-          </a:fontRef>
-        </p:style>
-        <p:txBody>
-          <a:bodyPr rtlCol="0" anchor="ctr"/>
-          <a:lstStyle/>
-          <a:p>
-            <a:pPr algn="ctr"/>
-            <a:endParaRPr lang="en-US" sz="1050"/>
-          </a:p>
-        </p:txBody>
-      </p:sp>
-      <p:cxnSp>
-        <p:nvCxnSpPr>
-          <p:cNvPr id="30" name="Elbow Connector 29"/>
-          <p:cNvCxnSpPr>
-            <a:stCxn id="51" idx="3"/>
-            <a:endCxn id="49" idx="1"/>
-          </p:cNvCxnSpPr>
-          <p:nvPr/>
-        </p:nvCxnSpPr>
-        <p:spPr>
-          <a:xfrm flipV="1">
-            <a:off x="4220351" y="2757195"/>
-            <a:ext cx="266666" cy="3486"/>
-          </a:xfrm>
-          <a:prstGeom prst="bentConnector3">
-            <a:avLst/>
-          </a:prstGeom>
-          <a:ln w="19050">
-            <a:solidFill>
-              <a:srgbClr val="7030A0"/>
-            </a:solidFill>
-            <a:headEnd type="none" w="med" len="med"/>
-            <a:tailEnd type="arrow" w="med" len="med"/>
-          </a:ln>
-          <a:effectLst/>
-        </p:spPr>
-        <p:style>
-          <a:lnRef idx="1">
-            <a:schemeClr val="accent2"/>
-          </a:lnRef>
-          <a:fillRef idx="2">
-            <a:schemeClr val="accent2"/>
-          </a:fillRef>
-          <a:effectRef idx="1">
-            <a:schemeClr val="accent2"/>
-          </a:effectRef>
-          <a:fontRef idx="minor">
-            <a:schemeClr val="dk1"/>
-          </a:fontRef>
-        </p:style>
-      </p:cxnSp>
-      <p:sp>
-        <p:nvSpPr>
-          <p:cNvPr id="62" name="Rectangle 8"/>
-          <p:cNvSpPr/>
-          <p:nvPr/>
-        </p:nvSpPr>
-        <p:spPr>
-          <a:xfrm>
-            <a:off x="6311755" y="2605395"/>
-            <a:ext cx="708186" cy="346760"/>
-          </a:xfrm>
-          <a:prstGeom prst="rect">
-            <a:avLst/>
-          </a:prstGeom>
-          <a:ln w="19050">
-            <a:solidFill>
-              <a:srgbClr val="7030A0"/>
-            </a:solidFill>
-          </a:ln>
-          <a:effectLst/>
-        </p:spPr>
-        <p:style>
-          <a:lnRef idx="1">
-            <a:schemeClr val="accent4"/>
-          </a:lnRef>
-          <a:fillRef idx="2">
-            <a:schemeClr val="accent4"/>
-          </a:fillRef>
-          <a:effectRef idx="1">
-            <a:schemeClr val="accent4"/>
-          </a:effectRef>
-          <a:fontRef idx="minor">
-            <a:schemeClr val="dk1"/>
-          </a:fontRef>
-        </p:style>
-        <p:txBody>
-          <a:bodyPr rtlCol="0" anchor="ctr"/>
-          <a:lstStyle/>
-          <a:p>
-            <a:pPr algn="ctr"/>
-            <a:r>
-              <a:rPr lang="en-US" sz="1050" dirty="0" err="1">
-                <a:solidFill>
-                  <a:srgbClr val="7030A0"/>
-                </a:solidFill>
-              </a:rPr>
-              <a:t>Todo</a:t>
-            </a:r>
-            <a:endParaRPr lang="en-SG" sz="1050" dirty="0">
-              <a:solidFill>
-                <a:srgbClr val="7030A0"/>
-              </a:solidFill>
-            </a:endParaRPr>
-          </a:p>
-        </p:txBody>
-      </p:sp>
-      <p:sp>
-        <p:nvSpPr>
-          <p:cNvPr id="63" name="Flowchart: Decision 96"/>
-          <p:cNvSpPr/>
-          <p:nvPr/>
-        </p:nvSpPr>
-        <p:spPr>
-          <a:xfrm>
-            <a:off x="5641305" y="2691308"/>
-            <a:ext cx="236048" cy="173380"/>
-          </a:xfrm>
-          <a:prstGeom prst="flowChartDecision">
-            <a:avLst/>
-          </a:prstGeom>
-          <a:noFill/>
-          <a:ln w="19050">
-            <a:solidFill>
-              <a:srgbClr val="7030A0"/>
-            </a:solidFill>
-          </a:ln>
-          <a:effectLst/>
-        </p:spPr>
-        <p:style>
-          <a:lnRef idx="1">
-            <a:schemeClr val="accent6"/>
-          </a:lnRef>
-          <a:fillRef idx="2">
-            <a:schemeClr val="accent6"/>
-          </a:fillRef>
-          <a:effectRef idx="1">
-            <a:schemeClr val="accent6"/>
-          </a:effectRef>
-          <a:fontRef idx="minor">
-            <a:schemeClr val="dk1"/>
-          </a:fontRef>
-        </p:style>
-        <p:txBody>
-          <a:bodyPr rtlCol="0" anchor="ctr"/>
-          <a:lstStyle/>
-          <a:p>
-            <a:pPr algn="ctr"/>
-            <a:endParaRPr lang="en-US" sz="1050"/>
-          </a:p>
-        </p:txBody>
-      </p:sp>
-      <p:cxnSp>
-        <p:nvCxnSpPr>
-          <p:cNvPr id="64" name="Elbow Connector 63"/>
-          <p:cNvCxnSpPr>
-            <a:stCxn id="63" idx="3"/>
-            <a:endCxn id="62" idx="1"/>
-          </p:cNvCxnSpPr>
-          <p:nvPr/>
-        </p:nvCxnSpPr>
-        <p:spPr>
-          <a:xfrm>
-            <a:off x="5877353" y="2777998"/>
-            <a:ext cx="434402" cy="777"/>
-          </a:xfrm>
-          <a:prstGeom prst="bentConnector3">
-            <a:avLst/>
-          </a:prstGeom>
-          <a:ln w="19050">
-            <a:solidFill>
-              <a:srgbClr val="7030A0"/>
-            </a:solidFill>
-            <a:headEnd type="none" w="med" len="med"/>
-            <a:tailEnd type="arrow" w="med" len="med"/>
-          </a:ln>
-          <a:effectLst/>
-        </p:spPr>
-        <p:style>
-          <a:lnRef idx="1">
-            <a:schemeClr val="accent2"/>
-          </a:lnRef>
-          <a:fillRef idx="2">
-            <a:schemeClr val="accent2"/>
-          </a:fillRef>
-          <a:effectRef idx="1">
-            <a:schemeClr val="accent2"/>
-          </a:effectRef>
-          <a:fontRef idx="minor">
-            <a:schemeClr val="dk1"/>
-          </a:fontRef>
-        </p:style>
-      </p:cxnSp>
-      <p:sp>
-        <p:nvSpPr>
-          <p:cNvPr id="67" name="Rectangle 8"/>
-          <p:cNvSpPr/>
-          <p:nvPr/>
-        </p:nvSpPr>
-        <p:spPr>
-          <a:xfrm>
-            <a:off x="6313367" y="2032913"/>
-            <a:ext cx="708186" cy="346760"/>
-          </a:xfrm>
-          <a:prstGeom prst="rect">
-            <a:avLst/>
-          </a:prstGeom>
-          <a:ln w="19050">
-            <a:solidFill>
-              <a:srgbClr val="7030A0"/>
-            </a:solidFill>
-          </a:ln>
-          <a:effectLst/>
-        </p:spPr>
-        <p:style>
-          <a:lnRef idx="1">
-            <a:schemeClr val="accent4"/>
-          </a:lnRef>
-          <a:fillRef idx="2">
-            <a:schemeClr val="accent4"/>
-          </a:fillRef>
-          <a:effectRef idx="1">
-            <a:schemeClr val="accent4"/>
-          </a:effectRef>
-          <a:fontRef idx="minor">
-            <a:schemeClr val="dk1"/>
-          </a:fontRef>
-        </p:style>
-        <p:txBody>
-          <a:bodyPr rtlCol="0" anchor="ctr"/>
-          <a:lstStyle/>
-          <a:p>
-            <a:pPr algn="ctr"/>
-            <a:r>
-              <a:rPr lang="en-US" sz="1050" dirty="0">
-                <a:solidFill>
-                  <a:srgbClr val="7030A0"/>
-                </a:solidFill>
-              </a:rPr>
-              <a:t>Tag</a:t>
-            </a:r>
-            <a:endParaRPr lang="en-SG" sz="1050" dirty="0">
-              <a:solidFill>
-                <a:srgbClr val="7030A0"/>
-              </a:solidFill>
-            </a:endParaRPr>
-          </a:p>
-        </p:txBody>
-      </p:sp>
-      <p:sp>
-        <p:nvSpPr>
-          <p:cNvPr id="72" name="Rectangle 8"/>
-          <p:cNvSpPr/>
-          <p:nvPr/>
-        </p:nvSpPr>
-        <p:spPr>
-          <a:xfrm>
-            <a:off x="5128257" y="3429000"/>
-            <a:ext cx="1156969" cy="346760"/>
-          </a:xfrm>
-          <a:prstGeom prst="rect">
-            <a:avLst/>
-          </a:prstGeom>
-          <a:ln w="19050">
-            <a:solidFill>
-              <a:srgbClr val="7030A0"/>
-            </a:solidFill>
-          </a:ln>
-          <a:effectLst/>
-        </p:spPr>
-        <p:style>
-          <a:lnRef idx="1">
-            <a:schemeClr val="accent4"/>
-          </a:lnRef>
-          <a:fillRef idx="2">
-            <a:schemeClr val="accent4"/>
-          </a:fillRef>
-          <a:effectRef idx="1">
-            <a:schemeClr val="accent4"/>
-          </a:effectRef>
-          <a:fontRef idx="minor">
-            <a:schemeClr val="dk1"/>
-          </a:fontRef>
-        </p:style>
-        <p:txBody>
-          <a:bodyPr rtlCol="0" anchor="ctr"/>
-          <a:lstStyle/>
-          <a:p>
-            <a:pPr algn="ctr"/>
-            <a:r>
-              <a:rPr lang="en-US" sz="1050" dirty="0">
-                <a:solidFill>
-                  <a:srgbClr val="7030A0"/>
+                  <a:srgbClr val="E46C0A"/>
                 </a:solidFill>
               </a:rPr>
               <a:t>&lt;&lt;interface&gt;&gt;</a:t>
             </a:r>
             <a:br>
-              <a:rPr lang="en-US" sz="1050" dirty="0">
+              <a:rPr lang="en-US" sz="1050" b="1" dirty="0">
                 <a:solidFill>
-                  <a:srgbClr val="7030A0"/>
+                  <a:srgbClr val="E46C0A"/>
                 </a:solidFill>
               </a:rPr>
             </a:br>
             <a:r>
-              <a:rPr lang="en-US" sz="1050" dirty="0" err="1">
+              <a:rPr lang="en-US" sz="1050" b="1" dirty="0" err="1">
                 <a:solidFill>
-                  <a:srgbClr val="7030A0"/>
+                  <a:srgbClr val="E46C0A"/>
                 </a:solidFill>
               </a:rPr>
-              <a:t>ReadOnlyTodo</a:t>
-            </a:r>
-            <a:endParaRPr lang="en-SG" sz="1050" dirty="0">
+              <a:t>ToDoListStorage</a:t>
+            </a:r>
+            <a:endParaRPr lang="en-SG" sz="1050" b="1" dirty="0">
               <a:solidFill>
-                <a:srgbClr val="7030A0"/>
+                <a:srgbClr val="E46C0A"/>
               </a:solidFill>
             </a:endParaRPr>
           </a:p>
@@ -23140,37 +21191,245 @@
       </p:sp>
       <p:sp>
         <p:nvSpPr>
-          <p:cNvPr id="78" name="Flowchart: Decision 96"/>
+          <p:cNvPr id="62" name="Flowchart: Decision 96"/>
           <p:cNvSpPr/>
           <p:nvPr/>
         </p:nvSpPr>
         <p:spPr>
           <a:xfrm>
-            <a:off x="7034644" y="2685386"/>
+            <a:off x="3208327" y="2409696"/>
             <a:ext cx="236048" cy="173380"/>
           </a:xfrm>
           <a:prstGeom prst="flowChartDecision">
             <a:avLst/>
           </a:prstGeom>
+          <a:noFill/>
+          <a:ln w="19050">
+            <a:solidFill>
+              <a:schemeClr val="accent6">
+                <a:lumMod val="75000"/>
+              </a:schemeClr>
+            </a:solidFill>
+          </a:ln>
+          <a:effectLst/>
+        </p:spPr>
+        <p:style>
+          <a:lnRef idx="1">
+            <a:schemeClr val="accent2"/>
+          </a:lnRef>
+          <a:fillRef idx="2">
+            <a:schemeClr val="accent2"/>
+          </a:fillRef>
+          <a:effectRef idx="1">
+            <a:schemeClr val="accent2"/>
+          </a:effectRef>
+          <a:fontRef idx="minor">
+            <a:schemeClr val="dk1"/>
+          </a:fontRef>
+        </p:style>
+        <p:txBody>
+          <a:bodyPr rtlCol="0" anchor="ctr"/>
+          <a:lstStyle/>
+          <a:p>
+            <a:pPr algn="ctr"/>
+            <a:endParaRPr lang="en-US" sz="1050">
+              <a:solidFill>
+                <a:schemeClr val="bg1"/>
+              </a:solidFill>
+            </a:endParaRPr>
+          </a:p>
+        </p:txBody>
+      </p:sp>
+      <p:sp>
+        <p:nvSpPr>
+          <p:cNvPr id="64" name="Rectangle 8"/>
+          <p:cNvSpPr/>
+          <p:nvPr/>
+        </p:nvSpPr>
+        <p:spPr>
+          <a:xfrm>
+            <a:off x="2644610" y="3464119"/>
+            <a:ext cx="1323049" cy="346760"/>
+          </a:xfrm>
+          <a:prstGeom prst="rect">
+            <a:avLst/>
+          </a:prstGeom>
+          <a:gradFill>
+            <a:gsLst>
+              <a:gs pos="0">
+                <a:schemeClr val="accent6">
+                  <a:lumMod val="60000"/>
+                  <a:lumOff val="40000"/>
+                </a:schemeClr>
+              </a:gs>
+              <a:gs pos="35000">
+                <a:schemeClr val="accent6">
+                  <a:lumMod val="40000"/>
+                  <a:lumOff val="60000"/>
+                </a:schemeClr>
+              </a:gs>
+              <a:gs pos="100000">
+                <a:schemeClr val="accent3">
+                  <a:tint val="15000"/>
+                  <a:satMod val="350000"/>
+                </a:schemeClr>
+              </a:gs>
+            </a:gsLst>
+            <a:lin ang="16200000" scaled="1"/>
+          </a:gradFill>
+          <a:ln w="19050">
+            <a:solidFill>
+              <a:schemeClr val="accent6">
+                <a:lumMod val="75000"/>
+                <a:alpha val="50000"/>
+              </a:schemeClr>
+            </a:solidFill>
+          </a:ln>
+          <a:effectLst/>
+        </p:spPr>
+        <p:style>
+          <a:lnRef idx="1">
+            <a:schemeClr val="accent2"/>
+          </a:lnRef>
+          <a:fillRef idx="2">
+            <a:schemeClr val="accent2"/>
+          </a:fillRef>
+          <a:effectRef idx="1">
+            <a:schemeClr val="accent2"/>
+          </a:effectRef>
+          <a:fontRef idx="minor">
+            <a:schemeClr val="dk1"/>
+          </a:fontRef>
+        </p:style>
+        <p:txBody>
+          <a:bodyPr rtlCol="0" anchor="ctr"/>
+          <a:lstStyle/>
+          <a:p>
+            <a:pPr algn="ctr"/>
+            <a:r>
+              <a:rPr lang="en-US" sz="1050" b="1" dirty="0">
+                <a:solidFill>
+                  <a:srgbClr val="E46C0A"/>
+                </a:solidFill>
+              </a:rPr>
+              <a:t>&lt;&lt;interface&gt;&gt;</a:t>
+            </a:r>
+            <a:br>
+              <a:rPr lang="en-US" sz="1050" b="1" dirty="0">
+                <a:solidFill>
+                  <a:srgbClr val="E46C0A"/>
+                </a:solidFill>
+              </a:rPr>
+            </a:br>
+            <a:r>
+              <a:rPr lang="en-US" sz="1050" b="1" dirty="0" err="1">
+                <a:solidFill>
+                  <a:srgbClr val="E46C0A"/>
+                </a:solidFill>
+              </a:rPr>
+              <a:t>UserPrefsStorage</a:t>
+            </a:r>
+            <a:endParaRPr lang="en-SG" sz="1050" b="1" dirty="0">
+              <a:solidFill>
+                <a:srgbClr val="E46C0A"/>
+              </a:solidFill>
+            </a:endParaRPr>
+          </a:p>
+        </p:txBody>
+      </p:sp>
+      <p:sp>
+        <p:nvSpPr>
+          <p:cNvPr id="66" name="Flowchart: Decision 96"/>
+          <p:cNvSpPr/>
+          <p:nvPr/>
+        </p:nvSpPr>
+        <p:spPr>
+          <a:xfrm rot="5400000">
+            <a:off x="2216639" y="2149421"/>
+            <a:ext cx="236048" cy="173380"/>
+          </a:xfrm>
+          <a:prstGeom prst="flowChartDecision">
+            <a:avLst/>
+          </a:prstGeom>
           <a:solidFill>
-            <a:srgbClr val="7030A0"/>
+            <a:schemeClr val="accent6">
+              <a:lumMod val="75000"/>
+              <a:alpha val="50000"/>
+            </a:schemeClr>
+          </a:solidFill>
+          <a:ln w="0">
+            <a:solidFill>
+              <a:schemeClr val="accent6">
+                <a:lumMod val="75000"/>
+                <a:alpha val="50000"/>
+              </a:schemeClr>
+            </a:solidFill>
+          </a:ln>
+          <a:effectLst/>
+        </p:spPr>
+        <p:style>
+          <a:lnRef idx="1">
+            <a:schemeClr val="accent2"/>
+          </a:lnRef>
+          <a:fillRef idx="2">
+            <a:schemeClr val="accent2"/>
+          </a:fillRef>
+          <a:effectRef idx="1">
+            <a:schemeClr val="accent2"/>
+          </a:effectRef>
+          <a:fontRef idx="minor">
+            <a:schemeClr val="dk1"/>
+          </a:fontRef>
+        </p:style>
+        <p:txBody>
+          <a:bodyPr rtlCol="0" anchor="ctr"/>
+          <a:lstStyle/>
+          <a:p>
+            <a:pPr algn="ctr"/>
+            <a:endParaRPr lang="en-US" sz="1050" b="1">
+              <a:solidFill>
+                <a:srgbClr val="E46C0A"/>
+              </a:solidFill>
+            </a:endParaRPr>
+          </a:p>
+        </p:txBody>
+      </p:sp>
+      <p:sp>
+        <p:nvSpPr>
+          <p:cNvPr id="68" name="Isosceles Triangle 102"/>
+          <p:cNvSpPr/>
+          <p:nvPr/>
+        </p:nvSpPr>
+        <p:spPr>
+          <a:xfrm rot="16200000" flipV="1">
+            <a:off x="2428428" y="3576047"/>
+            <a:ext cx="270504" cy="175523"/>
+          </a:xfrm>
+          <a:prstGeom prst="triangle">
+            <a:avLst/>
+          </a:prstGeom>
+          <a:solidFill>
+            <a:srgbClr val="F1F5E9"/>
           </a:solidFill>
           <a:ln w="19050">
             <a:solidFill>
-              <a:srgbClr val="7030A0"/>
+              <a:schemeClr val="accent6">
+                <a:lumMod val="75000"/>
+                <a:alpha val="50000"/>
+              </a:schemeClr>
             </a:solidFill>
           </a:ln>
           <a:effectLst/>
         </p:spPr>
         <p:style>
           <a:lnRef idx="1">
-            <a:schemeClr val="accent6"/>
+            <a:schemeClr val="accent3"/>
           </a:lnRef>
           <a:fillRef idx="2">
-            <a:schemeClr val="accent6"/>
+            <a:schemeClr val="accent3"/>
           </a:fillRef>
           <a:effectRef idx="1">
-            <a:schemeClr val="accent6"/>
+            <a:schemeClr val="accent3"/>
           </a:effectRef>
           <a:fontRef idx="minor">
             <a:schemeClr val="dk1"/>
@@ -23181,22 +21440,24 @@
           <a:lstStyle/>
           <a:p>
             <a:pPr algn="ctr"/>
-            <a:endParaRPr lang="en-US" sz="1050"/>
+            <a:endParaRPr lang="en-SG" sz="1050" b="1">
+              <a:solidFill>
+                <a:srgbClr val="0070C0"/>
+              </a:solidFill>
+            </a:endParaRPr>
           </a:p>
         </p:txBody>
       </p:sp>
       <p:cxnSp>
         <p:nvCxnSpPr>
-          <p:cNvPr id="97" name="Elbow Connector 63"/>
-          <p:cNvCxnSpPr>
-            <a:stCxn id="99" idx="3"/>
-          </p:cNvCxnSpPr>
+          <p:cNvPr id="69" name="Elbow Connector 188"/>
+          <p:cNvCxnSpPr/>
           <p:nvPr/>
         </p:nvCxnSpPr>
         <p:spPr>
-          <a:xfrm rot="16200000" flipH="1">
-            <a:off x="3279321" y="2485431"/>
-            <a:ext cx="293825" cy="1"/>
+          <a:xfrm>
+            <a:off x="1676400" y="3393630"/>
+            <a:ext cx="782032" cy="274524"/>
           </a:xfrm>
           <a:prstGeom prst="bentConnector3">
             <a:avLst>
@@ -23205,59 +21466,66 @@
           </a:prstGeom>
           <a:ln w="19050">
             <a:solidFill>
-              <a:srgbClr val="7030A0"/>
-            </a:solidFill>
-            <a:prstDash val="sysDot"/>
-            <a:headEnd type="none" w="med" len="med"/>
-            <a:tailEnd type="none" w="med" len="med"/>
+              <a:schemeClr val="accent6">
+                <a:lumMod val="75000"/>
+                <a:alpha val="50000"/>
+              </a:schemeClr>
+            </a:solidFill>
+            <a:prstDash val="sysDash"/>
+            <a:tailEnd type="none"/>
+          </a:ln>
+        </p:spPr>
+        <p:style>
+          <a:lnRef idx="1">
+            <a:schemeClr val="accent1"/>
+          </a:lnRef>
+          <a:fillRef idx="0">
+            <a:schemeClr val="accent1"/>
+          </a:fillRef>
+          <a:effectRef idx="0">
+            <a:schemeClr val="accent1"/>
+          </a:effectRef>
+          <a:fontRef idx="minor">
+            <a:schemeClr val="tx1"/>
+          </a:fontRef>
+        </p:style>
+      </p:cxnSp>
+      <p:sp>
+        <p:nvSpPr>
+          <p:cNvPr id="78" name="Isosceles Triangle 102"/>
+          <p:cNvSpPr/>
+          <p:nvPr/>
+        </p:nvSpPr>
+        <p:spPr>
+          <a:xfrm rot="16200000" flipV="1">
+            <a:off x="2428427" y="3990750"/>
+            <a:ext cx="270504" cy="175523"/>
+          </a:xfrm>
+          <a:prstGeom prst="triangle">
+            <a:avLst/>
+          </a:prstGeom>
+          <a:solidFill>
+            <a:srgbClr val="F1F5E9"/>
+          </a:solidFill>
+          <a:ln w="19050">
+            <a:solidFill>
+              <a:schemeClr val="accent6">
+                <a:lumMod val="75000"/>
+                <a:alpha val="50000"/>
+              </a:schemeClr>
+            </a:solidFill>
           </a:ln>
           <a:effectLst/>
         </p:spPr>
         <p:style>
           <a:lnRef idx="1">
-            <a:schemeClr val="accent2"/>
+            <a:schemeClr val="accent3"/>
           </a:lnRef>
           <a:fillRef idx="2">
-            <a:schemeClr val="accent2"/>
+            <a:schemeClr val="accent3"/>
           </a:fillRef>
           <a:effectRef idx="1">
-            <a:schemeClr val="accent2"/>
-          </a:effectRef>
-          <a:fontRef idx="minor">
-            <a:schemeClr val="dk1"/>
-          </a:fontRef>
-        </p:style>
-      </p:cxnSp>
-      <p:sp>
-        <p:nvSpPr>
-          <p:cNvPr id="99" name="Isosceles Triangle 102"/>
-          <p:cNvSpPr/>
-          <p:nvPr/>
-        </p:nvSpPr>
-        <p:spPr>
-          <a:xfrm rot="10800000" flipV="1">
-            <a:off x="3290981" y="2162997"/>
-            <a:ext cx="270504" cy="175523"/>
-          </a:xfrm>
-          <a:prstGeom prst="triangle">
-            <a:avLst/>
-          </a:prstGeom>
-          <a:ln w="19050">
-            <a:solidFill>
-              <a:srgbClr val="7030A0"/>
-            </a:solidFill>
-          </a:ln>
-          <a:effectLst/>
-        </p:spPr>
-        <p:style>
-          <a:lnRef idx="1">
-            <a:schemeClr val="accent4"/>
-          </a:lnRef>
-          <a:fillRef idx="2">
-            <a:schemeClr val="accent4"/>
-          </a:fillRef>
-          <a:effectRef idx="1">
-            <a:schemeClr val="accent4"/>
+            <a:schemeClr val="accent3"/>
           </a:effectRef>
           <a:fontRef idx="minor">
             <a:schemeClr val="dk1"/>
@@ -23270,42 +21538,110 @@
             <a:pPr algn="ctr"/>
             <a:endParaRPr lang="en-SG" sz="1050" b="1">
               <a:solidFill>
-                <a:srgbClr val="92D050"/>
+                <a:srgbClr val="0070C0"/>
               </a:solidFill>
             </a:endParaRPr>
           </a:p>
         </p:txBody>
       </p:sp>
-      <p:sp>
-        <p:nvSpPr>
-          <p:cNvPr id="100" name="Rectangle 8"/>
+      <p:cxnSp>
+        <p:nvCxnSpPr>
+          <p:cNvPr id="79" name="Elbow Connector 188"/>
+          <p:cNvCxnSpPr>
+            <a:stCxn id="6" idx="1"/>
+          </p:cNvCxnSpPr>
+          <p:nvPr/>
+        </p:nvCxnSpPr>
+        <p:spPr>
+          <a:xfrm rot="16200000" flipH="1">
+            <a:off x="1729997" y="3354422"/>
+            <a:ext cx="501457" cy="955411"/>
+          </a:xfrm>
+          <a:prstGeom prst="bentConnector2">
+            <a:avLst/>
+          </a:prstGeom>
+          <a:ln w="19050">
+            <a:solidFill>
+              <a:schemeClr val="accent6">
+                <a:lumMod val="75000"/>
+                <a:alpha val="50000"/>
+              </a:schemeClr>
+            </a:solidFill>
+            <a:prstDash val="sysDash"/>
+            <a:tailEnd type="none"/>
+          </a:ln>
+        </p:spPr>
+        <p:style>
+          <a:lnRef idx="1">
+            <a:schemeClr val="accent1"/>
+          </a:lnRef>
+          <a:fillRef idx="0">
+            <a:schemeClr val="accent1"/>
+          </a:fillRef>
+          <a:effectRef idx="0">
+            <a:schemeClr val="accent1"/>
+          </a:effectRef>
+          <a:fontRef idx="minor">
+            <a:schemeClr val="tx1"/>
+          </a:fontRef>
+        </p:style>
+      </p:cxnSp>
+      <p:sp>
+        <p:nvSpPr>
+          <p:cNvPr id="85" name="Rectangle 8"/>
           <p:cNvSpPr/>
           <p:nvPr/>
         </p:nvSpPr>
         <p:spPr>
           <a:xfrm>
-            <a:off x="2660303" y="1806470"/>
-            <a:ext cx="1539926" cy="346760"/>
+            <a:off x="2639872" y="2859552"/>
+            <a:ext cx="1323049" cy="346760"/>
           </a:xfrm>
           <a:prstGeom prst="rect">
             <a:avLst/>
           </a:prstGeom>
+          <a:gradFill>
+            <a:gsLst>
+              <a:gs pos="0">
+                <a:schemeClr val="accent6">
+                  <a:lumMod val="60000"/>
+                  <a:lumOff val="40000"/>
+                </a:schemeClr>
+              </a:gs>
+              <a:gs pos="35000">
+                <a:schemeClr val="accent6">
+                  <a:lumMod val="40000"/>
+                  <a:lumOff val="60000"/>
+                </a:schemeClr>
+              </a:gs>
+              <a:gs pos="100000">
+                <a:schemeClr val="accent3">
+                  <a:tint val="15000"/>
+                  <a:satMod val="350000"/>
+                </a:schemeClr>
+              </a:gs>
+            </a:gsLst>
+            <a:lin ang="16200000" scaled="1"/>
+          </a:gradFill>
           <a:ln w="19050">
             <a:solidFill>
-              <a:srgbClr val="7030A0"/>
+              <a:schemeClr val="accent6">
+                <a:lumMod val="75000"/>
+                <a:alpha val="50000"/>
+              </a:schemeClr>
             </a:solidFill>
           </a:ln>
           <a:effectLst/>
         </p:spPr>
         <p:style>
           <a:lnRef idx="1">
-            <a:schemeClr val="accent4"/>
+            <a:schemeClr val="accent2"/>
           </a:lnRef>
           <a:fillRef idx="2">
-            <a:schemeClr val="accent4"/>
+            <a:schemeClr val="accent2"/>
           </a:fillRef>
           <a:effectRef idx="1">
-            <a:schemeClr val="accent4"/>
+            <a:schemeClr val="accent2"/>
           </a:effectRef>
           <a:fontRef idx="minor">
             <a:schemeClr val="dk1"/>
@@ -23317,31 +21653,31 @@
           <a:p>
             <a:pPr algn="ctr"/>
             <a:r>
-              <a:rPr lang="en-US" sz="1050" dirty="0">
+              <a:rPr lang="en-US" sz="1050" b="1" dirty="0" err="1">
                 <a:solidFill>
-                  <a:srgbClr val="7030A0"/>
+                  <a:srgbClr val="E46C0A"/>
                 </a:solidFill>
               </a:rPr>
-              <a:t>&lt;&lt;interface&gt;&gt;</a:t>
+              <a:t>JsonUserPrefs</a:t>
             </a:r>
             <a:br>
-              <a:rPr lang="en-US" sz="1050" dirty="0">
+              <a:rPr lang="en-US" sz="1050" b="1" dirty="0">
                 <a:solidFill>
-                  <a:srgbClr val="7030A0"/>
+                  <a:srgbClr val="E46C0A"/>
                 </a:solidFill>
               </a:rPr>
             </a:br>
             <a:r>
-              <a:rPr lang="en-US" sz="1050" dirty="0" err="1">
+              <a:rPr lang="en-US" sz="1050" b="1" dirty="0">
                 <a:solidFill>
-                  <a:srgbClr val="7030A0"/>
+                  <a:srgbClr val="E46C0A"/>
                 </a:solidFill>
               </a:rPr>
-              <a:t>ReadOnlyTodoList</a:t>
-            </a:r>
-            <a:endParaRPr lang="en-SG" sz="1050" dirty="0">
+              <a:t>Storage</a:t>
+            </a:r>
+            <a:endParaRPr lang="en-SG" sz="1050" b="1" dirty="0">
               <a:solidFill>
-                <a:srgbClr val="7030A0"/>
+                <a:srgbClr val="E46C0A"/>
               </a:solidFill>
             </a:endParaRPr>
           </a:p>
@@ -23349,109 +21685,96 @@
       </p:sp>
       <p:sp>
         <p:nvSpPr>
-          <p:cNvPr id="114" name="TextBox 113"/>
-          <p:cNvSpPr txBox="1"/>
-          <p:nvPr/>
-        </p:nvSpPr>
-        <p:spPr>
-          <a:xfrm rot="16200000">
-            <a:off x="6581354" y="3514530"/>
-            <a:ext cx="881018" cy="261610"/>
+          <p:cNvPr id="86" name="Rectangle 8"/>
+          <p:cNvSpPr/>
+          <p:nvPr/>
+        </p:nvSpPr>
+        <p:spPr>
+          <a:xfrm>
+            <a:off x="2651440" y="2389935"/>
+            <a:ext cx="1323049" cy="346760"/>
           </a:xfrm>
           <a:prstGeom prst="rect">
             <a:avLst/>
           </a:prstGeom>
-          <a:noFill/>
-        </p:spPr>
-        <p:txBody>
-          <a:bodyPr wrap="square" rtlCol="0">
-            <a:spAutoFit/>
-          </a:bodyPr>
-          <a:lstStyle/>
-          <a:p>
-            <a:pPr algn="r"/>
-            <a:r>
-              <a:rPr lang="en-US" sz="1100" dirty="0">
+          <a:gradFill>
+            <a:gsLst>
+              <a:gs pos="0">
+                <a:schemeClr val="accent6">
+                  <a:lumMod val="60000"/>
+                  <a:lumOff val="40000"/>
+                </a:schemeClr>
+              </a:gs>
+              <a:gs pos="35000">
+                <a:schemeClr val="accent6">
+                  <a:lumMod val="40000"/>
+                  <a:lumOff val="60000"/>
+                </a:schemeClr>
+              </a:gs>
+              <a:gs pos="100000">
+                <a:schemeClr val="accent3">
+                  <a:tint val="15000"/>
+                  <a:satMod val="350000"/>
+                </a:schemeClr>
+              </a:gs>
+            </a:gsLst>
+            <a:lin ang="16200000" scaled="1"/>
+          </a:gradFill>
+          <a:ln w="19050">
+            <a:solidFill>
+              <a:schemeClr val="accent6">
+                <a:lumMod val="75000"/>
+                <a:alpha val="50000"/>
+              </a:schemeClr>
+            </a:solidFill>
+          </a:ln>
+          <a:effectLst/>
+        </p:spPr>
+        <p:style>
+          <a:lnRef idx="1">
+            <a:schemeClr val="accent2"/>
+          </a:lnRef>
+          <a:fillRef idx="2">
+            <a:schemeClr val="accent2"/>
+          </a:fillRef>
+          <a:effectRef idx="1">
+            <a:schemeClr val="accent2"/>
+          </a:effectRef>
+          <a:fontRef idx="minor">
+            <a:schemeClr val="dk1"/>
+          </a:fontRef>
+        </p:style>
+        <p:txBody>
+          <a:bodyPr rtlCol="0" anchor="ctr"/>
+          <a:lstStyle/>
+          <a:p>
+            <a:pPr algn="ctr"/>
+            <a:r>
+              <a:rPr lang="en-US" sz="1050" b="1" dirty="0" err="1">
                 <a:solidFill>
-                  <a:srgbClr val="7030A0"/>
+                  <a:srgbClr val="E46C0A"/>
                 </a:solidFill>
               </a:rPr>
-              <a:t>filtered list</a:t>
-            </a:r>
-            <a:endParaRPr lang="en-SG" sz="1100" dirty="0">
-              <a:solidFill>
-                <a:srgbClr val="7030A0"/>
-              </a:solidFill>
-            </a:endParaRPr>
-          </a:p>
-        </p:txBody>
-      </p:sp>
-      <p:sp>
-        <p:nvSpPr>
-          <p:cNvPr id="122" name="Rectangle 8"/>
-          <p:cNvSpPr/>
-          <p:nvPr/>
-        </p:nvSpPr>
-        <p:spPr>
-          <a:xfrm>
-            <a:off x="2057400" y="4239491"/>
-            <a:ext cx="1775949" cy="346760"/>
-          </a:xfrm>
-          <a:prstGeom prst="rect">
-            <a:avLst/>
-          </a:prstGeom>
-          <a:ln w="19050">
-            <a:solidFill>
-              <a:srgbClr val="7030A0"/>
-            </a:solidFill>
-          </a:ln>
-          <a:effectLst/>
-        </p:spPr>
-        <p:style>
-          <a:lnRef idx="1">
-            <a:schemeClr val="accent4"/>
-          </a:lnRef>
-          <a:fillRef idx="2">
-            <a:schemeClr val="accent4"/>
-          </a:fillRef>
-          <a:effectRef idx="1">
-            <a:schemeClr val="accent4"/>
-          </a:effectRef>
-          <a:fontRef idx="minor">
-            <a:schemeClr val="dk1"/>
-          </a:fontRef>
-        </p:style>
-        <p:txBody>
-          <a:bodyPr rtlCol="0" anchor="ctr"/>
-          <a:lstStyle/>
-          <a:p>
-            <a:pPr algn="ctr"/>
-            <a:r>
-              <a:rPr lang="en-US" sz="1050" dirty="0">
+              <a:t>XmlToDoList</a:t>
+            </a:r>
+            <a:br>
+              <a:rPr lang="en-US" sz="1050" b="1" dirty="0">
                 <a:solidFill>
-                  <a:srgbClr val="7030A0"/>
-                </a:solidFill>
-              </a:rPr>
-              <a:t>&lt;&lt;interface&gt;&gt;</a:t>
-            </a:r>
-            <a:br>
-              <a:rPr lang="en-US" sz="1050" dirty="0">
-                <a:solidFill>
-                  <a:srgbClr val="7030A0"/>
+                  <a:srgbClr val="E46C0A"/>
                 </a:solidFill>
               </a:rPr>
             </a:br>
             <a:r>
-              <a:rPr lang="en-US" sz="1050" dirty="0" err="1">
+              <a:rPr lang="en-US" sz="1050" b="1" dirty="0">
                 <a:solidFill>
-                  <a:srgbClr val="7030A0"/>
+                  <a:srgbClr val="E46C0A"/>
                 </a:solidFill>
               </a:rPr>
-              <a:t>UnmodifiableObservableList</a:t>
-            </a:r>
-            <a:endParaRPr lang="en-SG" sz="1050" dirty="0">
+              <a:t>Storage</a:t>
+            </a:r>
+            <a:endParaRPr lang="en-SG" sz="1050" b="1" dirty="0">
               <a:solidFill>
-                <a:srgbClr val="7030A0"/>
+                <a:srgbClr val="E46C0A"/>
               </a:solidFill>
             </a:endParaRPr>
           </a:p>
@@ -23459,28 +21782,117 @@
       </p:sp>
       <p:cxnSp>
         <p:nvCxnSpPr>
-          <p:cNvPr id="124" name="Elbow Connector 122"/>
+          <p:cNvPr id="89" name="Elbow Connector 188"/>
           <p:cNvCxnSpPr>
-            <a:stCxn id="119" idx="1"/>
-            <a:endCxn id="122" idx="1"/>
+            <a:stCxn id="66" idx="3"/>
+            <a:endCxn id="86" idx="1"/>
           </p:cNvCxnSpPr>
           <p:nvPr/>
         </p:nvCxnSpPr>
         <p:spPr>
           <a:xfrm rot="16200000" flipH="1">
-            <a:off x="1364475" y="3719945"/>
-            <a:ext cx="831471" cy="554380"/>
+            <a:off x="2388461" y="2300336"/>
+            <a:ext cx="209180" cy="316777"/>
           </a:xfrm>
           <a:prstGeom prst="bentConnector2">
             <a:avLst/>
           </a:prstGeom>
           <a:ln w="19050">
             <a:solidFill>
-              <a:srgbClr val="7030A0"/>
-            </a:solidFill>
-            <a:prstDash val="sysDot"/>
-            <a:headEnd type="none" w="med" len="med"/>
-            <a:tailEnd type="arrow" w="med" len="med"/>
+              <a:schemeClr val="accent6">
+                <a:lumMod val="75000"/>
+                <a:alpha val="50000"/>
+              </a:schemeClr>
+            </a:solidFill>
+            <a:prstDash val="solid"/>
+            <a:tailEnd type="arrow"/>
+          </a:ln>
+        </p:spPr>
+        <p:style>
+          <a:lnRef idx="1">
+            <a:schemeClr val="accent1"/>
+          </a:lnRef>
+          <a:fillRef idx="0">
+            <a:schemeClr val="accent1"/>
+          </a:fillRef>
+          <a:effectRef idx="0">
+            <a:schemeClr val="accent1"/>
+          </a:effectRef>
+          <a:fontRef idx="minor">
+            <a:schemeClr val="tx1"/>
+          </a:fontRef>
+        </p:style>
+      </p:cxnSp>
+      <p:cxnSp>
+        <p:nvCxnSpPr>
+          <p:cNvPr id="92" name="Elbow Connector 188"/>
+          <p:cNvCxnSpPr>
+            <a:stCxn id="97" idx="3"/>
+            <a:endCxn id="85" idx="1"/>
+          </p:cNvCxnSpPr>
+          <p:nvPr/>
+        </p:nvCxnSpPr>
+        <p:spPr>
+          <a:xfrm rot="16200000" flipH="1">
+            <a:off x="2028293" y="2421352"/>
+            <a:ext cx="679199" cy="543960"/>
+          </a:xfrm>
+          <a:prstGeom prst="bentConnector2">
+            <a:avLst/>
+          </a:prstGeom>
+          <a:ln w="19050">
+            <a:solidFill>
+              <a:schemeClr val="accent6">
+                <a:lumMod val="75000"/>
+                <a:alpha val="50000"/>
+              </a:schemeClr>
+            </a:solidFill>
+            <a:prstDash val="solid"/>
+            <a:tailEnd type="arrow"/>
+          </a:ln>
+        </p:spPr>
+        <p:style>
+          <a:lnRef idx="1">
+            <a:schemeClr val="accent1"/>
+          </a:lnRef>
+          <a:fillRef idx="0">
+            <a:schemeClr val="accent1"/>
+          </a:fillRef>
+          <a:effectRef idx="0">
+            <a:schemeClr val="accent1"/>
+          </a:effectRef>
+          <a:fontRef idx="minor">
+            <a:schemeClr val="tx1"/>
+          </a:fontRef>
+        </p:style>
+      </p:cxnSp>
+      <p:sp>
+        <p:nvSpPr>
+          <p:cNvPr id="97" name="Flowchart: Decision 96"/>
+          <p:cNvSpPr/>
+          <p:nvPr/>
+        </p:nvSpPr>
+        <p:spPr>
+          <a:xfrm rot="5400000">
+            <a:off x="1977888" y="2149019"/>
+            <a:ext cx="236048" cy="173380"/>
+          </a:xfrm>
+          <a:prstGeom prst="flowChartDecision">
+            <a:avLst/>
+          </a:prstGeom>
+          <a:solidFill>
+            <a:schemeClr val="accent6">
+              <a:lumMod val="75000"/>
+              <a:alpha val="50000"/>
+            </a:schemeClr>
+          </a:solidFill>
+          <a:ln w="0">
+            <a:solidFill>
+              <a:schemeClr val="accent6">
+                <a:lumMod val="75000"/>
+                <a:alpha val="50000"/>
+              </a:schemeClr>
+            </a:solidFill>
           </a:ln>
           <a:effectLst/>
         </p:spPr>
@@ -23498,37 +21910,154 @@
             <a:schemeClr val="dk1"/>
           </a:fontRef>
         </p:style>
+        <p:txBody>
+          <a:bodyPr rtlCol="0" anchor="ctr"/>
+          <a:lstStyle/>
+          <a:p>
+            <a:pPr algn="ctr"/>
+            <a:endParaRPr lang="en-US" sz="1050" b="1">
+              <a:solidFill>
+                <a:srgbClr val="E46C0A"/>
+              </a:solidFill>
+            </a:endParaRPr>
+          </a:p>
+        </p:txBody>
+      </p:sp>
+      <p:sp>
+        <p:nvSpPr>
+          <p:cNvPr id="103" name="Isosceles Triangle 102"/>
+          <p:cNvSpPr/>
+          <p:nvPr/>
+        </p:nvSpPr>
+        <p:spPr>
+          <a:xfrm rot="5400000" flipV="1">
+            <a:off x="3921924" y="3587866"/>
+            <a:ext cx="270504" cy="175523"/>
+          </a:xfrm>
+          <a:prstGeom prst="triangle">
+            <a:avLst/>
+          </a:prstGeom>
+          <a:solidFill>
+            <a:srgbClr val="F1F5E9"/>
+          </a:solidFill>
+          <a:ln w="19050">
+            <a:solidFill>
+              <a:schemeClr val="accent6">
+                <a:lumMod val="75000"/>
+                <a:alpha val="50000"/>
+              </a:schemeClr>
+            </a:solidFill>
+          </a:ln>
+          <a:effectLst/>
+        </p:spPr>
+        <p:style>
+          <a:lnRef idx="1">
+            <a:schemeClr val="accent3"/>
+          </a:lnRef>
+          <a:fillRef idx="2">
+            <a:schemeClr val="accent3"/>
+          </a:fillRef>
+          <a:effectRef idx="1">
+            <a:schemeClr val="accent3"/>
+          </a:effectRef>
+          <a:fontRef idx="minor">
+            <a:schemeClr val="dk1"/>
+          </a:fontRef>
+        </p:style>
+        <p:txBody>
+          <a:bodyPr rtlCol="0" anchor="ctr"/>
+          <a:lstStyle/>
+          <a:p>
+            <a:pPr algn="ctr"/>
+            <a:endParaRPr lang="en-SG" sz="1050" b="1">
+              <a:solidFill>
+                <a:srgbClr val="0070C0"/>
+              </a:solidFill>
+            </a:endParaRPr>
+          </a:p>
+        </p:txBody>
+      </p:sp>
+      <p:cxnSp>
+        <p:nvCxnSpPr>
+          <p:cNvPr id="104" name="Elbow Connector 188"/>
+          <p:cNvCxnSpPr>
+            <a:stCxn id="85" idx="3"/>
+            <a:endCxn id="103" idx="3"/>
+          </p:cNvCxnSpPr>
+          <p:nvPr/>
+        </p:nvCxnSpPr>
+        <p:spPr>
+          <a:xfrm>
+            <a:off x="3962921" y="3032932"/>
+            <a:ext cx="182017" cy="642696"/>
+          </a:xfrm>
+          <a:prstGeom prst="bentConnector3">
+            <a:avLst>
+              <a:gd name="adj1" fmla="val 188888"/>
+            </a:avLst>
+          </a:prstGeom>
+          <a:ln w="19050">
+            <a:solidFill>
+              <a:schemeClr val="accent6">
+                <a:lumMod val="75000"/>
+                <a:alpha val="50000"/>
+              </a:schemeClr>
+            </a:solidFill>
+            <a:prstDash val="sysDash"/>
+            <a:tailEnd type="none"/>
+          </a:ln>
+        </p:spPr>
+        <p:style>
+          <a:lnRef idx="1">
+            <a:schemeClr val="accent1"/>
+          </a:lnRef>
+          <a:fillRef idx="0">
+            <a:schemeClr val="accent1"/>
+          </a:fillRef>
+          <a:effectRef idx="0">
+            <a:schemeClr val="accent1"/>
+          </a:effectRef>
+          <a:fontRef idx="minor">
+            <a:schemeClr val="tx1"/>
+          </a:fontRef>
+        </p:style>
       </p:cxnSp>
       <p:sp>
         <p:nvSpPr>
-          <p:cNvPr id="50" name="Rectangle 8"/>
+          <p:cNvPr id="105" name="Isosceles Triangle 102"/>
           <p:cNvSpPr/>
           <p:nvPr/>
         </p:nvSpPr>
         <p:spPr>
-          <a:xfrm>
-            <a:off x="7714090" y="2307345"/>
-            <a:ext cx="839192" cy="285783"/>
-          </a:xfrm>
-          <a:prstGeom prst="rect">
-            <a:avLst/>
-          </a:prstGeom>
+          <a:xfrm rot="5400000" flipV="1">
+            <a:off x="3944485" y="4065212"/>
+            <a:ext cx="270504" cy="175523"/>
+          </a:xfrm>
+          <a:prstGeom prst="triangle">
+            <a:avLst/>
+          </a:prstGeom>
+          <a:solidFill>
+            <a:srgbClr val="F1F5E9"/>
+          </a:solidFill>
           <a:ln w="19050">
             <a:solidFill>
-              <a:srgbClr val="7030A0"/>
+              <a:schemeClr val="accent6">
+                <a:lumMod val="75000"/>
+                <a:alpha val="50000"/>
+              </a:schemeClr>
             </a:solidFill>
           </a:ln>
           <a:effectLst/>
         </p:spPr>
         <p:style>
           <a:lnRef idx="1">
-            <a:schemeClr val="accent4"/>
+            <a:schemeClr val="accent3"/>
           </a:lnRef>
           <a:fillRef idx="2">
-            <a:schemeClr val="accent4"/>
+            <a:schemeClr val="accent3"/>
           </a:fillRef>
           <a:effectRef idx="1">
-            <a:schemeClr val="accent4"/>
+            <a:schemeClr val="accent3"/>
           </a:effectRef>
           <a:fontRef idx="minor">
             <a:schemeClr val="dk1"/>
@@ -23539,44 +22068,332 @@
           <a:lstStyle/>
           <a:p>
             <a:pPr algn="ctr"/>
-            <a:r>
-              <a:rPr lang="en-US" sz="1050" dirty="0">
+            <a:endParaRPr lang="en-SG" sz="1050" b="1">
+              <a:solidFill>
+                <a:srgbClr val="0070C0"/>
+              </a:solidFill>
+            </a:endParaRPr>
+          </a:p>
+        </p:txBody>
+      </p:sp>
+      <p:cxnSp>
+        <p:nvCxnSpPr>
+          <p:cNvPr id="106" name="Elbow Connector 188"/>
+          <p:cNvCxnSpPr>
+            <a:stCxn id="86" idx="3"/>
+            <a:endCxn id="105" idx="3"/>
+          </p:cNvCxnSpPr>
+          <p:nvPr/>
+        </p:nvCxnSpPr>
+        <p:spPr>
+          <a:xfrm>
+            <a:off x="3974489" y="2563315"/>
+            <a:ext cx="193010" cy="1589659"/>
+          </a:xfrm>
+          <a:prstGeom prst="bentConnector3">
+            <a:avLst>
+              <a:gd name="adj1" fmla="val 243044"/>
+            </a:avLst>
+          </a:prstGeom>
+          <a:ln w="19050">
+            <a:solidFill>
+              <a:schemeClr val="accent6">
+                <a:lumMod val="75000"/>
+                <a:alpha val="50000"/>
+              </a:schemeClr>
+            </a:solidFill>
+            <a:prstDash val="sysDash"/>
+            <a:tailEnd type="none"/>
+          </a:ln>
+        </p:spPr>
+        <p:style>
+          <a:lnRef idx="1">
+            <a:schemeClr val="accent1"/>
+          </a:lnRef>
+          <a:fillRef idx="0">
+            <a:schemeClr val="accent1"/>
+          </a:fillRef>
+          <a:effectRef idx="0">
+            <a:schemeClr val="accent1"/>
+          </a:effectRef>
+          <a:fontRef idx="minor">
+            <a:schemeClr val="tx1"/>
+          </a:fontRef>
+        </p:style>
+      </p:cxnSp>
+      <p:sp>
+        <p:nvSpPr>
+          <p:cNvPr id="113" name="Rectangle 65"/>
+          <p:cNvSpPr/>
+          <p:nvPr/>
+        </p:nvSpPr>
+        <p:spPr>
+          <a:xfrm rot="16200000">
+            <a:off x="6194208" y="2559174"/>
+            <a:ext cx="1371599" cy="328045"/>
+          </a:xfrm>
+          <a:prstGeom prst="roundRect">
+            <a:avLst/>
+          </a:prstGeom>
+          <a:solidFill>
+            <a:schemeClr val="accent4">
+              <a:lumMod val="20000"/>
+              <a:lumOff val="80000"/>
+            </a:schemeClr>
+          </a:solidFill>
+          <a:ln w="19050">
+            <a:noFill/>
+          </a:ln>
+          <a:effectLst/>
+        </p:spPr>
+        <p:style>
+          <a:lnRef idx="1">
+            <a:schemeClr val="accent2"/>
+          </a:lnRef>
+          <a:fillRef idx="2">
+            <a:schemeClr val="accent2"/>
+          </a:fillRef>
+          <a:effectRef idx="1">
+            <a:schemeClr val="accent2"/>
+          </a:effectRef>
+          <a:fontRef idx="minor">
+            <a:schemeClr val="dk1"/>
+          </a:fontRef>
+        </p:style>
+        <p:txBody>
+          <a:bodyPr rtlCol="0" anchor="ctr"/>
+          <a:lstStyle/>
+          <a:p>
+            <a:pPr algn="ctr"/>
+            <a:r>
+              <a:rPr lang="en-US" sz="1100" b="1" dirty="0">
                 <a:solidFill>
-                  <a:srgbClr val="7030A0"/>
+                  <a:schemeClr val="bg1"/>
                 </a:solidFill>
               </a:rPr>
-              <a:t>Title</a:t>
-            </a:r>
-            <a:endParaRPr lang="en-SG" sz="1050" dirty="0">
+              <a:t>Model</a:t>
+            </a:r>
+            <a:endParaRPr lang="en-SG" sz="1100" b="1" dirty="0">
               <a:solidFill>
-                <a:srgbClr val="7030A0"/>
+                <a:schemeClr val="bg1"/>
               </a:solidFill>
             </a:endParaRPr>
           </a:p>
         </p:txBody>
       </p:sp>
+      <p:sp>
+        <p:nvSpPr>
+          <p:cNvPr id="114" name="Rectangle 11"/>
+          <p:cNvSpPr/>
+          <p:nvPr/>
+        </p:nvSpPr>
+        <p:spPr>
+          <a:xfrm>
+            <a:off x="3326351" y="1839118"/>
+            <a:ext cx="1093635" cy="236841"/>
+          </a:xfrm>
+          <a:prstGeom prst="rect">
+            <a:avLst/>
+          </a:prstGeom>
+          <a:gradFill>
+            <a:gsLst>
+              <a:gs pos="0">
+                <a:schemeClr val="accent6">
+                  <a:lumMod val="60000"/>
+                  <a:lumOff val="40000"/>
+                </a:schemeClr>
+              </a:gs>
+              <a:gs pos="35000">
+                <a:schemeClr val="accent6">
+                  <a:lumMod val="40000"/>
+                  <a:lumOff val="60000"/>
+                </a:schemeClr>
+              </a:gs>
+              <a:gs pos="100000">
+                <a:schemeClr val="accent3">
+                  <a:tint val="15000"/>
+                  <a:satMod val="350000"/>
+                </a:schemeClr>
+              </a:gs>
+            </a:gsLst>
+            <a:lin ang="16200000" scaled="1"/>
+          </a:gradFill>
+          <a:ln w="19050">
+            <a:solidFill>
+              <a:schemeClr val="accent6">
+                <a:lumMod val="75000"/>
+                <a:alpha val="50000"/>
+              </a:schemeClr>
+            </a:solidFill>
+          </a:ln>
+          <a:effectLst/>
+        </p:spPr>
+        <p:style>
+          <a:lnRef idx="1">
+            <a:schemeClr val="accent3"/>
+          </a:lnRef>
+          <a:fillRef idx="2">
+            <a:schemeClr val="accent3"/>
+          </a:fillRef>
+          <a:effectRef idx="1">
+            <a:schemeClr val="accent3"/>
+          </a:effectRef>
+          <a:fontRef idx="minor">
+            <a:schemeClr val="dk1"/>
+          </a:fontRef>
+        </p:style>
+        <p:txBody>
+          <a:bodyPr rtlCol="0" anchor="ctr"/>
+          <a:lstStyle/>
+          <a:p>
+            <a:pPr algn="ctr"/>
+            <a:r>
+              <a:rPr lang="en-US" sz="1050" b="1" dirty="0" err="1">
+                <a:solidFill>
+                  <a:srgbClr val="E46C0A"/>
+                </a:solidFill>
+              </a:rPr>
+              <a:t>XmlFileStorage</a:t>
+            </a:r>
+            <a:endParaRPr lang="en-SG" sz="1050" b="1" dirty="0">
+              <a:solidFill>
+                <a:srgbClr val="E46C0A"/>
+              </a:solidFill>
+            </a:endParaRPr>
+          </a:p>
+        </p:txBody>
+      </p:sp>
       <p:cxnSp>
         <p:nvCxnSpPr>
-          <p:cNvPr id="52" name="Elbow Connector 78"/>
+          <p:cNvPr id="115" name="Elbow Connector 77"/>
           <p:cNvCxnSpPr>
-            <a:endCxn id="50" idx="1"/>
+            <a:stCxn id="86" idx="0"/>
+            <a:endCxn id="114" idx="2"/>
           </p:cNvCxnSpPr>
           <p:nvPr/>
         </p:nvCxnSpPr>
         <p:spPr>
-          <a:xfrm flipV="1">
-            <a:off x="7279688" y="2450237"/>
-            <a:ext cx="434402" cy="327762"/>
+          <a:xfrm rot="5400000" flipH="1" flipV="1">
+            <a:off x="3436079" y="1952845"/>
+            <a:ext cx="313976" cy="560204"/>
           </a:xfrm>
           <a:prstGeom prst="bentConnector3">
-            <a:avLst/>
+            <a:avLst>
+              <a:gd name="adj1" fmla="val 50000"/>
+            </a:avLst>
           </a:prstGeom>
           <a:ln w="19050">
             <a:solidFill>
-              <a:srgbClr val="7030A0"/>
-            </a:solidFill>
-            <a:headEnd type="none" w="med" len="med"/>
-            <a:tailEnd type="arrow" w="med" len="med"/>
+              <a:schemeClr val="accent6">
+                <a:lumMod val="75000"/>
+                <a:alpha val="50000"/>
+              </a:schemeClr>
+            </a:solidFill>
+            <a:prstDash val="sysDash"/>
+            <a:tailEnd type="arrow"/>
+          </a:ln>
+        </p:spPr>
+        <p:style>
+          <a:lnRef idx="1">
+            <a:schemeClr val="accent1"/>
+          </a:lnRef>
+          <a:fillRef idx="0">
+            <a:schemeClr val="accent1"/>
+          </a:fillRef>
+          <a:effectRef idx="0">
+            <a:schemeClr val="accent1"/>
+          </a:effectRef>
+          <a:fontRef idx="minor">
+            <a:schemeClr val="tx1"/>
+          </a:fontRef>
+        </p:style>
+      </p:cxnSp>
+      <p:cxnSp>
+        <p:nvCxnSpPr>
+          <p:cNvPr id="130" name="Elbow Connector 77"/>
+          <p:cNvCxnSpPr>
+            <a:endCxn id="146" idx="0"/>
+          </p:cNvCxnSpPr>
+          <p:nvPr/>
+        </p:nvCxnSpPr>
+        <p:spPr>
+          <a:xfrm>
+            <a:off x="3974488" y="2444343"/>
+            <a:ext cx="1296706" cy="626931"/>
+          </a:xfrm>
+          <a:prstGeom prst="bentConnector2">
+            <a:avLst/>
+          </a:prstGeom>
+          <a:ln w="19050">
+            <a:solidFill>
+              <a:schemeClr val="accent6">
+                <a:lumMod val="75000"/>
+                <a:alpha val="50000"/>
+              </a:schemeClr>
+            </a:solidFill>
+            <a:prstDash val="sysDash"/>
+            <a:tailEnd type="arrow"/>
+          </a:ln>
+        </p:spPr>
+        <p:style>
+          <a:lnRef idx="1">
+            <a:schemeClr val="accent1"/>
+          </a:lnRef>
+          <a:fillRef idx="0">
+            <a:schemeClr val="accent1"/>
+          </a:fillRef>
+          <a:effectRef idx="0">
+            <a:schemeClr val="accent1"/>
+          </a:effectRef>
+          <a:fontRef idx="minor">
+            <a:schemeClr val="tx1"/>
+          </a:fontRef>
+        </p:style>
+      </p:cxnSp>
+      <p:sp>
+        <p:nvSpPr>
+          <p:cNvPr id="146" name="Rectangle 8"/>
+          <p:cNvSpPr/>
+          <p:nvPr/>
+        </p:nvSpPr>
+        <p:spPr>
+          <a:xfrm>
+            <a:off x="4749100" y="3071274"/>
+            <a:ext cx="1044188" cy="346760"/>
+          </a:xfrm>
+          <a:prstGeom prst="rect">
+            <a:avLst/>
+          </a:prstGeom>
+          <a:gradFill>
+            <a:gsLst>
+              <a:gs pos="0">
+                <a:schemeClr val="accent6">
+                  <a:lumMod val="60000"/>
+                  <a:lumOff val="40000"/>
+                </a:schemeClr>
+              </a:gs>
+              <a:gs pos="35000">
+                <a:schemeClr val="accent6">
+                  <a:lumMod val="40000"/>
+                  <a:lumOff val="60000"/>
+                </a:schemeClr>
+              </a:gs>
+              <a:gs pos="100000">
+                <a:schemeClr val="accent3">
+                  <a:tint val="15000"/>
+                  <a:satMod val="350000"/>
+                </a:schemeClr>
+              </a:gs>
+            </a:gsLst>
+            <a:lin ang="16200000" scaled="1"/>
+          </a:gradFill>
+          <a:ln w="19050">
+            <a:solidFill>
+              <a:schemeClr val="accent6">
+                <a:lumMod val="75000"/>
+                <a:alpha val="50000"/>
+              </a:schemeClr>
+            </a:solidFill>
           </a:ln>
           <a:effectLst/>
         </p:spPr>
@@ -23594,154 +22411,247 @@
             <a:schemeClr val="dk1"/>
           </a:fontRef>
         </p:style>
-      </p:cxnSp>
-      <p:sp>
-        <p:nvSpPr>
-          <p:cNvPr id="54" name="Rectangle 8"/>
-          <p:cNvSpPr/>
-          <p:nvPr/>
-        </p:nvSpPr>
-        <p:spPr>
-          <a:xfrm>
-            <a:off x="7714090" y="2630323"/>
-            <a:ext cx="839192" cy="285783"/>
-          </a:xfrm>
-          <a:prstGeom prst="rect">
-            <a:avLst/>
-          </a:prstGeom>
-          <a:ln w="19050">
-            <a:solidFill>
-              <a:srgbClr val="7030A0"/>
-            </a:solidFill>
-          </a:ln>
-          <a:effectLst/>
-        </p:spPr>
-        <p:style>
-          <a:lnRef idx="1">
-            <a:schemeClr val="accent4"/>
-          </a:lnRef>
-          <a:fillRef idx="2">
-            <a:schemeClr val="accent4"/>
-          </a:fillRef>
-          <a:effectRef idx="1">
-            <a:schemeClr val="accent4"/>
-          </a:effectRef>
-          <a:fontRef idx="minor">
-            <a:schemeClr val="dk1"/>
-          </a:fontRef>
-        </p:style>
         <p:txBody>
           <a:bodyPr rtlCol="0" anchor="ctr"/>
           <a:lstStyle/>
           <a:p>
             <a:pPr algn="ctr"/>
             <a:r>
-              <a:rPr lang="en-US" sz="1050" dirty="0" err="1">
+              <a:rPr lang="en-US" sz="1050" b="1" dirty="0" err="1">
                 <a:solidFill>
-                  <a:srgbClr val="7030A0"/>
+                  <a:srgbClr val="E46C0A"/>
                 </a:solidFill>
               </a:rPr>
-              <a:t>DueDate</a:t>
-            </a:r>
-            <a:endParaRPr lang="en-SG" sz="1050" dirty="0">
+              <a:t>XmlSerializableToDoList</a:t>
+            </a:r>
+            <a:endParaRPr lang="en-SG" sz="1050" b="1" dirty="0">
               <a:solidFill>
-                <a:srgbClr val="7030A0"/>
+                <a:srgbClr val="E46C0A"/>
               </a:solidFill>
             </a:endParaRPr>
           </a:p>
         </p:txBody>
       </p:sp>
+      <p:sp>
+        <p:nvSpPr>
+          <p:cNvPr id="147" name="Rectangle 8"/>
+          <p:cNvSpPr/>
+          <p:nvPr/>
+        </p:nvSpPr>
+        <p:spPr>
+          <a:xfrm>
+            <a:off x="4726879" y="4005398"/>
+            <a:ext cx="911921" cy="346760"/>
+          </a:xfrm>
+          <a:prstGeom prst="rect">
+            <a:avLst/>
+          </a:prstGeom>
+          <a:gradFill>
+            <a:gsLst>
+              <a:gs pos="0">
+                <a:schemeClr val="accent6">
+                  <a:lumMod val="60000"/>
+                  <a:lumOff val="40000"/>
+                </a:schemeClr>
+              </a:gs>
+              <a:gs pos="35000">
+                <a:schemeClr val="accent6">
+                  <a:lumMod val="40000"/>
+                  <a:lumOff val="60000"/>
+                </a:schemeClr>
+              </a:gs>
+              <a:gs pos="100000">
+                <a:schemeClr val="accent3">
+                  <a:tint val="15000"/>
+                  <a:satMod val="350000"/>
+                </a:schemeClr>
+              </a:gs>
+            </a:gsLst>
+            <a:lin ang="16200000" scaled="1"/>
+          </a:gradFill>
+          <a:ln w="19050">
+            <a:solidFill>
+              <a:schemeClr val="accent6">
+                <a:lumMod val="75000"/>
+                <a:alpha val="50000"/>
+              </a:schemeClr>
+            </a:solidFill>
+          </a:ln>
+          <a:effectLst/>
+        </p:spPr>
+        <p:style>
+          <a:lnRef idx="1">
+            <a:schemeClr val="accent2"/>
+          </a:lnRef>
+          <a:fillRef idx="2">
+            <a:schemeClr val="accent2"/>
+          </a:fillRef>
+          <a:effectRef idx="1">
+            <a:schemeClr val="accent2"/>
+          </a:effectRef>
+          <a:fontRef idx="minor">
+            <a:schemeClr val="dk1"/>
+          </a:fontRef>
+        </p:style>
+        <p:txBody>
+          <a:bodyPr rtlCol="0" anchor="ctr"/>
+          <a:lstStyle/>
+          <a:p>
+            <a:pPr algn="ctr"/>
+            <a:r>
+              <a:rPr lang="en-SG" sz="1050" b="1" dirty="0" err="1">
+                <a:solidFill>
+                  <a:srgbClr val="E46C0A"/>
+                </a:solidFill>
+              </a:rPr>
+              <a:t>XmlAdaptedToDo</a:t>
+            </a:r>
+            <a:endParaRPr lang="en-SG" sz="1050" b="1" dirty="0">
+              <a:solidFill>
+                <a:srgbClr val="E46C0A"/>
+              </a:solidFill>
+            </a:endParaRPr>
+          </a:p>
+        </p:txBody>
+      </p:sp>
+      <p:sp>
+        <p:nvSpPr>
+          <p:cNvPr id="148" name="Flowchart: Decision 96"/>
+          <p:cNvSpPr/>
+          <p:nvPr/>
+        </p:nvSpPr>
+        <p:spPr>
+          <a:xfrm rot="5400000">
+            <a:off x="5224232" y="3463440"/>
+            <a:ext cx="236048" cy="173380"/>
+          </a:xfrm>
+          <a:prstGeom prst="flowChartDecision">
+            <a:avLst/>
+          </a:prstGeom>
+          <a:solidFill>
+            <a:schemeClr val="accent6">
+              <a:lumMod val="75000"/>
+              <a:alpha val="50000"/>
+            </a:schemeClr>
+          </a:solidFill>
+          <a:ln w="0">
+            <a:solidFill>
+              <a:schemeClr val="accent6">
+                <a:lumMod val="75000"/>
+                <a:alpha val="50000"/>
+              </a:schemeClr>
+            </a:solidFill>
+          </a:ln>
+          <a:effectLst/>
+        </p:spPr>
+        <p:style>
+          <a:lnRef idx="1">
+            <a:schemeClr val="accent2"/>
+          </a:lnRef>
+          <a:fillRef idx="2">
+            <a:schemeClr val="accent2"/>
+          </a:fillRef>
+          <a:effectRef idx="1">
+            <a:schemeClr val="accent2"/>
+          </a:effectRef>
+          <a:fontRef idx="minor">
+            <a:schemeClr val="dk1"/>
+          </a:fontRef>
+        </p:style>
+        <p:txBody>
+          <a:bodyPr rtlCol="0" anchor="ctr"/>
+          <a:lstStyle/>
+          <a:p>
+            <a:pPr algn="ctr"/>
+            <a:endParaRPr lang="en-US" sz="1050">
+              <a:solidFill>
+                <a:schemeClr val="bg1"/>
+              </a:solidFill>
+            </a:endParaRPr>
+          </a:p>
+        </p:txBody>
+      </p:sp>
       <p:cxnSp>
         <p:nvCxnSpPr>
-          <p:cNvPr id="56" name="Elbow Connector 80"/>
+          <p:cNvPr id="149" name="Elbow Connector 188"/>
           <p:cNvCxnSpPr>
-            <a:endCxn id="54" idx="1"/>
+            <a:stCxn id="148" idx="3"/>
+            <a:endCxn id="147" idx="0"/>
           </p:cNvCxnSpPr>
           <p:nvPr/>
         </p:nvCxnSpPr>
         <p:spPr>
-          <a:xfrm flipV="1">
-            <a:off x="7279688" y="2773215"/>
-            <a:ext cx="434402" cy="4784"/>
+          <a:xfrm rot="5400000">
+            <a:off x="5093926" y="3757068"/>
+            <a:ext cx="337244" cy="159416"/>
           </a:xfrm>
           <a:prstGeom prst="bentConnector3">
-            <a:avLst/>
+            <a:avLst>
+              <a:gd name="adj1" fmla="val 50000"/>
+            </a:avLst>
           </a:prstGeom>
           <a:ln w="19050">
             <a:solidFill>
-              <a:srgbClr val="7030A0"/>
-            </a:solidFill>
-            <a:headEnd type="none" w="med" len="med"/>
-            <a:tailEnd type="arrow" w="med" len="med"/>
-          </a:ln>
-          <a:effectLst/>
-        </p:spPr>
-        <p:style>
-          <a:lnRef idx="1">
-            <a:schemeClr val="accent2"/>
-          </a:lnRef>
-          <a:fillRef idx="2">
-            <a:schemeClr val="accent2"/>
-          </a:fillRef>
-          <a:effectRef idx="1">
-            <a:schemeClr val="accent2"/>
-          </a:effectRef>
-          <a:fontRef idx="minor">
-            <a:schemeClr val="dk1"/>
+              <a:schemeClr val="accent6">
+                <a:lumMod val="75000"/>
+                <a:alpha val="50000"/>
+              </a:schemeClr>
+            </a:solidFill>
+            <a:prstDash val="solid"/>
+            <a:tailEnd type="arrow"/>
+          </a:ln>
+        </p:spPr>
+        <p:style>
+          <a:lnRef idx="1">
+            <a:schemeClr val="accent1"/>
+          </a:lnRef>
+          <a:fillRef idx="0">
+            <a:schemeClr val="accent1"/>
+          </a:fillRef>
+          <a:effectRef idx="0">
+            <a:schemeClr val="accent1"/>
+          </a:effectRef>
+          <a:fontRef idx="minor">
+            <a:schemeClr val="tx1"/>
           </a:fontRef>
         </p:style>
       </p:cxnSp>
       <p:sp>
         <p:nvSpPr>
-          <p:cNvPr id="60" name="Rectangle 8"/>
-          <p:cNvSpPr/>
-          <p:nvPr/>
-        </p:nvSpPr>
-        <p:spPr>
-          <a:xfrm>
-            <a:off x="7714090" y="2953301"/>
-            <a:ext cx="839192" cy="285783"/>
+          <p:cNvPr id="166" name="TextBox 264"/>
+          <p:cNvSpPr txBox="1"/>
+          <p:nvPr/>
+        </p:nvSpPr>
+        <p:spPr>
+          <a:xfrm>
+            <a:off x="5173795" y="3695463"/>
+            <a:ext cx="728806" cy="230832"/>
           </a:xfrm>
           <a:prstGeom prst="rect">
             <a:avLst/>
           </a:prstGeom>
-          <a:ln w="19050">
-            <a:solidFill>
-              <a:srgbClr val="7030A0"/>
-            </a:solidFill>
-          </a:ln>
-          <a:effectLst/>
-        </p:spPr>
-        <p:style>
-          <a:lnRef idx="1">
-            <a:schemeClr val="accent4"/>
-          </a:lnRef>
-          <a:fillRef idx="2">
-            <a:schemeClr val="accent4"/>
-          </a:fillRef>
-          <a:effectRef idx="1">
-            <a:schemeClr val="accent4"/>
-          </a:effectRef>
-          <a:fontRef idx="minor">
-            <a:schemeClr val="dk1"/>
-          </a:fontRef>
-        </p:style>
-        <p:txBody>
-          <a:bodyPr rtlCol="0" anchor="ctr"/>
-          <a:lstStyle/>
-          <a:p>
-            <a:pPr algn="ctr"/>
-            <a:r>
-              <a:rPr lang="en-US" sz="1050" dirty="0" err="1">
+          <a:noFill/>
+          <a:ln>
+            <a:noFill/>
+          </a:ln>
+        </p:spPr>
+        <p:txBody>
+          <a:bodyPr wrap="square" lIns="0" tIns="0" rIns="0" bIns="0" rtlCol="0">
+            <a:noAutofit/>
+          </a:bodyPr>
+          <a:lstStyle/>
+          <a:p>
+            <a:r>
+              <a:rPr lang="en-US" sz="1100" dirty="0">
                 <a:solidFill>
-                  <a:srgbClr val="7030A0"/>
+                  <a:srgbClr val="E46C0A"/>
                 </a:solidFill>
               </a:rPr>
-              <a:t>DateRange</a:t>
-            </a:r>
-            <a:endParaRPr lang="en-SG" sz="1050" dirty="0">
+              <a:t>*</a:t>
+            </a:r>
+            <a:endParaRPr lang="en-SG" sz="1100" dirty="0">
               <a:solidFill>
-                <a:srgbClr val="7030A0"/>
+                <a:srgbClr val="E46C0A"/>
               </a:solidFill>
             </a:endParaRPr>
           </a:p>
@@ -23749,48 +22659,97 @@
       </p:sp>
       <p:cxnSp>
         <p:nvCxnSpPr>
-          <p:cNvPr id="61" name="Elbow Connector 83"/>
+          <p:cNvPr id="168" name="Elbow Connector 77"/>
           <p:cNvCxnSpPr>
-            <a:endCxn id="60" idx="1"/>
+            <a:stCxn id="146" idx="3"/>
+            <a:endCxn id="113" idx="0"/>
           </p:cNvCxnSpPr>
           <p:nvPr/>
         </p:nvCxnSpPr>
         <p:spPr>
-          <a:xfrm>
-            <a:off x="7279688" y="2777998"/>
-            <a:ext cx="434402" cy="318195"/>
+          <a:xfrm flipV="1">
+            <a:off x="5793288" y="2723196"/>
+            <a:ext cx="922697" cy="521458"/>
           </a:xfrm>
           <a:prstGeom prst="bentConnector3">
-            <a:avLst/>
+            <a:avLst>
+              <a:gd name="adj1" fmla="val 26257"/>
+            </a:avLst>
           </a:prstGeom>
           <a:ln w="19050">
             <a:solidFill>
-              <a:srgbClr val="7030A0"/>
-            </a:solidFill>
-            <a:headEnd type="none" w="med" len="med"/>
-            <a:tailEnd type="arrow" w="med" len="med"/>
-          </a:ln>
-          <a:effectLst/>
-        </p:spPr>
-        <p:style>
-          <a:lnRef idx="1">
-            <a:schemeClr val="accent2"/>
-          </a:lnRef>
-          <a:fillRef idx="2">
-            <a:schemeClr val="accent2"/>
-          </a:fillRef>
-          <a:effectRef idx="1">
-            <a:schemeClr val="accent2"/>
-          </a:effectRef>
-          <a:fontRef idx="minor">
-            <a:schemeClr val="dk1"/>
+              <a:schemeClr val="accent6">
+                <a:lumMod val="75000"/>
+                <a:alpha val="50000"/>
+              </a:schemeClr>
+            </a:solidFill>
+            <a:prstDash val="sysDash"/>
+            <a:tailEnd type="arrow"/>
+          </a:ln>
+        </p:spPr>
+        <p:style>
+          <a:lnRef idx="1">
+            <a:schemeClr val="accent1"/>
+          </a:lnRef>
+          <a:fillRef idx="0">
+            <a:schemeClr val="accent1"/>
+          </a:fillRef>
+          <a:effectRef idx="0">
+            <a:schemeClr val="accent1"/>
+          </a:effectRef>
+          <a:fontRef idx="minor">
+            <a:schemeClr val="tx1"/>
+          </a:fontRef>
+        </p:style>
+      </p:cxnSp>
+      <p:cxnSp>
+        <p:nvCxnSpPr>
+          <p:cNvPr id="182" name="Elbow Connector 77"/>
+          <p:cNvCxnSpPr>
+            <a:stCxn id="147" idx="3"/>
+          </p:cNvCxnSpPr>
+          <p:nvPr/>
+        </p:nvCxnSpPr>
+        <p:spPr>
+          <a:xfrm flipV="1">
+            <a:off x="5638800" y="3206312"/>
+            <a:ext cx="1074225" cy="972466"/>
+          </a:xfrm>
+          <a:prstGeom prst="bentConnector3">
+            <a:avLst>
+              <a:gd name="adj1" fmla="val 50000"/>
+            </a:avLst>
+          </a:prstGeom>
+          <a:ln w="19050">
+            <a:solidFill>
+              <a:schemeClr val="accent6">
+                <a:lumMod val="75000"/>
+                <a:alpha val="50000"/>
+              </a:schemeClr>
+            </a:solidFill>
+            <a:prstDash val="sysDash"/>
+            <a:tailEnd type="arrow"/>
+          </a:ln>
+        </p:spPr>
+        <p:style>
+          <a:lnRef idx="1">
+            <a:schemeClr val="accent1"/>
+          </a:lnRef>
+          <a:fillRef idx="0">
+            <a:schemeClr val="accent1"/>
+          </a:fillRef>
+          <a:effectRef idx="0">
+            <a:schemeClr val="accent1"/>
+          </a:effectRef>
+          <a:fontRef idx="minor">
+            <a:schemeClr val="tx1"/>
           </a:fontRef>
         </p:style>
       </p:cxnSp>
     </p:spTree>
     <p:extLst>
       <p:ext uri="{BB962C8B-B14F-4D97-AF65-F5344CB8AC3E}">
-        <p14:creationId xmlns:p14="http://schemas.microsoft.com/office/powerpoint/2010/main" val="2396968029"/>
+        <p14:creationId xmlns:p14="http://schemas.microsoft.com/office/powerpoint/2010/main" val="2906714921"/>
       </p:ext>
     </p:extLst>
   </p:cSld>

</xml_diff>